<commit_message>
Enhance solution briefing template with metadata-driven configuration and universal logo placement
- Add YAML frontmatter metadata for flexible presentation configuration (presentation_title, solution_name, presenter_name, client_logo, footer_logo_left, footer_logo_right)
- Remove slide number prefixes from titles (e.g., "Slide 2:" -> clean titles)
- Implement universal footer logo placement across all slides (consulting company left, EO Framework right)
- Add client logo to title slide top center with current date auto-generation
- Update solution-doc-builder.py with metadata parsing and dynamic logo insertion
- Streamline solution briefing from 15 to 7 slides with talking points for remaining content
- Convert Timeline and Success Stories to table format for better presentation

🤖 Generated with [Claude Code](https://claude.com/claude-code)

Co-Authored-By: Claude <noreply@anthropic.com>
</commit_message>
<xml_diff>
--- a/solution-template/sample-provider/sample-category/sample-solution/presales/solution-briefing.pptx
+++ b/solution-template/sample-provider/sample-category/sample-solution/presales/solution-briefing.pptx
@@ -15,18 +15,6 @@
     <p:sldId id="260" r:id="rId11"/>
     <p:sldId id="261" r:id="rId12"/>
     <p:sldId id="262" r:id="rId13"/>
-    <p:sldId id="263" r:id="rId14"/>
-    <p:sldId id="264" r:id="rId15"/>
-    <p:sldId id="265" r:id="rId16"/>
-    <p:sldId id="266" r:id="rId17"/>
-    <p:sldId id="267" r:id="rId18"/>
-    <p:sldId id="268" r:id="rId19"/>
-    <p:sldId id="269" r:id="rId20"/>
-    <p:sldId id="270" r:id="rId21"/>
-    <p:sldId id="271" r:id="rId22"/>
-    <p:sldId id="272" r:id="rId23"/>
-    <p:sldId id="273" r:id="rId24"/>
-    <p:sldId id="274" r:id="rId25"/>
   </p:sldIdLst>
   <p:sldSz cx="9144000" cy="5143500" type="screen16x9"/>
   <p:notesSz cx="5143500" cy="9144000"/>
@@ -3251,7 +3239,7 @@
           <a:lstStyle/>
           <a:p>
             <a:r>
-              <a:t>Solution Briefing Template</a:t>
+              <a:t>Solution Briefing</a:t>
             </a:r>
           </a:p>
         </p:txBody>
@@ -3291,7 +3279,7 @@
           <a:lstStyle/>
           <a:p>
             <a:r>
-              <a:t>**[Solution Name] Business Proposal**</a:t>
+              <a:t>Test Solution</a:t>
             </a:r>
           </a:p>
         </p:txBody>
@@ -3312,1038 +3300,34 @@
           <a:lstStyle/>
           <a:p>
             <a:r>
-              <a:t>EO Framework Team | November 09, 2025</a:t>
-            </a:r>
-          </a:p>
-        </p:txBody>
-      </p:sp>
-    </p:spTree>
-  </p:cSld>
-  <p:clrMapOvr>
-    <a:masterClrMapping/>
-  </p:clrMapOvr>
-</p:sld>
-</file>
-
-<file path=ppt/slides/slide10.xml><?xml version="1.0" encoding="utf-8"?>
-<p:sld xmlns:a="http://schemas.openxmlformats.org/drawingml/2006/main" xmlns:p="http://schemas.openxmlformats.org/presentationml/2006/main" xmlns:r="http://schemas.openxmlformats.org/officeDocument/2006/relationships">
-  <p:cSld>
-    <p:spTree>
-      <p:nvGrpSpPr>
-        <p:cNvPr id="1" name=""/>
-        <p:cNvGrpSpPr/>
-        <p:nvPr/>
-      </p:nvGrpSpPr>
-      <p:grpSpPr/>
-      <p:sp>
-        <p:nvSpPr>
-          <p:cNvPr id="2" name="Text Placeholder 1"/>
-          <p:cNvSpPr>
-            <a:spLocks noGrp="1"/>
-          </p:cNvSpPr>
-          <p:nvPr>
-            <p:ph type="body" idx="10" sz="quarter"/>
-          </p:nvPr>
-        </p:nvSpPr>
-        <p:spPr/>
-        <p:txBody>
-          <a:bodyPr/>
-          <a:lstStyle/>
-          <a:p>
-            <a:r>
-              <a:t>Slide 9: Risk Mitigation</a:t>
-            </a:r>
-          </a:p>
-        </p:txBody>
-      </p:sp>
-      <p:sp>
-        <p:nvSpPr>
-          <p:cNvPr id="3" name="Text Placeholder 2"/>
-          <p:cNvSpPr>
-            <a:spLocks noGrp="1"/>
-          </p:cNvSpPr>
-          <p:nvPr>
-            <p:ph type="body" idx="11" sz="quarter"/>
-          </p:nvPr>
-        </p:nvSpPr>
-        <p:spPr/>
-        <p:txBody>
-          <a:bodyPr/>
-          <a:lstStyle/>
-          <a:p>
-            <a:r>
-              <a:t>[Guarantee/commitment 1]</a:t>
-            </a:r>
-          </a:p>
-          <a:p>
-            <a:pPr/>
-            <a:r>
-              <a:t>[Guarantee/commitment 2]</a:t>
+              <a:t>Alison Smith | November 09, 2025</a:t>
             </a:r>
           </a:p>
         </p:txBody>
       </p:sp>
       <p:pic>
         <p:nvPicPr>
-          <p:cNvPr id="4" name="Picture Placeholder 3" descr="consulting_company_logo.png"/>
+          <p:cNvPr id="7" name="Picture 6" descr="eo-framework-logo-real.png"/>
           <p:cNvPicPr>
-            <a:picLocks noGrp="1" noChangeAspect="1"/>
+            <a:picLocks noChangeAspect="1"/>
           </p:cNvPicPr>
-          <p:nvPr>
-            <p:ph type="pic" idx="13" sz="quarter"/>
-          </p:nvPr>
+          <p:nvPr/>
         </p:nvPicPr>
         <p:blipFill>
-          <a:blip r:embed="rId2"/>
-          <a:srcRect t="6762" b="6762"/>
+          <a:blip r:embed="rId4"/>
           <a:stretch>
             <a:fillRect/>
           </a:stretch>
         </p:blipFill>
-        <p:spPr/>
-      </p:pic>
-    </p:spTree>
-  </p:cSld>
-  <p:clrMapOvr>
-    <a:masterClrMapping/>
-  </p:clrMapOvr>
-</p:sld>
-</file>
-
-<file path=ppt/slides/slide11.xml><?xml version="1.0" encoding="utf-8"?>
-<p:sld xmlns:a="http://schemas.openxmlformats.org/drawingml/2006/main" xmlns:p="http://schemas.openxmlformats.org/presentationml/2006/main" xmlns:r="http://schemas.openxmlformats.org/officeDocument/2006/relationships">
-  <p:cSld>
-    <p:spTree>
-      <p:nvGrpSpPr>
-        <p:cNvPr id="1" name=""/>
-        <p:cNvGrpSpPr/>
-        <p:nvPr/>
-      </p:nvGrpSpPr>
-      <p:grpSpPr/>
-      <p:sp>
-        <p:nvSpPr>
-          <p:cNvPr id="2" name="Text Placeholder 1"/>
-          <p:cNvSpPr>
-            <a:spLocks noGrp="1"/>
-          </p:cNvSpPr>
-          <p:nvPr>
-            <p:ph type="body" idx="10" sz="quarter"/>
-          </p:nvPr>
-        </p:nvSpPr>
-        <p:spPr/>
-        <p:txBody>
-          <a:bodyPr/>
-          <a:lstStyle/>
-          <a:p>
-            <a:r>
-              <a:t>Slide 10: Investment Summary</a:t>
-            </a:r>
-          </a:p>
-        </p:txBody>
-      </p:sp>
-      <p:sp>
-        <p:nvSpPr>
-          <p:cNvPr id="3" name="Text Placeholder 2"/>
-          <p:cNvSpPr>
-            <a:spLocks noGrp="1"/>
-          </p:cNvSpPr>
-          <p:nvPr>
-            <p:ph type="body" idx="11" sz="quarter"/>
-          </p:nvPr>
-        </p:nvSpPr>
-        <p:spPr/>
-        <p:txBody>
-          <a:bodyPr/>
-          <a:lstStyle/>
-          <a:p>
-            <a:r>
-              <a:t>Implementation Services: $[Amount]</a:t>
-            </a:r>
-          </a:p>
-          <a:p>
-            <a:pPr/>
-            <a:r>
-              <a:t>Technology/Licenses: $[Amount]</a:t>
-            </a:r>
-          </a:p>
-          <a:p>
-            <a:pPr/>
-            <a:r>
-              <a:t>Training &amp; Change Management: $[Amount]</a:t>
-            </a:r>
-          </a:p>
-          <a:p>
-            <a:pPr/>
-            <a:r>
-              <a:t>Platform/Infrastructure: $[Amount]</a:t>
-            </a:r>
-          </a:p>
-          <a:p>
-            <a:pPr/>
-            <a:r>
-              <a:t>Support &amp; Maintenance: $[Amount]</a:t>
-            </a:r>
-          </a:p>
-        </p:txBody>
-      </p:sp>
-      <p:pic>
-        <p:nvPicPr>
-          <p:cNvPr id="4" name="Picture Placeholder 3" descr="consulting_company_logo.png"/>
-          <p:cNvPicPr>
-            <a:picLocks noGrp="1" noChangeAspect="1"/>
-          </p:cNvPicPr>
-          <p:nvPr>
-            <p:ph type="pic" idx="13" sz="quarter"/>
-          </p:nvPr>
-        </p:nvPicPr>
-        <p:blipFill>
-          <a:blip r:embed="rId2"/>
-          <a:srcRect t="6762" b="6762"/>
-          <a:stretch>
-            <a:fillRect/>
-          </a:stretch>
-        </p:blipFill>
-        <p:spPr/>
-      </p:pic>
-    </p:spTree>
-  </p:cSld>
-  <p:clrMapOvr>
-    <a:masterClrMapping/>
-  </p:clrMapOvr>
-</p:sld>
-</file>
-
-<file path=ppt/slides/slide12.xml><?xml version="1.0" encoding="utf-8"?>
-<p:sld xmlns:a="http://schemas.openxmlformats.org/drawingml/2006/main" xmlns:p="http://schemas.openxmlformats.org/presentationml/2006/main" xmlns:r="http://schemas.openxmlformats.org/officeDocument/2006/relationships">
-  <p:cSld>
-    <p:spTree>
-      <p:nvGrpSpPr>
-        <p:cNvPr id="1" name=""/>
-        <p:cNvGrpSpPr/>
-        <p:nvPr/>
-      </p:nvGrpSpPr>
-      <p:grpSpPr/>
-      <p:sp>
-        <p:nvSpPr>
-          <p:cNvPr id="2" name="Text Placeholder 1"/>
-          <p:cNvSpPr>
-            <a:spLocks noGrp="1"/>
-          </p:cNvSpPr>
-          <p:nvPr>
-            <p:ph type="body" idx="10" sz="quarter"/>
-          </p:nvPr>
-        </p:nvSpPr>
-        <p:spPr/>
-        <p:txBody>
-          <a:bodyPr/>
-          <a:lstStyle/>
-          <a:p>
-            <a:r>
-              <a:t>Slide 11: Timeline &amp; Milestones</a:t>
-            </a:r>
-          </a:p>
-        </p:txBody>
-      </p:sp>
-      <p:sp>
-        <p:nvSpPr>
-          <p:cNvPr id="3" name="Text Placeholder 2"/>
-          <p:cNvSpPr>
-            <a:spLocks noGrp="1"/>
-          </p:cNvSpPr>
-          <p:nvPr>
-            <p:ph type="body" idx="11" sz="quarter"/>
-          </p:nvPr>
-        </p:nvSpPr>
-        <p:spPr/>
-        <p:txBody>
-          <a:bodyPr/>
-          <a:lstStyle/>
-          <a:p>
-            <a:r>
-              <a:t>Month 2: [Milestone 1]</a:t>
-            </a:r>
-          </a:p>
-          <a:p>
-            <a:pPr/>
-            <a:r>
-              <a:t>Month 4: [Milestone 2]</a:t>
-            </a:r>
-          </a:p>
-          <a:p>
-            <a:pPr/>
-            <a:r>
-              <a:t>Month 6: [Milestone 3]</a:t>
-            </a:r>
-          </a:p>
-          <a:p>
-            <a:pPr/>
-            <a:r>
-              <a:t>Month 7: Full value realization</a:t>
-            </a:r>
-          </a:p>
-          <a:p>
-            <a:pPr/>
-            <a:r>
-              <a:t>[Early benefit 1] - Month 2</a:t>
-            </a:r>
-          </a:p>
-          <a:p>
-            <a:pPr/>
-            <a:r>
-              <a:t>[Early benefit 2] - Month 3</a:t>
-            </a:r>
-          </a:p>
-        </p:txBody>
-      </p:sp>
-      <p:pic>
-        <p:nvPicPr>
-          <p:cNvPr id="4" name="Picture Placeholder 3" descr="consulting_company_logo.png"/>
-          <p:cNvPicPr>
-            <a:picLocks noGrp="1" noChangeAspect="1"/>
-          </p:cNvPicPr>
-          <p:nvPr>
-            <p:ph type="pic" idx="13" sz="quarter"/>
-          </p:nvPr>
-        </p:nvPicPr>
-        <p:blipFill>
-          <a:blip r:embed="rId2"/>
-          <a:srcRect t="6762" b="6762"/>
-          <a:stretch>
-            <a:fillRect/>
-          </a:stretch>
-        </p:blipFill>
-        <p:spPr/>
-      </p:pic>
-    </p:spTree>
-  </p:cSld>
-  <p:clrMapOvr>
-    <a:masterClrMapping/>
-  </p:clrMapOvr>
-</p:sld>
-</file>
-
-<file path=ppt/slides/slide13.xml><?xml version="1.0" encoding="utf-8"?>
-<p:sld xmlns:a="http://schemas.openxmlformats.org/drawingml/2006/main" xmlns:p="http://schemas.openxmlformats.org/presentationml/2006/main" xmlns:r="http://schemas.openxmlformats.org/officeDocument/2006/relationships">
-  <p:cSld>
-    <p:spTree>
-      <p:nvGrpSpPr>
-        <p:cNvPr id="1" name=""/>
-        <p:cNvGrpSpPr/>
-        <p:nvPr/>
-      </p:nvGrpSpPr>
-      <p:grpSpPr/>
-      <p:sp>
-        <p:nvSpPr>
-          <p:cNvPr id="2" name="Text Placeholder 1"/>
-          <p:cNvSpPr>
-            <a:spLocks noGrp="1"/>
-          </p:cNvSpPr>
-          <p:nvPr>
-            <p:ph type="body" idx="10" sz="quarter"/>
-          </p:nvPr>
-        </p:nvSpPr>
-        <p:spPr/>
-        <p:txBody>
-          <a:bodyPr/>
-          <a:lstStyle/>
-          <a:p>
-            <a:r>
-              <a:t>Slide 12: Success Stories</a:t>
-            </a:r>
-          </a:p>
-        </p:txBody>
-      </p:sp>
-      <p:sp>
-        <p:nvSpPr>
-          <p:cNvPr id="3" name="Text Placeholder 2"/>
-          <p:cNvSpPr>
-            <a:spLocks noGrp="1"/>
-          </p:cNvSpPr>
-          <p:nvPr>
-            <p:ph type="body" idx="11" sz="quarter"/>
-          </p:nvPr>
-        </p:nvSpPr>
-        <p:spPr/>
-        <p:txBody>
-          <a:bodyPr/>
-          <a:lstStyle/>
-          <a:p>
-            <a:r>
-              <a:t>Challenge: [Similar challenge]</a:t>
-            </a:r>
-          </a:p>
-          <a:p>
-            <a:pPr/>
-            <a:r>
-              <a:t>Solution: [Similar solution]</a:t>
-            </a:r>
-          </a:p>
-          <a:p>
-            <a:pPr/>
-            <a:r>
-              <a:t>Results: [Quantified results]</a:t>
-            </a:r>
-          </a:p>
-          <a:p>
-            <a:pPr/>
-            <a:r>
-              <a:t>[Award/recognition 1]</a:t>
-            </a:r>
-          </a:p>
-          <a:p>
-            <a:pPr/>
-            <a:r>
-              <a:t>[Award/recognition 2]</a:t>
-            </a:r>
-          </a:p>
-          <a:p>
-            <a:pPr/>
-            <a:r>
-              <a:t>[Client Name, Title, Company]</a:t>
-            </a:r>
-          </a:p>
-        </p:txBody>
-      </p:sp>
-      <p:pic>
-        <p:nvPicPr>
-          <p:cNvPr id="4" name="Picture Placeholder 3" descr="consulting_company_logo.png"/>
-          <p:cNvPicPr>
-            <a:picLocks noGrp="1" noChangeAspect="1"/>
-          </p:cNvPicPr>
-          <p:nvPr>
-            <p:ph type="pic" idx="13" sz="quarter"/>
-          </p:nvPr>
-        </p:nvPicPr>
-        <p:blipFill>
-          <a:blip r:embed="rId2"/>
-          <a:srcRect t="6762" b="6762"/>
-          <a:stretch>
-            <a:fillRect/>
-          </a:stretch>
-        </p:blipFill>
-        <p:spPr/>
-      </p:pic>
-    </p:spTree>
-  </p:cSld>
-  <p:clrMapOvr>
-    <a:masterClrMapping/>
-  </p:clrMapOvr>
-</p:sld>
-</file>
-
-<file path=ppt/slides/slide14.xml><?xml version="1.0" encoding="utf-8"?>
-<p:sld xmlns:a="http://schemas.openxmlformats.org/drawingml/2006/main" xmlns:p="http://schemas.openxmlformats.org/presentationml/2006/main" xmlns:r="http://schemas.openxmlformats.org/officeDocument/2006/relationships">
-  <p:cSld>
-    <p:spTree>
-      <p:nvGrpSpPr>
-        <p:cNvPr id="1" name=""/>
-        <p:cNvGrpSpPr/>
-        <p:nvPr/>
-      </p:nvGrpSpPr>
-      <p:grpSpPr/>
-      <p:sp>
-        <p:nvSpPr>
-          <p:cNvPr id="2" name="Text Placeholder 1"/>
-          <p:cNvSpPr>
-            <a:spLocks noGrp="1"/>
-          </p:cNvSpPr>
-          <p:nvPr>
-            <p:ph type="body" idx="10" sz="quarter"/>
-          </p:nvPr>
-        </p:nvSpPr>
-        <p:spPr/>
-        <p:txBody>
-          <a:bodyPr/>
-          <a:lstStyle/>
-          <a:p>
-            <a:r>
-              <a:t>Slide 13: Our Partnership Advantage</a:t>
-            </a:r>
-          </a:p>
-        </p:txBody>
-      </p:sp>
-      <p:sp>
-        <p:nvSpPr>
-          <p:cNvPr id="3" name="Text Placeholder 2"/>
-          <p:cNvSpPr>
-            <a:spLocks noGrp="1"/>
-          </p:cNvSpPr>
-          <p:nvPr>
-            <p:ph type="body" idx="11" sz="quarter"/>
-          </p:nvPr>
-        </p:nvSpPr>
-        <p:spPr/>
-        <p:txBody>
-          <a:bodyPr/>
-          <a:lstStyle/>
-          <a:p>
-            <a:r>
-              <a:t>[Years] years of experience</a:t>
-            </a:r>
-          </a:p>
-          <a:p>
-            <a:pPr/>
-            <a:r>
-              <a:t>[Number] successful implementations</a:t>
-            </a:r>
-          </a:p>
-          <a:p>
-            <a:pPr/>
-            <a:r>
-              <a:t>[Certification/partnership level]</a:t>
-            </a:r>
-          </a:p>
-          <a:p>
-            <a:pPr/>
-            <a:r>
-              <a:t>End-to-end implementation</a:t>
-            </a:r>
-          </a:p>
-          <a:p>
-            <a:pPr/>
-            <a:r>
-              <a:t>24/7 support post-launch</a:t>
-            </a:r>
-          </a:p>
-          <a:p>
-            <a:pPr/>
-            <a:r>
-              <a:t>Ongoing optimization</a:t>
-            </a:r>
-          </a:p>
-          <a:p>
-            <a:pPr/>
-            <a:r>
-              <a:t>[Recognition 1]</a:t>
-            </a:r>
-          </a:p>
-          <a:p>
-            <a:pPr/>
-            <a:r>
-              <a:t>[Recognition 2]</a:t>
-            </a:r>
-          </a:p>
-        </p:txBody>
-      </p:sp>
-      <p:pic>
-        <p:nvPicPr>
-          <p:cNvPr id="4" name="Picture Placeholder 3" descr="consulting_company_logo.png"/>
-          <p:cNvPicPr>
-            <a:picLocks noGrp="1" noChangeAspect="1"/>
-          </p:cNvPicPr>
-          <p:nvPr>
-            <p:ph type="pic" idx="13" sz="quarter"/>
-          </p:nvPr>
-        </p:nvPicPr>
-        <p:blipFill>
-          <a:blip r:embed="rId2"/>
-          <a:srcRect t="6762" b="6762"/>
-          <a:stretch>
-            <a:fillRect/>
-          </a:stretch>
-        </p:blipFill>
-        <p:spPr/>
-      </p:pic>
-    </p:spTree>
-  </p:cSld>
-  <p:clrMapOvr>
-    <a:masterClrMapping/>
-  </p:clrMapOvr>
-</p:sld>
-</file>
-
-<file path=ppt/slides/slide15.xml><?xml version="1.0" encoding="utf-8"?>
-<p:sld xmlns:a="http://schemas.openxmlformats.org/drawingml/2006/main" xmlns:p="http://schemas.openxmlformats.org/presentationml/2006/main" xmlns:r="http://schemas.openxmlformats.org/officeDocument/2006/relationships">
-  <p:cSld>
-    <p:spTree>
-      <p:nvGrpSpPr>
-        <p:cNvPr id="1" name=""/>
-        <p:cNvGrpSpPr/>
-        <p:nvPr/>
-      </p:nvGrpSpPr>
-      <p:grpSpPr/>
-      <p:sp>
-        <p:nvSpPr>
-          <p:cNvPr id="2" name="Text Placeholder 1"/>
-          <p:cNvSpPr>
-            <a:spLocks noGrp="1"/>
-          </p:cNvSpPr>
-          <p:nvPr>
-            <p:ph type="body" idx="10" sz="quarter"/>
-          </p:nvPr>
-        </p:nvSpPr>
-        <p:spPr/>
-        <p:txBody>
-          <a:bodyPr/>
-          <a:lstStyle/>
-          <a:p>
-            <a:r>
-              <a:t>Slide 14: Next Steps</a:t>
-            </a:r>
-          </a:p>
-        </p:txBody>
-      </p:sp>
-      <p:sp>
-        <p:nvSpPr>
-          <p:cNvPr id="3" name="Text Placeholder 2"/>
-          <p:cNvSpPr>
-            <a:spLocks noGrp="1"/>
-          </p:cNvSpPr>
-          <p:nvPr>
-            <p:ph type="body" idx="11" sz="quarter"/>
-          </p:nvPr>
-        </p:nvSpPr>
-        <p:spPr/>
-        <p:txBody>
-          <a:bodyPr/>
-          <a:lstStyle/>
-          <a:p>
-            <a:r>
-              <a:t>Decision: [Specific decision needed]</a:t>
-            </a:r>
-          </a:p>
-          <a:p>
-            <a:pPr/>
-            <a:r>
-              <a:t>Kickoff: [Target start date]</a:t>
-            </a:r>
-          </a:p>
-          <a:p>
-            <a:pPr/>
-            <a:r>
-              <a:t>Team Formation: [Key team members]</a:t>
-            </a:r>
-          </a:p>
-          <a:p>
-            <a:pPr/>
-            <a:r>
-              <a:t>Week 1: Contract finalization</a:t>
-            </a:r>
-          </a:p>
-          <a:p>
-            <a:pPr/>
-            <a:r>
-              <a:t>Week 2: Project initiation</a:t>
-            </a:r>
-          </a:p>
-          <a:p>
-            <a:pPr/>
-            <a:r>
-              <a:t>Week 3: Environment setup</a:t>
-            </a:r>
-          </a:p>
-          <a:p>
-            <a:pPr/>
-            <a:r>
-              <a:t>Week 4: Initial implementation</a:t>
-            </a:r>
-          </a:p>
-        </p:txBody>
-      </p:sp>
-      <p:pic>
-        <p:nvPicPr>
-          <p:cNvPr id="4" name="Picture Placeholder 3" descr="consulting_company_logo.png"/>
-          <p:cNvPicPr>
-            <a:picLocks noGrp="1" noChangeAspect="1"/>
-          </p:cNvPicPr>
-          <p:nvPr>
-            <p:ph type="pic" idx="13" sz="quarter"/>
-          </p:nvPr>
-        </p:nvPicPr>
-        <p:blipFill>
-          <a:blip r:embed="rId2"/>
-          <a:srcRect t="6762" b="6762"/>
-          <a:stretch>
-            <a:fillRect/>
-          </a:stretch>
-        </p:blipFill>
-        <p:spPr/>
-      </p:pic>
-    </p:spTree>
-  </p:cSld>
-  <p:clrMapOvr>
-    <a:masterClrMapping/>
-  </p:clrMapOvr>
-</p:sld>
-</file>
-
-<file path=ppt/slides/slide16.xml><?xml version="1.0" encoding="utf-8"?>
-<p:sld xmlns:a="http://schemas.openxmlformats.org/drawingml/2006/main" xmlns:p="http://schemas.openxmlformats.org/presentationml/2006/main" xmlns:r="http://schemas.openxmlformats.org/officeDocument/2006/relationships">
-  <p:cSld>
-    <p:spTree>
-      <p:nvGrpSpPr>
-        <p:cNvPr id="1" name=""/>
-        <p:cNvGrpSpPr/>
-        <p:nvPr/>
-      </p:nvGrpSpPr>
-      <p:grpSpPr/>
-      <p:sp>
-        <p:nvSpPr>
-          <p:cNvPr id="2" name="Text Placeholder 1"/>
-          <p:cNvSpPr>
-            <a:spLocks noGrp="1"/>
-          </p:cNvSpPr>
-          <p:nvPr>
-            <p:ph type="body" idx="10" sz="quarter"/>
-          </p:nvPr>
-        </p:nvSpPr>
-        <p:spPr/>
-        <p:txBody>
-          <a:bodyPr/>
-          <a:lstStyle/>
-          <a:p>
-            <a:r>
-              <a:t>Slide 15: Contact Information</a:t>
-            </a:r>
-          </a:p>
-        </p:txBody>
-      </p:sp>
-      <p:sp>
-        <p:nvSpPr>
-          <p:cNvPr id="3" name="Text Placeholder 2"/>
-          <p:cNvSpPr>
-            <a:spLocks noGrp="1"/>
-          </p:cNvSpPr>
-          <p:nvPr>
-            <p:ph type="body" idx="11" sz="quarter"/>
-          </p:nvPr>
-        </p:nvSpPr>
-        <p:spPr/>
-        <p:txBody>
-          <a:bodyPr/>
-          <a:lstStyle/>
-          <a:p/>
-        </p:txBody>
-      </p:sp>
-      <p:pic>
-        <p:nvPicPr>
-          <p:cNvPr id="4" name="Picture Placeholder 3" descr="consulting_company_logo.png"/>
-          <p:cNvPicPr>
-            <a:picLocks noGrp="1" noChangeAspect="1"/>
-          </p:cNvPicPr>
-          <p:nvPr>
-            <p:ph type="pic" idx="13" sz="quarter"/>
-          </p:nvPr>
-        </p:nvPicPr>
-        <p:blipFill>
-          <a:blip r:embed="rId2"/>
-          <a:srcRect t="6762" b="6762"/>
-          <a:stretch>
-            <a:fillRect/>
-          </a:stretch>
-        </p:blipFill>
-        <p:spPr/>
-      </p:pic>
-    </p:spTree>
-  </p:cSld>
-  <p:clrMapOvr>
-    <a:masterClrMapping/>
-  </p:clrMapOvr>
-</p:sld>
-</file>
-
-<file path=ppt/slides/slide17.xml><?xml version="1.0" encoding="utf-8"?>
-<p:sld xmlns:a="http://schemas.openxmlformats.org/drawingml/2006/main" xmlns:p="http://schemas.openxmlformats.org/presentationml/2006/main" xmlns:r="http://schemas.openxmlformats.org/officeDocument/2006/relationships">
-  <p:cSld>
-    <p:spTree>
-      <p:nvGrpSpPr>
-        <p:cNvPr id="1" name=""/>
-        <p:cNvGrpSpPr/>
-        <p:nvPr/>
-      </p:nvGrpSpPr>
-      <p:grpSpPr/>
-      <p:sp>
-        <p:nvSpPr>
-          <p:cNvPr id="2" name="Text Placeholder 1"/>
-          <p:cNvSpPr>
-            <a:spLocks noGrp="1"/>
-          </p:cNvSpPr>
-          <p:nvPr>
-            <p:ph type="body" idx="10" sz="quarter"/>
-          </p:nvPr>
-        </p:nvSpPr>
-        <p:spPr/>
-        <p:txBody>
-          <a:bodyPr/>
-          <a:lstStyle/>
-          <a:p>
-            <a:r>
-              <a:t>Speaking Points for Each Slide</a:t>
-            </a:r>
-          </a:p>
-        </p:txBody>
-      </p:sp>
-      <p:sp>
-        <p:nvSpPr>
-          <p:cNvPr id="3" name="Text Placeholder 2"/>
-          <p:cNvSpPr>
-            <a:spLocks noGrp="1"/>
-          </p:cNvSpPr>
-          <p:nvPr>
-            <p:ph type="body" idx="11" sz="quarter"/>
-          </p:nvPr>
-        </p:nvSpPr>
-        <p:spPr/>
-        <p:txBody>
-          <a:bodyPr/>
-          <a:lstStyle/>
-          <a:p>
-            <a:r>
-              <a:t>Emphasize the financial and operational impact of current challenges</a:t>
-            </a:r>
-          </a:p>
-          <a:p>
-            <a:pPr/>
-            <a:r>
-              <a:t>Use client-specific data when possible</a:t>
-            </a:r>
-          </a:p>
-          <a:p>
-            <a:pPr/>
-            <a:r>
-              <a:t>Create urgency around the cost of inaction</a:t>
-            </a:r>
-          </a:p>
-          <a:p>
-            <a:pPr/>
-            <a:r>
-              <a:t>Connect pain points to measurable business impact</a:t>
-            </a:r>
-          </a:p>
-          <a:p>
-            <a:pPr/>
-            <a:r>
-              <a:t>Clearly identify all key stakeholders and their specific concerns</a:t>
-            </a:r>
-          </a:p>
-          <a:p>
-            <a:pPr/>
-            <a:r>
-              <a:t>Ensure success criteria are specific, measurable, and timeline-bound</a:t>
-            </a:r>
-          </a:p>
-          <a:p>
-            <a:pPr/>
-            <a:r>
-              <a:t>Get alignment on what "success" means to each stakeholder group</a:t>
-            </a:r>
-          </a:p>
-          <a:p>
-            <a:pPr/>
-            <a:r>
-              <a:t>Link success criteria back to the pain points and impacts from Slide 3</a:t>
-            </a:r>
-          </a:p>
-          <a:p>
-            <a:pPr/>
-            <a:r>
-              <a:t>Be transparent about all costs</a:t>
-            </a:r>
-          </a:p>
-          <a:p>
-            <a:pPr/>
-            <a:r>
-              <a:t>Explain value of each investment component</a:t>
-            </a:r>
-          </a:p>
-          <a:p>
-            <a:pPr/>
-            <a:r>
-              <a:t>Compare to alternative approaches</a:t>
-            </a:r>
-          </a:p>
-        </p:txBody>
-      </p:sp>
-      <p:pic>
-        <p:nvPicPr>
-          <p:cNvPr id="4" name="Picture Placeholder 3" descr="consulting_company_logo.png"/>
-          <p:cNvPicPr>
-            <a:picLocks noGrp="1" noChangeAspect="1"/>
-          </p:cNvPicPr>
-          <p:nvPr>
-            <p:ph type="pic" idx="13" sz="quarter"/>
-          </p:nvPr>
-        </p:nvPicPr>
-        <p:blipFill>
-          <a:blip r:embed="rId2"/>
-          <a:srcRect t="6762" b="6762"/>
-          <a:stretch>
-            <a:fillRect/>
-          </a:stretch>
-        </p:blipFill>
-        <p:spPr/>
-      </p:pic>
-    </p:spTree>
-  </p:cSld>
-  <p:clrMapOvr>
-    <a:masterClrMapping/>
-  </p:clrMapOvr>
-</p:sld>
-</file>
-
-<file path=ppt/slides/slide18.xml><?xml version="1.0" encoding="utf-8"?>
-<p:sld xmlns:a="http://schemas.openxmlformats.org/drawingml/2006/main" xmlns:p="http://schemas.openxmlformats.org/presentationml/2006/main" xmlns:r="http://schemas.openxmlformats.org/officeDocument/2006/relationships">
-  <p:cSld>
-    <p:spTree>
-      <p:nvGrpSpPr>
-        <p:cNvPr id="1" name=""/>
-        <p:cNvGrpSpPr/>
-        <p:nvPr/>
-      </p:nvGrpSpPr>
-      <p:grpSpPr/>
-      <p:sp>
-        <p:nvSpPr>
-          <p:cNvPr id="2" name="Text Placeholder 1"/>
-          <p:cNvSpPr>
-            <a:spLocks noGrp="1"/>
-          </p:cNvSpPr>
-          <p:nvPr>
-            <p:ph type="body" idx="10" sz="quarter"/>
-          </p:nvPr>
-        </p:nvSpPr>
-        <p:spPr/>
-        <p:txBody>
-          <a:bodyPr/>
-          <a:lstStyle/>
-          <a:p>
-            <a:r>
-              <a:t>Q&amp;A Preparation</a:t>
-            </a:r>
-          </a:p>
-        </p:txBody>
-      </p:sp>
-      <p:sp>
-        <p:nvSpPr>
-          <p:cNvPr id="3" name="Text Placeholder 2"/>
-          <p:cNvSpPr>
-            <a:spLocks noGrp="1"/>
-          </p:cNvSpPr>
-          <p:nvPr>
-            <p:ph type="body" idx="11" sz="quarter"/>
-          </p:nvPr>
-        </p:nvSpPr>
-        <p:spPr/>
-        <p:txBody>
-          <a:bodyPr/>
-          <a:lstStyle/>
-          <a:p/>
-        </p:txBody>
-      </p:sp>
-      <p:pic>
-        <p:nvPicPr>
-          <p:cNvPr id="4" name="Picture Placeholder 3" descr="consulting_company_logo.png"/>
-          <p:cNvPicPr>
-            <a:picLocks noGrp="1" noChangeAspect="1"/>
-          </p:cNvPicPr>
-          <p:nvPr>
-            <p:ph type="pic" idx="13" sz="quarter"/>
-          </p:nvPr>
-        </p:nvPicPr>
-        <p:blipFill>
-          <a:blip r:embed="rId2"/>
-          <a:srcRect t="6762" b="6762"/>
-          <a:stretch>
-            <a:fillRect/>
-          </a:stretch>
-        </p:blipFill>
-        <p:spPr/>
-      </p:pic>
-    </p:spTree>
-  </p:cSld>
-  <p:clrMapOvr>
-    <a:masterClrMapping/>
-  </p:clrMapOvr>
-</p:sld>
-</file>
-
-<file path=ppt/slides/slide19.xml><?xml version="1.0" encoding="utf-8"?>
-<p:sld xmlns:a="http://schemas.openxmlformats.org/drawingml/2006/main" xmlns:p="http://schemas.openxmlformats.org/presentationml/2006/main" xmlns:r="http://schemas.openxmlformats.org/officeDocument/2006/relationships">
-  <p:cSld>
-    <p:spTree>
-      <p:nvGrpSpPr>
-        <p:cNvPr id="1" name=""/>
-        <p:cNvGrpSpPr/>
-        <p:nvPr/>
-      </p:nvGrpSpPr>
-      <p:grpSpPr/>
-      <p:sp>
-        <p:nvSpPr>
-          <p:cNvPr id="2" name="Text Placeholder 1"/>
-          <p:cNvSpPr>
-            <a:spLocks noGrp="1"/>
-          </p:cNvSpPr>
-          <p:nvPr>
-            <p:ph type="body" idx="10" sz="quarter"/>
-          </p:nvPr>
-        </p:nvSpPr>
-        <p:spPr/>
-        <p:txBody>
-          <a:bodyPr/>
-          <a:lstStyle/>
-          <a:p>
-            <a:r>
-              <a:t>Appendix Slides (If Needed)</a:t>
-            </a:r>
-          </a:p>
-        </p:txBody>
-      </p:sp>
-      <p:sp>
-        <p:nvSpPr>
-          <p:cNvPr id="3" name="Text Placeholder 2"/>
-          <p:cNvSpPr>
-            <a:spLocks noGrp="1"/>
-          </p:cNvSpPr>
-          <p:nvPr>
-            <p:ph type="body" idx="11" sz="quarter"/>
-          </p:nvPr>
-        </p:nvSpPr>
-        <p:spPr/>
-        <p:txBody>
-          <a:bodyPr/>
-          <a:lstStyle/>
-          <a:p>
-            <a:r>
-              <a:t>Company brand colors and fonts</a:t>
-            </a:r>
-          </a:p>
-          <a:p>
-            <a:pPr/>
-            <a:r>
-              <a:t>Consistent slide layout and formatting</a:t>
-            </a:r>
-          </a:p>
-          <a:p>
-            <a:pPr/>
-            <a:r>
-              <a:t>Professional graphics and icons</a:t>
-            </a:r>
-          </a:p>
-          <a:p>
-            <a:pPr/>
-            <a:r>
-              <a:t>Client logo on each slide</a:t>
-            </a:r>
-          </a:p>
-        </p:txBody>
-      </p:sp>
-      <p:pic>
-        <p:nvPicPr>
-          <p:cNvPr id="4" name="Picture Placeholder 3" descr="consulting_company_logo.png"/>
-          <p:cNvPicPr>
-            <a:picLocks noGrp="1" noChangeAspect="1"/>
-          </p:cNvPicPr>
-          <p:nvPr>
-            <p:ph type="pic" idx="13" sz="quarter"/>
-          </p:nvPr>
-        </p:nvPicPr>
-        <p:blipFill>
-          <a:blip r:embed="rId2"/>
-          <a:srcRect t="6762" b="6762"/>
-          <a:stretch>
-            <a:fillRect/>
-          </a:stretch>
-        </p:blipFill>
-        <p:spPr/>
+        <p:spPr>
+          <a:xfrm>
+            <a:off x="6684264" y="4535424"/>
+            <a:ext cx="2139696" cy="530352"/>
+          </a:xfrm>
+          <a:prstGeom prst="rect">
+            <a:avLst/>
+          </a:prstGeom>
+        </p:spPr>
       </p:pic>
     </p:spTree>
   </p:cSld>
@@ -4379,7 +3363,7 @@
           <a:lstStyle/>
           <a:p>
             <a:r>
-              <a:t>Slide 1: Title Slide</a:t>
+              <a:t>Business Challenge, Impact &amp; Success</a:t>
             </a:r>
           </a:p>
         </p:txBody>
@@ -4400,25 +3384,144 @@
           <a:lstStyle/>
           <a:p>
             <a:r>
-              <a:t>Prepared for: [Client Name]</a:t>
-            </a:r>
-          </a:p>
-          <a:p>
-            <a:pPr/>
-            <a:r>
-              <a:t>Presented by: [Your Name, Title]</a:t>
-            </a:r>
-          </a:p>
-          <a:p>
-            <a:pPr/>
-            <a:r>
-              <a:t>Date: [Presentation Date]</a:t>
-            </a:r>
-          </a:p>
-          <a:p>
-            <a:pPr/>
-            <a:r>
-              <a:t>Company Logo</a:t>
+              <a:rPr sz="1400">
+                <a:solidFill>
+                  <a:srgbClr val="000000"/>
+                </a:solidFill>
+              </a:rPr>
+              <a:t>[Primary business driver or problem to solve]</a:t>
+            </a:r>
+          </a:p>
+          <a:p>
+            <a:pPr/>
+            <a:r>
+              <a:rPr sz="1400">
+                <a:solidFill>
+                  <a:srgbClr val="000000"/>
+                </a:solidFill>
+              </a:rPr>
+              <a:t>[Underlying need or strategic opportunity]</a:t>
+            </a:r>
+          </a:p>
+          <a:p>
+            <a:pPr/>
+            <a:r>
+              <a:rPr sz="1400">
+                <a:solidFill>
+                  <a:srgbClr val="000000"/>
+                </a:solidFill>
+              </a:rPr>
+              <a:t>[Challenge 1]: [Specific pain point with cost/operational impact]</a:t>
+            </a:r>
+          </a:p>
+          <a:p>
+            <a:pPr/>
+            <a:r>
+              <a:rPr sz="1400">
+                <a:solidFill>
+                  <a:srgbClr val="000000"/>
+                </a:solidFill>
+              </a:rPr>
+              <a:t>[Challenge 2]: [Specific pain point with cost/operational impact]</a:t>
+            </a:r>
+          </a:p>
+          <a:p>
+            <a:pPr/>
+            <a:r>
+              <a:rPr sz="1400">
+                <a:solidFill>
+                  <a:srgbClr val="000000"/>
+                </a:solidFill>
+              </a:rPr>
+              <a:t>[Challenge 3]: [Specific pain point with cost/operational impact]</a:t>
+            </a:r>
+          </a:p>
+          <a:p>
+            <a:pPr/>
+            <a:r>
+              <a:rPr sz="1400">
+                <a:solidFill>
+                  <a:srgbClr val="000000"/>
+                </a:solidFill>
+              </a:rPr>
+              <a:t>Operational: [Impact on efficiency, productivity, cost reduction]</a:t>
+            </a:r>
+          </a:p>
+          <a:p>
+            <a:pPr/>
+            <a:r>
+              <a:rPr sz="1400">
+                <a:solidFill>
+                  <a:srgbClr val="000000"/>
+                </a:solidFill>
+              </a:rPr>
+              <a:t>Competitive: [Strategic advantage and market positioning benefit]</a:t>
+            </a:r>
+          </a:p>
+          <a:p>
+            <a:pPr/>
+            <a:r>
+              <a:rPr sz="1400">
+                <a:solidFill>
+                  <a:srgbClr val="000000"/>
+                </a:solidFill>
+              </a:rPr>
+              <a:t>Innovation: [Future capabilities and scalability enabled]</a:t>
+            </a:r>
+          </a:p>
+          <a:p>
+            <a:pPr/>
+            <a:r>
+              <a:rPr sz="1400">
+                <a:solidFill>
+                  <a:srgbClr val="000000"/>
+                </a:solidFill>
+              </a:rPr>
+              <a:t>Risk: [Risk exposure reduction and compliance improvement]</a:t>
+            </a:r>
+          </a:p>
+          <a:p>
+            <a:pPr/>
+            <a:r>
+              <a:rPr sz="1400">
+                <a:solidFill>
+                  <a:srgbClr val="000000"/>
+                </a:solidFill>
+              </a:rPr>
+              <a:t>[Measurable Outcome 1]: [How we'll measure success]</a:t>
+            </a:r>
+          </a:p>
+          <a:p>
+            <a:pPr/>
+            <a:r>
+              <a:rPr sz="1400">
+                <a:solidFill>
+                  <a:srgbClr val="000000"/>
+                </a:solidFill>
+              </a:rPr>
+              <a:t>[Measurable Outcome 2]: [Timeline expectations]</a:t>
+            </a:r>
+          </a:p>
+          <a:p>
+            <a:pPr/>
+            <a:r>
+              <a:rPr sz="1400">
+                <a:solidFill>
+                  <a:srgbClr val="000000"/>
+                </a:solidFill>
+              </a:rPr>
+              <a:t>[Strategic Outcome]: [Long-term value realization]</a:t>
+            </a:r>
+          </a:p>
+          <a:p>
+            <a:pPr/>
+            <a:r>
+              <a:rPr sz="1400">
+                <a:solidFill>
+                  <a:srgbClr val="000000"/>
+                </a:solidFill>
+              </a:rPr>
+              <a:t>*"The cost of inaction: $[Amount] in lost value over [timeframe]"*</a:t>
             </a:r>
           </a:p>
         </p:txBody>
@@ -4441,6 +3544,30 @@
           </a:stretch>
         </p:blipFill>
         <p:spPr/>
+      </p:pic>
+      <p:pic>
+        <p:nvPicPr>
+          <p:cNvPr id="5" name="Picture 4" descr="eo-framework-logo-real.png"/>
+          <p:cNvPicPr>
+            <a:picLocks noChangeAspect="1"/>
+          </p:cNvPicPr>
+          <p:nvPr/>
+        </p:nvPicPr>
+        <p:blipFill>
+          <a:blip r:embed="rId3"/>
+          <a:stretch>
+            <a:fillRect/>
+          </a:stretch>
+        </p:blipFill>
+        <p:spPr>
+          <a:xfrm>
+            <a:off x="6684264" y="4535424"/>
+            <a:ext cx="2139696" cy="530352"/>
+          </a:xfrm>
+          <a:prstGeom prst="rect">
+            <a:avLst/>
+          </a:prstGeom>
+        </p:spPr>
       </p:pic>
     </p:spTree>
   </p:cSld>
@@ -4476,7 +3603,7 @@
           <a:lstStyle/>
           <a:p>
             <a:r>
-              <a:t>Slide 2: Agenda</a:t>
+              <a:t>Solution Overview</a:t>
             </a:r>
           </a:p>
         </p:txBody>
@@ -4497,53 +3624,142 @@
           <a:lstStyle/>
           <a:p>
             <a:r>
-              <a:t>Business Challenge &amp; Strategic Context</a:t>
-            </a:r>
-          </a:p>
-          <a:p>
-            <a:pPr/>
-            <a:r>
-              <a:t>Proposed Solution Overview</a:t>
-            </a:r>
-          </a:p>
-          <a:p>
-            <a:pPr/>
-            <a:r>
-              <a:t>Business Value &amp; Benefits</a:t>
-            </a:r>
-          </a:p>
-          <a:p>
-            <a:pPr/>
-            <a:r>
-              <a:t>Implementation Approach</a:t>
-            </a:r>
-          </a:p>
-          <a:p>
-            <a:pPr/>
-            <a:r>
-              <a:t>Investment &amp; Next Steps</a:t>
-            </a:r>
-          </a:p>
+              <a:rPr sz="1400">
+                <a:solidFill>
+                  <a:srgbClr val="000000"/>
+                </a:solidFill>
+              </a:rPr>
+              <a:t>[Component 1]: [Brief description]</a:t>
+            </a:r>
+          </a:p>
+          <a:p>
+            <a:pPr/>
+            <a:r>
+              <a:rPr sz="1400">
+                <a:solidFill>
+                  <a:srgbClr val="000000"/>
+                </a:solidFill>
+              </a:rPr>
+              <a:t>[Component 2]: [Brief description]</a:t>
+            </a:r>
+          </a:p>
+          <a:p>
+            <a:pPr/>
+            <a:r>
+              <a:rPr sz="1400">
+                <a:solidFill>
+                  <a:srgbClr val="000000"/>
+                </a:solidFill>
+              </a:rPr>
+              <a:t>[Component 3]: [Brief description]</a:t>
+            </a:r>
+          </a:p>
+          <a:p>
+            <a:pPr/>
+            <a:r>
+              <a:rPr sz="1400">
+                <a:solidFill>
+                  <a:srgbClr val="000000"/>
+                </a:solidFill>
+              </a:rPr>
+              <a:t>[Platform/Technology 1]</a:t>
+            </a:r>
+          </a:p>
+          <a:p>
+            <a:pPr/>
+            <a:r>
+              <a:rPr sz="1400">
+                <a:solidFill>
+                  <a:srgbClr val="000000"/>
+                </a:solidFill>
+              </a:rPr>
+              <a:t>[Platform/Technology 2]</a:t>
+            </a:r>
+          </a:p>
+          <a:p>
+            <a:pPr/>
+            <a:r>
+              <a:rPr sz="1400">
+                <a:solidFill>
+                  <a:srgbClr val="000000"/>
+                </a:solidFill>
+              </a:rPr>
+              <a:t>[Architecture Diagram Placeholder]</a:t>
+            </a:r>
+          </a:p>
+        </p:txBody>
+      </p:sp>
+      <p:sp>
+        <p:nvSpPr>
+          <p:cNvPr id="4" name="Text Placeholder 3"/>
+          <p:cNvSpPr>
+            <a:spLocks noGrp="1"/>
+          </p:cNvSpPr>
+          <p:nvPr>
+            <p:ph type="body" idx="13" sz="quarter"/>
+          </p:nvPr>
+        </p:nvSpPr>
+        <p:spPr/>
+        <p:txBody>
+          <a:bodyPr/>
+          <a:lstStyle/>
+          <a:p/>
         </p:txBody>
       </p:sp>
       <p:pic>
         <p:nvPicPr>
-          <p:cNvPr id="4" name="Picture Placeholder 3" descr="consulting_company_logo.png"/>
+          <p:cNvPr id="5" name="Picture Placeholder 4" descr="consulting_company_logo.png"/>
           <p:cNvPicPr>
             <a:picLocks noGrp="1" noChangeAspect="1"/>
           </p:cNvPicPr>
           <p:nvPr>
-            <p:ph type="pic" idx="13" sz="quarter"/>
+            <p:ph type="pic" idx="14" sz="quarter"/>
           </p:nvPr>
         </p:nvPicPr>
         <p:blipFill>
           <a:blip r:embed="rId2"/>
-          <a:srcRect t="6762" b="6762"/>
+          <a:srcRect t="6494" b="6494"/>
           <a:stretch>
             <a:fillRect/>
           </a:stretch>
         </p:blipFill>
         <p:spPr/>
+      </p:pic>
+      <p:sp>
+        <p:nvSpPr>
+          <p:cNvPr id="6" name="Picture Placeholder 5"/>
+          <p:cNvSpPr>
+            <a:spLocks noGrp="1"/>
+          </p:cNvSpPr>
+          <p:nvPr>
+            <p:ph type="pic" idx="15" sz="quarter"/>
+          </p:nvPr>
+        </p:nvSpPr>
+        <p:spPr/>
+      </p:sp>
+      <p:pic>
+        <p:nvPicPr>
+          <p:cNvPr id="7" name="Picture 6" descr="eo-framework-logo-real.png"/>
+          <p:cNvPicPr>
+            <a:picLocks noChangeAspect="1"/>
+          </p:cNvPicPr>
+          <p:nvPr/>
+        </p:nvPicPr>
+        <p:blipFill>
+          <a:blip r:embed="rId3"/>
+          <a:stretch>
+            <a:fillRect/>
+          </a:stretch>
+        </p:blipFill>
+        <p:spPr>
+          <a:xfrm>
+            <a:off x="6684264" y="4535424"/>
+            <a:ext cx="2139696" cy="530352"/>
+          </a:xfrm>
+          <a:prstGeom prst="rect">
+            <a:avLst/>
+          </a:prstGeom>
+        </p:spPr>
       </p:pic>
     </p:spTree>
   </p:cSld>
@@ -4579,7 +3795,7 @@
           <a:lstStyle/>
           <a:p>
             <a:r>
-              <a:t>Slide 3: Business Challenge &amp; Impact</a:t>
+              <a:t>Why This Solution?</a:t>
             </a:r>
           </a:p>
         </p:txBody>
@@ -4600,71 +3816,206 @@
           <a:lstStyle/>
           <a:p>
             <a:r>
-              <a:t>[Primary business driver or problem to solve]</a:t>
-            </a:r>
-          </a:p>
-          <a:p>
-            <a:pPr/>
-            <a:r>
-              <a:t>[Underlying need or strategic opportunity]</a:t>
-            </a:r>
-          </a:p>
-          <a:p>
-            <a:pPr/>
-            <a:r>
-              <a:t>[Challenge 1]: [Specific pain point with cost/operational impact]</a:t>
-            </a:r>
-          </a:p>
-          <a:p>
-            <a:pPr/>
-            <a:r>
-              <a:t>[Challenge 2]: [Specific pain point with cost/operational impact]</a:t>
-            </a:r>
-          </a:p>
-          <a:p>
-            <a:pPr/>
-            <a:r>
-              <a:t>[Challenge 3]: [Specific pain point with cost/operational impact]</a:t>
-            </a:r>
-          </a:p>
-          <a:p>
-            <a:pPr/>
-            <a:r>
-              <a:t>[Impact on business operations, revenue, or competitive position]</a:t>
-            </a:r>
-          </a:p>
-          <a:p>
-            <a:pPr/>
-            <a:r>
-              <a:t>[Risk exposure or cost of inaction]</a:t>
-            </a:r>
-          </a:p>
-          <a:p>
-            <a:pPr/>
-            <a:r>
-              <a:t>[Strategic disadvantage if unresolved]</a:t>
-            </a:r>
-          </a:p>
+              <a:rPr sz="1400">
+                <a:solidFill>
+                  <a:srgbClr val="000000"/>
+                </a:solidFill>
+              </a:rPr>
+              <a:t>[Relevant case study/metric]</a:t>
+            </a:r>
+          </a:p>
+          <a:p>
+            <a:pPr/>
+            <a:r>
+              <a:rPr sz="1400">
+                <a:solidFill>
+                  <a:srgbClr val="000000"/>
+                </a:solidFill>
+              </a:rPr>
+              <a:t>[Industry recognition/certification]</a:t>
+            </a:r>
+          </a:p>
+          <a:p>
+            <a:pPr/>
+            <a:r>
+              <a:rPr sz="1400">
+                <a:solidFill>
+                  <a:srgbClr val="000000"/>
+                </a:solidFill>
+              </a:rPr>
+              <a:t>[Unique capability 1]</a:t>
+            </a:r>
+          </a:p>
+          <a:p>
+            <a:pPr/>
+            <a:r>
+              <a:rPr sz="1400">
+                <a:solidFill>
+                  <a:srgbClr val="000000"/>
+                </a:solidFill>
+              </a:rPr>
+              <a:t>[Unique capability 2]</a:t>
+            </a:r>
+          </a:p>
+          <a:p>
+            <a:pPr/>
+            <a:r>
+              <a:rPr sz="1400">
+                <a:solidFill>
+                  <a:srgbClr val="000000"/>
+                </a:solidFill>
+              </a:rPr>
+              <a:t>Traditional Approach: [Current limitation 1]</a:t>
+            </a:r>
+          </a:p>
+        </p:txBody>
+      </p:sp>
+      <p:sp>
+        <p:nvSpPr>
+          <p:cNvPr id="4" name="Text Placeholder 3"/>
+          <p:cNvSpPr>
+            <a:spLocks noGrp="1"/>
+          </p:cNvSpPr>
+          <p:nvPr>
+            <p:ph type="body" idx="12" sz="quarter"/>
+          </p:nvPr>
+        </p:nvSpPr>
+        <p:spPr/>
+        <p:txBody>
+          <a:bodyPr/>
+          <a:lstStyle/>
+          <a:p>
+            <a:r>
+              <a:rPr sz="1400">
+                <a:solidFill>
+                  <a:srgbClr val="000000"/>
+                </a:solidFill>
+              </a:rPr>
+              <a:t>  • Our Solution: ✅ [Our advantage 1]</a:t>
+            </a:r>
+          </a:p>
+          <a:p>
+            <a:pPr/>
+            <a:r>
+              <a:rPr sz="1400">
+                <a:solidFill>
+                  <a:srgbClr val="000000"/>
+                </a:solidFill>
+              </a:rPr>
+              <a:t>Traditional Approach: [Current limitation 2]</a:t>
+            </a:r>
+          </a:p>
+          <a:p>
+            <a:pPr/>
+            <a:r>
+              <a:rPr sz="1400">
+                <a:solidFill>
+                  <a:srgbClr val="000000"/>
+                </a:solidFill>
+              </a:rPr>
+              <a:t>  • Our Solution: ✅ [Our advantage 2]</a:t>
+            </a:r>
+          </a:p>
+          <a:p>
+            <a:pPr/>
+            <a:r>
+              <a:rPr sz="1400">
+                <a:solidFill>
+                  <a:srgbClr val="000000"/>
+                </a:solidFill>
+              </a:rPr>
+              <a:t>Traditional Approach: [Current limitation 3]</a:t>
+            </a:r>
+          </a:p>
+          <a:p>
+            <a:pPr/>
+            <a:r>
+              <a:rPr sz="1400">
+                <a:solidFill>
+                  <a:srgbClr val="000000"/>
+                </a:solidFill>
+              </a:rPr>
+              <a:t>  • Our Solution: ✅ [Our advantage 3]</a:t>
+            </a:r>
+          </a:p>
+        </p:txBody>
+      </p:sp>
+      <p:sp>
+        <p:nvSpPr>
+          <p:cNvPr id="5" name="Text Placeholder 4"/>
+          <p:cNvSpPr>
+            <a:spLocks noGrp="1"/>
+          </p:cNvSpPr>
+          <p:nvPr>
+            <p:ph type="body" idx="13" sz="quarter"/>
+          </p:nvPr>
+        </p:nvSpPr>
+        <p:spPr/>
+        <p:txBody>
+          <a:bodyPr/>
+          <a:lstStyle/>
+          <a:p/>
         </p:txBody>
       </p:sp>
       <p:pic>
         <p:nvPicPr>
-          <p:cNvPr id="4" name="Picture Placeholder 3" descr="consulting_company_logo.png"/>
+          <p:cNvPr id="6" name="Picture Placeholder 5" descr="consulting_company_logo.png"/>
           <p:cNvPicPr>
             <a:picLocks noGrp="1" noChangeAspect="1"/>
           </p:cNvPicPr>
           <p:nvPr>
-            <p:ph type="pic" idx="13" sz="quarter"/>
+            <p:ph type="pic" idx="14" sz="quarter"/>
           </p:nvPr>
         </p:nvPicPr>
         <p:blipFill>
           <a:blip r:embed="rId2"/>
-          <a:srcRect t="6762" b="6762"/>
+          <a:srcRect t="6314" b="6314"/>
           <a:stretch>
             <a:fillRect/>
           </a:stretch>
         </p:blipFill>
         <p:spPr/>
+      </p:pic>
+      <p:sp>
+        <p:nvSpPr>
+          <p:cNvPr id="7" name="Text Placeholder 6"/>
+          <p:cNvSpPr>
+            <a:spLocks noGrp="1"/>
+          </p:cNvSpPr>
+          <p:nvPr>
+            <p:ph type="body" idx="15" sz="quarter"/>
+          </p:nvPr>
+        </p:nvSpPr>
+        <p:spPr/>
+        <p:txBody>
+          <a:bodyPr/>
+          <a:lstStyle/>
+          <a:p/>
+        </p:txBody>
+      </p:sp>
+      <p:pic>
+        <p:nvPicPr>
+          <p:cNvPr id="8" name="Picture 7" descr="eo-framework-logo-real.png"/>
+          <p:cNvPicPr>
+            <a:picLocks noChangeAspect="1"/>
+          </p:cNvPicPr>
+          <p:nvPr/>
+        </p:nvPicPr>
+        <p:blipFill>
+          <a:blip r:embed="rId3"/>
+          <a:stretch>
+            <a:fillRect/>
+          </a:stretch>
+        </p:blipFill>
+        <p:spPr>
+          <a:xfrm>
+            <a:off x="6684264" y="4535424"/>
+            <a:ext cx="2139696" cy="530352"/>
+          </a:xfrm>
+          <a:prstGeom prst="rect">
+            <a:avLst/>
+          </a:prstGeom>
+        </p:spPr>
       </p:pic>
     </p:spTree>
   </p:cSld>
@@ -4700,7 +4051,7 @@
           <a:lstStyle/>
           <a:p>
             <a:r>
-              <a:t>Slide 4: Success Framework</a:t>
+              <a:t>Implementation Approach</a:t>
             </a:r>
           </a:p>
         </p:txBody>
@@ -4721,37 +4072,166 @@
           <a:lstStyle/>
           <a:p>
             <a:r>
-              <a:t>[Stakeholder Group 1]: [Their key concern/benefit]</a:t>
-            </a:r>
-          </a:p>
-          <a:p>
-            <a:pPr/>
-            <a:r>
-              <a:t>[Stakeholder Group 2]: [Their key concern/benefit]</a:t>
-            </a:r>
-          </a:p>
-          <a:p>
-            <a:pPr/>
-            <a:r>
-              <a:t>[Executive Sponsor/Champion]: [Their strategic interest]</a:t>
-            </a:r>
-          </a:p>
-          <a:p>
-            <a:pPr/>
-            <a:r>
-              <a:t>[Measurable Outcome 1]: [How we'll measure success]</a:t>
-            </a:r>
-          </a:p>
-          <a:p>
-            <a:pPr/>
-            <a:r>
-              <a:t>[Measurable Outcome 2]: [Timeline expectations]</a:t>
-            </a:r>
-          </a:p>
-          <a:p>
-            <a:pPr/>
-            <a:r>
-              <a:t>[Strategic Outcome]: [Long-term value realization]</a:t>
+              <a:rPr sz="1400">
+                <a:solidFill>
+                  <a:srgbClr val="000000"/>
+                </a:solidFill>
+              </a:rPr>
+              <a:t>[Key milestone 1]</a:t>
+            </a:r>
+          </a:p>
+          <a:p>
+            <a:pPr/>
+            <a:r>
+              <a:rPr sz="1400">
+                <a:solidFill>
+                  <a:srgbClr val="000000"/>
+                </a:solidFill>
+              </a:rPr>
+              <a:t>[Key milestone 2]</a:t>
+            </a:r>
+          </a:p>
+          <a:p>
+            <a:pPr/>
+            <a:r>
+              <a:rPr sz="1400">
+                <a:solidFill>
+                  <a:srgbClr val="000000"/>
+                </a:solidFill>
+              </a:rPr>
+              <a:t>[Key milestone 1]</a:t>
+            </a:r>
+          </a:p>
+          <a:p>
+            <a:pPr/>
+            <a:r>
+              <a:rPr sz="1400">
+                <a:solidFill>
+                  <a:srgbClr val="000000"/>
+                </a:solidFill>
+              </a:rPr>
+              <a:t>[Key milestone 2]</a:t>
+            </a:r>
+          </a:p>
+          <a:p>
+            <a:pPr/>
+            <a:r>
+              <a:rPr sz="1400">
+                <a:solidFill>
+                  <a:srgbClr val="000000"/>
+                </a:solidFill>
+              </a:rPr>
+              <a:t>[Key milestone 1]</a:t>
+            </a:r>
+          </a:p>
+          <a:p>
+            <a:pPr/>
+            <a:r>
+              <a:rPr sz="1400">
+                <a:solidFill>
+                  <a:srgbClr val="000000"/>
+                </a:solidFill>
+              </a:rPr>
+              <a:t>[Key milestone 2]</a:t>
+            </a:r>
+          </a:p>
+          <a:p>
+            <a:pPr/>
+            <a:r>
+              <a:rPr sz="1400">
+                <a:solidFill>
+                  <a:srgbClr val="000000"/>
+                </a:solidFill>
+              </a:rPr>
+              <a:t>Dedicated project team with executive sponsorship</a:t>
+            </a:r>
+          </a:p>
+          <a:p>
+            <a:pPr/>
+            <a:r>
+              <a:rPr sz="1400">
+                <a:solidFill>
+                  <a:srgbClr val="000000"/>
+                </a:solidFill>
+              </a:rPr>
+              <a:t>Structured change management and training</a:t>
+            </a:r>
+          </a:p>
+          <a:p>
+            <a:pPr/>
+            <a:r>
+              <a:rPr sz="1400">
+                <a:solidFill>
+                  <a:srgbClr val="000000"/>
+                </a:solidFill>
+              </a:rPr>
+              <a:t>Continuous monitoring and optimization</a:t>
+            </a:r>
+          </a:p>
+          <a:p>
+            <a:pPr/>
+            <a:r>
+              <a:rPr sz="1400">
+                <a:solidFill>
+                  <a:srgbClr val="000000"/>
+                </a:solidFill>
+              </a:rPr>
+              <a:t>Risk: [Risk 1]</a:t>
+            </a:r>
+          </a:p>
+          <a:p>
+            <a:pPr/>
+            <a:r>
+              <a:rPr sz="1400">
+                <a:solidFill>
+                  <a:srgbClr val="000000"/>
+                </a:solidFill>
+              </a:rPr>
+              <a:t>  • Mitigation Strategy: [Mitigation approach]</a:t>
+            </a:r>
+          </a:p>
+          <a:p>
+            <a:pPr/>
+            <a:r>
+              <a:rPr sz="1400">
+                <a:solidFill>
+                  <a:srgbClr val="000000"/>
+                </a:solidFill>
+              </a:rPr>
+              <a:t>  • Probability: [Low/Med/High]</a:t>
+            </a:r>
+          </a:p>
+          <a:p>
+            <a:pPr/>
+            <a:r>
+              <a:rPr sz="1400">
+                <a:solidFill>
+                  <a:srgbClr val="000000"/>
+                </a:solidFill>
+              </a:rPr>
+              <a:t>Risk: [Risk 2]</a:t>
+            </a:r>
+          </a:p>
+          <a:p>
+            <a:pPr/>
+            <a:r>
+              <a:rPr sz="1400">
+                <a:solidFill>
+                  <a:srgbClr val="000000"/>
+                </a:solidFill>
+              </a:rPr>
+              <a:t>  • Mitigation Strategy: [Mitigation approach]</a:t>
+            </a:r>
+          </a:p>
+          <a:p>
+            <a:pPr/>
+            <a:r>
+              <a:rPr sz="1400">
+                <a:solidFill>
+                  <a:srgbClr val="000000"/>
+                </a:solidFill>
+              </a:rPr>
+              <a:t>  • Probability: [Low/Med/High]</a:t>
             </a:r>
           </a:p>
         </p:txBody>
@@ -4774,6 +4254,30 @@
           </a:stretch>
         </p:blipFill>
         <p:spPr/>
+      </p:pic>
+      <p:pic>
+        <p:nvPicPr>
+          <p:cNvPr id="5" name="Picture 4" descr="eo-framework-logo-real.png"/>
+          <p:cNvPicPr>
+            <a:picLocks noChangeAspect="1"/>
+          </p:cNvPicPr>
+          <p:nvPr/>
+        </p:nvPicPr>
+        <p:blipFill>
+          <a:blip r:embed="rId3"/>
+          <a:stretch>
+            <a:fillRect/>
+          </a:stretch>
+        </p:blipFill>
+        <p:spPr>
+          <a:xfrm>
+            <a:off x="6684264" y="4535424"/>
+            <a:ext cx="2139696" cy="530352"/>
+          </a:xfrm>
+          <a:prstGeom prst="rect">
+            <a:avLst/>
+          </a:prstGeom>
+        </p:spPr>
       </p:pic>
     </p:spTree>
   </p:cSld>
@@ -4809,7 +4313,7 @@
           <a:lstStyle/>
           <a:p>
             <a:r>
-              <a:t>Slide 5: Solution Overview</a:t>
+              <a:t>Timeline &amp; Milestones</a:t>
             </a:r>
           </a:p>
         </p:txBody>
@@ -4830,19 +4334,155 @@
           <a:lstStyle/>
           <a:p>
             <a:r>
-              <a:t>[Component 1]: [Brief description]</a:t>
-            </a:r>
-          </a:p>
-          <a:p>
-            <a:pPr/>
-            <a:r>
-              <a:t>[Component 2]: [Brief description]</a:t>
-            </a:r>
-          </a:p>
-          <a:p>
-            <a:pPr/>
-            <a:r>
-              <a:t>[Component 3]: [Brief description]</a:t>
+              <a:rPr sz="1400">
+                <a:solidFill>
+                  <a:srgbClr val="000000"/>
+                </a:solidFill>
+              </a:rPr>
+              <a:t>[Early benefit 1] - Month 2</a:t>
+            </a:r>
+          </a:p>
+          <a:p>
+            <a:pPr/>
+            <a:r>
+              <a:rPr sz="1400">
+                <a:solidFill>
+                  <a:srgbClr val="000000"/>
+                </a:solidFill>
+              </a:rPr>
+              <a:t>[Early benefit 2] - Month 3</a:t>
+            </a:r>
+          </a:p>
+          <a:p>
+            <a:pPr/>
+            <a:r>
+              <a:rPr sz="1400">
+                <a:solidFill>
+                  <a:srgbClr val="000000"/>
+                </a:solidFill>
+              </a:rPr>
+              <a:t>Phase: Foundation</a:t>
+            </a:r>
+          </a:p>
+          <a:p>
+            <a:pPr/>
+            <a:r>
+              <a:rPr sz="1400">
+                <a:solidFill>
+                  <a:srgbClr val="000000"/>
+                </a:solidFill>
+              </a:rPr>
+              <a:t>  • Timeline: Months 1-2</a:t>
+            </a:r>
+          </a:p>
+          <a:p>
+            <a:pPr/>
+            <a:r>
+              <a:rPr sz="1400">
+                <a:solidFill>
+                  <a:srgbClr val="000000"/>
+                </a:solidFill>
+              </a:rPr>
+              <a:t>  • Key Deliverables: [Milestone 1], [Milestone 2]</a:t>
+            </a:r>
+          </a:p>
+          <a:p>
+            <a:pPr/>
+            <a:r>
+              <a:rPr sz="1400">
+                <a:solidFill>
+                  <a:srgbClr val="000000"/>
+                </a:solidFill>
+              </a:rPr>
+              <a:t>Phase: Implementation</a:t>
+            </a:r>
+          </a:p>
+          <a:p>
+            <a:pPr/>
+            <a:r>
+              <a:rPr sz="1400">
+                <a:solidFill>
+                  <a:srgbClr val="000000"/>
+                </a:solidFill>
+              </a:rPr>
+              <a:t>  • Timeline: Months 3-4</a:t>
+            </a:r>
+          </a:p>
+          <a:p>
+            <a:pPr/>
+            <a:r>
+              <a:rPr sz="1400">
+                <a:solidFill>
+                  <a:srgbClr val="000000"/>
+                </a:solidFill>
+              </a:rPr>
+              <a:t>  • Key Deliverables: [Milestone 3], [Milestone 4]</a:t>
+            </a:r>
+          </a:p>
+          <a:p>
+            <a:pPr/>
+            <a:r>
+              <a:rPr sz="1400">
+                <a:solidFill>
+                  <a:srgbClr val="000000"/>
+                </a:solidFill>
+              </a:rPr>
+              <a:t>Phase: Optimization</a:t>
+            </a:r>
+          </a:p>
+          <a:p>
+            <a:pPr/>
+            <a:r>
+              <a:rPr sz="1400">
+                <a:solidFill>
+                  <a:srgbClr val="000000"/>
+                </a:solidFill>
+              </a:rPr>
+              <a:t>  • Timeline: Months 5-6</a:t>
+            </a:r>
+          </a:p>
+          <a:p>
+            <a:pPr/>
+            <a:r>
+              <a:rPr sz="1400">
+                <a:solidFill>
+                  <a:srgbClr val="000000"/>
+                </a:solidFill>
+              </a:rPr>
+              <a:t>  • Key Deliverables: [Milestone 5], [Milestone 6]</a:t>
+            </a:r>
+          </a:p>
+          <a:p>
+            <a:pPr/>
+            <a:r>
+              <a:rPr sz="1400">
+                <a:solidFill>
+                  <a:srgbClr val="000000"/>
+                </a:solidFill>
+              </a:rPr>
+              <a:t>Phase: Value Realization</a:t>
+            </a:r>
+          </a:p>
+          <a:p>
+            <a:pPr/>
+            <a:r>
+              <a:rPr sz="1400">
+                <a:solidFill>
+                  <a:srgbClr val="000000"/>
+                </a:solidFill>
+              </a:rPr>
+              <a:t>  • Timeline: Month 7+</a:t>
+            </a:r>
+          </a:p>
+          <a:p>
+            <a:pPr/>
+            <a:r>
+              <a:rPr sz="1400">
+                <a:solidFill>
+                  <a:srgbClr val="000000"/>
+                </a:solidFill>
+              </a:rPr>
+              <a:t>  • Key Deliverables: Full production deployment</a:t>
             </a:r>
           </a:p>
         </p:txBody>
@@ -4865,6 +4505,30 @@
           </a:stretch>
         </p:blipFill>
         <p:spPr/>
+      </p:pic>
+      <p:pic>
+        <p:nvPicPr>
+          <p:cNvPr id="5" name="Picture 4" descr="eo-framework-logo-real.png"/>
+          <p:cNvPicPr>
+            <a:picLocks noChangeAspect="1"/>
+          </p:cNvPicPr>
+          <p:nvPr/>
+        </p:nvPicPr>
+        <p:blipFill>
+          <a:blip r:embed="rId3"/>
+          <a:stretch>
+            <a:fillRect/>
+          </a:stretch>
+        </p:blipFill>
+        <p:spPr>
+          <a:xfrm>
+            <a:off x="6684264" y="4535424"/>
+            <a:ext cx="2139696" cy="530352"/>
+          </a:xfrm>
+          <a:prstGeom prst="rect">
+            <a:avLst/>
+          </a:prstGeom>
+        </p:spPr>
       </p:pic>
     </p:spTree>
   </p:cSld>
@@ -4900,7 +4564,7 @@
           <a:lstStyle/>
           <a:p>
             <a:r>
-              <a:t>Slide 6: Why This Solution?</a:t>
+              <a:t>Success Stories</a:t>
             </a:r>
           </a:p>
         </p:txBody>
@@ -4921,13 +4585,133 @@
           <a:lstStyle/>
           <a:p>
             <a:r>
-              <a:t>[Relevant case study/metric]</a:t>
-            </a:r>
-          </a:p>
-          <a:p>
-            <a:pPr/>
-            <a:r>
-              <a:t>[Industry recognition/certification]</a:t>
+              <a:rPr sz="1400">
+                <a:solidFill>
+                  <a:srgbClr val="000000"/>
+                </a:solidFill>
+              </a:rPr>
+              <a:t>Aspect: Client</a:t>
+            </a:r>
+          </a:p>
+          <a:p>
+            <a:pPr/>
+            <a:r>
+              <a:rPr sz="1400">
+                <a:solidFill>
+                  <a:srgbClr val="000000"/>
+                </a:solidFill>
+              </a:rPr>
+              <a:t>  • Details: [Similar Company Name]</a:t>
+            </a:r>
+          </a:p>
+          <a:p>
+            <a:pPr/>
+            <a:r>
+              <a:rPr sz="1400">
+                <a:solidFill>
+                  <a:srgbClr val="000000"/>
+                </a:solidFill>
+              </a:rPr>
+              <a:t>Aspect: Challenge</a:t>
+            </a:r>
+          </a:p>
+          <a:p>
+            <a:pPr/>
+            <a:r>
+              <a:rPr sz="1400">
+                <a:solidFill>
+                  <a:srgbClr val="000000"/>
+                </a:solidFill>
+              </a:rPr>
+              <a:t>  • Details: [Similar challenge they faced]</a:t>
+            </a:r>
+          </a:p>
+          <a:p>
+            <a:pPr/>
+            <a:r>
+              <a:rPr sz="1400">
+                <a:solidFill>
+                  <a:srgbClr val="000000"/>
+                </a:solidFill>
+              </a:rPr>
+              <a:t>Aspect: Solution</a:t>
+            </a:r>
+          </a:p>
+          <a:p>
+            <a:pPr/>
+            <a:r>
+              <a:rPr sz="1400">
+                <a:solidFill>
+                  <a:srgbClr val="000000"/>
+                </a:solidFill>
+              </a:rPr>
+              <a:t>  • Details: [Solution we implemented]</a:t>
+            </a:r>
+          </a:p>
+          <a:p>
+            <a:pPr/>
+            <a:r>
+              <a:rPr sz="1400">
+                <a:solidFill>
+                  <a:srgbClr val="000000"/>
+                </a:solidFill>
+              </a:rPr>
+              <a:t>Aspect: Results</a:t>
+            </a:r>
+          </a:p>
+          <a:p>
+            <a:pPr/>
+            <a:r>
+              <a:rPr sz="1400">
+                <a:solidFill>
+                  <a:srgbClr val="000000"/>
+                </a:solidFill>
+              </a:rPr>
+              <a:t>  • Details: [Quantified results - ROI, efficiency gains, cost savings]</a:t>
+            </a:r>
+          </a:p>
+          <a:p>
+            <a:pPr/>
+            <a:r>
+              <a:rPr sz="1400">
+                <a:solidFill>
+                  <a:srgbClr val="000000"/>
+                </a:solidFill>
+              </a:rPr>
+              <a:t>Aspect: Industry Recognition</a:t>
+            </a:r>
+          </a:p>
+          <a:p>
+            <a:pPr/>
+            <a:r>
+              <a:rPr sz="1400">
+                <a:solidFill>
+                  <a:srgbClr val="000000"/>
+                </a:solidFill>
+              </a:rPr>
+              <a:t>  • Details: [Award/recognition 1], [Award/recognition 2]</a:t>
+            </a:r>
+          </a:p>
+          <a:p>
+            <a:pPr/>
+            <a:r>
+              <a:rPr sz="1400">
+                <a:solidFill>
+                  <a:srgbClr val="000000"/>
+                </a:solidFill>
+              </a:rPr>
+              <a:t>*"[Relevant quote from similar client showcasing business impact]"*</a:t>
+            </a:r>
+          </a:p>
+          <a:p>
+            <a:pPr/>
+            <a:r>
+              <a:rPr sz="1400">
+                <a:solidFill>
+                  <a:srgbClr val="000000"/>
+                </a:solidFill>
+              </a:rPr>
+              <a:t>— [Client Name, Title, Company]</a:t>
             </a:r>
           </a:p>
         </p:txBody>
@@ -4951,253 +4735,29 @@
         </p:blipFill>
         <p:spPr/>
       </p:pic>
-    </p:spTree>
-  </p:cSld>
-  <p:clrMapOvr>
-    <a:masterClrMapping/>
-  </p:clrMapOvr>
-</p:sld>
-</file>
-
-<file path=ppt/slides/slide8.xml><?xml version="1.0" encoding="utf-8"?>
-<p:sld xmlns:a="http://schemas.openxmlformats.org/drawingml/2006/main" xmlns:p="http://schemas.openxmlformats.org/presentationml/2006/main" xmlns:r="http://schemas.openxmlformats.org/officeDocument/2006/relationships">
-  <p:cSld>
-    <p:spTree>
-      <p:nvGrpSpPr>
-        <p:cNvPr id="1" name=""/>
-        <p:cNvGrpSpPr/>
-        <p:nvPr/>
-      </p:nvGrpSpPr>
-      <p:grpSpPr/>
-      <p:sp>
-        <p:nvSpPr>
-          <p:cNvPr id="2" name="Text Placeholder 1"/>
-          <p:cNvSpPr>
-            <a:spLocks noGrp="1"/>
-          </p:cNvSpPr>
-          <p:nvPr>
-            <p:ph type="body" idx="10" sz="quarter"/>
-          </p:nvPr>
-        </p:nvSpPr>
-        <p:spPr/>
-        <p:txBody>
-          <a:bodyPr/>
-          <a:lstStyle/>
-          <a:p>
-            <a:r>
-              <a:t>Slide 7: Business Value - Strategic Benefits</a:t>
-            </a:r>
-          </a:p>
-        </p:txBody>
-      </p:sp>
-      <p:sp>
-        <p:nvSpPr>
-          <p:cNvPr id="3" name="Text Placeholder 2"/>
-          <p:cNvSpPr>
-            <a:spLocks noGrp="1"/>
-          </p:cNvSpPr>
-          <p:nvPr>
-            <p:ph type="body" idx="11" sz="quarter"/>
-          </p:nvPr>
-        </p:nvSpPr>
-        <p:spPr/>
-        <p:txBody>
-          <a:bodyPr/>
-          <a:lstStyle/>
-          <a:p>
-            <a:r>
-              <a:t>[Specific operational improvement]</a:t>
-            </a:r>
-          </a:p>
-          <a:p>
-            <a:pPr/>
-            <a:r>
-              <a:t>[Efficiency gain with metrics]</a:t>
-            </a:r>
-          </a:p>
-          <a:p>
-            <a:pPr/>
-            <a:r>
-              <a:t>[Strategic differentiator 1]</a:t>
-            </a:r>
-          </a:p>
-          <a:p>
-            <a:pPr/>
-            <a:r>
-              <a:t>[Strategic differentiator 2]</a:t>
-            </a:r>
-          </a:p>
-          <a:p>
-            <a:pPr/>
-            <a:r>
-              <a:t>[Risk reduction 1]</a:t>
-            </a:r>
-          </a:p>
-          <a:p>
-            <a:pPr/>
-            <a:r>
-              <a:t>[Risk reduction 2]</a:t>
-            </a:r>
-          </a:p>
-          <a:p>
-            <a:pPr/>
-            <a:r>
-              <a:t>[Future capability 1]</a:t>
-            </a:r>
-          </a:p>
-          <a:p>
-            <a:pPr/>
-            <a:r>
-              <a:t>[Future capability 2]</a:t>
-            </a:r>
-          </a:p>
-        </p:txBody>
-      </p:sp>
       <p:pic>
         <p:nvPicPr>
-          <p:cNvPr id="4" name="Picture Placeholder 3" descr="consulting_company_logo.png"/>
+          <p:cNvPr id="5" name="Picture 4" descr="eo-framework-logo-real.png"/>
           <p:cNvPicPr>
-            <a:picLocks noGrp="1" noChangeAspect="1"/>
+            <a:picLocks noChangeAspect="1"/>
           </p:cNvPicPr>
-          <p:nvPr>
-            <p:ph type="pic" idx="13" sz="quarter"/>
-          </p:nvPr>
+          <p:nvPr/>
         </p:nvPicPr>
         <p:blipFill>
-          <a:blip r:embed="rId2"/>
-          <a:srcRect t="6762" b="6762"/>
+          <a:blip r:embed="rId3"/>
           <a:stretch>
             <a:fillRect/>
           </a:stretch>
         </p:blipFill>
-        <p:spPr/>
-      </p:pic>
-    </p:spTree>
-  </p:cSld>
-  <p:clrMapOvr>
-    <a:masterClrMapping/>
-  </p:clrMapOvr>
-</p:sld>
-</file>
-
-<file path=ppt/slides/slide9.xml><?xml version="1.0" encoding="utf-8"?>
-<p:sld xmlns:a="http://schemas.openxmlformats.org/drawingml/2006/main" xmlns:p="http://schemas.openxmlformats.org/presentationml/2006/main" xmlns:r="http://schemas.openxmlformats.org/officeDocument/2006/relationships">
-  <p:cSld>
-    <p:spTree>
-      <p:nvGrpSpPr>
-        <p:cNvPr id="1" name=""/>
-        <p:cNvGrpSpPr/>
-        <p:nvPr/>
-      </p:nvGrpSpPr>
-      <p:grpSpPr/>
-      <p:sp>
-        <p:nvSpPr>
-          <p:cNvPr id="2" name="Text Placeholder 1"/>
-          <p:cNvSpPr>
-            <a:spLocks noGrp="1"/>
-          </p:cNvSpPr>
-          <p:nvPr>
-            <p:ph type="body" idx="10" sz="quarter"/>
-          </p:nvPr>
-        </p:nvSpPr>
-        <p:spPr/>
-        <p:txBody>
-          <a:bodyPr/>
-          <a:lstStyle/>
-          <a:p>
-            <a:r>
-              <a:t>Slide 8: Implementation Approach</a:t>
-            </a:r>
-          </a:p>
-        </p:txBody>
-      </p:sp>
-      <p:sp>
-        <p:nvSpPr>
-          <p:cNvPr id="3" name="Text Placeholder 2"/>
-          <p:cNvSpPr>
-            <a:spLocks noGrp="1"/>
-          </p:cNvSpPr>
-          <p:nvPr>
-            <p:ph type="body" idx="11" sz="quarter"/>
-          </p:nvPr>
-        </p:nvSpPr>
-        <p:spPr/>
-        <p:txBody>
-          <a:bodyPr/>
-          <a:lstStyle/>
-          <a:p>
-            <a:r>
-              <a:t>[Key milestone 1]</a:t>
-            </a:r>
-          </a:p>
-          <a:p>
-            <a:pPr/>
-            <a:r>
-              <a:t>[Key milestone 2]</a:t>
-            </a:r>
-          </a:p>
-          <a:p>
-            <a:pPr/>
-            <a:r>
-              <a:t>[Key milestone 1]</a:t>
-            </a:r>
-          </a:p>
-          <a:p>
-            <a:pPr/>
-            <a:r>
-              <a:t>[Key milestone 2]</a:t>
-            </a:r>
-          </a:p>
-          <a:p>
-            <a:pPr/>
-            <a:r>
-              <a:t>[Key milestone 1]</a:t>
-            </a:r>
-          </a:p>
-          <a:p>
-            <a:pPr/>
-            <a:r>
-              <a:t>[Key milestone 2]</a:t>
-            </a:r>
-          </a:p>
-          <a:p>
-            <a:pPr/>
-            <a:r>
-              <a:t>Dedicated project team</a:t>
-            </a:r>
-          </a:p>
-          <a:p>
-            <a:pPr/>
-            <a:r>
-              <a:t>Executive sponsorship</a:t>
-            </a:r>
-          </a:p>
-          <a:p>
-            <a:pPr/>
-            <a:r>
-              <a:t>Change management focus</a:t>
-            </a:r>
-          </a:p>
-        </p:txBody>
-      </p:sp>
-      <p:pic>
-        <p:nvPicPr>
-          <p:cNvPr id="4" name="Picture Placeholder 3" descr="consulting_company_logo.png"/>
-          <p:cNvPicPr>
-            <a:picLocks noGrp="1" noChangeAspect="1"/>
-          </p:cNvPicPr>
-          <p:nvPr>
-            <p:ph type="pic" idx="13" sz="quarter"/>
-          </p:nvPr>
-        </p:nvPicPr>
-        <p:blipFill>
-          <a:blip r:embed="rId2"/>
-          <a:srcRect t="6762" b="6762"/>
-          <a:stretch>
-            <a:fillRect/>
-          </a:stretch>
-        </p:blipFill>
-        <p:spPr/>
+        <p:spPr>
+          <a:xfrm>
+            <a:off x="6684264" y="4535424"/>
+            <a:ext cx="2139696" cy="530352"/>
+          </a:xfrm>
+          <a:prstGeom prst="rect">
+            <a:avLst/>
+          </a:prstGeom>
+        </p:spPr>
       </p:pic>
     </p:spTree>
   </p:cSld>

</xml_diff>

<commit_message>
Add hierarchical bullet support for PowerPoint presentations
Updates:
- Implement multi-level bullet indentation parsing in markdown (2 spaces = 1 level)
- Preserve line indentation during markdown parsing for accurate level detection
- Fix placeholder index mapping for EO Single Column layout (idx=14)
- Remove explicit color overrides to inherit template formatting
- Update solution briefing to use hierarchical structure (Opportunity/Success Criteria)
- Store bullets as (text, level) tuples for proper PowerPoint paragraph level assignment
- Regenerate presentations with updated formatting and structure
</commit_message>
<xml_diff>
--- a/solution-template/sample-provider/sample-category/sample-solution/presales/solution-briefing.pptx
+++ b/solution-template/sample-provider/sample-category/sample-solution/presales/solution-briefing.pptx
@@ -5,16 +5,19 @@
     <p:sldMasterId id="2147483648" r:id="rId1"/>
   </p:sldMasterIdLst>
   <p:notesMasterIdLst>
-    <p:notesMasterId r:id="rId2"/>
+    <p:notesMasterId r:id="rId4"/>
   </p:notesMasterIdLst>
   <p:sldIdLst>
-    <p:sldId id="256" r:id="rId7"/>
-    <p:sldId id="257" r:id="rId8"/>
+    <p:sldId id="256" r:id="rId3"/>
+    <p:sldId id="257" r:id="rId2"/>
     <p:sldId id="258" r:id="rId9"/>
     <p:sldId id="259" r:id="rId10"/>
     <p:sldId id="260" r:id="rId11"/>
     <p:sldId id="261" r:id="rId12"/>
     <p:sldId id="262" r:id="rId13"/>
+    <p:sldId id="263" r:id="rId14"/>
+    <p:sldId id="264" r:id="rId15"/>
+    <p:sldId id="265" r:id="rId16"/>
   </p:sldIdLst>
   <p:sldSz cx="9144000" cy="5143500" type="screen16x9"/>
   <p:notesSz cx="5143500" cy="9144000"/>
@@ -727,122 +730,6 @@
       </p:sp>
       <p:sp>
         <p:nvSpPr>
-          <p:cNvPr id="11" name="Text Placeholder 10">
-            <a:extLst>
-              <a:ext uri="{FF2B5EF4-FFF2-40B4-BE49-F238E27FC236}">
-                <a16:creationId xmlns:a16="http://schemas.microsoft.com/office/drawing/2014/main" id="{B273A1B3-664A-DD19-7B35-B4E3982A4030}"/>
-              </a:ext>
-            </a:extLst>
-          </p:cNvPr>
-          <p:cNvSpPr>
-            <a:spLocks noGrp="1"/>
-          </p:cNvSpPr>
-          <p:nvPr>
-            <p:ph type="body" sz="quarter" idx="11" hasCustomPrompt="1"/>
-          </p:nvPr>
-        </p:nvSpPr>
-        <p:spPr>
-          <a:xfrm>
-            <a:off x="296863" y="685597"/>
-            <a:ext cx="8509304" cy="3771184"/>
-          </a:xfrm>
-          <a:prstGeom prst="rect">
-            <a:avLst/>
-          </a:prstGeom>
-        </p:spPr>
-        <p:txBody>
-          <a:bodyPr/>
-          <a:lstStyle>
-            <a:lvl1pPr marL="0" indent="0">
-              <a:buNone/>
-              <a:defRPr sz="1600">
-                <a:latin typeface="Arial" panose="020B0604020202020204" pitchFamily="34" charset="0"/>
-                <a:cs typeface="Arial" panose="020B0604020202020204" pitchFamily="34" charset="0"/>
-              </a:defRPr>
-            </a:lvl1pPr>
-            <a:lvl2pPr>
-              <a:defRPr sz="1600">
-                <a:latin typeface="Arial" panose="020B0604020202020204" pitchFamily="34" charset="0"/>
-                <a:cs typeface="Arial" panose="020B0604020202020204" pitchFamily="34" charset="0"/>
-              </a:defRPr>
-            </a:lvl2pPr>
-            <a:lvl3pPr>
-              <a:defRPr sz="1600">
-                <a:latin typeface="Arial" panose="020B0604020202020204" pitchFamily="34" charset="0"/>
-                <a:cs typeface="Arial" panose="020B0604020202020204" pitchFamily="34" charset="0"/>
-              </a:defRPr>
-            </a:lvl3pPr>
-            <a:lvl4pPr>
-              <a:defRPr sz="1600">
-                <a:latin typeface="Arial" panose="020B0604020202020204" pitchFamily="34" charset="0"/>
-                <a:cs typeface="Arial" panose="020B0604020202020204" pitchFamily="34" charset="0"/>
-              </a:defRPr>
-            </a:lvl4pPr>
-            <a:lvl5pPr>
-              <a:defRPr sz="1600">
-                <a:latin typeface="Arial" panose="020B0604020202020204" pitchFamily="34" charset="0"/>
-                <a:cs typeface="Arial" panose="020B0604020202020204" pitchFamily="34" charset="0"/>
-              </a:defRPr>
-            </a:lvl5pPr>
-          </a:lstStyle>
-          <a:p>
-            <a:pPr marL="0" marR="0" lvl="0" indent="0" algn="l" defTabSz="914400" rtl="0" eaLnBrk="1" fontAlgn="auto" latinLnBrk="0" hangingPunct="1">
-              <a:lnSpc>
-                <a:spcPts val="2400"/>
-              </a:lnSpc>
-              <a:spcBef>
-                <a:spcPts val="300"/>
-              </a:spcBef>
-              <a:spcAft>
-                <a:spcPts val="300"/>
-              </a:spcAft>
-              <a:buClrTx/>
-              <a:buSzTx/>
-              <a:buFontTx/>
-              <a:buNone/>
-              <a:tabLst/>
-              <a:defRPr/>
-            </a:pPr>
-            <a:r>
-              <a:rPr kumimoji="0" lang="en-US" sz="1500" b="0" i="0" u="none" strike="noStrike" kern="1200" cap="none" spc="0" normalizeH="0" baseline="0" noProof="0" dirty="0">
-                <a:ln>
-                  <a:noFill/>
-                </a:ln>
-                <a:solidFill>
-                  <a:srgbClr val="2C3E50"/>
-                </a:solidFill>
-                <a:effectLst/>
-                <a:uLnTx/>
-                <a:uFillTx/>
-                <a:latin typeface="Arial" pitchFamily="34" charset="0"/>
-                <a:ea typeface="Arial" pitchFamily="34" charset="-122"/>
-                <a:cs typeface="Arial" pitchFamily="34" charset="-120"/>
-              </a:rPr>
-              <a:t>This is a single-column content slide. Use this layout for focused content with paragraphs or key messages.</a:t>
-            </a:r>
-            <a:endParaRPr kumimoji="0" lang="en-US" sz="1500" b="0" i="0" u="none" strike="noStrike" kern="1200" cap="none" spc="0" normalizeH="0" baseline="0" noProof="0" dirty="0">
-              <a:ln>
-                <a:noFill/>
-              </a:ln>
-              <a:solidFill>
-                <a:prstClr val="black"/>
-              </a:solidFill>
-              <a:effectLst/>
-              <a:uLnTx/>
-              <a:uFillTx/>
-              <a:latin typeface="Calibri" panose="020F0502020204030204"/>
-              <a:ea typeface="+mn-ea"/>
-              <a:cs typeface="+mn-cs"/>
-            </a:endParaRPr>
-          </a:p>
-          <a:p>
-            <a:pPr lvl="0"/>
-            <a:endParaRPr lang="en-US" dirty="0"/>
-          </a:p>
-        </p:txBody>
-      </p:sp>
-      <p:sp>
-        <p:nvSpPr>
           <p:cNvPr id="12" name="Picture Placeholder 13">
             <a:extLst>
               <a:ext uri="{FF2B5EF4-FFF2-40B4-BE49-F238E27FC236}">
@@ -904,6 +791,85 @@
           </a:prstGeom>
         </p:spPr>
       </p:pic>
+      <p:sp>
+        <p:nvSpPr>
+          <p:cNvPr id="4" name="Text Placeholder 3">
+            <a:extLst>
+              <a:ext uri="{FF2B5EF4-FFF2-40B4-BE49-F238E27FC236}">
+                <a16:creationId xmlns:a16="http://schemas.microsoft.com/office/drawing/2014/main" id="{54BEE1A0-720D-187D-95F8-429F3DF3D64E}"/>
+              </a:ext>
+            </a:extLst>
+          </p:cNvPr>
+          <p:cNvSpPr>
+            <a:spLocks noGrp="1"/>
+          </p:cNvSpPr>
+          <p:nvPr>
+            <p:ph type="body" sz="quarter" idx="14"/>
+          </p:nvPr>
+        </p:nvSpPr>
+        <p:spPr>
+          <a:xfrm>
+            <a:off x="296863" y="787400"/>
+            <a:ext cx="8548687" cy="3568700"/>
+          </a:xfrm>
+          <a:prstGeom prst="rect">
+            <a:avLst/>
+          </a:prstGeom>
+        </p:spPr>
+        <p:txBody>
+          <a:bodyPr/>
+          <a:lstStyle>
+            <a:lvl1pPr>
+              <a:defRPr sz="2000" baseline="0">
+                <a:solidFill>
+                  <a:srgbClr val="C00000"/>
+                </a:solidFill>
+              </a:defRPr>
+            </a:lvl1pPr>
+            <a:lvl2pPr>
+              <a:buFont typeface="Arial" panose="020B0604020202020204" pitchFamily="34" charset="0"/>
+              <a:buChar char="•"/>
+              <a:defRPr sz="1600"/>
+            </a:lvl2pPr>
+            <a:lvl3pPr>
+              <a:defRPr sz="1400"/>
+            </a:lvl3pPr>
+            <a:lvl4pPr>
+              <a:buFont typeface="Arial" panose="020B0604020202020204" pitchFamily="34" charset="0"/>
+              <a:buChar char="•"/>
+              <a:defRPr sz="1200"/>
+            </a:lvl4pPr>
+          </a:lstStyle>
+          <a:p>
+            <a:pPr lvl="0"/>
+            <a:r>
+              <a:rPr lang="en-US" dirty="0"/>
+              <a:t>Click to edit Master text styles</a:t>
+            </a:r>
+          </a:p>
+          <a:p>
+            <a:pPr lvl="1"/>
+            <a:r>
+              <a:rPr lang="en-US" dirty="0"/>
+              <a:t>Second level</a:t>
+            </a:r>
+          </a:p>
+          <a:p>
+            <a:pPr lvl="2"/>
+            <a:r>
+              <a:rPr lang="en-US" dirty="0"/>
+              <a:t>Third level</a:t>
+            </a:r>
+          </a:p>
+          <a:p>
+            <a:pPr lvl="3"/>
+            <a:r>
+              <a:rPr lang="en-US" dirty="0"/>
+              <a:t>Fourth level</a:t>
+            </a:r>
+          </a:p>
+        </p:txBody>
+      </p:sp>
     </p:spTree>
     <p:extLst>
       <p:ext uri="{BB962C8B-B14F-4D97-AF65-F5344CB8AC3E}">
@@ -1176,8 +1142,21 @@
         <p:txBody>
           <a:bodyPr/>
           <a:lstStyle>
-            <a:lvl1pPr marL="0" indent="0">
-              <a:buNone/>
+            <a:lvl1pPr marL="0" marR="0" indent="0" algn="l" defTabSz="914400" rtl="0" eaLnBrk="1" fontAlgn="auto" latinLnBrk="0" hangingPunct="1">
+              <a:lnSpc>
+                <a:spcPct val="100000"/>
+              </a:lnSpc>
+              <a:spcBef>
+                <a:spcPct val="20000"/>
+              </a:spcBef>
+              <a:spcAft>
+                <a:spcPts val="0"/>
+              </a:spcAft>
+              <a:buClrTx/>
+              <a:buSzTx/>
+              <a:buFont typeface="Arial" panose="020B0604020202020204" pitchFamily="34" charset="0"/>
+              <a:buChar char="•"/>
+              <a:tabLst/>
               <a:defRPr sz="1500">
                 <a:latin typeface="Arial" panose="020B0604020202020204" pitchFamily="34" charset="0"/>
                 <a:cs typeface="Arial" panose="020B0604020202020204" pitchFamily="34" charset="0"/>
@@ -1212,8 +1191,35 @@
             <a:pPr lvl="0"/>
             <a:r>
               <a:rPr lang="en-US" dirty="0"/>
-              <a:t>Left Column Text</a:t>
-            </a:r>
+              <a:t> Left Column Text</a:t>
+            </a:r>
+          </a:p>
+          <a:p>
+            <a:pPr marL="0" marR="0" lvl="0" indent="0" algn="l" defTabSz="914400" rtl="0" eaLnBrk="1" fontAlgn="auto" latinLnBrk="0" hangingPunct="1">
+              <a:lnSpc>
+                <a:spcPct val="100000"/>
+              </a:lnSpc>
+              <a:spcBef>
+                <a:spcPct val="20000"/>
+              </a:spcBef>
+              <a:spcAft>
+                <a:spcPts val="0"/>
+              </a:spcAft>
+              <a:buClrTx/>
+              <a:buSzTx/>
+              <a:buFont typeface="Arial" panose="020B0604020202020204" pitchFamily="34" charset="0"/>
+              <a:buChar char="•"/>
+              <a:tabLst/>
+              <a:defRPr/>
+            </a:pPr>
+            <a:r>
+              <a:rPr lang="en-US" dirty="0"/>
+              <a:t> Left Column Text</a:t>
+            </a:r>
+          </a:p>
+          <a:p>
+            <a:pPr lvl="0"/>
+            <a:endParaRPr lang="en-US" dirty="0"/>
           </a:p>
         </p:txBody>
       </p:sp>
@@ -1308,8 +1314,21 @@
         <p:txBody>
           <a:bodyPr/>
           <a:lstStyle>
-            <a:lvl1pPr marL="0" indent="0">
-              <a:buNone/>
+            <a:lvl1pPr marL="0" marR="0" indent="0" algn="l" defTabSz="914400" rtl="0" eaLnBrk="1" fontAlgn="auto" latinLnBrk="0" hangingPunct="1">
+              <a:lnSpc>
+                <a:spcPct val="100000"/>
+              </a:lnSpc>
+              <a:spcBef>
+                <a:spcPct val="20000"/>
+              </a:spcBef>
+              <a:spcAft>
+                <a:spcPts val="0"/>
+              </a:spcAft>
+              <a:buClrTx/>
+              <a:buSzTx/>
+              <a:buFont typeface="Arial" panose="020B0604020202020204" pitchFamily="34" charset="0"/>
+              <a:buChar char="•"/>
+              <a:tabLst/>
               <a:defRPr sz="1500">
                 <a:latin typeface="Arial" panose="020B0604020202020204" pitchFamily="34" charset="0"/>
                 <a:cs typeface="Arial" panose="020B0604020202020204" pitchFamily="34" charset="0"/>
@@ -1344,8 +1363,35 @@
             <a:pPr lvl="0"/>
             <a:r>
               <a:rPr lang="en-US" dirty="0"/>
-              <a:t>Right Column Text</a:t>
-            </a:r>
+              <a:t> Right Column Text</a:t>
+            </a:r>
+          </a:p>
+          <a:p>
+            <a:pPr marL="0" marR="0" lvl="0" indent="0" algn="l" defTabSz="914400" rtl="0" eaLnBrk="1" fontAlgn="auto" latinLnBrk="0" hangingPunct="1">
+              <a:lnSpc>
+                <a:spcPct val="100000"/>
+              </a:lnSpc>
+              <a:spcBef>
+                <a:spcPct val="20000"/>
+              </a:spcBef>
+              <a:spcAft>
+                <a:spcPts val="0"/>
+              </a:spcAft>
+              <a:buClrTx/>
+              <a:buSzTx/>
+              <a:buFont typeface="Arial" panose="020B0604020202020204" pitchFamily="34" charset="0"/>
+              <a:buChar char="•"/>
+              <a:tabLst/>
+              <a:defRPr/>
+            </a:pPr>
+            <a:r>
+              <a:rPr lang="en-US" dirty="0"/>
+              <a:t> Right Column Text</a:t>
+            </a:r>
+          </a:p>
+          <a:p>
+            <a:pPr lvl="0"/>
+            <a:endParaRPr lang="en-US" dirty="0"/>
           </a:p>
         </p:txBody>
       </p:sp>
@@ -1592,7 +1638,10 @@
           <a:bodyPr/>
           <a:lstStyle>
             <a:lvl1pPr>
-              <a:defRPr sz="2400">
+              <a:defRPr sz="2200">
+                <a:solidFill>
+                  <a:srgbClr val="C00000"/>
+                </a:solidFill>
                 <a:latin typeface="Arial" panose="020B0604020202020204" pitchFamily="34" charset="0"/>
                 <a:cs typeface="Arial" panose="020B0604020202020204" pitchFamily="34" charset="0"/>
               </a:defRPr>
@@ -3300,7 +3349,7 @@
           <a:lstStyle/>
           <a:p>
             <a:r>
-              <a:t>Alison Smith | November 09, 2025</a:t>
+              <a:t>Alison Smith | November 10, 2025</a:t>
             </a:r>
           </a:p>
         </p:txBody>
@@ -3308,6 +3357,165 @@
       <p:pic>
         <p:nvPicPr>
           <p:cNvPr id="7" name="Picture 6" descr="eo-framework-logo-real.png"/>
+          <p:cNvPicPr>
+            <a:picLocks noChangeAspect="1"/>
+          </p:cNvPicPr>
+          <p:nvPr/>
+        </p:nvPicPr>
+        <p:blipFill>
+          <a:blip r:embed="rId4"/>
+          <a:stretch>
+            <a:fillRect/>
+          </a:stretch>
+        </p:blipFill>
+        <p:spPr>
+          <a:xfrm>
+            <a:off x="6684264" y="4535424"/>
+            <a:ext cx="2139696" cy="530352"/>
+          </a:xfrm>
+          <a:prstGeom prst="rect">
+            <a:avLst/>
+          </a:prstGeom>
+        </p:spPr>
+      </p:pic>
+    </p:spTree>
+  </p:cSld>
+  <p:clrMapOvr>
+    <a:masterClrMapping/>
+  </p:clrMapOvr>
+</p:sld>
+</file>
+
+<file path=ppt/slides/slide10.xml><?xml version="1.0" encoding="utf-8"?>
+<p:sld xmlns:a="http://schemas.openxmlformats.org/drawingml/2006/main" xmlns:p="http://schemas.openxmlformats.org/presentationml/2006/main" xmlns:r="http://schemas.openxmlformats.org/officeDocument/2006/relationships">
+  <p:cSld>
+    <p:spTree>
+      <p:nvGrpSpPr>
+        <p:cNvPr id="1" name=""/>
+        <p:cNvGrpSpPr/>
+        <p:nvPr/>
+      </p:nvGrpSpPr>
+      <p:grpSpPr/>
+      <p:pic>
+        <p:nvPicPr>
+          <p:cNvPr id="2" name="Picture Placeholder 1" descr="client_logo.png"/>
+          <p:cNvPicPr>
+            <a:picLocks noGrp="1" noChangeAspect="1"/>
+          </p:cNvPicPr>
+          <p:nvPr>
+            <p:ph type="pic" idx="10" sz="quarter"/>
+          </p:nvPr>
+        </p:nvPicPr>
+        <p:blipFill>
+          <a:blip r:embed="rId2"/>
+          <a:srcRect t="433" b="433"/>
+          <a:stretch>
+            <a:fillRect/>
+          </a:stretch>
+        </p:blipFill>
+        <p:spPr/>
+      </p:pic>
+      <p:sp>
+        <p:nvSpPr>
+          <p:cNvPr id="3" name="Text Placeholder 2"/>
+          <p:cNvSpPr>
+            <a:spLocks noGrp="1"/>
+          </p:cNvSpPr>
+          <p:nvPr>
+            <p:ph type="body" idx="12" sz="quarter"/>
+          </p:nvPr>
+        </p:nvSpPr>
+        <p:spPr/>
+        <p:txBody>
+          <a:bodyPr/>
+          <a:lstStyle/>
+          <a:p>
+            <a:r>
+              <a:t>Thank You &amp; Next Steps</a:t>
+            </a:r>
+          </a:p>
+        </p:txBody>
+      </p:sp>
+      <p:pic>
+        <p:nvPicPr>
+          <p:cNvPr id="4" name="Picture Placeholder 3" descr="consulting_company_logo.png"/>
+          <p:cNvPicPr>
+            <a:picLocks noGrp="1" noChangeAspect="1"/>
+          </p:cNvPicPr>
+          <p:nvPr>
+            <p:ph type="pic" idx="13" sz="quarter"/>
+          </p:nvPr>
+        </p:nvPicPr>
+        <p:blipFill>
+          <a:blip r:embed="rId3"/>
+          <a:srcRect t="7166" b="7166"/>
+          <a:stretch>
+            <a:fillRect/>
+          </a:stretch>
+        </p:blipFill>
+        <p:spPr/>
+      </p:pic>
+      <p:sp>
+        <p:nvSpPr>
+          <p:cNvPr id="5" name="Text Placeholder 4"/>
+          <p:cNvSpPr>
+            <a:spLocks noGrp="1"/>
+          </p:cNvSpPr>
+          <p:nvPr>
+            <p:ph type="body" idx="14" sz="quarter"/>
+          </p:nvPr>
+        </p:nvSpPr>
+        <p:spPr/>
+        <p:txBody>
+          <a:bodyPr/>
+          <a:lstStyle/>
+          <a:p>
+            <a:pPr/>
+            <a:r>
+              <a:t>Week 1: Contract finalization</a:t>
+            </a:r>
+          </a:p>
+          <a:p>
+            <a:pPr/>
+            <a:r>
+              <a:t>Week 2: Project initiation &amp; planning</a:t>
+            </a:r>
+          </a:p>
+          <a:p>
+            <a:pPr/>
+            <a:r>
+              <a:t>Week 3: Environment setup</a:t>
+            </a:r>
+          </a:p>
+          <a:p>
+            <a:pPr/>
+            <a:r>
+              <a:t>Week 4: Initial implementation begins</a:t>
+            </a:r>
+          </a:p>
+          <a:p>
+            <a:pPr/>
+            <a:r>
+              <a:t>Project Lead: [Name, Title] | [Email] | [Phone]</a:t>
+            </a:r>
+          </a:p>
+          <a:p>
+            <a:pPr/>
+            <a:r>
+              <a:t>Technical Lead: [Name, Title] | [Email] | [Phone]</a:t>
+            </a:r>
+          </a:p>
+          <a:p>
+            <a:pPr/>
+            <a:r>
+              <a:t>Account Manager: [Name, Title] | [Email] | [Phone]</a:t>
+            </a:r>
+          </a:p>
+        </p:txBody>
+      </p:sp>
+      <p:pic>
+        <p:nvPicPr>
+          <p:cNvPr id="6" name="Picture 5" descr="eo-framework-logo-real.png"/>
           <p:cNvPicPr>
             <a:picLocks noChangeAspect="1"/>
           </p:cNvPicPr>
@@ -3363,172 +3571,14 @@
           <a:lstStyle/>
           <a:p>
             <a:r>
-              <a:t>Business Challenge, Impact &amp; Success</a:t>
-            </a:r>
-          </a:p>
-        </p:txBody>
-      </p:sp>
-      <p:sp>
-        <p:nvSpPr>
-          <p:cNvPr id="3" name="Text Placeholder 2"/>
-          <p:cNvSpPr>
-            <a:spLocks noGrp="1"/>
-          </p:cNvSpPr>
-          <p:nvPr>
-            <p:ph type="body" idx="11" sz="quarter"/>
-          </p:nvPr>
-        </p:nvSpPr>
-        <p:spPr/>
-        <p:txBody>
-          <a:bodyPr/>
-          <a:lstStyle/>
-          <a:p>
-            <a:r>
-              <a:rPr sz="1400">
-                <a:solidFill>
-                  <a:srgbClr val="000000"/>
-                </a:solidFill>
-              </a:rPr>
-              <a:t>[Primary business driver or problem to solve]</a:t>
-            </a:r>
-          </a:p>
-          <a:p>
-            <a:pPr/>
-            <a:r>
-              <a:rPr sz="1400">
-                <a:solidFill>
-                  <a:srgbClr val="000000"/>
-                </a:solidFill>
-              </a:rPr>
-              <a:t>[Underlying need or strategic opportunity]</a:t>
-            </a:r>
-          </a:p>
-          <a:p>
-            <a:pPr/>
-            <a:r>
-              <a:rPr sz="1400">
-                <a:solidFill>
-                  <a:srgbClr val="000000"/>
-                </a:solidFill>
-              </a:rPr>
-              <a:t>[Challenge 1]: [Specific pain point with cost/operational impact]</a:t>
-            </a:r>
-          </a:p>
-          <a:p>
-            <a:pPr/>
-            <a:r>
-              <a:rPr sz="1400">
-                <a:solidFill>
-                  <a:srgbClr val="000000"/>
-                </a:solidFill>
-              </a:rPr>
-              <a:t>[Challenge 2]: [Specific pain point with cost/operational impact]</a:t>
-            </a:r>
-          </a:p>
-          <a:p>
-            <a:pPr/>
-            <a:r>
-              <a:rPr sz="1400">
-                <a:solidFill>
-                  <a:srgbClr val="000000"/>
-                </a:solidFill>
-              </a:rPr>
-              <a:t>[Challenge 3]: [Specific pain point with cost/operational impact]</a:t>
-            </a:r>
-          </a:p>
-          <a:p>
-            <a:pPr/>
-            <a:r>
-              <a:rPr sz="1400">
-                <a:solidFill>
-                  <a:srgbClr val="000000"/>
-                </a:solidFill>
-              </a:rPr>
-              <a:t>Operational: [Impact on efficiency, productivity, cost reduction]</a:t>
-            </a:r>
-          </a:p>
-          <a:p>
-            <a:pPr/>
-            <a:r>
-              <a:rPr sz="1400">
-                <a:solidFill>
-                  <a:srgbClr val="000000"/>
-                </a:solidFill>
-              </a:rPr>
-              <a:t>Competitive: [Strategic advantage and market positioning benefit]</a:t>
-            </a:r>
-          </a:p>
-          <a:p>
-            <a:pPr/>
-            <a:r>
-              <a:rPr sz="1400">
-                <a:solidFill>
-                  <a:srgbClr val="000000"/>
-                </a:solidFill>
-              </a:rPr>
-              <a:t>Innovation: [Future capabilities and scalability enabled]</a:t>
-            </a:r>
-          </a:p>
-          <a:p>
-            <a:pPr/>
-            <a:r>
-              <a:rPr sz="1400">
-                <a:solidFill>
-                  <a:srgbClr val="000000"/>
-                </a:solidFill>
-              </a:rPr>
-              <a:t>Risk: [Risk exposure reduction and compliance improvement]</a:t>
-            </a:r>
-          </a:p>
-          <a:p>
-            <a:pPr/>
-            <a:r>
-              <a:rPr sz="1400">
-                <a:solidFill>
-                  <a:srgbClr val="000000"/>
-                </a:solidFill>
-              </a:rPr>
-              <a:t>[Measurable Outcome 1]: [How we'll measure success]</a:t>
-            </a:r>
-          </a:p>
-          <a:p>
-            <a:pPr/>
-            <a:r>
-              <a:rPr sz="1400">
-                <a:solidFill>
-                  <a:srgbClr val="000000"/>
-                </a:solidFill>
-              </a:rPr>
-              <a:t>[Measurable Outcome 2]: [Timeline expectations]</a:t>
-            </a:r>
-          </a:p>
-          <a:p>
-            <a:pPr/>
-            <a:r>
-              <a:rPr sz="1400">
-                <a:solidFill>
-                  <a:srgbClr val="000000"/>
-                </a:solidFill>
-              </a:rPr>
-              <a:t>[Strategic Outcome]: [Long-term value realization]</a:t>
-            </a:r>
-          </a:p>
-          <a:p>
-            <a:pPr/>
-            <a:r>
-              <a:rPr sz="1400">
-                <a:solidFill>
-                  <a:srgbClr val="000000"/>
-                </a:solidFill>
-              </a:rPr>
-              <a:t>*"The cost of inaction: $[Amount] in lost value over [timeframe]"*</a:t>
+              <a:t>Business Opportunity</a:t>
             </a:r>
           </a:p>
         </p:txBody>
       </p:sp>
       <p:pic>
         <p:nvPicPr>
-          <p:cNvPr id="4" name="Picture Placeholder 3" descr="consulting_company_logo.png"/>
+          <p:cNvPr id="3" name="Picture Placeholder 2" descr="consulting_company_logo.png"/>
           <p:cNvPicPr>
             <a:picLocks noGrp="1" noChangeAspect="1"/>
           </p:cNvPicPr>
@@ -3545,6 +3595,70 @@
         </p:blipFill>
         <p:spPr/>
       </p:pic>
+      <p:sp>
+        <p:nvSpPr>
+          <p:cNvPr id="4" name="Text Placeholder 3"/>
+          <p:cNvSpPr>
+            <a:spLocks noGrp="1"/>
+          </p:cNvSpPr>
+          <p:nvPr>
+            <p:ph type="body" idx="14" sz="quarter"/>
+          </p:nvPr>
+        </p:nvSpPr>
+        <p:spPr/>
+        <p:txBody>
+          <a:bodyPr/>
+          <a:lstStyle/>
+          <a:p>
+            <a:pPr/>
+            <a:r>
+              <a:t>Opportunity</a:t>
+            </a:r>
+          </a:p>
+          <a:p>
+            <a:pPr lvl="1"/>
+            <a:r>
+              <a:t>Accelerate digital transformation and modernize legacy systems to unlock new revenue streams</a:t>
+            </a:r>
+          </a:p>
+          <a:p>
+            <a:pPr lvl="1"/>
+            <a:r>
+              <a:t>Gain competitive advantage through data-driven insights and faster time-to-market</a:t>
+            </a:r>
+          </a:p>
+          <a:p>
+            <a:pPr lvl="1"/>
+            <a:r>
+              <a:t>Enable scalability and innovation while reducing operational costs by 30-40%</a:t>
+            </a:r>
+          </a:p>
+          <a:p>
+            <a:pPr/>
+            <a:r>
+              <a:t>Success Criteria</a:t>
+            </a:r>
+          </a:p>
+          <a:p>
+            <a:pPr lvl="1"/>
+            <a:r>
+              <a:t>Achieve measurable ROI within 12 months with quantified business value metrics</a:t>
+            </a:r>
+          </a:p>
+          <a:p>
+            <a:pPr lvl="1"/>
+            <a:r>
+              <a:t>Complete deployment across all business units with 95% user adoption rate</a:t>
+            </a:r>
+          </a:p>
+          <a:p>
+            <a:pPr lvl="1"/>
+            <a:r>
+              <a:t>Establish foundation for continuous innovation and future capability expansion</a:t>
+            </a:r>
+          </a:p>
+        </p:txBody>
+      </p:sp>
       <p:pic>
         <p:nvPicPr>
           <p:cNvPr id="5" name="Picture 4" descr="eo-framework-logo-real.png"/>
@@ -3623,68 +3737,33 @@
           <a:bodyPr/>
           <a:lstStyle/>
           <a:p>
-            <a:r>
-              <a:rPr sz="1400">
-                <a:solidFill>
-                  <a:srgbClr val="000000"/>
-                </a:solidFill>
-              </a:rPr>
+            <a:pPr/>
+            <a:r>
               <a:t>[Component 1]: [Brief description]</a:t>
             </a:r>
           </a:p>
           <a:p>
             <a:pPr/>
             <a:r>
-              <a:rPr sz="1400">
-                <a:solidFill>
-                  <a:srgbClr val="000000"/>
-                </a:solidFill>
-              </a:rPr>
               <a:t>[Component 2]: [Brief description]</a:t>
             </a:r>
           </a:p>
           <a:p>
             <a:pPr/>
             <a:r>
-              <a:rPr sz="1400">
-                <a:solidFill>
-                  <a:srgbClr val="000000"/>
-                </a:solidFill>
-              </a:rPr>
               <a:t>[Component 3]: [Brief description]</a:t>
             </a:r>
           </a:p>
           <a:p>
             <a:pPr/>
             <a:r>
-              <a:rPr sz="1400">
-                <a:solidFill>
-                  <a:srgbClr val="000000"/>
-                </a:solidFill>
-              </a:rPr>
               <a:t>[Platform/Technology 1]</a:t>
             </a:r>
           </a:p>
           <a:p>
             <a:pPr/>
             <a:r>
-              <a:rPr sz="1400">
-                <a:solidFill>
-                  <a:srgbClr val="000000"/>
-                </a:solidFill>
-              </a:rPr>
               <a:t>[Platform/Technology 2]</a:t>
-            </a:r>
-          </a:p>
-          <a:p>
-            <a:pPr/>
-            <a:r>
-              <a:rPr sz="1400">
-                <a:solidFill>
-                  <a:srgbClr val="000000"/>
-                </a:solidFill>
-              </a:rPr>
-              <a:t>[Architecture Diagram Placeholder]</a:t>
             </a:r>
           </a:p>
         </p:txBody>
@@ -3815,127 +3894,43 @@
           <a:bodyPr/>
           <a:lstStyle/>
           <a:p>
-            <a:r>
-              <a:rPr sz="1400">
-                <a:solidFill>
-                  <a:srgbClr val="000000"/>
-                </a:solidFill>
-              </a:rPr>
+            <a:pPr/>
+            <a:r>
               <a:t>[Relevant case study/metric]</a:t>
             </a:r>
           </a:p>
           <a:p>
             <a:pPr/>
             <a:r>
-              <a:rPr sz="1400">
-                <a:solidFill>
-                  <a:srgbClr val="000000"/>
-                </a:solidFill>
-              </a:rPr>
               <a:t>[Industry recognition/certification]</a:t>
             </a:r>
           </a:p>
+        </p:txBody>
+      </p:sp>
+      <p:sp>
+        <p:nvSpPr>
+          <p:cNvPr id="4" name="Text Placeholder 3"/>
+          <p:cNvSpPr>
+            <a:spLocks noGrp="1"/>
+          </p:cNvSpPr>
+          <p:nvPr>
+            <p:ph type="body" idx="12" sz="quarter"/>
+          </p:nvPr>
+        </p:nvSpPr>
+        <p:spPr/>
+        <p:txBody>
+          <a:bodyPr/>
+          <a:lstStyle/>
           <a:p>
             <a:pPr/>
             <a:r>
-              <a:rPr sz="1400">
-                <a:solidFill>
-                  <a:srgbClr val="000000"/>
-                </a:solidFill>
-              </a:rPr>
               <a:t>[Unique capability 1]</a:t>
             </a:r>
           </a:p>
           <a:p>
             <a:pPr/>
             <a:r>
-              <a:rPr sz="1400">
-                <a:solidFill>
-                  <a:srgbClr val="000000"/>
-                </a:solidFill>
-              </a:rPr>
               <a:t>[Unique capability 2]</a:t>
-            </a:r>
-          </a:p>
-          <a:p>
-            <a:pPr/>
-            <a:r>
-              <a:rPr sz="1400">
-                <a:solidFill>
-                  <a:srgbClr val="000000"/>
-                </a:solidFill>
-              </a:rPr>
-              <a:t>Traditional Approach: [Current limitation 1]</a:t>
-            </a:r>
-          </a:p>
-        </p:txBody>
-      </p:sp>
-      <p:sp>
-        <p:nvSpPr>
-          <p:cNvPr id="4" name="Text Placeholder 3"/>
-          <p:cNvSpPr>
-            <a:spLocks noGrp="1"/>
-          </p:cNvSpPr>
-          <p:nvPr>
-            <p:ph type="body" idx="12" sz="quarter"/>
-          </p:nvPr>
-        </p:nvSpPr>
-        <p:spPr/>
-        <p:txBody>
-          <a:bodyPr/>
-          <a:lstStyle/>
-          <a:p>
-            <a:r>
-              <a:rPr sz="1400">
-                <a:solidFill>
-                  <a:srgbClr val="000000"/>
-                </a:solidFill>
-              </a:rPr>
-              <a:t>  • Our Solution: ✅ [Our advantage 1]</a:t>
-            </a:r>
-          </a:p>
-          <a:p>
-            <a:pPr/>
-            <a:r>
-              <a:rPr sz="1400">
-                <a:solidFill>
-                  <a:srgbClr val="000000"/>
-                </a:solidFill>
-              </a:rPr>
-              <a:t>Traditional Approach: [Current limitation 2]</a:t>
-            </a:r>
-          </a:p>
-          <a:p>
-            <a:pPr/>
-            <a:r>
-              <a:rPr sz="1400">
-                <a:solidFill>
-                  <a:srgbClr val="000000"/>
-                </a:solidFill>
-              </a:rPr>
-              <a:t>  • Our Solution: ✅ [Our advantage 2]</a:t>
-            </a:r>
-          </a:p>
-          <a:p>
-            <a:pPr/>
-            <a:r>
-              <a:rPr sz="1400">
-                <a:solidFill>
-                  <a:srgbClr val="000000"/>
-                </a:solidFill>
-              </a:rPr>
-              <a:t>Traditional Approach: [Current limitation 3]</a:t>
-            </a:r>
-          </a:p>
-          <a:p>
-            <a:pPr/>
-            <a:r>
-              <a:rPr sz="1400">
-                <a:solidFill>
-                  <a:srgbClr val="000000"/>
-                </a:solidFill>
-              </a:rPr>
-              <a:t>  • Our Solution: ✅ [Our advantage 3]</a:t>
             </a:r>
           </a:p>
         </p:txBody>
@@ -4056,189 +4051,9 @@
           </a:p>
         </p:txBody>
       </p:sp>
-      <p:sp>
-        <p:nvSpPr>
-          <p:cNvPr id="3" name="Text Placeholder 2"/>
-          <p:cNvSpPr>
-            <a:spLocks noGrp="1"/>
-          </p:cNvSpPr>
-          <p:nvPr>
-            <p:ph type="body" idx="11" sz="quarter"/>
-          </p:nvPr>
-        </p:nvSpPr>
-        <p:spPr/>
-        <p:txBody>
-          <a:bodyPr/>
-          <a:lstStyle/>
-          <a:p>
-            <a:r>
-              <a:rPr sz="1400">
-                <a:solidFill>
-                  <a:srgbClr val="000000"/>
-                </a:solidFill>
-              </a:rPr>
-              <a:t>[Key milestone 1]</a:t>
-            </a:r>
-          </a:p>
-          <a:p>
-            <a:pPr/>
-            <a:r>
-              <a:rPr sz="1400">
-                <a:solidFill>
-                  <a:srgbClr val="000000"/>
-                </a:solidFill>
-              </a:rPr>
-              <a:t>[Key milestone 2]</a:t>
-            </a:r>
-          </a:p>
-          <a:p>
-            <a:pPr/>
-            <a:r>
-              <a:rPr sz="1400">
-                <a:solidFill>
-                  <a:srgbClr val="000000"/>
-                </a:solidFill>
-              </a:rPr>
-              <a:t>[Key milestone 1]</a:t>
-            </a:r>
-          </a:p>
-          <a:p>
-            <a:pPr/>
-            <a:r>
-              <a:rPr sz="1400">
-                <a:solidFill>
-                  <a:srgbClr val="000000"/>
-                </a:solidFill>
-              </a:rPr>
-              <a:t>[Key milestone 2]</a:t>
-            </a:r>
-          </a:p>
-          <a:p>
-            <a:pPr/>
-            <a:r>
-              <a:rPr sz="1400">
-                <a:solidFill>
-                  <a:srgbClr val="000000"/>
-                </a:solidFill>
-              </a:rPr>
-              <a:t>[Key milestone 1]</a:t>
-            </a:r>
-          </a:p>
-          <a:p>
-            <a:pPr/>
-            <a:r>
-              <a:rPr sz="1400">
-                <a:solidFill>
-                  <a:srgbClr val="000000"/>
-                </a:solidFill>
-              </a:rPr>
-              <a:t>[Key milestone 2]</a:t>
-            </a:r>
-          </a:p>
-          <a:p>
-            <a:pPr/>
-            <a:r>
-              <a:rPr sz="1400">
-                <a:solidFill>
-                  <a:srgbClr val="000000"/>
-                </a:solidFill>
-              </a:rPr>
-              <a:t>Dedicated project team with executive sponsorship</a:t>
-            </a:r>
-          </a:p>
-          <a:p>
-            <a:pPr/>
-            <a:r>
-              <a:rPr sz="1400">
-                <a:solidFill>
-                  <a:srgbClr val="000000"/>
-                </a:solidFill>
-              </a:rPr>
-              <a:t>Structured change management and training</a:t>
-            </a:r>
-          </a:p>
-          <a:p>
-            <a:pPr/>
-            <a:r>
-              <a:rPr sz="1400">
-                <a:solidFill>
-                  <a:srgbClr val="000000"/>
-                </a:solidFill>
-              </a:rPr>
-              <a:t>Continuous monitoring and optimization</a:t>
-            </a:r>
-          </a:p>
-          <a:p>
-            <a:pPr/>
-            <a:r>
-              <a:rPr sz="1400">
-                <a:solidFill>
-                  <a:srgbClr val="000000"/>
-                </a:solidFill>
-              </a:rPr>
-              <a:t>Risk: [Risk 1]</a:t>
-            </a:r>
-          </a:p>
-          <a:p>
-            <a:pPr/>
-            <a:r>
-              <a:rPr sz="1400">
-                <a:solidFill>
-                  <a:srgbClr val="000000"/>
-                </a:solidFill>
-              </a:rPr>
-              <a:t>  • Mitigation Strategy: [Mitigation approach]</a:t>
-            </a:r>
-          </a:p>
-          <a:p>
-            <a:pPr/>
-            <a:r>
-              <a:rPr sz="1400">
-                <a:solidFill>
-                  <a:srgbClr val="000000"/>
-                </a:solidFill>
-              </a:rPr>
-              <a:t>  • Probability: [Low/Med/High]</a:t>
-            </a:r>
-          </a:p>
-          <a:p>
-            <a:pPr/>
-            <a:r>
-              <a:rPr sz="1400">
-                <a:solidFill>
-                  <a:srgbClr val="000000"/>
-                </a:solidFill>
-              </a:rPr>
-              <a:t>Risk: [Risk 2]</a:t>
-            </a:r>
-          </a:p>
-          <a:p>
-            <a:pPr/>
-            <a:r>
-              <a:rPr sz="1400">
-                <a:solidFill>
-                  <a:srgbClr val="000000"/>
-                </a:solidFill>
-              </a:rPr>
-              <a:t>  • Mitigation Strategy: [Mitigation approach]</a:t>
-            </a:r>
-          </a:p>
-          <a:p>
-            <a:pPr/>
-            <a:r>
-              <a:rPr sz="1400">
-                <a:solidFill>
-                  <a:srgbClr val="000000"/>
-                </a:solidFill>
-              </a:rPr>
-              <a:t>  • Probability: [Low/Med/High]</a:t>
-            </a:r>
-          </a:p>
-        </p:txBody>
-      </p:sp>
       <p:pic>
         <p:nvPicPr>
-          <p:cNvPr id="4" name="Picture Placeholder 3" descr="consulting_company_logo.png"/>
+          <p:cNvPr id="3" name="Picture Placeholder 2" descr="consulting_company_logo.png"/>
           <p:cNvPicPr>
             <a:picLocks noGrp="1" noChangeAspect="1"/>
           </p:cNvPicPr>
@@ -4255,6 +4070,76 @@
         </p:blipFill>
         <p:spPr/>
       </p:pic>
+      <p:sp>
+        <p:nvSpPr>
+          <p:cNvPr id="4" name="Text Placeholder 3"/>
+          <p:cNvSpPr>
+            <a:spLocks noGrp="1"/>
+          </p:cNvSpPr>
+          <p:nvPr>
+            <p:ph type="body" idx="14" sz="quarter"/>
+          </p:nvPr>
+        </p:nvSpPr>
+        <p:spPr/>
+        <p:txBody>
+          <a:bodyPr/>
+          <a:lstStyle/>
+          <a:p>
+            <a:pPr/>
+            <a:r>
+              <a:t>[Key milestone 1]</a:t>
+            </a:r>
+          </a:p>
+          <a:p>
+            <a:pPr/>
+            <a:r>
+              <a:t>[Key milestone 2]</a:t>
+            </a:r>
+          </a:p>
+          <a:p>
+            <a:pPr/>
+            <a:r>
+              <a:t>[Key milestone 1]</a:t>
+            </a:r>
+          </a:p>
+          <a:p>
+            <a:pPr/>
+            <a:r>
+              <a:t>[Key milestone 2]</a:t>
+            </a:r>
+          </a:p>
+          <a:p>
+            <a:pPr/>
+            <a:r>
+              <a:t>[Key milestone 1]</a:t>
+            </a:r>
+          </a:p>
+          <a:p>
+            <a:pPr/>
+            <a:r>
+              <a:t>[Key milestone 2]</a:t>
+            </a:r>
+          </a:p>
+          <a:p>
+            <a:pPr/>
+            <a:r>
+              <a:t>Dedicated project team with executive sponsorship</a:t>
+            </a:r>
+          </a:p>
+          <a:p>
+            <a:pPr/>
+            <a:r>
+              <a:t>Structured change management and training</a:t>
+            </a:r>
+          </a:p>
+          <a:p>
+            <a:pPr/>
+            <a:r>
+              <a:t>Continuous monitoring and optimization</a:t>
+            </a:r>
+          </a:p>
+        </p:txBody>
+      </p:sp>
       <p:pic>
         <p:nvPicPr>
           <p:cNvPr id="5" name="Picture 4" descr="eo-framework-logo-real.png"/>
@@ -4318,178 +4203,9 @@
           </a:p>
         </p:txBody>
       </p:sp>
-      <p:sp>
-        <p:nvSpPr>
-          <p:cNvPr id="3" name="Text Placeholder 2"/>
-          <p:cNvSpPr>
-            <a:spLocks noGrp="1"/>
-          </p:cNvSpPr>
-          <p:nvPr>
-            <p:ph type="body" idx="11" sz="quarter"/>
-          </p:nvPr>
-        </p:nvSpPr>
-        <p:spPr/>
-        <p:txBody>
-          <a:bodyPr/>
-          <a:lstStyle/>
-          <a:p>
-            <a:r>
-              <a:rPr sz="1400">
-                <a:solidFill>
-                  <a:srgbClr val="000000"/>
-                </a:solidFill>
-              </a:rPr>
-              <a:t>[Early benefit 1] - Month 2</a:t>
-            </a:r>
-          </a:p>
-          <a:p>
-            <a:pPr/>
-            <a:r>
-              <a:rPr sz="1400">
-                <a:solidFill>
-                  <a:srgbClr val="000000"/>
-                </a:solidFill>
-              </a:rPr>
-              <a:t>[Early benefit 2] - Month 3</a:t>
-            </a:r>
-          </a:p>
-          <a:p>
-            <a:pPr/>
-            <a:r>
-              <a:rPr sz="1400">
-                <a:solidFill>
-                  <a:srgbClr val="000000"/>
-                </a:solidFill>
-              </a:rPr>
-              <a:t>Phase: Foundation</a:t>
-            </a:r>
-          </a:p>
-          <a:p>
-            <a:pPr/>
-            <a:r>
-              <a:rPr sz="1400">
-                <a:solidFill>
-                  <a:srgbClr val="000000"/>
-                </a:solidFill>
-              </a:rPr>
-              <a:t>  • Timeline: Months 1-2</a:t>
-            </a:r>
-          </a:p>
-          <a:p>
-            <a:pPr/>
-            <a:r>
-              <a:rPr sz="1400">
-                <a:solidFill>
-                  <a:srgbClr val="000000"/>
-                </a:solidFill>
-              </a:rPr>
-              <a:t>  • Key Deliverables: [Milestone 1], [Milestone 2]</a:t>
-            </a:r>
-          </a:p>
-          <a:p>
-            <a:pPr/>
-            <a:r>
-              <a:rPr sz="1400">
-                <a:solidFill>
-                  <a:srgbClr val="000000"/>
-                </a:solidFill>
-              </a:rPr>
-              <a:t>Phase: Implementation</a:t>
-            </a:r>
-          </a:p>
-          <a:p>
-            <a:pPr/>
-            <a:r>
-              <a:rPr sz="1400">
-                <a:solidFill>
-                  <a:srgbClr val="000000"/>
-                </a:solidFill>
-              </a:rPr>
-              <a:t>  • Timeline: Months 3-4</a:t>
-            </a:r>
-          </a:p>
-          <a:p>
-            <a:pPr/>
-            <a:r>
-              <a:rPr sz="1400">
-                <a:solidFill>
-                  <a:srgbClr val="000000"/>
-                </a:solidFill>
-              </a:rPr>
-              <a:t>  • Key Deliverables: [Milestone 3], [Milestone 4]</a:t>
-            </a:r>
-          </a:p>
-          <a:p>
-            <a:pPr/>
-            <a:r>
-              <a:rPr sz="1400">
-                <a:solidFill>
-                  <a:srgbClr val="000000"/>
-                </a:solidFill>
-              </a:rPr>
-              <a:t>Phase: Optimization</a:t>
-            </a:r>
-          </a:p>
-          <a:p>
-            <a:pPr/>
-            <a:r>
-              <a:rPr sz="1400">
-                <a:solidFill>
-                  <a:srgbClr val="000000"/>
-                </a:solidFill>
-              </a:rPr>
-              <a:t>  • Timeline: Months 5-6</a:t>
-            </a:r>
-          </a:p>
-          <a:p>
-            <a:pPr/>
-            <a:r>
-              <a:rPr sz="1400">
-                <a:solidFill>
-                  <a:srgbClr val="000000"/>
-                </a:solidFill>
-              </a:rPr>
-              <a:t>  • Key Deliverables: [Milestone 5], [Milestone 6]</a:t>
-            </a:r>
-          </a:p>
-          <a:p>
-            <a:pPr/>
-            <a:r>
-              <a:rPr sz="1400">
-                <a:solidFill>
-                  <a:srgbClr val="000000"/>
-                </a:solidFill>
-              </a:rPr>
-              <a:t>Phase: Value Realization</a:t>
-            </a:r>
-          </a:p>
-          <a:p>
-            <a:pPr/>
-            <a:r>
-              <a:rPr sz="1400">
-                <a:solidFill>
-                  <a:srgbClr val="000000"/>
-                </a:solidFill>
-              </a:rPr>
-              <a:t>  • Timeline: Month 7+</a:t>
-            </a:r>
-          </a:p>
-          <a:p>
-            <a:pPr/>
-            <a:r>
-              <a:rPr sz="1400">
-                <a:solidFill>
-                  <a:srgbClr val="000000"/>
-                </a:solidFill>
-              </a:rPr>
-              <a:t>  • Key Deliverables: Full production deployment</a:t>
-            </a:r>
-          </a:p>
-        </p:txBody>
-      </p:sp>
       <p:pic>
         <p:nvPicPr>
-          <p:cNvPr id="4" name="Picture Placeholder 3" descr="consulting_company_logo.png"/>
+          <p:cNvPr id="3" name="Picture Placeholder 2" descr="consulting_company_logo.png"/>
           <p:cNvPicPr>
             <a:picLocks noGrp="1" noChangeAspect="1"/>
           </p:cNvPicPr>
@@ -4506,6 +4222,34 @@
         </p:blipFill>
         <p:spPr/>
       </p:pic>
+      <p:sp>
+        <p:nvSpPr>
+          <p:cNvPr id="4" name="Text Placeholder 3"/>
+          <p:cNvSpPr>
+            <a:spLocks noGrp="1"/>
+          </p:cNvSpPr>
+          <p:nvPr>
+            <p:ph type="body" idx="14" sz="quarter"/>
+          </p:nvPr>
+        </p:nvSpPr>
+        <p:spPr/>
+        <p:txBody>
+          <a:bodyPr/>
+          <a:lstStyle/>
+          <a:p>
+            <a:pPr/>
+            <a:r>
+              <a:t>[Early benefit 1] - Month 2</a:t>
+            </a:r>
+          </a:p>
+          <a:p>
+            <a:pPr/>
+            <a:r>
+              <a:t>[Early benefit 2] - Month 3</a:t>
+            </a:r>
+          </a:p>
+        </p:txBody>
+      </p:sp>
       <p:pic>
         <p:nvPicPr>
           <p:cNvPr id="5" name="Picture 4" descr="eo-framework-logo-real.png"/>
@@ -4569,156 +4313,9 @@
           </a:p>
         </p:txBody>
       </p:sp>
-      <p:sp>
-        <p:nvSpPr>
-          <p:cNvPr id="3" name="Text Placeholder 2"/>
-          <p:cNvSpPr>
-            <a:spLocks noGrp="1"/>
-          </p:cNvSpPr>
-          <p:nvPr>
-            <p:ph type="body" idx="11" sz="quarter"/>
-          </p:nvPr>
-        </p:nvSpPr>
-        <p:spPr/>
-        <p:txBody>
-          <a:bodyPr/>
-          <a:lstStyle/>
-          <a:p>
-            <a:r>
-              <a:rPr sz="1400">
-                <a:solidFill>
-                  <a:srgbClr val="000000"/>
-                </a:solidFill>
-              </a:rPr>
-              <a:t>Aspect: Client</a:t>
-            </a:r>
-          </a:p>
-          <a:p>
-            <a:pPr/>
-            <a:r>
-              <a:rPr sz="1400">
-                <a:solidFill>
-                  <a:srgbClr val="000000"/>
-                </a:solidFill>
-              </a:rPr>
-              <a:t>  • Details: [Similar Company Name]</a:t>
-            </a:r>
-          </a:p>
-          <a:p>
-            <a:pPr/>
-            <a:r>
-              <a:rPr sz="1400">
-                <a:solidFill>
-                  <a:srgbClr val="000000"/>
-                </a:solidFill>
-              </a:rPr>
-              <a:t>Aspect: Challenge</a:t>
-            </a:r>
-          </a:p>
-          <a:p>
-            <a:pPr/>
-            <a:r>
-              <a:rPr sz="1400">
-                <a:solidFill>
-                  <a:srgbClr val="000000"/>
-                </a:solidFill>
-              </a:rPr>
-              <a:t>  • Details: [Similar challenge they faced]</a:t>
-            </a:r>
-          </a:p>
-          <a:p>
-            <a:pPr/>
-            <a:r>
-              <a:rPr sz="1400">
-                <a:solidFill>
-                  <a:srgbClr val="000000"/>
-                </a:solidFill>
-              </a:rPr>
-              <a:t>Aspect: Solution</a:t>
-            </a:r>
-          </a:p>
-          <a:p>
-            <a:pPr/>
-            <a:r>
-              <a:rPr sz="1400">
-                <a:solidFill>
-                  <a:srgbClr val="000000"/>
-                </a:solidFill>
-              </a:rPr>
-              <a:t>  • Details: [Solution we implemented]</a:t>
-            </a:r>
-          </a:p>
-          <a:p>
-            <a:pPr/>
-            <a:r>
-              <a:rPr sz="1400">
-                <a:solidFill>
-                  <a:srgbClr val="000000"/>
-                </a:solidFill>
-              </a:rPr>
-              <a:t>Aspect: Results</a:t>
-            </a:r>
-          </a:p>
-          <a:p>
-            <a:pPr/>
-            <a:r>
-              <a:rPr sz="1400">
-                <a:solidFill>
-                  <a:srgbClr val="000000"/>
-                </a:solidFill>
-              </a:rPr>
-              <a:t>  • Details: [Quantified results - ROI, efficiency gains, cost savings]</a:t>
-            </a:r>
-          </a:p>
-          <a:p>
-            <a:pPr/>
-            <a:r>
-              <a:rPr sz="1400">
-                <a:solidFill>
-                  <a:srgbClr val="000000"/>
-                </a:solidFill>
-              </a:rPr>
-              <a:t>Aspect: Industry Recognition</a:t>
-            </a:r>
-          </a:p>
-          <a:p>
-            <a:pPr/>
-            <a:r>
-              <a:rPr sz="1400">
-                <a:solidFill>
-                  <a:srgbClr val="000000"/>
-                </a:solidFill>
-              </a:rPr>
-              <a:t>  • Details: [Award/recognition 1], [Award/recognition 2]</a:t>
-            </a:r>
-          </a:p>
-          <a:p>
-            <a:pPr/>
-            <a:r>
-              <a:rPr sz="1400">
-                <a:solidFill>
-                  <a:srgbClr val="000000"/>
-                </a:solidFill>
-              </a:rPr>
-              <a:t>*"[Relevant quote from similar client showcasing business impact]"*</a:t>
-            </a:r>
-          </a:p>
-          <a:p>
-            <a:pPr/>
-            <a:r>
-              <a:rPr sz="1400">
-                <a:solidFill>
-                  <a:srgbClr val="000000"/>
-                </a:solidFill>
-              </a:rPr>
-              <a:t>— [Client Name, Title, Company]</a:t>
-            </a:r>
-          </a:p>
-        </p:txBody>
-      </p:sp>
       <p:pic>
         <p:nvPicPr>
-          <p:cNvPr id="4" name="Picture Placeholder 3" descr="consulting_company_logo.png"/>
+          <p:cNvPr id="3" name="Picture Placeholder 2" descr="consulting_company_logo.png"/>
           <p:cNvPicPr>
             <a:picLocks noGrp="1" noChangeAspect="1"/>
           </p:cNvPicPr>
@@ -4735,9 +4332,365 @@
         </p:blipFill>
         <p:spPr/>
       </p:pic>
+      <p:sp>
+        <p:nvSpPr>
+          <p:cNvPr id="4" name="Text Placeholder 3"/>
+          <p:cNvSpPr>
+            <a:spLocks noGrp="1"/>
+          </p:cNvSpPr>
+          <p:nvPr>
+            <p:ph type="body" idx="14" sz="quarter"/>
+          </p:nvPr>
+        </p:nvSpPr>
+        <p:spPr/>
+        <p:txBody>
+          <a:bodyPr/>
+          <a:lstStyle/>
+          <a:p/>
+        </p:txBody>
+      </p:sp>
       <p:pic>
         <p:nvPicPr>
           <p:cNvPr id="5" name="Picture 4" descr="eo-framework-logo-real.png"/>
+          <p:cNvPicPr>
+            <a:picLocks noChangeAspect="1"/>
+          </p:cNvPicPr>
+          <p:nvPr/>
+        </p:nvPicPr>
+        <p:blipFill>
+          <a:blip r:embed="rId3"/>
+          <a:stretch>
+            <a:fillRect/>
+          </a:stretch>
+        </p:blipFill>
+        <p:spPr>
+          <a:xfrm>
+            <a:off x="6684264" y="4535424"/>
+            <a:ext cx="2139696" cy="530352"/>
+          </a:xfrm>
+          <a:prstGeom prst="rect">
+            <a:avLst/>
+          </a:prstGeom>
+        </p:spPr>
+      </p:pic>
+    </p:spTree>
+  </p:cSld>
+  <p:clrMapOvr>
+    <a:masterClrMapping/>
+  </p:clrMapOvr>
+</p:sld>
+</file>
+
+<file path=ppt/slides/slide8.xml><?xml version="1.0" encoding="utf-8"?>
+<p:sld xmlns:a="http://schemas.openxmlformats.org/drawingml/2006/main" xmlns:p="http://schemas.openxmlformats.org/presentationml/2006/main" xmlns:r="http://schemas.openxmlformats.org/officeDocument/2006/relationships">
+  <p:cSld>
+    <p:spTree>
+      <p:nvGrpSpPr>
+        <p:cNvPr id="1" name=""/>
+        <p:cNvGrpSpPr/>
+        <p:nvPr/>
+      </p:nvGrpSpPr>
+      <p:grpSpPr/>
+      <p:sp>
+        <p:nvSpPr>
+          <p:cNvPr id="2" name="Text Placeholder 1"/>
+          <p:cNvSpPr>
+            <a:spLocks noGrp="1"/>
+          </p:cNvSpPr>
+          <p:nvPr>
+            <p:ph type="body" idx="10" sz="quarter"/>
+          </p:nvPr>
+        </p:nvSpPr>
+        <p:spPr/>
+        <p:txBody>
+          <a:bodyPr/>
+          <a:lstStyle/>
+          <a:p>
+            <a:r>
+              <a:t>Our Partnership Advantage</a:t>
+            </a:r>
+          </a:p>
+        </p:txBody>
+      </p:sp>
+      <p:pic>
+        <p:nvPicPr>
+          <p:cNvPr id="3" name="Picture Placeholder 2" descr="consulting_company_logo.png"/>
+          <p:cNvPicPr>
+            <a:picLocks noGrp="1" noChangeAspect="1"/>
+          </p:cNvPicPr>
+          <p:nvPr>
+            <p:ph type="pic" idx="13" sz="quarter"/>
+          </p:nvPr>
+        </p:nvPicPr>
+        <p:blipFill>
+          <a:blip r:embed="rId2"/>
+          <a:srcRect t="6404" b="6404"/>
+          <a:stretch>
+            <a:fillRect/>
+          </a:stretch>
+        </p:blipFill>
+        <p:spPr/>
+      </p:pic>
+      <p:sp>
+        <p:nvSpPr>
+          <p:cNvPr id="4" name="Text Placeholder 3"/>
+          <p:cNvSpPr>
+            <a:spLocks noGrp="1"/>
+          </p:cNvSpPr>
+          <p:nvPr>
+            <p:ph type="body" idx="14" sz="quarter"/>
+          </p:nvPr>
+        </p:nvSpPr>
+        <p:spPr/>
+        <p:txBody>
+          <a:bodyPr/>
+          <a:lstStyle/>
+          <a:p>
+            <a:pPr/>
+            <a:r>
+              <a:t>[Years] years of experience in [domain]</a:t>
+            </a:r>
+          </a:p>
+          <a:p>
+            <a:pPr/>
+            <a:r>
+              <a:t>[Number] successful implementations</a:t>
+            </a:r>
+          </a:p>
+          <a:p>
+            <a:pPr/>
+            <a:r>
+              <a:t>[Certification/partnership level with key vendors]</a:t>
+            </a:r>
+          </a:p>
+          <a:p>
+            <a:pPr/>
+            <a:r>
+              <a:t>End-to-end implementation services</a:t>
+            </a:r>
+          </a:p>
+          <a:p>
+            <a:pPr/>
+            <a:r>
+              <a:t>24/7 support post-launch</a:t>
+            </a:r>
+          </a:p>
+          <a:p>
+            <a:pPr/>
+            <a:r>
+              <a:t>Ongoing optimization and innovation roadmap</a:t>
+            </a:r>
+          </a:p>
+          <a:p>
+            <a:pPr/>
+            <a:r>
+              <a:t>[Recognition 1]</a:t>
+            </a:r>
+          </a:p>
+          <a:p>
+            <a:pPr/>
+            <a:r>
+              <a:t>[Recognition 2]</a:t>
+            </a:r>
+          </a:p>
+          <a:p>
+            <a:pPr/>
+            <a:r>
+              <a:t>Solution architects with [domain] expertise</a:t>
+            </a:r>
+          </a:p>
+          <a:p>
+            <a:pPr/>
+            <a:r>
+              <a:t>Certified implementation specialists</a:t>
+            </a:r>
+          </a:p>
+          <a:p>
+            <a:pPr/>
+            <a:r>
+              <a:t>Dedicated account and support management</a:t>
+            </a:r>
+          </a:p>
+        </p:txBody>
+      </p:sp>
+      <p:pic>
+        <p:nvPicPr>
+          <p:cNvPr id="5" name="Picture 4" descr="eo-framework-logo-real.png"/>
+          <p:cNvPicPr>
+            <a:picLocks noChangeAspect="1"/>
+          </p:cNvPicPr>
+          <p:nvPr/>
+        </p:nvPicPr>
+        <p:blipFill>
+          <a:blip r:embed="rId3"/>
+          <a:stretch>
+            <a:fillRect/>
+          </a:stretch>
+        </p:blipFill>
+        <p:spPr>
+          <a:xfrm>
+            <a:off x="6684264" y="4535424"/>
+            <a:ext cx="2139696" cy="530352"/>
+          </a:xfrm>
+          <a:prstGeom prst="rect">
+            <a:avLst/>
+          </a:prstGeom>
+        </p:spPr>
+      </p:pic>
+    </p:spTree>
+  </p:cSld>
+  <p:clrMapOvr>
+    <a:masterClrMapping/>
+  </p:clrMapOvr>
+</p:sld>
+</file>
+
+<file path=ppt/slides/slide9.xml><?xml version="1.0" encoding="utf-8"?>
+<p:sld xmlns:a="http://schemas.openxmlformats.org/drawingml/2006/main" xmlns:p="http://schemas.openxmlformats.org/presentationml/2006/main" xmlns:r="http://schemas.openxmlformats.org/officeDocument/2006/relationships">
+  <p:cSld>
+    <p:spTree>
+      <p:nvGrpSpPr>
+        <p:cNvPr id="1" name=""/>
+        <p:cNvGrpSpPr/>
+        <p:nvPr/>
+      </p:nvGrpSpPr>
+      <p:grpSpPr/>
+      <p:sp>
+        <p:nvSpPr>
+          <p:cNvPr id="2" name="Text Placeholder 1"/>
+          <p:cNvSpPr>
+            <a:spLocks noGrp="1"/>
+          </p:cNvSpPr>
+          <p:nvPr>
+            <p:ph type="body" idx="10" sz="quarter"/>
+          </p:nvPr>
+        </p:nvSpPr>
+        <p:spPr/>
+        <p:txBody>
+          <a:bodyPr/>
+          <a:lstStyle/>
+          <a:p>
+            <a:r>
+              <a:t>Investment Summary</a:t>
+            </a:r>
+          </a:p>
+        </p:txBody>
+      </p:sp>
+      <p:sp>
+        <p:nvSpPr>
+          <p:cNvPr id="3" name="Text Placeholder 2"/>
+          <p:cNvSpPr>
+            <a:spLocks noGrp="1"/>
+          </p:cNvSpPr>
+          <p:nvPr>
+            <p:ph type="body" idx="11" sz="quarter"/>
+          </p:nvPr>
+        </p:nvSpPr>
+        <p:spPr/>
+        <p:txBody>
+          <a:bodyPr/>
+          <a:lstStyle/>
+          <a:p>
+            <a:pPr/>
+            <a:r>
+              <a:t>Implementation Services: $[Amount]</a:t>
+            </a:r>
+          </a:p>
+          <a:p>
+            <a:pPr/>
+            <a:r>
+              <a:t>Technology/Licenses: $[Amount]</a:t>
+            </a:r>
+          </a:p>
+          <a:p>
+            <a:pPr/>
+            <a:r>
+              <a:t>Training &amp; Change Management: $[Amount]</a:t>
+            </a:r>
+          </a:p>
+          <a:p>
+            <a:pPr/>
+            <a:r>
+              <a:t>Platform/Infrastructure: $[Amount]</a:t>
+            </a:r>
+          </a:p>
+          <a:p>
+            <a:pPr/>
+            <a:r>
+              <a:t>Support &amp; Maintenance: $[Amount]</a:t>
+            </a:r>
+          </a:p>
+          <a:p>
+            <a:pPr/>
+            <a:r>
+              <a:t>Payback Period: [Months]</a:t>
+            </a:r>
+          </a:p>
+          <a:p>
+            <a:pPr/>
+            <a:r>
+              <a:t>3-Year ROI: [Percentage]</a:t>
+            </a:r>
+          </a:p>
+          <a:p>
+            <a:pPr/>
+            <a:r>
+              <a:t>Annual Benefits: $[Amount]</a:t>
+            </a:r>
+          </a:p>
+        </p:txBody>
+      </p:sp>
+      <p:sp>
+        <p:nvSpPr>
+          <p:cNvPr id="4" name="Text Placeholder 3"/>
+          <p:cNvSpPr>
+            <a:spLocks noGrp="1"/>
+          </p:cNvSpPr>
+          <p:nvPr>
+            <p:ph type="body" idx="13" sz="quarter"/>
+          </p:nvPr>
+        </p:nvSpPr>
+        <p:spPr/>
+        <p:txBody>
+          <a:bodyPr/>
+          <a:lstStyle/>
+          <a:p/>
+        </p:txBody>
+      </p:sp>
+      <p:pic>
+        <p:nvPicPr>
+          <p:cNvPr id="5" name="Picture Placeholder 4" descr="consulting_company_logo.png"/>
+          <p:cNvPicPr>
+            <a:picLocks noGrp="1" noChangeAspect="1"/>
+          </p:cNvPicPr>
+          <p:nvPr>
+            <p:ph type="pic" idx="14" sz="quarter"/>
+          </p:nvPr>
+        </p:nvPicPr>
+        <p:blipFill>
+          <a:blip r:embed="rId2"/>
+          <a:srcRect t="5949" b="5949"/>
+          <a:stretch>
+            <a:fillRect/>
+          </a:stretch>
+        </p:blipFill>
+        <p:spPr/>
+      </p:pic>
+      <p:sp>
+        <p:nvSpPr>
+          <p:cNvPr id="6" name="Chart Placeholder 5"/>
+          <p:cNvSpPr>
+            <a:spLocks noGrp="1"/>
+          </p:cNvSpPr>
+          <p:nvPr>
+            <p:ph type="chart" idx="15" sz="quarter"/>
+          </p:nvPr>
+        </p:nvSpPr>
+        <p:spPr/>
+      </p:sp>
+      <p:pic>
+        <p:nvPicPr>
+          <p:cNvPr id="7" name="Picture 6" descr="eo-framework-logo-real.png"/>
           <p:cNvPicPr>
             <a:picLocks noChangeAspect="1"/>
           </p:cNvPicPr>

</xml_diff>

<commit_message>
Remove redundant 'Why This Solution?' slide from presales presentation
Streamlined presentation from 10 to 9 slides by removing redundant content.

Rationale:
- Solution Overview already showcases technical capabilities and architecture
- Our Partnership Advantage addresses "why choose us" from partnership perspective
- Success Stories provides proof points and validation
- Removing slide creates cleaner narrative flow and reduces redundancy
- Sales Engineers can duplicate Solution Overview if more technical depth needed

Changes:
- Removed "Why This Solution?" slide with comparison table and differentiators
- Updated slide count from 10 to 9 slides
- Renumbered speaking points for slides 4-9
- Regenerated presentation with updated structure

New Flow (9 slides):
1. Title
2. Business Opportunity
3. Solution Overview
4. Implementation Approach
5. Timeline & Milestones
6. Success Stories
7. Our Partnership Advantage
8. Investment Summary
9. Next Steps
</commit_message>
<xml_diff>
--- a/solution-template/sample-provider/sample-category/sample-solution/presales/solution-briefing.pptx
+++ b/solution-template/sample-provider/sample-category/sample-solution/presales/solution-briefing.pptx
@@ -17,7 +17,6 @@
     <p:sldId id="262" r:id="rId13"/>
     <p:sldId id="263" r:id="rId14"/>
     <p:sldId id="264" r:id="rId15"/>
-    <p:sldId id="265" r:id="rId16"/>
   </p:sldIdLst>
   <p:sldSz cx="9144000" cy="5143500" type="screen16x9"/>
   <p:notesSz cx="5143500" cy="9144000"/>
@@ -3000,195 +2999,6 @@
 </p:sld>
 </file>
 
-<file path=ppt/slides/slide10.xml><?xml version="1.0" encoding="utf-8"?>
-<p:sld xmlns:a="http://schemas.openxmlformats.org/drawingml/2006/main" xmlns:p="http://schemas.openxmlformats.org/presentationml/2006/main" xmlns:r="http://schemas.openxmlformats.org/officeDocument/2006/relationships">
-  <p:cSld>
-    <p:spTree>
-      <p:nvGrpSpPr>
-        <p:cNvPr id="1" name=""/>
-        <p:cNvGrpSpPr/>
-        <p:nvPr/>
-      </p:nvGrpSpPr>
-      <p:grpSpPr/>
-      <p:pic>
-        <p:nvPicPr>
-          <p:cNvPr id="2" name="Picture Placeholder 1" descr="client_logo.png"/>
-          <p:cNvPicPr>
-            <a:picLocks noGrp="1" noChangeAspect="1"/>
-          </p:cNvPicPr>
-          <p:nvPr>
-            <p:ph type="pic" idx="10" sz="quarter"/>
-          </p:nvPr>
-        </p:nvPicPr>
-        <p:blipFill>
-          <a:blip r:embed="rId2"/>
-          <a:srcRect t="433" b="433"/>
-          <a:stretch>
-            <a:fillRect/>
-          </a:stretch>
-        </p:blipFill>
-        <p:spPr/>
-      </p:pic>
-      <p:sp>
-        <p:nvSpPr>
-          <p:cNvPr id="3" name="Text Placeholder 2"/>
-          <p:cNvSpPr>
-            <a:spLocks noGrp="1"/>
-          </p:cNvSpPr>
-          <p:nvPr>
-            <p:ph type="body" idx="12" sz="quarter"/>
-          </p:nvPr>
-        </p:nvSpPr>
-        <p:spPr/>
-        <p:txBody>
-          <a:bodyPr/>
-          <a:lstStyle/>
-          <a:p>
-            <a:r>
-              <a:t>Thank You &amp; Next Steps</a:t>
-            </a:r>
-          </a:p>
-        </p:txBody>
-      </p:sp>
-      <p:pic>
-        <p:nvPicPr>
-          <p:cNvPr id="4" name="Picture Placeholder 3" descr="consulting_company_logo.png"/>
-          <p:cNvPicPr>
-            <a:picLocks noGrp="1" noChangeAspect="1"/>
-          </p:cNvPicPr>
-          <p:nvPr>
-            <p:ph type="pic" idx="13" sz="quarter"/>
-          </p:nvPr>
-        </p:nvPicPr>
-        <p:blipFill>
-          <a:blip r:embed="rId3"/>
-          <a:srcRect t="7166" b="7166"/>
-          <a:stretch>
-            <a:fillRect/>
-          </a:stretch>
-        </p:blipFill>
-        <p:spPr/>
-      </p:pic>
-      <p:sp>
-        <p:nvSpPr>
-          <p:cNvPr id="5" name="Text Placeholder 4"/>
-          <p:cNvSpPr>
-            <a:spLocks noGrp="1"/>
-          </p:cNvSpPr>
-          <p:nvPr>
-            <p:ph type="body" idx="14" sz="quarter"/>
-          </p:nvPr>
-        </p:nvSpPr>
-        <p:spPr/>
-        <p:txBody>
-          <a:bodyPr/>
-          <a:lstStyle/>
-          <a:p>
-            <a:pPr/>
-            <a:r>
-              <a:t>Decision: [Specific decision needed by when]</a:t>
-            </a:r>
-          </a:p>
-          <a:p>
-            <a:pPr/>
-            <a:r>
-              <a:t>Kickoff: [Target start date]</a:t>
-            </a:r>
-          </a:p>
-          <a:p>
-            <a:pPr/>
-            <a:r>
-              <a:t>Team Formation: [Key team members required]</a:t>
-            </a:r>
-          </a:p>
-          <a:p>
-            <a:pPr/>
-            <a:r>
-              <a:t>Week 1: Contract finalization</a:t>
-            </a:r>
-          </a:p>
-          <a:p>
-            <a:pPr/>
-            <a:r>
-              <a:t>Week 2: Project initiation &amp; planning</a:t>
-            </a:r>
-          </a:p>
-          <a:p>
-            <a:pPr/>
-            <a:r>
-              <a:t>Week 3: Environment setup</a:t>
-            </a:r>
-          </a:p>
-          <a:p>
-            <a:pPr/>
-            <a:r>
-              <a:t>Week 4: Initial implementation begins</a:t>
-            </a:r>
-          </a:p>
-          <a:p>
-            <a:pPr/>
-            <a:r>
-              <a:rPr b="1"/>
-              <a:t>Project Lead:</a:t>
-            </a:r>
-            <a:r>
-              <a:t> [Name, Title] | [Email] | [Phone]</a:t>
-            </a:r>
-          </a:p>
-          <a:p>
-            <a:pPr/>
-            <a:r>
-              <a:rPr b="1"/>
-              <a:t>Technical Lead:</a:t>
-            </a:r>
-            <a:r>
-              <a:t> [Name, Title] | [Email] | [Phone]</a:t>
-            </a:r>
-          </a:p>
-          <a:p>
-            <a:pPr/>
-            <a:r>
-              <a:rPr b="1"/>
-              <a:t>Account Manager:</a:t>
-            </a:r>
-            <a:r>
-              <a:t> [Name, Title] | [Email] | [Phone]</a:t>
-            </a:r>
-          </a:p>
-        </p:txBody>
-      </p:sp>
-      <p:pic>
-        <p:nvPicPr>
-          <p:cNvPr id="6" name="Picture 5" descr="eo-framework-logo-real.png"/>
-          <p:cNvPicPr>
-            <a:picLocks noChangeAspect="1"/>
-          </p:cNvPicPr>
-          <p:nvPr/>
-        </p:nvPicPr>
-        <p:blipFill>
-          <a:blip r:embed="rId4"/>
-          <a:stretch>
-            <a:fillRect/>
-          </a:stretch>
-        </p:blipFill>
-        <p:spPr>
-          <a:xfrm>
-            <a:off x="6684264" y="4535424"/>
-            <a:ext cx="2139696" cy="530352"/>
-          </a:xfrm>
-          <a:prstGeom prst="rect">
-            <a:avLst/>
-          </a:prstGeom>
-        </p:spPr>
-      </p:pic>
-    </p:spTree>
-  </p:cSld>
-  <p:clrMapOvr>
-    <a:masterClrMapping/>
-  </p:clrMapOvr>
-</p:sld>
-</file>
-
 <file path=ppt/slides/slide2.xml><?xml version="1.0" encoding="utf-8"?>
 <p:sld xmlns:a="http://schemas.openxmlformats.org/drawingml/2006/main" xmlns:p="http://schemas.openxmlformats.org/presentationml/2006/main" xmlns:r="http://schemas.openxmlformats.org/officeDocument/2006/relationships">
   <p:cSld>
@@ -3541,7 +3351,7 @@
           <a:lstStyle/>
           <a:p>
             <a:r>
-              <a:t>Why This Solution?</a:t>
+              <a:t>Implementation Approach</a:t>
             </a:r>
           </a:p>
         </p:txBody>
@@ -3553,12 +3363,12 @@
             <a:picLocks noGrp="1" noChangeAspect="1"/>
           </p:cNvPicPr>
           <p:nvPr>
-            <p:ph type="pic" idx="14" sz="quarter"/>
+            <p:ph type="pic" idx="13" sz="quarter"/>
           </p:nvPr>
         </p:nvPicPr>
         <p:blipFill>
           <a:blip r:embed="rId2"/>
-          <a:srcRect t="6314" b="6314"/>
+          <a:srcRect t="6762" b="6762"/>
           <a:stretch>
             <a:fillRect/>
           </a:stretch>
@@ -3572,36 +3382,72 @@
             <a:spLocks noGrp="1"/>
           </p:cNvSpPr>
           <p:nvPr>
-            <p:ph type="body" idx="16" sz="quarter"/>
+            <p:ph type="body" idx="14" sz="quarter"/>
           </p:nvPr>
         </p:nvSpPr>
         <p:spPr/>
         <p:txBody>
           <a:bodyPr/>
           <a:lstStyle/>
-          <a:p/>
-        </p:txBody>
-      </p:sp>
-      <p:sp>
-        <p:nvSpPr>
-          <p:cNvPr id="5" name="Text Placeholder 4"/>
-          <p:cNvSpPr>
-            <a:spLocks noGrp="1"/>
-          </p:cNvSpPr>
-          <p:nvPr>
-            <p:ph type="body" idx="17" sz="quarter"/>
-          </p:nvPr>
-        </p:nvSpPr>
-        <p:spPr/>
-        <p:txBody>
-          <a:bodyPr/>
-          <a:lstStyle/>
-          <a:p/>
+          <a:p>
+            <a:pPr/>
+            <a:r>
+              <a:t>[Key milestone 1]</a:t>
+            </a:r>
+          </a:p>
+          <a:p>
+            <a:pPr/>
+            <a:r>
+              <a:t>[Key milestone 2]</a:t>
+            </a:r>
+          </a:p>
+          <a:p>
+            <a:pPr/>
+            <a:r>
+              <a:t>[Key milestone 1]</a:t>
+            </a:r>
+          </a:p>
+          <a:p>
+            <a:pPr/>
+            <a:r>
+              <a:t>[Key milestone 2]</a:t>
+            </a:r>
+          </a:p>
+          <a:p>
+            <a:pPr/>
+            <a:r>
+              <a:t>[Key milestone 1]</a:t>
+            </a:r>
+          </a:p>
+          <a:p>
+            <a:pPr/>
+            <a:r>
+              <a:t>[Key milestone 2]</a:t>
+            </a:r>
+          </a:p>
+          <a:p>
+            <a:pPr/>
+            <a:r>
+              <a:t>Dedicated project team with executive sponsorship</a:t>
+            </a:r>
+          </a:p>
+          <a:p>
+            <a:pPr/>
+            <a:r>
+              <a:t>Structured change management and training</a:t>
+            </a:r>
+          </a:p>
+          <a:p>
+            <a:pPr/>
+            <a:r>
+              <a:t>Continuous monitoring and optimization</a:t>
+            </a:r>
+          </a:p>
         </p:txBody>
       </p:sp>
       <p:pic>
         <p:nvPicPr>
-          <p:cNvPr id="6" name="Picture 5" descr="eo-framework-logo-real.png"/>
+          <p:cNvPr id="5" name="Picture 4" descr="eo-framework-logo-real.png"/>
           <p:cNvPicPr>
             <a:picLocks noChangeAspect="1"/>
           </p:cNvPicPr>
@@ -3657,7 +3503,7 @@
           <a:lstStyle/>
           <a:p>
             <a:r>
-              <a:t>Implementation Approach</a:t>
+              <a:t>Timeline &amp; Milestones</a:t>
             </a:r>
           </a:p>
         </p:txBody>
@@ -3698,55 +3544,13 @@
           <a:p>
             <a:pPr/>
             <a:r>
-              <a:t>[Key milestone 1]</a:t>
+              <a:t>[Early benefit 1] - Month 2</a:t>
             </a:r>
           </a:p>
           <a:p>
             <a:pPr/>
             <a:r>
-              <a:t>[Key milestone 2]</a:t>
-            </a:r>
-          </a:p>
-          <a:p>
-            <a:pPr/>
-            <a:r>
-              <a:t>[Key milestone 1]</a:t>
-            </a:r>
-          </a:p>
-          <a:p>
-            <a:pPr/>
-            <a:r>
-              <a:t>[Key milestone 2]</a:t>
-            </a:r>
-          </a:p>
-          <a:p>
-            <a:pPr/>
-            <a:r>
-              <a:t>[Key milestone 1]</a:t>
-            </a:r>
-          </a:p>
-          <a:p>
-            <a:pPr/>
-            <a:r>
-              <a:t>[Key milestone 2]</a:t>
-            </a:r>
-          </a:p>
-          <a:p>
-            <a:pPr/>
-            <a:r>
-              <a:t>Dedicated project team with executive sponsorship</a:t>
-            </a:r>
-          </a:p>
-          <a:p>
-            <a:pPr/>
-            <a:r>
-              <a:t>Structured change management and training</a:t>
-            </a:r>
-          </a:p>
-          <a:p>
-            <a:pPr/>
-            <a:r>
-              <a:t>Continuous monitoring and optimization</a:t>
+              <a:t>[Early benefit 2] - Month 3</a:t>
             </a:r>
           </a:p>
         </p:txBody>
@@ -3809,7 +3613,7 @@
           <a:lstStyle/>
           <a:p>
             <a:r>
-              <a:t>Timeline &amp; Milestones</a:t>
+              <a:t>Success Stories</a:t>
             </a:r>
           </a:p>
         </p:txBody>
@@ -3847,18 +3651,7 @@
         <p:txBody>
           <a:bodyPr/>
           <a:lstStyle/>
-          <a:p>
-            <a:pPr/>
-            <a:r>
-              <a:t>[Early benefit 1] - Month 2</a:t>
-            </a:r>
-          </a:p>
-          <a:p>
-            <a:pPr/>
-            <a:r>
-              <a:t>[Early benefit 2] - Month 3</a:t>
-            </a:r>
-          </a:p>
+          <a:p/>
         </p:txBody>
       </p:sp>
       <p:pic>
@@ -3919,7 +3712,7 @@
           <a:lstStyle/>
           <a:p>
             <a:r>
-              <a:t>Success Stories</a:t>
+              <a:t>Our Partnership Advantage</a:t>
             </a:r>
           </a:p>
         </p:txBody>
@@ -3936,7 +3729,7 @@
         </p:nvPicPr>
         <p:blipFill>
           <a:blip r:embed="rId2"/>
-          <a:srcRect t="6762" b="6762"/>
+          <a:srcRect t="6404" b="6404"/>
           <a:stretch>
             <a:fillRect/>
           </a:stretch>
@@ -3957,7 +3750,72 @@
         <p:txBody>
           <a:bodyPr/>
           <a:lstStyle/>
-          <a:p/>
+          <a:p>
+            <a:pPr/>
+            <a:r>
+              <a:t>[Years] years of experience in [domain]</a:t>
+            </a:r>
+          </a:p>
+          <a:p>
+            <a:pPr/>
+            <a:r>
+              <a:t>[Number] successful implementations</a:t>
+            </a:r>
+          </a:p>
+          <a:p>
+            <a:pPr/>
+            <a:r>
+              <a:t>[Certification/partnership level with key vendors]</a:t>
+            </a:r>
+          </a:p>
+          <a:p>
+            <a:pPr/>
+            <a:r>
+              <a:t>End-to-end implementation services</a:t>
+            </a:r>
+          </a:p>
+          <a:p>
+            <a:pPr/>
+            <a:r>
+              <a:t>24/7 support post-launch</a:t>
+            </a:r>
+          </a:p>
+          <a:p>
+            <a:pPr/>
+            <a:r>
+              <a:t>Ongoing optimization and innovation roadmap</a:t>
+            </a:r>
+          </a:p>
+          <a:p>
+            <a:pPr/>
+            <a:r>
+              <a:t>[Recognition 1]</a:t>
+            </a:r>
+          </a:p>
+          <a:p>
+            <a:pPr/>
+            <a:r>
+              <a:t>[Recognition 2]</a:t>
+            </a:r>
+          </a:p>
+          <a:p>
+            <a:pPr/>
+            <a:r>
+              <a:t>Solution architects with [domain] expertise</a:t>
+            </a:r>
+          </a:p>
+          <a:p>
+            <a:pPr/>
+            <a:r>
+              <a:t>Certified implementation specialists</a:t>
+            </a:r>
+          </a:p>
+          <a:p>
+            <a:pPr/>
+            <a:r>
+              <a:t>Dedicated account and support management</a:t>
+            </a:r>
+          </a:p>
         </p:txBody>
       </p:sp>
       <p:pic>
@@ -4018,7 +3876,7 @@
           <a:lstStyle/>
           <a:p>
             <a:r>
-              <a:t>Our Partnership Advantage</a:t>
+              <a:t>Investment Summary</a:t>
             </a:r>
           </a:p>
         </p:txBody>
@@ -4030,12 +3888,12 @@
             <a:picLocks noGrp="1" noChangeAspect="1"/>
           </p:cNvPicPr>
           <p:nvPr>
-            <p:ph type="pic" idx="13" sz="quarter"/>
+            <p:ph type="pic" idx="14" sz="quarter"/>
           </p:nvPr>
         </p:nvPicPr>
         <p:blipFill>
           <a:blip r:embed="rId2"/>
-          <a:srcRect t="6404" b="6404"/>
+          <a:srcRect t="5949" b="5949"/>
           <a:stretch>
             <a:fillRect/>
           </a:stretch>
@@ -4044,89 +3902,36 @@
       </p:pic>
       <p:sp>
         <p:nvSpPr>
-          <p:cNvPr id="4" name="Text Placeholder 3"/>
+          <p:cNvPr id="4" name="Chart Placeholder 3"/>
           <p:cNvSpPr>
             <a:spLocks noGrp="1"/>
           </p:cNvSpPr>
           <p:nvPr>
-            <p:ph type="body" idx="14" sz="quarter"/>
+            <p:ph type="chart" idx="15" sz="quarter"/>
           </p:nvPr>
         </p:nvSpPr>
         <p:spPr/>
+      </p:sp>
+      <p:sp>
+        <p:nvSpPr>
+          <p:cNvPr id="5" name="Content Placeholder 4"/>
+          <p:cNvSpPr>
+            <a:spLocks noGrp="1"/>
+          </p:cNvSpPr>
+          <p:nvPr>
+            <p:ph idx="16" sz="quarter"/>
+          </p:nvPr>
+        </p:nvSpPr>
+        <p:spPr/>
         <p:txBody>
           <a:bodyPr/>
           <a:lstStyle/>
-          <a:p>
-            <a:pPr/>
-            <a:r>
-              <a:t>[Years] years of experience in [domain]</a:t>
-            </a:r>
-          </a:p>
-          <a:p>
-            <a:pPr/>
-            <a:r>
-              <a:t>[Number] successful implementations</a:t>
-            </a:r>
-          </a:p>
-          <a:p>
-            <a:pPr/>
-            <a:r>
-              <a:t>[Certification/partnership level with key vendors]</a:t>
-            </a:r>
-          </a:p>
-          <a:p>
-            <a:pPr/>
-            <a:r>
-              <a:t>End-to-end implementation services</a:t>
-            </a:r>
-          </a:p>
-          <a:p>
-            <a:pPr/>
-            <a:r>
-              <a:t>24/7 support post-launch</a:t>
-            </a:r>
-          </a:p>
-          <a:p>
-            <a:pPr/>
-            <a:r>
-              <a:t>Ongoing optimization and innovation roadmap</a:t>
-            </a:r>
-          </a:p>
-          <a:p>
-            <a:pPr/>
-            <a:r>
-              <a:t>[Recognition 1]</a:t>
-            </a:r>
-          </a:p>
-          <a:p>
-            <a:pPr/>
-            <a:r>
-              <a:t>[Recognition 2]</a:t>
-            </a:r>
-          </a:p>
-          <a:p>
-            <a:pPr/>
-            <a:r>
-              <a:t>Solution architects with [domain] expertise</a:t>
-            </a:r>
-          </a:p>
-          <a:p>
-            <a:pPr/>
-            <a:r>
-              <a:t>Certified implementation specialists</a:t>
-            </a:r>
-          </a:p>
-          <a:p>
-            <a:pPr/>
-            <a:r>
-              <a:t>Dedicated account and support management</a:t>
-            </a:r>
-          </a:p>
+          <a:p/>
         </p:txBody>
       </p:sp>
       <p:pic>
         <p:nvPicPr>
-          <p:cNvPr id="5" name="Picture 4" descr="eo-framework-logo-real.png"/>
+          <p:cNvPr id="6" name="Picture 5" descr="eo-framework-logo-real.png"/>
           <p:cNvPicPr>
             <a:picLocks noChangeAspect="1"/>
           </p:cNvPicPr>
@@ -4166,40 +3971,19 @@
         <p:nvPr/>
       </p:nvGrpSpPr>
       <p:grpSpPr/>
-      <p:sp>
-        <p:nvSpPr>
-          <p:cNvPr id="2" name="Text Placeholder 1"/>
-          <p:cNvSpPr>
-            <a:spLocks noGrp="1"/>
-          </p:cNvSpPr>
-          <p:nvPr>
-            <p:ph type="body" idx="10" sz="quarter"/>
-          </p:nvPr>
-        </p:nvSpPr>
-        <p:spPr/>
-        <p:txBody>
-          <a:bodyPr/>
-          <a:lstStyle/>
-          <a:p>
-            <a:r>
-              <a:t>Investment Summary</a:t>
-            </a:r>
-          </a:p>
-        </p:txBody>
-      </p:sp>
       <p:pic>
         <p:nvPicPr>
-          <p:cNvPr id="3" name="Picture Placeholder 2" descr="consulting_company_logo.png"/>
+          <p:cNvPr id="2" name="Picture Placeholder 1" descr="client_logo.png"/>
           <p:cNvPicPr>
             <a:picLocks noGrp="1" noChangeAspect="1"/>
           </p:cNvPicPr>
           <p:nvPr>
-            <p:ph type="pic" idx="14" sz="quarter"/>
+            <p:ph type="pic" idx="10" sz="quarter"/>
           </p:nvPr>
         </p:nvPicPr>
         <p:blipFill>
           <a:blip r:embed="rId2"/>
-          <a:srcRect t="5949" b="5949"/>
+          <a:srcRect t="433" b="433"/>
           <a:stretch>
             <a:fillRect/>
           </a:stretch>
@@ -4208,31 +3992,130 @@
       </p:pic>
       <p:sp>
         <p:nvSpPr>
-          <p:cNvPr id="4" name="Chart Placeholder 3"/>
+          <p:cNvPr id="3" name="Text Placeholder 2"/>
           <p:cNvSpPr>
             <a:spLocks noGrp="1"/>
           </p:cNvSpPr>
           <p:nvPr>
-            <p:ph type="chart" idx="15" sz="quarter"/>
+            <p:ph type="body" idx="12" sz="quarter"/>
           </p:nvPr>
         </p:nvSpPr>
         <p:spPr/>
-      </p:sp>
-      <p:sp>
-        <p:nvSpPr>
-          <p:cNvPr id="5" name="Content Placeholder 4"/>
+        <p:txBody>
+          <a:bodyPr/>
+          <a:lstStyle/>
+          <a:p>
+            <a:r>
+              <a:t>Thank You &amp; Next Steps</a:t>
+            </a:r>
+          </a:p>
+        </p:txBody>
+      </p:sp>
+      <p:pic>
+        <p:nvPicPr>
+          <p:cNvPr id="4" name="Picture Placeholder 3" descr="consulting_company_logo.png"/>
+          <p:cNvPicPr>
+            <a:picLocks noGrp="1" noChangeAspect="1"/>
+          </p:cNvPicPr>
+          <p:nvPr>
+            <p:ph type="pic" idx="13" sz="quarter"/>
+          </p:nvPr>
+        </p:nvPicPr>
+        <p:blipFill>
+          <a:blip r:embed="rId3"/>
+          <a:srcRect t="7166" b="7166"/>
+          <a:stretch>
+            <a:fillRect/>
+          </a:stretch>
+        </p:blipFill>
+        <p:spPr/>
+      </p:pic>
+      <p:sp>
+        <p:nvSpPr>
+          <p:cNvPr id="5" name="Text Placeholder 4"/>
           <p:cNvSpPr>
             <a:spLocks noGrp="1"/>
           </p:cNvSpPr>
           <p:nvPr>
-            <p:ph idx="16" sz="quarter"/>
+            <p:ph type="body" idx="14" sz="quarter"/>
           </p:nvPr>
         </p:nvSpPr>
         <p:spPr/>
         <p:txBody>
           <a:bodyPr/>
           <a:lstStyle/>
-          <a:p/>
+          <a:p>
+            <a:pPr/>
+            <a:r>
+              <a:t>Decision: [Specific decision needed by when]</a:t>
+            </a:r>
+          </a:p>
+          <a:p>
+            <a:pPr/>
+            <a:r>
+              <a:t>Kickoff: [Target start date]</a:t>
+            </a:r>
+          </a:p>
+          <a:p>
+            <a:pPr/>
+            <a:r>
+              <a:t>Team Formation: [Key team members required]</a:t>
+            </a:r>
+          </a:p>
+          <a:p>
+            <a:pPr/>
+            <a:r>
+              <a:t>Week 1: Contract finalization</a:t>
+            </a:r>
+          </a:p>
+          <a:p>
+            <a:pPr/>
+            <a:r>
+              <a:t>Week 2: Project initiation &amp; planning</a:t>
+            </a:r>
+          </a:p>
+          <a:p>
+            <a:pPr/>
+            <a:r>
+              <a:t>Week 3: Environment setup</a:t>
+            </a:r>
+          </a:p>
+          <a:p>
+            <a:pPr/>
+            <a:r>
+              <a:t>Week 4: Initial implementation begins</a:t>
+            </a:r>
+          </a:p>
+          <a:p>
+            <a:pPr/>
+            <a:r>
+              <a:rPr b="1"/>
+              <a:t>Project Lead:</a:t>
+            </a:r>
+            <a:r>
+              <a:t> [Name, Title] | [Email] | [Phone]</a:t>
+            </a:r>
+          </a:p>
+          <a:p>
+            <a:pPr/>
+            <a:r>
+              <a:rPr b="1"/>
+              <a:t>Technical Lead:</a:t>
+            </a:r>
+            <a:r>
+              <a:t> [Name, Title] | [Email] | [Phone]</a:t>
+            </a:r>
+          </a:p>
+          <a:p>
+            <a:pPr/>
+            <a:r>
+              <a:rPr b="1"/>
+              <a:t>Account Manager:</a:t>
+            </a:r>
+            <a:r>
+              <a:t> [Name, Title] | [Email] | [Phone]</a:t>
+            </a:r>
+          </a:p>
         </p:txBody>
       </p:sp>
       <p:pic>
@@ -4244,7 +4127,7 @@
           <p:nvPr/>
         </p:nvPicPr>
         <p:blipFill>
-          <a:blip r:embed="rId3"/>
+          <a:blip r:embed="rId4"/>
           <a:stretch>
             <a:fillRect/>
           </a:stretch>

</xml_diff>

<commit_message>
Update solution briefing template with enhanced content
- Replace Success Stories placeholder table with detailed case study example
- Add Global Manufacturing Leader success story with quantified results
- Update Partnership Advantage section to two-column format
- Restructure into What We Bring / Value to You columns
- Include specific metrics and value propositions

This provides more compelling template content for solution presentations.
</commit_message>
<xml_diff>
--- a/solution-template/sample-provider/sample-category/sample-solution/presales/solution-briefing.pptx
+++ b/solution-template/sample-provider/sample-category/sample-solution/presales/solution-briefing.pptx
@@ -3968,61 +3968,65 @@
           <a:p>
             <a:pPr/>
             <a:r>
-              <a:t>Aspect: Client</a:t>
+              <a:rPr b="1"/>
+              <a:t>Client Success: Global Manufacturing Leader</a:t>
             </a:r>
           </a:p>
           <a:p>
             <a:pPr lvl="1"/>
             <a:r>
-              <a:t>Details: [Similar Company Name]</a:t>
-            </a:r>
-          </a:p>
-          <a:p>
-            <a:pPr/>
-            <a:r>
-              <a:t>Aspect: Challenge</a:t>
+              <a:rPr b="1"/>
+              <a:t>Client:</a:t>
+            </a:r>
+            <a:r>
+              <a:t> Fortune 500 Manufacturing Company with 15,000+ employees across 30 countries</a:t>
             </a:r>
           </a:p>
           <a:p>
             <a:pPr lvl="1"/>
             <a:r>
-              <a:t>Details: [Similar challenge they faced]</a:t>
-            </a:r>
-          </a:p>
-          <a:p>
-            <a:pPr/>
-            <a:r>
-              <a:t>Aspect: Solution</a:t>
+              <a:rPr b="1"/>
+              <a:t>Challenge:</a:t>
+            </a:r>
+            <a:r>
+              <a:t> Legacy systems causing 40% operational inefficiency, $12M annual waste from manual processes, and inability to scale for market expansion</a:t>
             </a:r>
           </a:p>
           <a:p>
             <a:pPr lvl="1"/>
             <a:r>
-              <a:t>Details: [Solution we implemented]</a:t>
-            </a:r>
-          </a:p>
-          <a:p>
-            <a:pPr/>
-            <a:r>
-              <a:t>Aspect: Results</a:t>
+              <a:rPr b="1"/>
+              <a:t>Solution:</a:t>
+            </a:r>
+            <a:r>
+              <a:t> Deployed cloud-native platform with automated workflows, real-time analytics, and integrated supply chain visibility across all manufacturing sites</a:t>
             </a:r>
           </a:p>
           <a:p>
             <a:pPr lvl="1"/>
             <a:r>
-              <a:t>Details: [Quantified results - ROI, efficiency gains, cost savings]</a:t>
-            </a:r>
-          </a:p>
-          <a:p>
-            <a:pPr/>
-            <a:r>
-              <a:t>Aspect: Industry Recognition</a:t>
+              <a:rPr b="1"/>
+              <a:t>Results:</a:t>
+            </a:r>
+            <a:r>
+              <a:t> 45% reduction in operational costs ($5.4M annual savings), 60% faster order-to-delivery cycle, 99.7% system uptime, full ROI achieved in 14 months</a:t>
             </a:r>
           </a:p>
           <a:p>
             <a:pPr lvl="1"/>
             <a:r>
-              <a:t>Details: [Award/recognition 1], [Award/recognition 2]</a:t>
+              <a:rPr b="1"/>
+              <a:t>Testimonial:</a:t>
+            </a:r>
+            <a:r>
+              <a:t> "This transformation exceeded our expectations. We've not only modernized our operations but created a competitive advantage that positions us for the next decade of growth. The implementation was seamless and the results were measurable from day one." — </a:t>
+            </a:r>
+            <a:r>
+              <a:rPr b="1"/>
+              <a:t>Michael Chen, Chief Operations Officer</a:t>
+            </a:r>
+            <a:r>
+              <a:t>, Global Manufacturing Corp</a:t>
             </a:r>
           </a:p>
         </p:txBody>
@@ -4097,12 +4101,12 @@
             <a:picLocks noGrp="1" noChangeAspect="1"/>
           </p:cNvPicPr>
           <p:nvPr>
-            <p:ph type="pic" idx="13" sz="quarter"/>
+            <p:ph type="pic" idx="14" sz="quarter"/>
           </p:nvPr>
         </p:nvPicPr>
         <p:blipFill>
           <a:blip r:embed="rId2"/>
-          <a:srcRect t="6762" b="6762"/>
+          <a:srcRect t="6314" b="6314"/>
           <a:stretch>
             <a:fillRect/>
           </a:stretch>
@@ -4116,7 +4120,7 @@
             <a:spLocks noGrp="1"/>
           </p:cNvSpPr>
           <p:nvPr>
-            <p:ph type="body" idx="14" sz="quarter"/>
+            <p:ph type="body" idx="16" sz="quarter"/>
           </p:nvPr>
         </p:nvSpPr>
         <p:spPr/>
@@ -4126,74 +4130,98 @@
           <a:p>
             <a:pPr/>
             <a:r>
-              <a:t>[Years] years of experience in [domain]</a:t>
-            </a:r>
-          </a:p>
+              <a:rPr b="1"/>
+              <a:t>What We Bring</a:t>
+            </a:r>
+          </a:p>
+          <a:p>
+            <a:pPr lvl="1"/>
+            <a:r>
+              <a:t>15+ years delivering enterprise technology solutions</a:t>
+            </a:r>
+          </a:p>
+          <a:p>
+            <a:pPr lvl="1"/>
+            <a:r>
+              <a:t>200+ successful implementations for Fortune 500 companies</a:t>
+            </a:r>
+          </a:p>
+          <a:p>
+            <a:pPr lvl="1"/>
+            <a:r>
+              <a:t>Premier partnerships with AWS, Azure, Google Cloud</a:t>
+            </a:r>
+          </a:p>
+          <a:p>
+            <a:pPr lvl="1"/>
+            <a:r>
+              <a:t>Certified solution architects with 10+ years expertise</a:t>
+            </a:r>
+          </a:p>
+          <a:p>
+            <a:pPr lvl="1"/>
+            <a:r>
+              <a:t>24/7 support with 99.5% SLA guarantee</a:t>
+            </a:r>
+          </a:p>
+        </p:txBody>
+      </p:sp>
+      <p:sp>
+        <p:nvSpPr>
+          <p:cNvPr id="5" name="Text Placeholder 4"/>
+          <p:cNvSpPr>
+            <a:spLocks noGrp="1"/>
+          </p:cNvSpPr>
+          <p:nvPr>
+            <p:ph type="body" idx="17" sz="quarter"/>
+          </p:nvPr>
+        </p:nvSpPr>
+        <p:spPr/>
+        <p:txBody>
+          <a:bodyPr/>
+          <a:lstStyle/>
           <a:p>
             <a:pPr/>
             <a:r>
-              <a:t>[Number] successful implementations</a:t>
-            </a:r>
-          </a:p>
-          <a:p>
-            <a:pPr/>
-            <a:r>
-              <a:t>[Certification/partnership level with key vendors]</a:t>
-            </a:r>
-          </a:p>
-          <a:p>
-            <a:pPr/>
-            <a:r>
-              <a:t>End-to-end implementation services</a:t>
-            </a:r>
-          </a:p>
-          <a:p>
-            <a:pPr/>
-            <a:r>
-              <a:t>24/7 support post-launch</a:t>
-            </a:r>
-          </a:p>
-          <a:p>
-            <a:pPr/>
-            <a:r>
-              <a:t>Ongoing optimization and innovation roadmap</a:t>
-            </a:r>
-          </a:p>
-          <a:p>
-            <a:pPr/>
-            <a:r>
-              <a:t>[Recognition 1]</a:t>
-            </a:r>
-          </a:p>
-          <a:p>
-            <a:pPr/>
-            <a:r>
-              <a:t>[Recognition 2]</a:t>
-            </a:r>
-          </a:p>
-          <a:p>
-            <a:pPr/>
-            <a:r>
-              <a:t>Solution architects with [domain] expertise</a:t>
-            </a:r>
-          </a:p>
-          <a:p>
-            <a:pPr/>
-            <a:r>
-              <a:t>Certified implementation specialists</a:t>
-            </a:r>
-          </a:p>
-          <a:p>
-            <a:pPr/>
-            <a:r>
-              <a:t>Dedicated account and support management</a:t>
+              <a:rPr b="1"/>
+              <a:t>Value to You</a:t>
+            </a:r>
+          </a:p>
+          <a:p>
+            <a:pPr lvl="1"/>
+            <a:r>
+              <a:t>Proven methodology reduces implementation risk by 60%</a:t>
+            </a:r>
+          </a:p>
+          <a:p>
+            <a:pPr lvl="1"/>
+            <a:r>
+              <a:t>Pre-built accelerators fast-track your deployment</a:t>
+            </a:r>
+          </a:p>
+          <a:p>
+            <a:pPr lvl="1"/>
+            <a:r>
+              <a:t>Direct vendor escalation and early-access programs</a:t>
+            </a:r>
+          </a:p>
+          <a:p>
+            <a:pPr lvl="1"/>
+            <a:r>
+              <a:t>Comprehensive skills transfer for team self-sufficiency</a:t>
+            </a:r>
+          </a:p>
+          <a:p>
+            <a:pPr lvl="1"/>
+            <a:r>
+              <a:t>Best practices from 200+ implementations</a:t>
             </a:r>
           </a:p>
         </p:txBody>
       </p:sp>
       <p:pic>
         <p:nvPicPr>
-          <p:cNvPr id="5" name="Picture 4" descr="eo-framework-logo-real.png"/>
+          <p:cNvPr id="6" name="Picture 5" descr="eo-framework-logo-real.png"/>
           <p:cNvPicPr>
             <a:picLocks noChangeAspect="1"/>
           </p:cNvPicPr>

</xml_diff>

<commit_message>
Enhance Investment Summary with professional financial table
Updates:
- Replace bullet list with 5-column financial table format
- Add columns: Cost Item, Cost per Item, Credits, Total Cost to Client, Comments
- Include sample data showing $364K Year 1 investment with $40K in credits
- Add comprehensive speaker notes for objection handling and value positioning
- Update presentation speaking points for Investment Summary slide

Technical improvements to solution-doc-builder.py:
- Fix table rendering: prioritize table layout for slides with markdown tables
- Add 5-column table support with optimized widths (25%, 15%, 12%, 18%, 30%)
- Prevent table-to-bullets conversion when using table layout
- Support dynamic column width allocation for different table types

Generated output verified with proper table rendering in EO Table layout.
</commit_message>
<xml_diff>
--- a/solution-template/sample-provider/sample-category/sample-solution/presales/solution-briefing.pptx
+++ b/solution-template/sample-provider/sample-category/sample-solution/presales/solution-briefing.pptx
@@ -295,6 +295,31 @@
 </p:notes>
 </file>
 
+<file path=ppt/notesSlides/notesSlide3.xml><?xml version="1.0" encoding="utf-8"?>
+<p:notes xmlns:a="http://schemas.openxmlformats.org/drawingml/2006/main" xmlns:p="http://schemas.openxmlformats.org/presentationml/2006/main" xmlns:r="http://schemas.openxmlformats.org/officeDocument/2006/relationships">
+  <p:cSld>
+    <p:spTree>
+      <p:nvGrpSpPr>
+        <p:cNvPr id="1" name=""/>
+        <p:cNvGrpSpPr/>
+        <p:nvPr/>
+      </p:nvGrpSpPr>
+      <p:grpSpPr>
+        <a:xfrm>
+          <a:off x="0" y="0"/>
+          <a:ext cx="0" cy="0"/>
+          <a:chOff x="0" y="0"/>
+          <a:chExt cx="0" cy="0"/>
+        </a:xfrm>
+      </p:grpSpPr>
+    </p:spTree>
+  </p:cSld>
+  <p:clrMapOvr>
+    <a:masterClrMapping/>
+  </p:clrMapOvr>
+</p:notes>
+</file>
+
 <file path=ppt/slideLayouts/slideLayout1.xml><?xml version="1.0" encoding="utf-8"?>
 <p:sldLayout xmlns:a="http://schemas.openxmlformats.org/drawingml/2006/main" xmlns:r="http://schemas.openxmlformats.org/officeDocument/2006/relationships" xmlns:p="http://schemas.openxmlformats.org/presentationml/2006/main" preserve="1" userDrawn="1">
   <p:cSld name="EO Title Slide">
@@ -1135,17 +1160,17 @@
           <a:bodyPr/>
           <a:lstStyle>
             <a:lvl1pPr>
-              <a:defRPr sz="1800">
+              <a:defRPr sz="2000">
                 <a:solidFill>
                   <a:srgbClr val="C00000"/>
                 </a:solidFill>
               </a:defRPr>
             </a:lvl1pPr>
             <a:lvl2pPr>
-              <a:defRPr sz="1400"/>
+              <a:defRPr sz="1600"/>
             </a:lvl2pPr>
             <a:lvl3pPr>
-              <a:defRPr sz="1200"/>
+              <a:defRPr sz="1400"/>
             </a:lvl3pPr>
             <a:lvl4pPr>
               <a:defRPr sz="1200"/>
@@ -1220,17 +1245,17 @@
           <a:bodyPr/>
           <a:lstStyle>
             <a:lvl1pPr>
-              <a:defRPr sz="1800">
+              <a:defRPr sz="2000">
                 <a:solidFill>
                   <a:srgbClr val="C00000"/>
                 </a:solidFill>
               </a:defRPr>
             </a:lvl1pPr>
             <a:lvl2pPr>
-              <a:defRPr sz="1400"/>
+              <a:defRPr sz="1600"/>
             </a:lvl2pPr>
             <a:lvl3pPr>
-              <a:defRPr sz="1200"/>
+              <a:defRPr sz="1400"/>
             </a:lvl3pPr>
             <a:lvl4pPr>
               <a:defRPr sz="1200"/>
@@ -4276,7 +4301,9 @@
           <a:bodyPr/>
           <a:lstStyle/>
           <a:p>
-            <a:r>
+            <a:pPr algn="l"/>
+            <a:r>
+              <a:rPr b="1"/>
               <a:t>Investment Summary</a:t>
             </a:r>
           </a:p>
@@ -4289,50 +4316,681 @@
             <a:picLocks noGrp="1" noChangeAspect="1"/>
           </p:cNvPicPr>
           <p:nvPr>
-            <p:ph type="pic" idx="14" sz="quarter"/>
+            <p:ph type="pic" idx="13" sz="quarter"/>
           </p:nvPr>
         </p:nvPicPr>
         <p:blipFill>
           <a:blip r:embed="rId2"/>
-          <a:srcRect t="5949" b="5949"/>
+          <a:srcRect t="6404" b="6404"/>
           <a:stretch>
             <a:fillRect/>
           </a:stretch>
         </p:blipFill>
         <p:spPr/>
       </p:pic>
-      <p:sp>
-        <p:nvSpPr>
-          <p:cNvPr id="4" name="Chart Placeholder 3"/>
-          <p:cNvSpPr>
-            <a:spLocks noGrp="1"/>
-          </p:cNvSpPr>
+      <p:graphicFrame>
+        <p:nvGraphicFramePr>
+          <p:cNvPr id="4" name="Table Placeholder 3"/>
+          <p:cNvGraphicFramePr>
+            <a:graphicFrameLocks noGrp="1"/>
+          </p:cNvGraphicFramePr>
           <p:nvPr>
-            <p:ph type="chart" idx="15" sz="quarter"/>
+            <p:ph type="tbl" idx="14" sz="quarter"/>
           </p:nvPr>
-        </p:nvSpPr>
-        <p:spPr/>
-      </p:sp>
-      <p:sp>
-        <p:nvSpPr>
-          <p:cNvPr id="5" name="Content Placeholder 4"/>
-          <p:cNvSpPr>
-            <a:spLocks noGrp="1"/>
-          </p:cNvSpPr>
-          <p:nvPr>
-            <p:ph idx="16" sz="quarter"/>
-          </p:nvPr>
-        </p:nvSpPr>
-        <p:spPr/>
-        <p:txBody>
-          <a:bodyPr/>
-          <a:lstStyle/>
-          <a:p/>
-        </p:txBody>
-      </p:sp>
+        </p:nvGraphicFramePr>
+        <p:xfrm>
+          <a:off x="256855" y="677011"/>
+          <a:ext cx="8710929" cy="2595880"/>
+        </p:xfrm>
+        <a:graphic>
+          <a:graphicData uri="http://schemas.openxmlformats.org/drawingml/2006/table">
+            <a:tbl>
+              <a:tblPr firstRow="1" bandRow="1">
+                <a:tableStyleId>{5C22544A-7EE6-4342-B048-85BDC9FD1C3A}</a:tableStyleId>
+              </a:tblPr>
+              <a:tblGrid>
+                <a:gridCol w="2177733"/>
+                <a:gridCol w="1306639"/>
+                <a:gridCol w="1045311"/>
+                <a:gridCol w="1567967"/>
+                <a:gridCol w="2613279"/>
+              </a:tblGrid>
+              <a:tr h="370840">
+                <a:tc>
+                  <a:txBody>
+                    <a:bodyPr/>
+                    <a:lstStyle/>
+                    <a:p>
+                      <a:r>
+                        <a:rPr b="1" sz="1400">
+                          <a:solidFill>
+                            <a:srgbClr val="FFFFFF"/>
+                          </a:solidFill>
+                        </a:rPr>
+                        <a:t>Cost Item</a:t>
+                      </a:r>
+                    </a:p>
+                  </a:txBody>
+                  <a:tcPr>
+                    <a:solidFill>
+                      <a:srgbClr val="A01C02"/>
+                    </a:solidFill>
+                  </a:tcPr>
+                </a:tc>
+                <a:tc>
+                  <a:txBody>
+                    <a:bodyPr/>
+                    <a:lstStyle/>
+                    <a:p>
+                      <a:r>
+                        <a:rPr b="1" sz="1400">
+                          <a:solidFill>
+                            <a:srgbClr val="FFFFFF"/>
+                          </a:solidFill>
+                        </a:rPr>
+                        <a:t>Cost per Item</a:t>
+                      </a:r>
+                    </a:p>
+                  </a:txBody>
+                  <a:tcPr>
+                    <a:solidFill>
+                      <a:srgbClr val="A01C02"/>
+                    </a:solidFill>
+                  </a:tcPr>
+                </a:tc>
+                <a:tc>
+                  <a:txBody>
+                    <a:bodyPr/>
+                    <a:lstStyle/>
+                    <a:p>
+                      <a:r>
+                        <a:rPr b="1" sz="1400">
+                          <a:solidFill>
+                            <a:srgbClr val="FFFFFF"/>
+                          </a:solidFill>
+                        </a:rPr>
+                        <a:t>Credits</a:t>
+                      </a:r>
+                    </a:p>
+                  </a:txBody>
+                  <a:tcPr>
+                    <a:solidFill>
+                      <a:srgbClr val="A01C02"/>
+                    </a:solidFill>
+                  </a:tcPr>
+                </a:tc>
+                <a:tc>
+                  <a:txBody>
+                    <a:bodyPr/>
+                    <a:lstStyle/>
+                    <a:p>
+                      <a:r>
+                        <a:rPr b="1" sz="1400">
+                          <a:solidFill>
+                            <a:srgbClr val="FFFFFF"/>
+                          </a:solidFill>
+                        </a:rPr>
+                        <a:t>Total Cost to Client</a:t>
+                      </a:r>
+                    </a:p>
+                  </a:txBody>
+                  <a:tcPr>
+                    <a:solidFill>
+                      <a:srgbClr val="A01C02"/>
+                    </a:solidFill>
+                  </a:tcPr>
+                </a:tc>
+                <a:tc>
+                  <a:txBody>
+                    <a:bodyPr/>
+                    <a:lstStyle/>
+                    <a:p>
+                      <a:r>
+                        <a:rPr b="1" sz="1400">
+                          <a:solidFill>
+                            <a:srgbClr val="FFFFFF"/>
+                          </a:solidFill>
+                        </a:rPr>
+                        <a:t>Comments</a:t>
+                      </a:r>
+                    </a:p>
+                  </a:txBody>
+                  <a:tcPr>
+                    <a:solidFill>
+                      <a:srgbClr val="A01C02"/>
+                    </a:solidFill>
+                  </a:tcPr>
+                </a:tc>
+              </a:tr>
+              <a:tr h="370840">
+                <a:tc>
+                  <a:txBody>
+                    <a:bodyPr/>
+                    <a:lstStyle/>
+                    <a:p>
+                      <a:r>
+                        <a:rPr sz="1100"/>
+                        <a:t>Assessment &amp; Discovery</a:t>
+                      </a:r>
+                    </a:p>
+                  </a:txBody>
+                  <a:tcPr>
+                    <a:solidFill>
+                      <a:srgbClr val="E7E6E6"/>
+                    </a:solidFill>
+                  </a:tcPr>
+                </a:tc>
+                <a:tc>
+                  <a:txBody>
+                    <a:bodyPr/>
+                    <a:lstStyle/>
+                    <a:p>
+                      <a:r>
+                        <a:rPr sz="1100"/>
+                        <a:t>$45,000</a:t>
+                      </a:r>
+                    </a:p>
+                  </a:txBody>
+                  <a:tcPr>
+                    <a:solidFill>
+                      <a:srgbClr val="E7E6E6"/>
+                    </a:solidFill>
+                  </a:tcPr>
+                </a:tc>
+                <a:tc>
+                  <a:txBody>
+                    <a:bodyPr/>
+                    <a:lstStyle/>
+                    <a:p>
+                      <a:r>
+                        <a:rPr sz="1100"/>
+                        <a:t>$0</a:t>
+                      </a:r>
+                    </a:p>
+                  </a:txBody>
+                  <a:tcPr>
+                    <a:solidFill>
+                      <a:srgbClr val="E7E6E6"/>
+                    </a:solidFill>
+                  </a:tcPr>
+                </a:tc>
+                <a:tc>
+                  <a:txBody>
+                    <a:bodyPr/>
+                    <a:lstStyle/>
+                    <a:p>
+                      <a:r>
+                        <a:rPr sz="1100"/>
+                        <a:t>$45,000</a:t>
+                      </a:r>
+                    </a:p>
+                  </a:txBody>
+                  <a:tcPr>
+                    <a:solidFill>
+                      <a:srgbClr val="E7E6E6"/>
+                    </a:solidFill>
+                  </a:tcPr>
+                </a:tc>
+                <a:tc>
+                  <a:txBody>
+                    <a:bodyPr/>
+                    <a:lstStyle/>
+                    <a:p>
+                      <a:r>
+                        <a:rPr sz="1100"/>
+                        <a:t>4-week assessment, architecture design, ROI analysis</a:t>
+                      </a:r>
+                    </a:p>
+                  </a:txBody>
+                  <a:tcPr>
+                    <a:solidFill>
+                      <a:srgbClr val="E7E6E6"/>
+                    </a:solidFill>
+                  </a:tcPr>
+                </a:tc>
+              </a:tr>
+              <a:tr h="370840">
+                <a:tc>
+                  <a:txBody>
+                    <a:bodyPr/>
+                    <a:lstStyle/>
+                    <a:p>
+                      <a:r>
+                        <a:rPr sz="1100"/>
+                        <a:t>Implementation Services</a:t>
+                      </a:r>
+                    </a:p>
+                  </a:txBody>
+                  <a:tcPr>
+                    <a:solidFill>
+                      <a:srgbClr val="E7E6E6"/>
+                    </a:solidFill>
+                  </a:tcPr>
+                </a:tc>
+                <a:tc>
+                  <a:txBody>
+                    <a:bodyPr/>
+                    <a:lstStyle/>
+                    <a:p>
+                      <a:r>
+                        <a:rPr sz="1100"/>
+                        <a:t>$180,000</a:t>
+                      </a:r>
+                    </a:p>
+                  </a:txBody>
+                  <a:tcPr>
+                    <a:solidFill>
+                      <a:srgbClr val="E7E6E6"/>
+                    </a:solidFill>
+                  </a:tcPr>
+                </a:tc>
+                <a:tc>
+                  <a:txBody>
+                    <a:bodyPr/>
+                    <a:lstStyle/>
+                    <a:p>
+                      <a:r>
+                        <a:rPr sz="1100"/>
+                        <a:t>($25,000)</a:t>
+                      </a:r>
+                    </a:p>
+                  </a:txBody>
+                  <a:tcPr>
+                    <a:solidFill>
+                      <a:srgbClr val="E7E6E6"/>
+                    </a:solidFill>
+                  </a:tcPr>
+                </a:tc>
+                <a:tc>
+                  <a:txBody>
+                    <a:bodyPr/>
+                    <a:lstStyle/>
+                    <a:p>
+                      <a:r>
+                        <a:rPr sz="1100"/>
+                        <a:t>$155,000</a:t>
+                      </a:r>
+                    </a:p>
+                  </a:txBody>
+                  <a:tcPr>
+                    <a:solidFill>
+                      <a:srgbClr val="E7E6E6"/>
+                    </a:solidFill>
+                  </a:tcPr>
+                </a:tc>
+                <a:tc>
+                  <a:txBody>
+                    <a:bodyPr/>
+                    <a:lstStyle/>
+                    <a:p>
+                      <a:r>
+                        <a:rPr sz="1100"/>
+                        <a:t>Cloud Partner Program credit applied</a:t>
+                      </a:r>
+                    </a:p>
+                  </a:txBody>
+                  <a:tcPr>
+                    <a:solidFill>
+                      <a:srgbClr val="E7E6E6"/>
+                    </a:solidFill>
+                  </a:tcPr>
+                </a:tc>
+              </a:tr>
+              <a:tr h="370840">
+                <a:tc>
+                  <a:txBody>
+                    <a:bodyPr/>
+                    <a:lstStyle/>
+                    <a:p>
+                      <a:r>
+                        <a:rPr sz="1100"/>
+                        <a:t>Cloud Consumption (Year 1)</a:t>
+                      </a:r>
+                    </a:p>
+                  </a:txBody>
+                  <a:tcPr>
+                    <a:solidFill>
+                      <a:srgbClr val="E7E6E6"/>
+                    </a:solidFill>
+                  </a:tcPr>
+                </a:tc>
+                <a:tc>
+                  <a:txBody>
+                    <a:bodyPr/>
+                    <a:lstStyle/>
+                    <a:p>
+                      <a:r>
+                        <a:rPr sz="1100"/>
+                        <a:t>$96,000</a:t>
+                      </a:r>
+                    </a:p>
+                  </a:txBody>
+                  <a:tcPr>
+                    <a:solidFill>
+                      <a:srgbClr val="E7E6E6"/>
+                    </a:solidFill>
+                  </a:tcPr>
+                </a:tc>
+                <a:tc>
+                  <a:txBody>
+                    <a:bodyPr/>
+                    <a:lstStyle/>
+                    <a:p>
+                      <a:r>
+                        <a:rPr sz="1100"/>
+                        <a:t>($15,000)</a:t>
+                      </a:r>
+                    </a:p>
+                  </a:txBody>
+                  <a:tcPr>
+                    <a:solidFill>
+                      <a:srgbClr val="E7E6E6"/>
+                    </a:solidFill>
+                  </a:tcPr>
+                </a:tc>
+                <a:tc>
+                  <a:txBody>
+                    <a:bodyPr/>
+                    <a:lstStyle/>
+                    <a:p>
+                      <a:r>
+                        <a:rPr sz="1100"/>
+                        <a:t>$81,000</a:t>
+                      </a:r>
+                    </a:p>
+                  </a:txBody>
+                  <a:tcPr>
+                    <a:solidFill>
+                      <a:srgbClr val="E7E6E6"/>
+                    </a:solidFill>
+                  </a:tcPr>
+                </a:tc>
+                <a:tc>
+                  <a:txBody>
+                    <a:bodyPr/>
+                    <a:lstStyle/>
+                    <a:p>
+                      <a:r>
+                        <a:rPr sz="1100"/>
+                        <a:t>Platform services with 15% partner discount</a:t>
+                      </a:r>
+                    </a:p>
+                  </a:txBody>
+                  <a:tcPr>
+                    <a:solidFill>
+                      <a:srgbClr val="E7E6E6"/>
+                    </a:solidFill>
+                  </a:tcPr>
+                </a:tc>
+              </a:tr>
+              <a:tr h="370840">
+                <a:tc>
+                  <a:txBody>
+                    <a:bodyPr/>
+                    <a:lstStyle/>
+                    <a:p>
+                      <a:r>
+                        <a:rPr sz="1100"/>
+                        <a:t>Training &amp; Change Management</a:t>
+                      </a:r>
+                    </a:p>
+                  </a:txBody>
+                  <a:tcPr>
+                    <a:solidFill>
+                      <a:srgbClr val="E7E6E6"/>
+                    </a:solidFill>
+                  </a:tcPr>
+                </a:tc>
+                <a:tc>
+                  <a:txBody>
+                    <a:bodyPr/>
+                    <a:lstStyle/>
+                    <a:p>
+                      <a:r>
+                        <a:rPr sz="1100"/>
+                        <a:t>$35,000</a:t>
+                      </a:r>
+                    </a:p>
+                  </a:txBody>
+                  <a:tcPr>
+                    <a:solidFill>
+                      <a:srgbClr val="E7E6E6"/>
+                    </a:solidFill>
+                  </a:tcPr>
+                </a:tc>
+                <a:tc>
+                  <a:txBody>
+                    <a:bodyPr/>
+                    <a:lstStyle/>
+                    <a:p>
+                      <a:r>
+                        <a:rPr sz="1100"/>
+                        <a:t>$0</a:t>
+                      </a:r>
+                    </a:p>
+                  </a:txBody>
+                  <a:tcPr>
+                    <a:solidFill>
+                      <a:srgbClr val="E7E6E6"/>
+                    </a:solidFill>
+                  </a:tcPr>
+                </a:tc>
+                <a:tc>
+                  <a:txBody>
+                    <a:bodyPr/>
+                    <a:lstStyle/>
+                    <a:p>
+                      <a:r>
+                        <a:rPr sz="1100"/>
+                        <a:t>$35,000</a:t>
+                      </a:r>
+                    </a:p>
+                  </a:txBody>
+                  <a:tcPr>
+                    <a:solidFill>
+                      <a:srgbClr val="E7E6E6"/>
+                    </a:solidFill>
+                  </a:tcPr>
+                </a:tc>
+                <a:tc>
+                  <a:txBody>
+                    <a:bodyPr/>
+                    <a:lstStyle/>
+                    <a:p>
+                      <a:r>
+                        <a:rPr sz="1100"/>
+                        <a:t>User training, documentation, adoption support</a:t>
+                      </a:r>
+                    </a:p>
+                  </a:txBody>
+                  <a:tcPr>
+                    <a:solidFill>
+                      <a:srgbClr val="E7E6E6"/>
+                    </a:solidFill>
+                  </a:tcPr>
+                </a:tc>
+              </a:tr>
+              <a:tr h="370840">
+                <a:tc>
+                  <a:txBody>
+                    <a:bodyPr/>
+                    <a:lstStyle/>
+                    <a:p>
+                      <a:r>
+                        <a:rPr sz="1100"/>
+                        <a:t>Support &amp; Maintenance (Year 1)</a:t>
+                      </a:r>
+                    </a:p>
+                  </a:txBody>
+                  <a:tcPr>
+                    <a:solidFill>
+                      <a:srgbClr val="E7E6E6"/>
+                    </a:solidFill>
+                  </a:tcPr>
+                </a:tc>
+                <a:tc>
+                  <a:txBody>
+                    <a:bodyPr/>
+                    <a:lstStyle/>
+                    <a:p>
+                      <a:r>
+                        <a:rPr sz="1100"/>
+                        <a:t>$48,000</a:t>
+                      </a:r>
+                    </a:p>
+                  </a:txBody>
+                  <a:tcPr>
+                    <a:solidFill>
+                      <a:srgbClr val="E7E6E6"/>
+                    </a:solidFill>
+                  </a:tcPr>
+                </a:tc>
+                <a:tc>
+                  <a:txBody>
+                    <a:bodyPr/>
+                    <a:lstStyle/>
+                    <a:p>
+                      <a:r>
+                        <a:rPr sz="1100"/>
+                        <a:t>$0</a:t>
+                      </a:r>
+                    </a:p>
+                  </a:txBody>
+                  <a:tcPr>
+                    <a:solidFill>
+                      <a:srgbClr val="E7E6E6"/>
+                    </a:solidFill>
+                  </a:tcPr>
+                </a:tc>
+                <a:tc>
+                  <a:txBody>
+                    <a:bodyPr/>
+                    <a:lstStyle/>
+                    <a:p>
+                      <a:r>
+                        <a:rPr sz="1100"/>
+                        <a:t>$48,000</a:t>
+                      </a:r>
+                    </a:p>
+                  </a:txBody>
+                  <a:tcPr>
+                    <a:solidFill>
+                      <a:srgbClr val="E7E6E6"/>
+                    </a:solidFill>
+                  </a:tcPr>
+                </a:tc>
+                <a:tc>
+                  <a:txBody>
+                    <a:bodyPr/>
+                    <a:lstStyle/>
+                    <a:p>
+                      <a:r>
+                        <a:rPr sz="1100"/>
+                        <a:t>24/7 support, SLA guarantee, ongoing optimization</a:t>
+                      </a:r>
+                    </a:p>
+                  </a:txBody>
+                  <a:tcPr>
+                    <a:solidFill>
+                      <a:srgbClr val="E7E6E6"/>
+                    </a:solidFill>
+                  </a:tcPr>
+                </a:tc>
+              </a:tr>
+              <a:tr h="370840">
+                <a:tc>
+                  <a:txBody>
+                    <a:bodyPr/>
+                    <a:lstStyle/>
+                    <a:p>
+                      <a:r>
+                        <a:rPr sz="1100"/>
+                        <a:t>Total Year 1 Investment</a:t>
+                      </a:r>
+                    </a:p>
+                  </a:txBody>
+                  <a:tcPr>
+                    <a:solidFill>
+                      <a:srgbClr val="E7E6E6"/>
+                    </a:solidFill>
+                  </a:tcPr>
+                </a:tc>
+                <a:tc>
+                  <a:txBody>
+                    <a:bodyPr/>
+                    <a:lstStyle/>
+                    <a:p>
+                      <a:r>
+                        <a:rPr sz="1100"/>
+                        <a:t>$404,000</a:t>
+                      </a:r>
+                    </a:p>
+                  </a:txBody>
+                  <a:tcPr>
+                    <a:solidFill>
+                      <a:srgbClr val="E7E6E6"/>
+                    </a:solidFill>
+                  </a:tcPr>
+                </a:tc>
+                <a:tc>
+                  <a:txBody>
+                    <a:bodyPr/>
+                    <a:lstStyle/>
+                    <a:p>
+                      <a:r>
+                        <a:rPr sz="1100"/>
+                        <a:t>($40,000)</a:t>
+                      </a:r>
+                    </a:p>
+                  </a:txBody>
+                  <a:tcPr>
+                    <a:solidFill>
+                      <a:srgbClr val="E7E6E6"/>
+                    </a:solidFill>
+                  </a:tcPr>
+                </a:tc>
+                <a:tc>
+                  <a:txBody>
+                    <a:bodyPr/>
+                    <a:lstStyle/>
+                    <a:p>
+                      <a:r>
+                        <a:rPr sz="1100"/>
+                        <a:t>$364,000</a:t>
+                      </a:r>
+                    </a:p>
+                  </a:txBody>
+                  <a:tcPr>
+                    <a:solidFill>
+                      <a:srgbClr val="E7E6E6"/>
+                    </a:solidFill>
+                  </a:tcPr>
+                </a:tc>
+                <a:tc>
+                  <a:txBody>
+                    <a:bodyPr/>
+                    <a:lstStyle/>
+                    <a:p>
+                      <a:r>
+                        <a:rPr sz="1100"/>
+                        <a:t>All-in first year cost with credits</a:t>
+                      </a:r>
+                    </a:p>
+                  </a:txBody>
+                  <a:tcPr>
+                    <a:solidFill>
+                      <a:srgbClr val="E7E6E6"/>
+                    </a:solidFill>
+                  </a:tcPr>
+                </a:tc>
+              </a:tr>
+            </a:tbl>
+          </a:graphicData>
+        </a:graphic>
+      </p:graphicFrame>
       <p:pic>
         <p:nvPicPr>
-          <p:cNvPr id="6" name="Picture 5" descr="eo-framework-logo-real.png"/>
+          <p:cNvPr id="5" name="Picture 4" descr="eo-framework-logo-real.png"/>
           <p:cNvPicPr>
             <a:picLocks noChangeAspect="1"/>
           </p:cNvPicPr>

</xml_diff>

<commit_message>
Improve solution briefing presentation with slide layout enhancements
Updates to solution briefing template:
- Split final slide into separate Next Steps and Thank You slides
- Add EO Bullet Points layout support for Next Steps slide
- Simplify Thank You slide to show only Account Manager contact
- Update presentation structure from 9 to 10 slides

Technical improvements:
- Add bullet_points layout detection and handling
- Fix Thank You slide to use correct placeholder (idx=15)
- Ensure content appears below title without overlap
- Add dynamic layout selection based on slide title keywords

Generated presentation verified with proper formatting and spacing.
</commit_message>
<xml_diff>
--- a/solution-template/sample-provider/sample-category/sample-solution/presales/solution-briefing.pptx
+++ b/solution-template/sample-provider/sample-category/sample-solution/presales/solution-briefing.pptx
@@ -5,18 +5,19 @@
     <p:sldMasterId id="2147483648" r:id="rId1"/>
   </p:sldMasterIdLst>
   <p:notesMasterIdLst>
-    <p:notesMasterId r:id="rId7"/>
+    <p:notesMasterId r:id="rId9"/>
   </p:notesMasterIdLst>
   <p:sldIdLst>
-    <p:sldId id="256" r:id="rId6"/>
-    <p:sldId id="257" r:id="rId5"/>
-    <p:sldId id="258" r:id="rId4"/>
-    <p:sldId id="259" r:id="rId3"/>
-    <p:sldId id="260" r:id="rId2"/>
-    <p:sldId id="261" r:id="rId12"/>
-    <p:sldId id="262" r:id="rId13"/>
+    <p:sldId id="256" r:id="rId7"/>
+    <p:sldId id="257" r:id="rId8"/>
+    <p:sldId id="258" r:id="rId6"/>
+    <p:sldId id="259" r:id="rId5"/>
+    <p:sldId id="260" r:id="rId4"/>
+    <p:sldId id="261" r:id="rId3"/>
+    <p:sldId id="262" r:id="rId2"/>
     <p:sldId id="263" r:id="rId14"/>
     <p:sldId id="264" r:id="rId15"/>
+    <p:sldId id="265" r:id="rId16"/>
   </p:sldIdLst>
   <p:sldSz cx="9144000" cy="5143500" type="screen16x9"/>
   <p:notesSz cx="5143500" cy="9144000"/>
@@ -320,6 +321,56 @@
 </p:notes>
 </file>
 
+<file path=ppt/notesSlides/notesSlide4.xml><?xml version="1.0" encoding="utf-8"?>
+<p:notes xmlns:a="http://schemas.openxmlformats.org/drawingml/2006/main" xmlns:p="http://schemas.openxmlformats.org/presentationml/2006/main" xmlns:r="http://schemas.openxmlformats.org/officeDocument/2006/relationships">
+  <p:cSld>
+    <p:spTree>
+      <p:nvGrpSpPr>
+        <p:cNvPr id="1" name=""/>
+        <p:cNvGrpSpPr/>
+        <p:nvPr/>
+      </p:nvGrpSpPr>
+      <p:grpSpPr>
+        <a:xfrm>
+          <a:off x="0" y="0"/>
+          <a:ext cx="0" cy="0"/>
+          <a:chOff x="0" y="0"/>
+          <a:chExt cx="0" cy="0"/>
+        </a:xfrm>
+      </p:grpSpPr>
+    </p:spTree>
+  </p:cSld>
+  <p:clrMapOvr>
+    <a:masterClrMapping/>
+  </p:clrMapOvr>
+</p:notes>
+</file>
+
+<file path=ppt/notesSlides/notesSlide5.xml><?xml version="1.0" encoding="utf-8"?>
+<p:notes xmlns:a="http://schemas.openxmlformats.org/drawingml/2006/main" xmlns:p="http://schemas.openxmlformats.org/presentationml/2006/main" xmlns:r="http://schemas.openxmlformats.org/officeDocument/2006/relationships">
+  <p:cSld>
+    <p:spTree>
+      <p:nvGrpSpPr>
+        <p:cNvPr id="1" name=""/>
+        <p:cNvGrpSpPr/>
+        <p:nvPr/>
+      </p:nvGrpSpPr>
+      <p:grpSpPr>
+        <a:xfrm>
+          <a:off x="0" y="0"/>
+          <a:ext cx="0" cy="0"/>
+          <a:chOff x="0" y="0"/>
+          <a:chExt cx="0" cy="0"/>
+        </a:xfrm>
+      </p:grpSpPr>
+    </p:spTree>
+  </p:cSld>
+  <p:clrMapOvr>
+    <a:masterClrMapping/>
+  </p:clrMapOvr>
+</p:notes>
+</file>
+
 <file path=ppt/slideLayouts/slideLayout1.xml><?xml version="1.0" encoding="utf-8"?>
 <p:sldLayout xmlns:a="http://schemas.openxmlformats.org/drawingml/2006/main" xmlns:r="http://schemas.openxmlformats.org/officeDocument/2006/relationships" xmlns:p="http://schemas.openxmlformats.org/presentationml/2006/main" preserve="1" userDrawn="1">
   <p:cSld name="EO Title Slide">
@@ -959,6 +1010,258 @@
 
 <file path=ppt/slideLayouts/slideLayout3.xml><?xml version="1.0" encoding="utf-8"?>
 <p:sldLayout xmlns:a="http://schemas.openxmlformats.org/drawingml/2006/main" xmlns:r="http://schemas.openxmlformats.org/officeDocument/2006/relationships" xmlns:p="http://schemas.openxmlformats.org/presentationml/2006/main" preserve="1" userDrawn="1">
+  <p:cSld name="EO Bullet Points">
+    <p:spTree>
+      <p:nvGrpSpPr>
+        <p:cNvPr id="1" name=""/>
+        <p:cNvGrpSpPr/>
+        <p:nvPr/>
+      </p:nvGrpSpPr>
+      <p:grpSpPr>
+        <a:xfrm>
+          <a:off x="0" y="0"/>
+          <a:ext cx="0" cy="0"/>
+          <a:chOff x="0" y="0"/>
+          <a:chExt cx="0" cy="0"/>
+        </a:xfrm>
+      </p:grpSpPr>
+      <p:sp>
+        <p:nvSpPr>
+          <p:cNvPr id="3" name="Shape 1">
+            <a:extLst>
+              <a:ext uri="{FF2B5EF4-FFF2-40B4-BE49-F238E27FC236}">
+                <a16:creationId xmlns:a16="http://schemas.microsoft.com/office/drawing/2014/main" id="{4EA828A1-D5D6-9ADA-1918-E5FE226673A0}"/>
+              </a:ext>
+            </a:extLst>
+          </p:cNvPr>
+          <p:cNvSpPr/>
+          <p:nvPr userDrawn="1"/>
+        </p:nvSpPr>
+        <p:spPr>
+          <a:xfrm>
+            <a:off x="0" y="606304"/>
+            <a:ext cx="9144000" cy="0"/>
+          </a:xfrm>
+          <a:prstGeom prst="line">
+            <a:avLst/>
+          </a:prstGeom>
+          <a:noFill/>
+          <a:ln w="28575">
+            <a:solidFill>
+              <a:srgbClr val="CC0000"/>
+            </a:solidFill>
+            <a:prstDash val="solid"/>
+          </a:ln>
+        </p:spPr>
+        <p:txBody>
+          <a:bodyPr/>
+          <a:lstStyle/>
+          <a:p>
+            <a:endParaRPr lang="en-US"/>
+          </a:p>
+        </p:txBody>
+      </p:sp>
+      <p:sp>
+        <p:nvSpPr>
+          <p:cNvPr id="9" name="Text Placeholder 8">
+            <a:extLst>
+              <a:ext uri="{FF2B5EF4-FFF2-40B4-BE49-F238E27FC236}">
+                <a16:creationId xmlns:a16="http://schemas.microsoft.com/office/drawing/2014/main" id="{980A86D4-478F-6846-9F0A-B815F2A3AB2D}"/>
+              </a:ext>
+            </a:extLst>
+          </p:cNvPr>
+          <p:cNvSpPr>
+            <a:spLocks noGrp="1"/>
+          </p:cNvSpPr>
+          <p:nvPr>
+            <p:ph type="body" sz="quarter" idx="10" hasCustomPrompt="1"/>
+          </p:nvPr>
+        </p:nvSpPr>
+        <p:spPr>
+          <a:xfrm>
+            <a:off x="296863" y="0"/>
+            <a:ext cx="8509304" cy="527008"/>
+          </a:xfrm>
+          <a:prstGeom prst="rect">
+            <a:avLst/>
+          </a:prstGeom>
+        </p:spPr>
+        <p:txBody>
+          <a:bodyPr/>
+          <a:lstStyle>
+            <a:lvl1pPr marL="0" marR="0" indent="0" algn="l" defTabSz="914400" rtl="0" eaLnBrk="1" fontAlgn="auto" latinLnBrk="0" hangingPunct="1">
+              <a:lnSpc>
+                <a:spcPct val="100000"/>
+              </a:lnSpc>
+              <a:spcBef>
+                <a:spcPct val="20000"/>
+              </a:spcBef>
+              <a:spcAft>
+                <a:spcPts val="0"/>
+              </a:spcAft>
+              <a:buClrTx/>
+              <a:buSzTx/>
+              <a:buFont typeface="Arial" pitchFamily="34" charset="0"/>
+              <a:buNone/>
+              <a:tabLst/>
+              <a:defRPr sz="2700" b="1">
+                <a:latin typeface="Arial" panose="020B0604020202020204" pitchFamily="34" charset="0"/>
+                <a:cs typeface="Arial" panose="020B0604020202020204" pitchFamily="34" charset="0"/>
+              </a:defRPr>
+            </a:lvl1pPr>
+          </a:lstStyle>
+          <a:p>
+            <a:pPr lvl="0"/>
+            <a:r>
+              <a:rPr lang="en-US" dirty="0"/>
+              <a:t>Bullet Points</a:t>
+            </a:r>
+          </a:p>
+        </p:txBody>
+      </p:sp>
+      <p:sp>
+        <p:nvSpPr>
+          <p:cNvPr id="12" name="Picture Placeholder 13">
+            <a:extLst>
+              <a:ext uri="{FF2B5EF4-FFF2-40B4-BE49-F238E27FC236}">
+                <a16:creationId xmlns:a16="http://schemas.microsoft.com/office/drawing/2014/main" id="{2DB97592-C4D5-B315-7F11-AA14F6EE8A62}"/>
+              </a:ext>
+            </a:extLst>
+          </p:cNvPr>
+          <p:cNvSpPr>
+            <a:spLocks noGrp="1"/>
+          </p:cNvSpPr>
+          <p:nvPr>
+            <p:ph type="pic" sz="quarter" idx="13"/>
+          </p:nvPr>
+        </p:nvSpPr>
+        <p:spPr>
+          <a:xfrm>
+            <a:off x="313593" y="4536078"/>
+            <a:ext cx="2143858" cy="529698"/>
+          </a:xfrm>
+          <a:prstGeom prst="rect">
+            <a:avLst/>
+          </a:prstGeom>
+        </p:spPr>
+        <p:txBody>
+          <a:bodyPr/>
+          <a:lstStyle/>
+          <a:p>
+            <a:endParaRPr lang="en-US" dirty="0"/>
+          </a:p>
+        </p:txBody>
+      </p:sp>
+      <p:pic>
+        <p:nvPicPr>
+          <p:cNvPr id="13" name="Image 0" descr="/home/claude/eo-framework-logo.png">
+            <a:extLst>
+              <a:ext uri="{FF2B5EF4-FFF2-40B4-BE49-F238E27FC236}">
+                <a16:creationId xmlns:a16="http://schemas.microsoft.com/office/drawing/2014/main" id="{25116040-BB88-891D-9118-628A78E99872}"/>
+              </a:ext>
+            </a:extLst>
+          </p:cNvPr>
+          <p:cNvPicPr>
+            <a:picLocks noChangeAspect="1"/>
+          </p:cNvPicPr>
+          <p:nvPr userDrawn="1"/>
+        </p:nvPicPr>
+        <p:blipFill>
+          <a:blip r:embed="rId2"/>
+          <a:stretch>
+            <a:fillRect/>
+          </a:stretch>
+        </p:blipFill>
+        <p:spPr>
+          <a:xfrm>
+            <a:off x="6945879" y="4648200"/>
+            <a:ext cx="1952244" cy="417576"/>
+          </a:xfrm>
+          <a:prstGeom prst="rect">
+            <a:avLst/>
+          </a:prstGeom>
+        </p:spPr>
+      </p:pic>
+      <p:sp>
+        <p:nvSpPr>
+          <p:cNvPr id="4" name="Text Placeholder 3">
+            <a:extLst>
+              <a:ext uri="{FF2B5EF4-FFF2-40B4-BE49-F238E27FC236}">
+                <a16:creationId xmlns:a16="http://schemas.microsoft.com/office/drawing/2014/main" id="{54BEE1A0-720D-187D-95F8-429F3DF3D64E}"/>
+              </a:ext>
+            </a:extLst>
+          </p:cNvPr>
+          <p:cNvSpPr>
+            <a:spLocks noGrp="1"/>
+          </p:cNvSpPr>
+          <p:nvPr>
+            <p:ph type="body" sz="quarter" idx="14" hasCustomPrompt="1"/>
+          </p:nvPr>
+        </p:nvSpPr>
+        <p:spPr>
+          <a:xfrm>
+            <a:off x="296863" y="685601"/>
+            <a:ext cx="8548687" cy="3811657"/>
+          </a:xfrm>
+          <a:prstGeom prst="rect">
+            <a:avLst/>
+          </a:prstGeom>
+        </p:spPr>
+        <p:txBody>
+          <a:bodyPr/>
+          <a:lstStyle>
+            <a:lvl1pPr>
+              <a:defRPr sz="2000" baseline="0">
+                <a:solidFill>
+                  <a:schemeClr val="tx1"/>
+                </a:solidFill>
+              </a:defRPr>
+            </a:lvl1pPr>
+            <a:lvl2pPr>
+              <a:buFont typeface="Arial" panose="020B0604020202020204" pitchFamily="34" charset="0"/>
+              <a:buChar char="•"/>
+              <a:defRPr sz="1600"/>
+            </a:lvl2pPr>
+            <a:lvl3pPr>
+              <a:defRPr sz="1400"/>
+            </a:lvl3pPr>
+            <a:lvl4pPr>
+              <a:buFont typeface="Arial" panose="020B0604020202020204" pitchFamily="34" charset="0"/>
+              <a:buChar char="•"/>
+              <a:defRPr sz="1200"/>
+            </a:lvl4pPr>
+          </a:lstStyle>
+          <a:p>
+            <a:pPr lvl="0"/>
+            <a:r>
+              <a:rPr lang="en-US" dirty="0"/>
+              <a:t>Bullet Point 1</a:t>
+            </a:r>
+          </a:p>
+          <a:p>
+            <a:pPr lvl="0"/>
+            <a:r>
+              <a:rPr lang="en-US" dirty="0"/>
+              <a:t>Bullet Point 2</a:t>
+            </a:r>
+          </a:p>
+        </p:txBody>
+      </p:sp>
+    </p:spTree>
+    <p:extLst>
+      <p:ext uri="{BB962C8B-B14F-4D97-AF65-F5344CB8AC3E}">
+        <p14:creationId xmlns:p14="http://schemas.microsoft.com/office/powerpoint/2010/main" val="1090737763"/>
+      </p:ext>
+    </p:extLst>
+  </p:cSld>
+  <p:clrMapOvr>
+    <a:masterClrMapping/>
+  </p:clrMapOvr>
+</p:sldLayout>
+</file>
+
+<file path=ppt/slideLayouts/slideLayout4.xml><?xml version="1.0" encoding="utf-8"?>
+<p:sldLayout xmlns:a="http://schemas.openxmlformats.org/drawingml/2006/main" xmlns:r="http://schemas.openxmlformats.org/officeDocument/2006/relationships" xmlns:p="http://schemas.openxmlformats.org/presentationml/2006/main" preserve="1" userDrawn="1">
   <p:cSld name="EO Two Column">
     <p:spTree>
       <p:nvGrpSpPr>
@@ -1160,17 +1463,17 @@
           <a:bodyPr/>
           <a:lstStyle>
             <a:lvl1pPr>
-              <a:defRPr sz="2000">
+              <a:defRPr sz="1800">
                 <a:solidFill>
                   <a:srgbClr val="C00000"/>
                 </a:solidFill>
               </a:defRPr>
             </a:lvl1pPr>
             <a:lvl2pPr>
-              <a:defRPr sz="1600"/>
+              <a:defRPr sz="1400"/>
             </a:lvl2pPr>
             <a:lvl3pPr>
-              <a:defRPr sz="1400"/>
+              <a:defRPr sz="1200"/>
             </a:lvl3pPr>
             <a:lvl4pPr>
               <a:defRPr sz="1200"/>
@@ -1245,17 +1548,17 @@
           <a:bodyPr/>
           <a:lstStyle>
             <a:lvl1pPr>
-              <a:defRPr sz="2000">
+              <a:defRPr sz="1800">
                 <a:solidFill>
                   <a:srgbClr val="C00000"/>
                 </a:solidFill>
               </a:defRPr>
             </a:lvl1pPr>
             <a:lvl2pPr>
-              <a:defRPr sz="1600"/>
+              <a:defRPr sz="1400"/>
             </a:lvl2pPr>
             <a:lvl3pPr>
-              <a:defRPr sz="1400"/>
+              <a:defRPr sz="1200"/>
             </a:lvl3pPr>
             <a:lvl4pPr>
               <a:defRPr sz="1200"/>
@@ -1314,7 +1617,7 @@
 </p:sldLayout>
 </file>
 
-<file path=ppt/slideLayouts/slideLayout4.xml><?xml version="1.0" encoding="utf-8"?>
+<file path=ppt/slideLayouts/slideLayout5.xml><?xml version="1.0" encoding="utf-8"?>
 <p:sldLayout xmlns:a="http://schemas.openxmlformats.org/drawingml/2006/main" xmlns:r="http://schemas.openxmlformats.org/officeDocument/2006/relationships" xmlns:p="http://schemas.openxmlformats.org/presentationml/2006/main" preserve="1" userDrawn="1">
   <p:cSld name="EO Table">
     <p:spTree>
@@ -1561,7 +1864,7 @@
 </p:sldLayout>
 </file>
 
-<file path=ppt/slideLayouts/slideLayout5.xml><?xml version="1.0" encoding="utf-8"?>
+<file path=ppt/slideLayouts/slideLayout6.xml><?xml version="1.0" encoding="utf-8"?>
 <p:sldLayout xmlns:a="http://schemas.openxmlformats.org/drawingml/2006/main" xmlns:r="http://schemas.openxmlformats.org/officeDocument/2006/relationships" xmlns:p="http://schemas.openxmlformats.org/presentationml/2006/main" preserve="1" userDrawn="1">
   <p:cSld name="EO Visual Content">
     <p:spTree>
@@ -1866,7 +2169,7 @@
 </p:sldLayout>
 </file>
 
-<file path=ppt/slideLayouts/slideLayout6.xml><?xml version="1.0" encoding="utf-8"?>
+<file path=ppt/slideLayouts/slideLayout7.xml><?xml version="1.0" encoding="utf-8"?>
 <p:sldLayout xmlns:a="http://schemas.openxmlformats.org/drawingml/2006/main" xmlns:r="http://schemas.openxmlformats.org/officeDocument/2006/relationships" xmlns:p="http://schemas.openxmlformats.org/presentationml/2006/main" preserve="1" userDrawn="1">
   <p:cSld name="EO Data Visualization">
     <p:spTree>
@@ -2171,7 +2474,7 @@
 </p:sldLayout>
 </file>
 
-<file path=ppt/slideLayouts/slideLayout7.xml><?xml version="1.0" encoding="utf-8"?>
+<file path=ppt/slideLayouts/slideLayout8.xml><?xml version="1.0" encoding="utf-8"?>
 <p:sldLayout xmlns:a="http://schemas.openxmlformats.org/drawingml/2006/main" xmlns:r="http://schemas.openxmlformats.org/officeDocument/2006/relationships" xmlns:p="http://schemas.openxmlformats.org/presentationml/2006/main" preserve="1" userDrawn="1">
   <p:cSld name="EO Thank You">
     <p:spTree>
@@ -2269,7 +2572,7 @@
         </p:nvSpPr>
         <p:spPr>
           <a:xfrm>
-            <a:off x="538528" y="1886679"/>
+            <a:off x="736356" y="2247927"/>
             <a:ext cx="7671288" cy="527050"/>
           </a:xfrm>
           <a:prstGeom prst="rect">
@@ -2307,6 +2610,14 @@
               </a:rPr>
               <a:t>Thank You</a:t>
             </a:r>
+          </a:p>
+          <a:p>
+            <a:pPr marL="0" indent="0" algn="ctr">
+              <a:lnSpc>
+                <a:spcPts val="3600"/>
+              </a:lnSpc>
+              <a:buNone/>
+            </a:pPr>
             <a:endParaRPr lang="en-US" sz="3600" dirty="0"/>
           </a:p>
         </p:txBody>
@@ -2400,7 +2711,7 @@
         </p:nvSpPr>
         <p:spPr>
           <a:xfrm>
-            <a:off x="1059473" y="2437679"/>
+            <a:off x="1024304" y="1874962"/>
             <a:ext cx="6629399" cy="334598"/>
           </a:xfrm>
           <a:prstGeom prst="rect">
@@ -2561,6 +2872,83 @@
                 </a:schemeClr>
               </a:solidFill>
             </a:endParaRPr>
+          </a:p>
+        </p:txBody>
+      </p:sp>
+      <p:sp>
+        <p:nvSpPr>
+          <p:cNvPr id="16" name="Text Placeholder 9">
+            <a:extLst>
+              <a:ext uri="{FF2B5EF4-FFF2-40B4-BE49-F238E27FC236}">
+                <a16:creationId xmlns:a16="http://schemas.microsoft.com/office/drawing/2014/main" id="{2DED039B-C555-DCF4-1CA7-CA1E44823784}"/>
+              </a:ext>
+            </a:extLst>
+          </p:cNvPr>
+          <p:cNvSpPr>
+            <a:spLocks noGrp="1"/>
+          </p:cNvSpPr>
+          <p:nvPr>
+            <p:ph type="body" sz="quarter" idx="15" hasCustomPrompt="1"/>
+          </p:nvPr>
+        </p:nvSpPr>
+        <p:spPr>
+          <a:xfrm>
+            <a:off x="268165" y="3131272"/>
+            <a:ext cx="8480181" cy="334598"/>
+          </a:xfrm>
+          <a:prstGeom prst="rect">
+            <a:avLst/>
+          </a:prstGeom>
+        </p:spPr>
+        <p:txBody>
+          <a:bodyPr/>
+          <a:lstStyle>
+            <a:lvl1pPr marL="0" marR="0" indent="0" algn="ctr" defTabSz="914400" rtl="0" eaLnBrk="1" fontAlgn="auto" latinLnBrk="0" hangingPunct="1">
+              <a:lnSpc>
+                <a:spcPct val="100000"/>
+              </a:lnSpc>
+              <a:spcBef>
+                <a:spcPct val="20000"/>
+              </a:spcBef>
+              <a:spcAft>
+                <a:spcPts val="0"/>
+              </a:spcAft>
+              <a:buClrTx/>
+              <a:buSzTx/>
+              <a:buFont typeface="Arial" pitchFamily="34" charset="0"/>
+              <a:buNone/>
+              <a:tabLst/>
+              <a:defRPr sz="1800" b="0">
+                <a:solidFill>
+                  <a:schemeClr val="tx1"/>
+                </a:solidFill>
+                <a:latin typeface="Arial" panose="020B0604020202020204" pitchFamily="34" charset="0"/>
+                <a:cs typeface="Arial" panose="020B0604020202020204" pitchFamily="34" charset="0"/>
+              </a:defRPr>
+            </a:lvl1pPr>
+          </a:lstStyle>
+          <a:p>
+            <a:pPr>
+              <a:spcAft>
+                <a:spcPts val="1200"/>
+              </a:spcAft>
+            </a:pPr>
+            <a:r>
+              <a:rPr lang="en-US" sz="1800" b="1" dirty="0">
+                <a:solidFill>
+                  <a:srgbClr val="000000"/>
+                </a:solidFill>
+              </a:rPr>
+              <a:t>Account Manager:</a:t>
+            </a:r>
+            <a:r>
+              <a:rPr lang="en-US" sz="1800" dirty="0">
+                <a:solidFill>
+                  <a:srgbClr val="000000"/>
+                </a:solidFill>
+              </a:rPr>
+              <a:t> [Name, Title] | [Email] | [Phone]</a:t>
+            </a:r>
           </a:p>
         </p:txBody>
       </p:sp>
@@ -2605,11 +2993,12 @@
   <p:sldLayoutIdLst>
     <p:sldLayoutId id="2147483651" r:id="rId1"/>
     <p:sldLayoutId id="2147483653" r:id="rId2"/>
-    <p:sldLayoutId id="2147483654" r:id="rId3"/>
-    <p:sldLayoutId id="2147483655" r:id="rId4"/>
-    <p:sldLayoutId id="2147483656" r:id="rId5"/>
-    <p:sldLayoutId id="2147483657" r:id="rId6"/>
-    <p:sldLayoutId id="2147483658" r:id="rId7"/>
+    <p:sldLayoutId id="2147483659" r:id="rId3"/>
+    <p:sldLayoutId id="2147483654" r:id="rId4"/>
+    <p:sldLayoutId id="2147483655" r:id="rId5"/>
+    <p:sldLayoutId id="2147483656" r:id="rId6"/>
+    <p:sldLayoutId id="2147483657" r:id="rId7"/>
+    <p:sldLayoutId id="2147483658" r:id="rId8"/>
   </p:sldLayoutIdLst>
   <p:hf sldNum="0" hdr="0" ftr="0" dt="0"/>
   <p:txStyles>
@@ -2972,6 +3361,150 @@
           <a:p>
             <a:r>
               <a:t>Alison Smith | November 11, 2025</a:t>
+            </a:r>
+          </a:p>
+        </p:txBody>
+      </p:sp>
+      <p:pic>
+        <p:nvPicPr>
+          <p:cNvPr id="7" name="Picture 6" descr="eo-framework-logo-real.png"/>
+          <p:cNvPicPr>
+            <a:picLocks noChangeAspect="1"/>
+          </p:cNvPicPr>
+          <p:nvPr/>
+        </p:nvPicPr>
+        <p:blipFill>
+          <a:blip r:embed="rId4"/>
+          <a:stretch>
+            <a:fillRect/>
+          </a:stretch>
+        </p:blipFill>
+        <p:spPr>
+          <a:xfrm>
+            <a:off x="6684264" y="4535424"/>
+            <a:ext cx="2139696" cy="530352"/>
+          </a:xfrm>
+          <a:prstGeom prst="rect">
+            <a:avLst/>
+          </a:prstGeom>
+        </p:spPr>
+      </p:pic>
+    </p:spTree>
+  </p:cSld>
+  <p:clrMapOvr>
+    <a:masterClrMapping/>
+  </p:clrMapOvr>
+</p:sld>
+</file>
+
+<file path=ppt/slides/slide10.xml><?xml version="1.0" encoding="utf-8"?>
+<p:sld xmlns:a="http://schemas.openxmlformats.org/drawingml/2006/main" xmlns:p="http://schemas.openxmlformats.org/presentationml/2006/main" xmlns:r="http://schemas.openxmlformats.org/officeDocument/2006/relationships">
+  <p:cSld>
+    <p:spTree>
+      <p:nvGrpSpPr>
+        <p:cNvPr id="1" name=""/>
+        <p:cNvGrpSpPr/>
+        <p:nvPr/>
+      </p:nvGrpSpPr>
+      <p:grpSpPr/>
+      <p:pic>
+        <p:nvPicPr>
+          <p:cNvPr id="2" name="Picture Placeholder 1" descr="client_logo.png"/>
+          <p:cNvPicPr>
+            <a:picLocks noGrp="1" noChangeAspect="1"/>
+          </p:cNvPicPr>
+          <p:nvPr>
+            <p:ph type="pic" idx="10" sz="quarter"/>
+          </p:nvPr>
+        </p:nvPicPr>
+        <p:blipFill>
+          <a:blip r:embed="rId2"/>
+          <a:srcRect t="433" b="433"/>
+          <a:stretch>
+            <a:fillRect/>
+          </a:stretch>
+        </p:blipFill>
+        <p:spPr/>
+      </p:pic>
+      <p:sp>
+        <p:nvSpPr>
+          <p:cNvPr id="3" name="Text Placeholder 2"/>
+          <p:cNvSpPr>
+            <a:spLocks noGrp="1"/>
+          </p:cNvSpPr>
+          <p:nvPr>
+            <p:ph type="body" idx="12" sz="quarter"/>
+          </p:nvPr>
+        </p:nvSpPr>
+        <p:spPr/>
+        <p:txBody>
+          <a:bodyPr/>
+          <a:lstStyle/>
+          <a:p>
+            <a:r>
+              <a:t>Thank You</a:t>
+            </a:r>
+          </a:p>
+        </p:txBody>
+      </p:sp>
+      <p:pic>
+        <p:nvPicPr>
+          <p:cNvPr id="4" name="Picture Placeholder 3" descr="consulting_company_logo.png"/>
+          <p:cNvPicPr>
+            <a:picLocks noGrp="1" noChangeAspect="1"/>
+          </p:cNvPicPr>
+          <p:nvPr>
+            <p:ph type="pic" idx="13" sz="quarter"/>
+          </p:nvPr>
+        </p:nvPicPr>
+        <p:blipFill>
+          <a:blip r:embed="rId3"/>
+          <a:srcRect t="7166" b="7166"/>
+          <a:stretch>
+            <a:fillRect/>
+          </a:stretch>
+        </p:blipFill>
+        <p:spPr/>
+      </p:pic>
+      <p:sp>
+        <p:nvSpPr>
+          <p:cNvPr id="5" name="Text Placeholder 4"/>
+          <p:cNvSpPr>
+            <a:spLocks noGrp="1"/>
+          </p:cNvSpPr>
+          <p:nvPr>
+            <p:ph type="body" idx="14" sz="quarter"/>
+          </p:nvPr>
+        </p:nvSpPr>
+        <p:spPr/>
+        <p:txBody>
+          <a:bodyPr/>
+          <a:lstStyle/>
+          <a:p/>
+        </p:txBody>
+      </p:sp>
+      <p:sp>
+        <p:nvSpPr>
+          <p:cNvPr id="6" name="Text Placeholder 5"/>
+          <p:cNvSpPr>
+            <a:spLocks noGrp="1"/>
+          </p:cNvSpPr>
+          <p:nvPr>
+            <p:ph type="body" idx="15" sz="quarter"/>
+          </p:nvPr>
+        </p:nvSpPr>
+        <p:spPr/>
+        <p:txBody>
+          <a:bodyPr/>
+          <a:lstStyle/>
+          <a:p>
+            <a:pPr/>
+            <a:r>
+              <a:rPr b="1"/>
+              <a:t>Your Account Manager:</a:t>
+            </a:r>
+            <a:r>
+              <a:t> [Name, Title] | [Email] | [Phone]</a:t>
             </a:r>
           </a:p>
         </p:txBody>
@@ -5030,19 +5563,40 @@
         <p:nvPr/>
       </p:nvGrpSpPr>
       <p:grpSpPr/>
+      <p:sp>
+        <p:nvSpPr>
+          <p:cNvPr id="2" name="Text Placeholder 1"/>
+          <p:cNvSpPr>
+            <a:spLocks noGrp="1"/>
+          </p:cNvSpPr>
+          <p:nvPr>
+            <p:ph type="body" idx="10" sz="quarter"/>
+          </p:nvPr>
+        </p:nvSpPr>
+        <p:spPr/>
+        <p:txBody>
+          <a:bodyPr/>
+          <a:lstStyle/>
+          <a:p>
+            <a:r>
+              <a:t>Next Steps</a:t>
+            </a:r>
+          </a:p>
+        </p:txBody>
+      </p:sp>
       <p:pic>
         <p:nvPicPr>
-          <p:cNvPr id="2" name="Picture Placeholder 1" descr="client_logo.png"/>
+          <p:cNvPr id="3" name="Picture Placeholder 2" descr="consulting_company_logo.png"/>
           <p:cNvPicPr>
             <a:picLocks noGrp="1" noChangeAspect="1"/>
           </p:cNvPicPr>
           <p:nvPr>
-            <p:ph type="pic" idx="10" sz="quarter"/>
+            <p:ph type="pic" idx="13" sz="quarter"/>
           </p:nvPr>
         </p:nvPicPr>
         <p:blipFill>
           <a:blip r:embed="rId2"/>
-          <a:srcRect t="433" b="433"/>
+          <a:srcRect t="6762" b="6762"/>
           <a:stretch>
             <a:fillRect/>
           </a:stretch>
@@ -5051,12 +5605,12 @@
       </p:pic>
       <p:sp>
         <p:nvSpPr>
-          <p:cNvPr id="3" name="Text Placeholder 2"/>
+          <p:cNvPr id="4" name="Text Placeholder 3"/>
           <p:cNvSpPr>
             <a:spLocks noGrp="1"/>
           </p:cNvSpPr>
           <p:nvPr>
-            <p:ph type="body" idx="12" sz="quarter"/>
+            <p:ph type="body" idx="14" sz="quarter"/>
           </p:nvPr>
         </p:nvSpPr>
         <p:spPr/>
@@ -5064,129 +5618,59 @@
           <a:bodyPr/>
           <a:lstStyle/>
           <a:p>
-            <a:r>
-              <a:t>Thank You &amp; Next Steps</a:t>
+            <a:pPr/>
+            <a:r>
+              <a:t>Decision: [Specific decision needed by when]</a:t>
+            </a:r>
+          </a:p>
+          <a:p>
+            <a:pPr/>
+            <a:r>
+              <a:t>Kickoff: [Target start date]</a:t>
+            </a:r>
+          </a:p>
+          <a:p>
+            <a:pPr/>
+            <a:r>
+              <a:t>Team Formation: [Key team members required]</a:t>
+            </a:r>
+          </a:p>
+          <a:p>
+            <a:pPr/>
+            <a:r>
+              <a:t>Week 1: Contract finalization and legal review</a:t>
+            </a:r>
+          </a:p>
+          <a:p>
+            <a:pPr/>
+            <a:r>
+              <a:t>Week 2: Project initiation &amp; planning kickoff</a:t>
+            </a:r>
+          </a:p>
+          <a:p>
+            <a:pPr/>
+            <a:r>
+              <a:t>Week 3: Environment setup and access provisioning</a:t>
+            </a:r>
+          </a:p>
+          <a:p>
+            <a:pPr/>
+            <a:r>
+              <a:t>Week 4: Initial implementation begins</a:t>
             </a:r>
           </a:p>
         </p:txBody>
       </p:sp>
       <p:pic>
         <p:nvPicPr>
-          <p:cNvPr id="4" name="Picture Placeholder 3" descr="consulting_company_logo.png"/>
-          <p:cNvPicPr>
-            <a:picLocks noGrp="1" noChangeAspect="1"/>
-          </p:cNvPicPr>
-          <p:nvPr>
-            <p:ph type="pic" idx="13" sz="quarter"/>
-          </p:nvPr>
-        </p:nvPicPr>
-        <p:blipFill>
-          <a:blip r:embed="rId3"/>
-          <a:srcRect t="7166" b="7166"/>
-          <a:stretch>
-            <a:fillRect/>
-          </a:stretch>
-        </p:blipFill>
-        <p:spPr/>
-      </p:pic>
-      <p:sp>
-        <p:nvSpPr>
-          <p:cNvPr id="5" name="Text Placeholder 4"/>
-          <p:cNvSpPr>
-            <a:spLocks noGrp="1"/>
-          </p:cNvSpPr>
-          <p:nvPr>
-            <p:ph type="body" idx="14" sz="quarter"/>
-          </p:nvPr>
-        </p:nvSpPr>
-        <p:spPr/>
-        <p:txBody>
-          <a:bodyPr/>
-          <a:lstStyle/>
-          <a:p>
-            <a:pPr/>
-            <a:r>
-              <a:t>Decision: [Specific decision needed by when]</a:t>
-            </a:r>
-          </a:p>
-          <a:p>
-            <a:pPr/>
-            <a:r>
-              <a:t>Kickoff: [Target start date]</a:t>
-            </a:r>
-          </a:p>
-          <a:p>
-            <a:pPr/>
-            <a:r>
-              <a:t>Team Formation: [Key team members required]</a:t>
-            </a:r>
-          </a:p>
-          <a:p>
-            <a:pPr/>
-            <a:r>
-              <a:t>Week 1: Contract finalization</a:t>
-            </a:r>
-          </a:p>
-          <a:p>
-            <a:pPr/>
-            <a:r>
-              <a:t>Week 2: Project initiation &amp; planning</a:t>
-            </a:r>
-          </a:p>
-          <a:p>
-            <a:pPr/>
-            <a:r>
-              <a:t>Week 3: Environment setup</a:t>
-            </a:r>
-          </a:p>
-          <a:p>
-            <a:pPr/>
-            <a:r>
-              <a:t>Week 4: Initial implementation begins</a:t>
-            </a:r>
-          </a:p>
-          <a:p>
-            <a:pPr/>
-            <a:r>
-              <a:rPr b="1"/>
-              <a:t>Project Lead:</a:t>
-            </a:r>
-            <a:r>
-              <a:t> [Name, Title] | [Email] | [Phone]</a:t>
-            </a:r>
-          </a:p>
-          <a:p>
-            <a:pPr/>
-            <a:r>
-              <a:rPr b="1"/>
-              <a:t>Technical Lead:</a:t>
-            </a:r>
-            <a:r>
-              <a:t> [Name, Title] | [Email] | [Phone]</a:t>
-            </a:r>
-          </a:p>
-          <a:p>
-            <a:pPr/>
-            <a:r>
-              <a:rPr b="1"/>
-              <a:t>Account Manager:</a:t>
-            </a:r>
-            <a:r>
-              <a:t> [Name, Title] | [Email] | [Phone]</a:t>
-            </a:r>
-          </a:p>
-        </p:txBody>
-      </p:sp>
-      <p:pic>
-        <p:nvPicPr>
-          <p:cNvPr id="6" name="Picture 5" descr="eo-framework-logo-real.png"/>
+          <p:cNvPr id="5" name="Picture 4" descr="eo-framework-logo-real.png"/>
           <p:cNvPicPr>
             <a:picLocks noChangeAspect="1"/>
           </p:cNvPicPr>
           <p:nvPr/>
         </p:nvPicPr>
         <p:blipFill>
-          <a:blip r:embed="rId4"/>
+          <a:blip r:embed="rId3"/>
           <a:stretch>
             <a:fillRect/>
           </a:stretch>

</xml_diff>

<commit_message>
Standardize all solutions on credit-based cost format
- Rewrote compute-costs.py to support credit-based format only
- Converted solution-template to 9-column credit format with generic content
- Fixed Azure document-intelligence architecture diagram embedding
- Updated document-intelligence LOE with correct IDP tasks
- Updated COST_CREDITS_GUIDANCE.md to reflect credit-based as standard
- Fixed logo paths in solution-template PowerPoint
- Regenerated all Word, PowerPoint, and Excel outputs
</commit_message>
<xml_diff>
--- a/solution-template/sample-provider/sample-category/sample-solution/presales/solution-briefing.pptx
+++ b/solution-template/sample-provider/sample-category/sample-solution/presales/solution-briefing.pptx
@@ -3264,18 +3264,25 @@
         <p:nvPr/>
       </p:nvGrpSpPr>
       <p:grpSpPr/>
-      <p:sp>
-        <p:nvSpPr>
-          <p:cNvPr id="2" name="Picture Placeholder 1"/>
-          <p:cNvSpPr>
-            <a:spLocks noGrp="1"/>
-          </p:cNvSpPr>
+      <p:pic>
+        <p:nvPicPr>
+          <p:cNvPr id="2" name="Picture Placeholder 1" descr="client_logo.png"/>
+          <p:cNvPicPr>
+            <a:picLocks noGrp="1" noChangeAspect="1"/>
+          </p:cNvPicPr>
           <p:nvPr>
             <p:ph type="pic" idx="10" sz="quarter"/>
           </p:nvPr>
-        </p:nvSpPr>
+        </p:nvPicPr>
+        <p:blipFill>
+          <a:blip r:embed="rId2"/>
+          <a:srcRect t="433" b="433"/>
+          <a:stretch>
+            <a:fillRect/>
+          </a:stretch>
+        </p:blipFill>
         <p:spPr/>
-      </p:sp>
+      </p:pic>
       <p:sp>
         <p:nvSpPr>
           <p:cNvPr id="3" name="Text Placeholder 2"/>
@@ -3297,18 +3304,25 @@
           </a:p>
         </p:txBody>
       </p:sp>
-      <p:sp>
-        <p:nvSpPr>
-          <p:cNvPr id="4" name="Picture Placeholder 3"/>
-          <p:cNvSpPr>
-            <a:spLocks noGrp="1"/>
-          </p:cNvSpPr>
+      <p:pic>
+        <p:nvPicPr>
+          <p:cNvPr id="4" name="Picture Placeholder 3" descr="consulting_company_logo.png"/>
+          <p:cNvPicPr>
+            <a:picLocks noGrp="1" noChangeAspect="1"/>
+          </p:cNvPicPr>
           <p:nvPr>
             <p:ph type="pic" idx="13" sz="quarter"/>
           </p:nvPr>
-        </p:nvSpPr>
+        </p:nvPicPr>
+        <p:blipFill>
+          <a:blip r:embed="rId3"/>
+          <a:srcRect t="5856" b="5856"/>
+          <a:stretch>
+            <a:fillRect/>
+          </a:stretch>
+        </p:blipFill>
         <p:spPr/>
-      </p:sp>
+      </p:pic>
       <p:sp>
         <p:nvSpPr>
           <p:cNvPr id="5" name="Text Placeholder 4"/>
@@ -3351,6 +3365,30 @@
           </a:p>
         </p:txBody>
       </p:sp>
+      <p:pic>
+        <p:nvPicPr>
+          <p:cNvPr id="7" name="Picture 6" descr="eo-framework-logo-real.png"/>
+          <p:cNvPicPr>
+            <a:picLocks noChangeAspect="1"/>
+          </p:cNvPicPr>
+          <p:nvPr/>
+        </p:nvPicPr>
+        <p:blipFill>
+          <a:blip r:embed="rId4"/>
+          <a:stretch>
+            <a:fillRect/>
+          </a:stretch>
+        </p:blipFill>
+        <p:spPr>
+          <a:xfrm>
+            <a:off x="6684264" y="4535424"/>
+            <a:ext cx="2139696" cy="530352"/>
+          </a:xfrm>
+          <a:prstGeom prst="rect">
+            <a:avLst/>
+          </a:prstGeom>
+        </p:spPr>
+      </p:pic>
     </p:spTree>
   </p:cSld>
   <p:clrMapOvr>
@@ -3369,18 +3407,25 @@
         <p:nvPr/>
       </p:nvGrpSpPr>
       <p:grpSpPr/>
-      <p:sp>
-        <p:nvSpPr>
-          <p:cNvPr id="2" name="Picture Placeholder 1"/>
-          <p:cNvSpPr>
-            <a:spLocks noGrp="1"/>
-          </p:cNvSpPr>
+      <p:pic>
+        <p:nvPicPr>
+          <p:cNvPr id="2" name="Picture Placeholder 1" descr="client_logo.png"/>
+          <p:cNvPicPr>
+            <a:picLocks noGrp="1" noChangeAspect="1"/>
+          </p:cNvPicPr>
           <p:nvPr>
             <p:ph type="pic" idx="10" sz="quarter"/>
           </p:nvPr>
-        </p:nvSpPr>
+        </p:nvPicPr>
+        <p:blipFill>
+          <a:blip r:embed="rId2"/>
+          <a:srcRect t="433" b="433"/>
+          <a:stretch>
+            <a:fillRect/>
+          </a:stretch>
+        </p:blipFill>
         <p:spPr/>
-      </p:sp>
+      </p:pic>
       <p:sp>
         <p:nvSpPr>
           <p:cNvPr id="3" name="Text Placeholder 2"/>
@@ -3402,18 +3447,25 @@
           </a:p>
         </p:txBody>
       </p:sp>
-      <p:sp>
-        <p:nvSpPr>
-          <p:cNvPr id="4" name="Picture Placeholder 3"/>
-          <p:cNvSpPr>
-            <a:spLocks noGrp="1"/>
-          </p:cNvSpPr>
+      <p:pic>
+        <p:nvPicPr>
+          <p:cNvPr id="4" name="Picture Placeholder 3" descr="consulting_company_logo.png"/>
+          <p:cNvPicPr>
+            <a:picLocks noGrp="1" noChangeAspect="1"/>
+          </p:cNvPicPr>
           <p:nvPr>
             <p:ph type="pic" idx="13" sz="quarter"/>
           </p:nvPr>
-        </p:nvSpPr>
+        </p:nvPicPr>
+        <p:blipFill>
+          <a:blip r:embed="rId3"/>
+          <a:srcRect t="7166" b="7166"/>
+          <a:stretch>
+            <a:fillRect/>
+          </a:stretch>
+        </p:blipFill>
         <p:spPr/>
-      </p:sp>
+      </p:pic>
       <p:sp>
         <p:nvSpPr>
           <p:cNvPr id="5" name="Text Placeholder 4"/>
@@ -3457,6 +3509,30 @@
           </a:p>
         </p:txBody>
       </p:sp>
+      <p:pic>
+        <p:nvPicPr>
+          <p:cNvPr id="7" name="Picture 6" descr="eo-framework-logo-real.png"/>
+          <p:cNvPicPr>
+            <a:picLocks noChangeAspect="1"/>
+          </p:cNvPicPr>
+          <p:nvPr/>
+        </p:nvPicPr>
+        <p:blipFill>
+          <a:blip r:embed="rId4"/>
+          <a:stretch>
+            <a:fillRect/>
+          </a:stretch>
+        </p:blipFill>
+        <p:spPr>
+          <a:xfrm>
+            <a:off x="6684264" y="4535424"/>
+            <a:ext cx="2139696" cy="530352"/>
+          </a:xfrm>
+          <a:prstGeom prst="rect">
+            <a:avLst/>
+          </a:prstGeom>
+        </p:spPr>
+      </p:pic>
     </p:spTree>
   </p:cSld>
   <p:clrMapOvr>
@@ -3496,18 +3572,25 @@
           </a:p>
         </p:txBody>
       </p:sp>
-      <p:sp>
-        <p:nvSpPr>
-          <p:cNvPr id="3" name="Picture Placeholder 2"/>
-          <p:cNvSpPr>
-            <a:spLocks noGrp="1"/>
-          </p:cNvSpPr>
+      <p:pic>
+        <p:nvPicPr>
+          <p:cNvPr id="3" name="Picture Placeholder 2" descr="consulting_company_logo.png"/>
+          <p:cNvPicPr>
+            <a:picLocks noGrp="1" noChangeAspect="1"/>
+          </p:cNvPicPr>
           <p:nvPr>
             <p:ph type="pic" idx="13" sz="quarter"/>
           </p:nvPr>
-        </p:nvSpPr>
+        </p:nvPicPr>
+        <p:blipFill>
+          <a:blip r:embed="rId2"/>
+          <a:srcRect t="6762" b="6762"/>
+          <a:stretch>
+            <a:fillRect/>
+          </a:stretch>
+        </p:blipFill>
         <p:spPr/>
-      </p:sp>
+      </p:pic>
       <p:sp>
         <p:nvSpPr>
           <p:cNvPr id="4" name="Text Placeholder 3"/>
@@ -3574,6 +3657,30 @@
           </a:p>
         </p:txBody>
       </p:sp>
+      <p:pic>
+        <p:nvPicPr>
+          <p:cNvPr id="5" name="Picture 4" descr="eo-framework-logo-real.png"/>
+          <p:cNvPicPr>
+            <a:picLocks noChangeAspect="1"/>
+          </p:cNvPicPr>
+          <p:nvPr/>
+        </p:nvPicPr>
+        <p:blipFill>
+          <a:blip r:embed="rId3"/>
+          <a:stretch>
+            <a:fillRect/>
+          </a:stretch>
+        </p:blipFill>
+        <p:spPr>
+          <a:xfrm>
+            <a:off x="6684264" y="4535424"/>
+            <a:ext cx="2139696" cy="530352"/>
+          </a:xfrm>
+          <a:prstGeom prst="rect">
+            <a:avLst/>
+          </a:prstGeom>
+        </p:spPr>
+      </p:pic>
     </p:spTree>
   </p:cSld>
   <p:clrMapOvr>
@@ -3613,18 +3720,25 @@
           </a:p>
         </p:txBody>
       </p:sp>
-      <p:sp>
-        <p:nvSpPr>
-          <p:cNvPr id="3" name="Picture Placeholder 2"/>
-          <p:cNvSpPr>
-            <a:spLocks noGrp="1"/>
-          </p:cNvSpPr>
+      <p:pic>
+        <p:nvPicPr>
+          <p:cNvPr id="3" name="Picture Placeholder 2" descr="consulting_company_logo.png"/>
+          <p:cNvPicPr>
+            <a:picLocks noGrp="1" noChangeAspect="1"/>
+          </p:cNvPicPr>
           <p:nvPr>
             <p:ph type="pic" idx="14" sz="quarter"/>
           </p:nvPr>
-        </p:nvSpPr>
+        </p:nvPicPr>
+        <p:blipFill>
+          <a:blip r:embed="rId2"/>
+          <a:srcRect t="6494" b="6494"/>
+          <a:stretch>
+            <a:fillRect/>
+          </a:stretch>
+        </p:blipFill>
         <p:spPr/>
-      </p:sp>
+      </p:pic>
       <p:sp>
         <p:nvSpPr>
           <p:cNvPr id="4" name="Picture Placeholder 3"/>
@@ -3730,7 +3844,7 @@
           <p:nvPr/>
         </p:nvPicPr>
         <p:blipFill>
-          <a:blip r:embed="rId2"/>
+          <a:blip r:embed="rId4"/>
           <a:stretch>
             <a:fillRect/>
           </a:stretch>
@@ -3784,18 +3898,25 @@
           </a:p>
         </p:txBody>
       </p:sp>
-      <p:sp>
-        <p:nvSpPr>
-          <p:cNvPr id="3" name="Picture Placeholder 2"/>
-          <p:cNvSpPr>
-            <a:spLocks noGrp="1"/>
-          </p:cNvSpPr>
+      <p:pic>
+        <p:nvPicPr>
+          <p:cNvPr id="3" name="Picture Placeholder 2" descr="consulting_company_logo.png"/>
+          <p:cNvPicPr>
+            <a:picLocks noGrp="1" noChangeAspect="1"/>
+          </p:cNvPicPr>
           <p:nvPr>
             <p:ph type="pic" idx="13" sz="quarter"/>
           </p:nvPr>
-        </p:nvSpPr>
+        </p:nvPicPr>
+        <p:blipFill>
+          <a:blip r:embed="rId2"/>
+          <a:srcRect t="6762" b="6762"/>
+          <a:stretch>
+            <a:fillRect/>
+          </a:stretch>
+        </p:blipFill>
         <p:spPr/>
-      </p:sp>
+      </p:pic>
       <p:sp>
         <p:nvSpPr>
           <p:cNvPr id="4" name="Text Placeholder 3"/>
@@ -3896,6 +4017,30 @@
           </a:p>
         </p:txBody>
       </p:sp>
+      <p:pic>
+        <p:nvPicPr>
+          <p:cNvPr id="5" name="Picture 4" descr="eo-framework-logo-real.png"/>
+          <p:cNvPicPr>
+            <a:picLocks noChangeAspect="1"/>
+          </p:cNvPicPr>
+          <p:nvPr/>
+        </p:nvPicPr>
+        <p:blipFill>
+          <a:blip r:embed="rId3"/>
+          <a:stretch>
+            <a:fillRect/>
+          </a:stretch>
+        </p:blipFill>
+        <p:spPr>
+          <a:xfrm>
+            <a:off x="6684264" y="4535424"/>
+            <a:ext cx="2139696" cy="530352"/>
+          </a:xfrm>
+          <a:prstGeom prst="rect">
+            <a:avLst/>
+          </a:prstGeom>
+        </p:spPr>
+      </p:pic>
     </p:spTree>
   </p:cSld>
   <p:clrMapOvr>
@@ -3937,18 +4082,25 @@
           </a:p>
         </p:txBody>
       </p:sp>
-      <p:sp>
-        <p:nvSpPr>
-          <p:cNvPr id="3" name="Picture Placeholder 2"/>
-          <p:cNvSpPr>
-            <a:spLocks noGrp="1"/>
-          </p:cNvSpPr>
+      <p:pic>
+        <p:nvPicPr>
+          <p:cNvPr id="3" name="Picture Placeholder 2" descr="consulting_company_logo.png"/>
+          <p:cNvPicPr>
+            <a:picLocks noGrp="1" noChangeAspect="1"/>
+          </p:cNvPicPr>
           <p:nvPr>
             <p:ph type="pic" idx="13" sz="quarter"/>
           </p:nvPr>
-        </p:nvSpPr>
+        </p:nvPicPr>
+        <p:blipFill>
+          <a:blip r:embed="rId2"/>
+          <a:srcRect t="6404" b="6404"/>
+          <a:stretch>
+            <a:fillRect/>
+          </a:stretch>
+        </p:blipFill>
         <p:spPr/>
-      </p:sp>
+      </p:pic>
       <p:graphicFrame>
         <p:nvGraphicFramePr>
           <p:cNvPr id="4" name="Table Placeholder 3"/>
@@ -4275,6 +4427,30 @@
           </a:graphicData>
         </a:graphic>
       </p:graphicFrame>
+      <p:pic>
+        <p:nvPicPr>
+          <p:cNvPr id="5" name="Picture 4" descr="eo-framework-logo-real.png"/>
+          <p:cNvPicPr>
+            <a:picLocks noChangeAspect="1"/>
+          </p:cNvPicPr>
+          <p:nvPr/>
+        </p:nvPicPr>
+        <p:blipFill>
+          <a:blip r:embed="rId3"/>
+          <a:stretch>
+            <a:fillRect/>
+          </a:stretch>
+        </p:blipFill>
+        <p:spPr>
+          <a:xfrm>
+            <a:off x="6684264" y="4535424"/>
+            <a:ext cx="2139696" cy="530352"/>
+          </a:xfrm>
+          <a:prstGeom prst="rect">
+            <a:avLst/>
+          </a:prstGeom>
+        </p:spPr>
+      </p:pic>
     </p:spTree>
   </p:cSld>
   <p:clrMapOvr>
@@ -4314,18 +4490,25 @@
           </a:p>
         </p:txBody>
       </p:sp>
-      <p:sp>
-        <p:nvSpPr>
-          <p:cNvPr id="3" name="Picture Placeholder 2"/>
-          <p:cNvSpPr>
-            <a:spLocks noGrp="1"/>
-          </p:cNvSpPr>
+      <p:pic>
+        <p:nvPicPr>
+          <p:cNvPr id="3" name="Picture Placeholder 2" descr="consulting_company_logo.png"/>
+          <p:cNvPicPr>
+            <a:picLocks noGrp="1" noChangeAspect="1"/>
+          </p:cNvPicPr>
           <p:nvPr>
             <p:ph type="pic" idx="13" sz="quarter"/>
           </p:nvPr>
-        </p:nvSpPr>
+        </p:nvPicPr>
+        <p:blipFill>
+          <a:blip r:embed="rId2"/>
+          <a:srcRect t="6762" b="6762"/>
+          <a:stretch>
+            <a:fillRect/>
+          </a:stretch>
+        </p:blipFill>
         <p:spPr/>
-      </p:sp>
+      </p:pic>
       <p:sp>
         <p:nvSpPr>
           <p:cNvPr id="4" name="Text Placeholder 3"/>
@@ -4406,6 +4589,30 @@
           </a:p>
         </p:txBody>
       </p:sp>
+      <p:pic>
+        <p:nvPicPr>
+          <p:cNvPr id="5" name="Picture 4" descr="eo-framework-logo-real.png"/>
+          <p:cNvPicPr>
+            <a:picLocks noChangeAspect="1"/>
+          </p:cNvPicPr>
+          <p:nvPr/>
+        </p:nvPicPr>
+        <p:blipFill>
+          <a:blip r:embed="rId3"/>
+          <a:stretch>
+            <a:fillRect/>
+          </a:stretch>
+        </p:blipFill>
+        <p:spPr>
+          <a:xfrm>
+            <a:off x="6684264" y="4535424"/>
+            <a:ext cx="2139696" cy="530352"/>
+          </a:xfrm>
+          <a:prstGeom prst="rect">
+            <a:avLst/>
+          </a:prstGeom>
+        </p:spPr>
+      </p:pic>
     </p:spTree>
   </p:cSld>
   <p:clrMapOvr>
@@ -4445,18 +4652,25 @@
           </a:p>
         </p:txBody>
       </p:sp>
-      <p:sp>
-        <p:nvSpPr>
-          <p:cNvPr id="3" name="Picture Placeholder 2"/>
-          <p:cNvSpPr>
-            <a:spLocks noGrp="1"/>
-          </p:cNvSpPr>
+      <p:pic>
+        <p:nvPicPr>
+          <p:cNvPr id="3" name="Picture Placeholder 2" descr="consulting_company_logo.png"/>
+          <p:cNvPicPr>
+            <a:picLocks noGrp="1" noChangeAspect="1"/>
+          </p:cNvPicPr>
           <p:nvPr>
             <p:ph type="pic" idx="14" sz="quarter"/>
           </p:nvPr>
-        </p:nvSpPr>
+        </p:nvPicPr>
+        <p:blipFill>
+          <a:blip r:embed="rId2"/>
+          <a:srcRect t="6314" b="6314"/>
+          <a:stretch>
+            <a:fillRect/>
+          </a:stretch>
+        </p:blipFill>
         <p:spPr/>
-      </p:sp>
+      </p:pic>
       <p:sp>
         <p:nvSpPr>
           <p:cNvPr id="4" name="Text Placeholder 3"/>
@@ -4563,6 +4777,30 @@
           </a:p>
         </p:txBody>
       </p:sp>
+      <p:pic>
+        <p:nvPicPr>
+          <p:cNvPr id="6" name="Picture 5" descr="eo-framework-logo-real.png"/>
+          <p:cNvPicPr>
+            <a:picLocks noChangeAspect="1"/>
+          </p:cNvPicPr>
+          <p:nvPr/>
+        </p:nvPicPr>
+        <p:blipFill>
+          <a:blip r:embed="rId3"/>
+          <a:stretch>
+            <a:fillRect/>
+          </a:stretch>
+        </p:blipFill>
+        <p:spPr>
+          <a:xfrm>
+            <a:off x="6684264" y="4535424"/>
+            <a:ext cx="2139696" cy="530352"/>
+          </a:xfrm>
+          <a:prstGeom prst="rect">
+            <a:avLst/>
+          </a:prstGeom>
+        </p:spPr>
+      </p:pic>
     </p:spTree>
   </p:cSld>
   <p:clrMapOvr>
@@ -4604,18 +4842,25 @@
           </a:p>
         </p:txBody>
       </p:sp>
-      <p:sp>
-        <p:nvSpPr>
-          <p:cNvPr id="3" name="Picture Placeholder 2"/>
-          <p:cNvSpPr>
-            <a:spLocks noGrp="1"/>
-          </p:cNvSpPr>
+      <p:pic>
+        <p:nvPicPr>
+          <p:cNvPr id="3" name="Picture Placeholder 2" descr="consulting_company_logo.png"/>
+          <p:cNvPicPr>
+            <a:picLocks noGrp="1" noChangeAspect="1"/>
+          </p:cNvPicPr>
           <p:nvPr>
             <p:ph type="pic" idx="13" sz="quarter"/>
           </p:nvPr>
-        </p:nvSpPr>
+        </p:nvPicPr>
+        <p:blipFill>
+          <a:blip r:embed="rId2"/>
+          <a:srcRect t="6404" b="6404"/>
+          <a:stretch>
+            <a:fillRect/>
+          </a:stretch>
+        </p:blipFill>
         <p:spPr/>
-      </p:sp>
+      </p:pic>
       <p:graphicFrame>
         <p:nvGraphicFramePr>
           <p:cNvPr id="4" name="Table Placeholder 3"/>
@@ -4628,7 +4873,7 @@
         </p:nvGraphicFramePr>
         <p:xfrm>
           <a:off x="256855" y="677011"/>
-          <a:ext cx="8710929" cy="2225040"/>
+          <a:ext cx="8719641" cy="2225040"/>
         </p:xfrm>
         <a:graphic>
           <a:graphicData uri="http://schemas.openxmlformats.org/drawingml/2006/table">
@@ -4637,11 +4882,13 @@
                 <a:tableStyleId>{5C22544A-7EE6-4342-B048-85BDC9FD1C3A}</a:tableStyleId>
               </a:tblPr>
               <a:tblGrid>
-                <a:gridCol w="2177733"/>
-                <a:gridCol w="1306639"/>
-                <a:gridCol w="1045311"/>
                 <a:gridCol w="1567967"/>
-                <a:gridCol w="2613279"/>
+                <a:gridCol w="1132421"/>
+                <a:gridCol w="1742186"/>
+                <a:gridCol w="1132421"/>
+                <a:gridCol w="993046"/>
+                <a:gridCol w="993046"/>
+                <a:gridCol w="1158554"/>
               </a:tblGrid>
               <a:tr h="370840">
                 <a:tc>
@@ -4676,7 +4923,49 @@
                             <a:srgbClr val="FFFFFF"/>
                           </a:solidFill>
                         </a:rPr>
-                        <a:t>Year 1</a:t>
+                        <a:t>Year 1 List</a:t>
+                      </a:r>
+                    </a:p>
+                  </a:txBody>
+                  <a:tcPr>
+                    <a:solidFill>
+                      <a:srgbClr val="A01C02"/>
+                    </a:solidFill>
+                  </a:tcPr>
+                </a:tc>
+                <a:tc>
+                  <a:txBody>
+                    <a:bodyPr/>
+                    <a:lstStyle/>
+                    <a:p>
+                      <a:r>
+                        <a:rPr b="1" sz="1400">
+                          <a:solidFill>
+                            <a:srgbClr val="FFFFFF"/>
+                          </a:solidFill>
+                        </a:rPr>
+                        <a:t>Provider/Partner Credits</a:t>
+                      </a:r>
+                    </a:p>
+                  </a:txBody>
+                  <a:tcPr>
+                    <a:solidFill>
+                      <a:srgbClr val="A01C02"/>
+                    </a:solidFill>
+                  </a:tcPr>
+                </a:tc>
+                <a:tc>
+                  <a:txBody>
+                    <a:bodyPr/>
+                    <a:lstStyle/>
+                    <a:p>
+                      <a:r>
+                        <a:rPr b="1" sz="1400">
+                          <a:solidFill>
+                            <a:srgbClr val="FFFFFF"/>
+                          </a:solidFill>
+                        </a:rPr>
+                        <a:t>Year 1 Net</a:t>
                       </a:r>
                     </a:p>
                   </a:txBody>
@@ -4758,6 +5047,127 @@
                     <a:p>
                       <a:r>
                         <a:rPr sz="1100"/>
+                        <a:t>Cloud Infrastructure</a:t>
+                      </a:r>
+                    </a:p>
+                  </a:txBody>
+                  <a:tcPr>
+                    <a:solidFill>
+                      <a:srgbClr val="E7E6E6"/>
+                    </a:solidFill>
+                  </a:tcPr>
+                </a:tc>
+                <a:tc>
+                  <a:txBody>
+                    <a:bodyPr/>
+                    <a:lstStyle/>
+                    <a:p>
+                      <a:r>
+                        <a:rPr sz="1100"/>
+                        <a:t>$12,225</a:t>
+                      </a:r>
+                    </a:p>
+                  </a:txBody>
+                  <a:tcPr>
+                    <a:solidFill>
+                      <a:srgbClr val="E7E6E6"/>
+                    </a:solidFill>
+                  </a:tcPr>
+                </a:tc>
+                <a:tc>
+                  <a:txBody>
+                    <a:bodyPr/>
+                    <a:lstStyle/>
+                    <a:p>
+                      <a:r>
+                        <a:rPr sz="1100"/>
+                        <a:t>($990)</a:t>
+                      </a:r>
+                    </a:p>
+                  </a:txBody>
+                  <a:tcPr>
+                    <a:solidFill>
+                      <a:srgbClr val="E7E6E6"/>
+                    </a:solidFill>
+                  </a:tcPr>
+                </a:tc>
+                <a:tc>
+                  <a:txBody>
+                    <a:bodyPr/>
+                    <a:lstStyle/>
+                    <a:p>
+                      <a:r>
+                        <a:rPr sz="1100"/>
+                        <a:t>$11,235</a:t>
+                      </a:r>
+                    </a:p>
+                  </a:txBody>
+                  <a:tcPr>
+                    <a:solidFill>
+                      <a:srgbClr val="E7E6E6"/>
+                    </a:solidFill>
+                  </a:tcPr>
+                </a:tc>
+                <a:tc>
+                  <a:txBody>
+                    <a:bodyPr/>
+                    <a:lstStyle/>
+                    <a:p>
+                      <a:r>
+                        <a:rPr sz="1100"/>
+                        <a:t>$12,225</a:t>
+                      </a:r>
+                    </a:p>
+                  </a:txBody>
+                  <a:tcPr>
+                    <a:solidFill>
+                      <a:srgbClr val="E7E6E6"/>
+                    </a:solidFill>
+                  </a:tcPr>
+                </a:tc>
+                <a:tc>
+                  <a:txBody>
+                    <a:bodyPr/>
+                    <a:lstStyle/>
+                    <a:p>
+                      <a:r>
+                        <a:rPr sz="1100"/>
+                        <a:t>$12,225</a:t>
+                      </a:r>
+                    </a:p>
+                  </a:txBody>
+                  <a:tcPr>
+                    <a:solidFill>
+                      <a:srgbClr val="E7E6E6"/>
+                    </a:solidFill>
+                  </a:tcPr>
+                </a:tc>
+                <a:tc>
+                  <a:txBody>
+                    <a:bodyPr/>
+                    <a:lstStyle/>
+                    <a:p>
+                      <a:r>
+                        <a:rPr sz="1100"/>
+                        <a:t>$35,685</a:t>
+                      </a:r>
+                    </a:p>
+                  </a:txBody>
+                  <a:tcPr>
+                    <a:solidFill>
+                      <a:srgbClr val="E7E6E6"/>
+                    </a:solidFill>
+                  </a:tcPr>
+                </a:tc>
+              </a:tr>
+              <a:tr h="370840">
+                <a:tc>
+                  <a:txBody>
+                    <a:bodyPr/>
+                    <a:lstStyle/>
+                    <a:p>
+                      <a:r>
+                        <a:rPr sz="1100"/>
                         <a:t>Professional Services</a:t>
                       </a:r>
                     </a:p>
@@ -4775,7 +5185,41 @@
                     <a:p>
                       <a:r>
                         <a:rPr sz="1100"/>
-                        <a:t>$364,000</a:t>
+                        <a:t>$64,300</a:t>
+                      </a:r>
+                    </a:p>
+                  </a:txBody>
+                  <a:tcPr>
+                    <a:solidFill>
+                      <a:srgbClr val="E7E6E6"/>
+                    </a:solidFill>
+                  </a:tcPr>
+                </a:tc>
+                <a:tc>
+                  <a:txBody>
+                    <a:bodyPr/>
+                    <a:lstStyle/>
+                    <a:p>
+                      <a:r>
+                        <a:rPr sz="1100"/>
+                        <a:t>($5,000)</a:t>
+                      </a:r>
+                    </a:p>
+                  </a:txBody>
+                  <a:tcPr>
+                    <a:solidFill>
+                      <a:srgbClr val="E7E6E6"/>
+                    </a:solidFill>
+                  </a:tcPr>
+                </a:tc>
+                <a:tc>
+                  <a:txBody>
+                    <a:bodyPr/>
+                    <a:lstStyle/>
+                    <a:p>
+                      <a:r>
+                        <a:rPr sz="1100"/>
+                        <a:t>$59,300</a:t>
                       </a:r>
                     </a:p>
                   </a:txBody>
@@ -4826,94 +5270,7 @@
                     <a:p>
                       <a:r>
                         <a:rPr sz="1100"/>
-                        <a:t>$364,000</a:t>
-                      </a:r>
-                    </a:p>
-                  </a:txBody>
-                  <a:tcPr>
-                    <a:solidFill>
-                      <a:srgbClr val="E7E6E6"/>
-                    </a:solidFill>
-                  </a:tcPr>
-                </a:tc>
-              </a:tr>
-              <a:tr h="370840">
-                <a:tc>
-                  <a:txBody>
-                    <a:bodyPr/>
-                    <a:lstStyle/>
-                    <a:p>
-                      <a:r>
-                        <a:rPr sz="1100"/>
-                        <a:t>Cloud Infrastructure</a:t>
-                      </a:r>
-                    </a:p>
-                  </a:txBody>
-                  <a:tcPr>
-                    <a:solidFill>
-                      <a:srgbClr val="E7E6E6"/>
-                    </a:solidFill>
-                  </a:tcPr>
-                </a:tc>
-                <a:tc>
-                  <a:txBody>
-                    <a:bodyPr/>
-                    <a:lstStyle/>
-                    <a:p>
-                      <a:r>
-                        <a:rPr sz="1100"/>
-                        <a:t>$8,914</a:t>
-                      </a:r>
-                    </a:p>
-                  </a:txBody>
-                  <a:tcPr>
-                    <a:solidFill>
-                      <a:srgbClr val="E7E6E6"/>
-                    </a:solidFill>
-                  </a:tcPr>
-                </a:tc>
-                <a:tc>
-                  <a:txBody>
-                    <a:bodyPr/>
-                    <a:lstStyle/>
-                    <a:p>
-                      <a:r>
-                        <a:rPr sz="1100"/>
-                        <a:t>$8,914</a:t>
-                      </a:r>
-                    </a:p>
-                  </a:txBody>
-                  <a:tcPr>
-                    <a:solidFill>
-                      <a:srgbClr val="E7E6E6"/>
-                    </a:solidFill>
-                  </a:tcPr>
-                </a:tc>
-                <a:tc>
-                  <a:txBody>
-                    <a:bodyPr/>
-                    <a:lstStyle/>
-                    <a:p>
-                      <a:r>
-                        <a:rPr sz="1100"/>
-                        <a:t>$8,914</a:t>
-                      </a:r>
-                    </a:p>
-                  </a:txBody>
-                  <a:tcPr>
-                    <a:solidFill>
-                      <a:srgbClr val="E7E6E6"/>
-                    </a:solidFill>
-                  </a:tcPr>
-                </a:tc>
-                <a:tc>
-                  <a:txBody>
-                    <a:bodyPr/>
-                    <a:lstStyle/>
-                    <a:p>
-                      <a:r>
-                        <a:rPr sz="1100"/>
-                        <a:t>$26,741</a:t>
+                        <a:t>$59,300</a:t>
                       </a:r>
                     </a:p>
                   </a:txBody>
@@ -4933,6 +5290,40 @@
                       <a:r>
                         <a:rPr sz="1100"/>
                         <a:t>Software Licenses &amp; Subscriptions</a:t>
+                      </a:r>
+                    </a:p>
+                  </a:txBody>
+                  <a:tcPr>
+                    <a:solidFill>
+                      <a:srgbClr val="E7E6E6"/>
+                    </a:solidFill>
+                  </a:tcPr>
+                </a:tc>
+                <a:tc>
+                  <a:txBody>
+                    <a:bodyPr/>
+                    <a:lstStyle/>
+                    <a:p>
+                      <a:r>
+                        <a:rPr sz="1100"/>
+                        <a:t>$7,650</a:t>
+                      </a:r>
+                    </a:p>
+                  </a:txBody>
+                  <a:tcPr>
+                    <a:solidFill>
+                      <a:srgbClr val="E7E6E6"/>
+                    </a:solidFill>
+                  </a:tcPr>
+                </a:tc>
+                <a:tc>
+                  <a:txBody>
+                    <a:bodyPr/>
+                    <a:lstStyle/>
+                    <a:p>
+                      <a:r>
+                        <a:rPr sz="1100"/>
+                        <a:t>$0</a:t>
                       </a:r>
                     </a:p>
                   </a:txBody>
@@ -5097,6 +5488,40 @@
                     </a:solidFill>
                   </a:tcPr>
                 </a:tc>
+                <a:tc>
+                  <a:txBody>
+                    <a:bodyPr/>
+                    <a:lstStyle/>
+                    <a:p>
+                      <a:r>
+                        <a:rPr sz="1100"/>
+                        <a:t>$0</a:t>
+                      </a:r>
+                    </a:p>
+                  </a:txBody>
+                  <a:tcPr>
+                    <a:solidFill>
+                      <a:srgbClr val="E7E6E6"/>
+                    </a:solidFill>
+                  </a:tcPr>
+                </a:tc>
+                <a:tc>
+                  <a:txBody>
+                    <a:bodyPr/>
+                    <a:lstStyle/>
+                    <a:p>
+                      <a:r>
+                        <a:rPr sz="1100"/>
+                        <a:t>$0</a:t>
+                      </a:r>
+                    </a:p>
+                  </a:txBody>
+                  <a:tcPr>
+                    <a:solidFill>
+                      <a:srgbClr val="E7E6E6"/>
+                    </a:solidFill>
+                  </a:tcPr>
+                </a:tc>
               </a:tr>
               <a:tr h="370840">
                 <a:tc>
@@ -5123,7 +5548,7 @@
                     <a:p>
                       <a:r>
                         <a:rPr b="1" sz="1100"/>
-                        <a:t>$380,564</a:t>
+                        <a:t>$84,175</a:t>
                       </a:r>
                     </a:p>
                   </a:txBody>
@@ -5140,7 +5565,7 @@
                     <a:p>
                       <a:r>
                         <a:rPr b="1" sz="1100"/>
-                        <a:t>$16,564</a:t>
+                        <a:t>($5,990)</a:t>
                       </a:r>
                     </a:p>
                   </a:txBody>
@@ -5157,7 +5582,7 @@
                     <a:p>
                       <a:r>
                         <a:rPr b="1" sz="1100"/>
-                        <a:t>$16,564</a:t>
+                        <a:t>$78,185</a:t>
                       </a:r>
                     </a:p>
                   </a:txBody>
@@ -5174,7 +5599,41 @@
                     <a:p>
                       <a:r>
                         <a:rPr b="1" sz="1100"/>
-                        <a:t>$413,691</a:t>
+                        <a:t>$19,875</a:t>
+                      </a:r>
+                    </a:p>
+                  </a:txBody>
+                  <a:tcPr>
+                    <a:solidFill>
+                      <a:srgbClr val="E7E6E6"/>
+                    </a:solidFill>
+                  </a:tcPr>
+                </a:tc>
+                <a:tc>
+                  <a:txBody>
+                    <a:bodyPr/>
+                    <a:lstStyle/>
+                    <a:p>
+                      <a:r>
+                        <a:rPr b="1" sz="1100"/>
+                        <a:t>$19,875</a:t>
+                      </a:r>
+                    </a:p>
+                  </a:txBody>
+                  <a:tcPr>
+                    <a:solidFill>
+                      <a:srgbClr val="E7E6E6"/>
+                    </a:solidFill>
+                  </a:tcPr>
+                </a:tc>
+                <a:tc>
+                  <a:txBody>
+                    <a:bodyPr/>
+                    <a:lstStyle/>
+                    <a:p>
+                      <a:r>
+                        <a:rPr b="1" sz="1100"/>
+                        <a:t>$117,935</a:t>
                       </a:r>
                     </a:p>
                   </a:txBody>
@@ -5189,6 +5648,30 @@
           </a:graphicData>
         </a:graphic>
       </p:graphicFrame>
+      <p:pic>
+        <p:nvPicPr>
+          <p:cNvPr id="5" name="Picture 4" descr="eo-framework-logo-real.png"/>
+          <p:cNvPicPr>
+            <a:picLocks noChangeAspect="1"/>
+          </p:cNvPicPr>
+          <p:nvPr/>
+        </p:nvPicPr>
+        <p:blipFill>
+          <a:blip r:embed="rId3"/>
+          <a:stretch>
+            <a:fillRect/>
+          </a:stretch>
+        </p:blipFill>
+        <p:spPr>
+          <a:xfrm>
+            <a:off x="6684264" y="4535424"/>
+            <a:ext cx="2139696" cy="530352"/>
+          </a:xfrm>
+          <a:prstGeom prst="rect">
+            <a:avLst/>
+          </a:prstGeom>
+        </p:spPr>
+      </p:pic>
     </p:spTree>
   </p:cSld>
   <p:clrMapOvr>
@@ -5228,18 +5711,25 @@
           </a:p>
         </p:txBody>
       </p:sp>
-      <p:sp>
-        <p:nvSpPr>
-          <p:cNvPr id="3" name="Picture Placeholder 2"/>
-          <p:cNvSpPr>
-            <a:spLocks noGrp="1"/>
-          </p:cNvSpPr>
+      <p:pic>
+        <p:nvPicPr>
+          <p:cNvPr id="3" name="Picture Placeholder 2" descr="consulting_company_logo.png"/>
+          <p:cNvPicPr>
+            <a:picLocks noGrp="1" noChangeAspect="1"/>
+          </p:cNvPicPr>
           <p:nvPr>
             <p:ph type="pic" idx="13" sz="quarter"/>
           </p:nvPr>
-        </p:nvSpPr>
+        </p:nvPicPr>
+        <p:blipFill>
+          <a:blip r:embed="rId2"/>
+          <a:srcRect t="6762" b="6762"/>
+          <a:stretch>
+            <a:fillRect/>
+          </a:stretch>
+        </p:blipFill>
         <p:spPr/>
-      </p:sp>
+      </p:pic>
       <p:sp>
         <p:nvSpPr>
           <p:cNvPr id="4" name="Text Placeholder 3"/>
@@ -5298,6 +5788,30 @@
           </a:p>
         </p:txBody>
       </p:sp>
+      <p:pic>
+        <p:nvPicPr>
+          <p:cNvPr id="5" name="Picture 4" descr="eo-framework-logo-real.png"/>
+          <p:cNvPicPr>
+            <a:picLocks noChangeAspect="1"/>
+          </p:cNvPicPr>
+          <p:nvPr/>
+        </p:nvPicPr>
+        <p:blipFill>
+          <a:blip r:embed="rId3"/>
+          <a:stretch>
+            <a:fillRect/>
+          </a:stretch>
+        </p:blipFill>
+        <p:spPr>
+          <a:xfrm>
+            <a:off x="6684264" y="4535424"/>
+            <a:ext cx="2139696" cy="530352"/>
+          </a:xfrm>
+          <a:prstGeom prst="rect">
+            <a:avLst/>
+          </a:prstGeom>
+        </p:spPr>
+      </p:pic>
     </p:spTree>
   </p:cSld>
   <p:clrMapOvr>

</xml_diff>

<commit_message>
Add explicit layout specifications to all solutions
Update all Azure and AWS solution-briefing.md files with explicit
**layout:** specifications for strict mode compliance. This aligns
with the new requirement that all slides must specify their layout
instead of relying on keyword-based inference.

Changes:
- Updated 6 Azure solution briefings with layout specifications
- Updated 3 AWS solution briefings with layout specifications
- Updated solution-template with explicit layouts
- Regenerated affected PowerPoint and Excel files

Layout assignments follow pattern:
- two_column: Business Opportunity, Partnership Advantage
- visual: Solution Overview, Architecture diagrams
- table: Timeline & Milestones
- data_viz: Investment Summary, Financial information
- bullet_points: Next Steps
- thank_you: Thank You slide
- single: All other content slides
</commit_message>
<xml_diff>
--- a/solution-template/sample-provider/sample-category/sample-solution/presales/solution-briefing.pptx
+++ b/solution-template/sample-provider/sample-category/sample-solution/presales/solution-briefing.pptx
@@ -3579,12 +3579,12 @@
             <a:picLocks noGrp="1" noChangeAspect="1"/>
           </p:cNvPicPr>
           <p:nvPr>
-            <p:ph type="pic" idx="13" sz="quarter"/>
+            <p:ph type="pic" idx="14" sz="quarter"/>
           </p:nvPr>
         </p:nvPicPr>
         <p:blipFill>
           <a:blip r:embed="rId2"/>
-          <a:srcRect t="6762" b="6762"/>
+          <a:srcRect t="6314" b="6314"/>
           <a:stretch>
             <a:fillRect/>
           </a:stretch>
@@ -3598,7 +3598,7 @@
             <a:spLocks noGrp="1"/>
           </p:cNvSpPr>
           <p:nvPr>
-            <p:ph type="body" idx="14" sz="quarter"/>
+            <p:ph type="body" idx="16" sz="quarter"/>
           </p:nvPr>
         </p:nvSpPr>
         <p:spPr/>
@@ -3630,6 +3630,22 @@
               <a:t>Enable scalability and innovation while reducing operational costs by 30-40%</a:t>
             </a:r>
           </a:p>
+        </p:txBody>
+      </p:sp>
+      <p:sp>
+        <p:nvSpPr>
+          <p:cNvPr id="5" name="Text Placeholder 4"/>
+          <p:cNvSpPr>
+            <a:spLocks noGrp="1"/>
+          </p:cNvSpPr>
+          <p:nvPr>
+            <p:ph type="body" idx="17" sz="quarter"/>
+          </p:nvPr>
+        </p:nvSpPr>
+        <p:spPr/>
+        <p:txBody>
+          <a:bodyPr/>
+          <a:lstStyle/>
           <a:p>
             <a:pPr/>
             <a:r>
@@ -3659,7 +3675,7 @@
       </p:sp>
       <p:pic>
         <p:nvPicPr>
-          <p:cNvPr id="5" name="Picture 4" descr="eo-framework-logo-real.png"/>
+          <p:cNvPr id="6" name="Picture 5" descr="eo-framework-logo-real.png"/>
           <p:cNvPicPr>
             <a:picLocks noChangeAspect="1"/>
           </p:cNvPicPr>

</xml_diff>

<commit_message>
Fix solution briefing validation and clean up presales folders
- Add layout specs to AWS solution briefings (intelligent-document-processing, disaster-recovery, onpremise-migration)
- Fix virtual-wan-global image path from assets/images to assets/diagrams
- Clean up virtual-desktop presales folder (remove duplicate files, move diagrams to assets)
- Clean up virtual-wan-global presales folder (remove duplicate files, move diagrams to assets)
- Update virtual-wan-global Timeline table to match template structure (4 columns)
- Add Presentation Notes section header for documentation content
- Fix YAML frontmatter logo paths to use eof-tools/doc-tools/brands/default paths
- Consolidate Implementation Approach phases from 4 to 3 bullet points
- Consolidate Solution Overview components from 4-5 to 3 bullet points each
- Regenerate all affected PPTX files with strict validation
</commit_message>
<xml_diff>
--- a/solution-template/sample-provider/sample-category/sample-solution/presales/solution-briefing.pptx
+++ b/solution-template/sample-provider/sample-category/sample-solution/presales/solution-briefing.pptx
@@ -4150,7 +4150,7 @@
                     <a:lstStyle/>
                     <a:p>
                       <a:r>
-                        <a:rPr b="1" sz="1400">
+                        <a:rPr sz="1400">
                           <a:solidFill>
                             <a:srgbClr val="FFFFFF"/>
                           </a:solidFill>
@@ -4171,7 +4171,7 @@
                     <a:lstStyle/>
                     <a:p>
                       <a:r>
-                        <a:rPr b="1" sz="1400">
+                        <a:rPr sz="1400">
                           <a:solidFill>
                             <a:srgbClr val="FFFFFF"/>
                           </a:solidFill>
@@ -4192,7 +4192,7 @@
                     <a:lstStyle/>
                     <a:p>
                       <a:r>
-                        <a:rPr b="1" sz="1400">
+                        <a:rPr sz="1400">
                           <a:solidFill>
                             <a:srgbClr val="FFFFFF"/>
                           </a:solidFill>
@@ -4213,7 +4213,7 @@
                     <a:lstStyle/>
                     <a:p>
                       <a:r>
-                        <a:rPr b="1" sz="1400">
+                        <a:rPr sz="1400">
                           <a:solidFill>
                             <a:srgbClr val="FFFFFF"/>
                           </a:solidFill>
@@ -4376,7 +4376,7 @@
                     <a:lstStyle/>
                     <a:p>
                       <a:r>
-                        <a:rPr b="1" sz="1100"/>
+                        <a:rPr sz="1100"/>
                         <a:t>Phase 3</a:t>
                       </a:r>
                     </a:p>
@@ -4393,7 +4393,7 @@
                     <a:lstStyle/>
                     <a:p>
                       <a:r>
-                        <a:rPr b="1" sz="1100"/>
+                        <a:rPr sz="1100"/>
                         <a:t>Deployment &amp; Optimization</a:t>
                       </a:r>
                     </a:p>
@@ -4410,7 +4410,7 @@
                     <a:lstStyle/>
                     <a:p>
                       <a:r>
-                        <a:rPr b="1" sz="1100"/>
+                        <a:rPr sz="1100"/>
                         <a:t>Months 5-6</a:t>
                       </a:r>
                     </a:p>
@@ -4427,7 +4427,7 @@
                     <a:lstStyle/>
                     <a:p>
                       <a:r>
-                        <a:rPr b="1" sz="1100"/>
+                        <a:rPr sz="1100"/>
                         <a:t>UAT completed, Production deployment successful, Monitoring and optimization active</a:t>
                       </a:r>
                     </a:p>
@@ -4913,7 +4913,7 @@
                     <a:lstStyle/>
                     <a:p>
                       <a:r>
-                        <a:rPr b="1" sz="1400">
+                        <a:rPr sz="1400">
                           <a:solidFill>
                             <a:srgbClr val="FFFFFF"/>
                           </a:solidFill>
@@ -4934,7 +4934,7 @@
                     <a:lstStyle/>
                     <a:p>
                       <a:r>
-                        <a:rPr b="1" sz="1400">
+                        <a:rPr sz="1400">
                           <a:solidFill>
                             <a:srgbClr val="FFFFFF"/>
                           </a:solidFill>
@@ -4955,7 +4955,7 @@
                     <a:lstStyle/>
                     <a:p>
                       <a:r>
-                        <a:rPr b="1" sz="1400">
+                        <a:rPr sz="1400">
                           <a:solidFill>
                             <a:srgbClr val="FFFFFF"/>
                           </a:solidFill>
@@ -4976,7 +4976,7 @@
                     <a:lstStyle/>
                     <a:p>
                       <a:r>
-                        <a:rPr b="1" sz="1400">
+                        <a:rPr sz="1400">
                           <a:solidFill>
                             <a:srgbClr val="FFFFFF"/>
                           </a:solidFill>
@@ -4997,7 +4997,7 @@
                     <a:lstStyle/>
                     <a:p>
                       <a:r>
-                        <a:rPr b="1" sz="1400">
+                        <a:rPr sz="1400">
                           <a:solidFill>
                             <a:srgbClr val="FFFFFF"/>
                           </a:solidFill>
@@ -5018,7 +5018,7 @@
                     <a:lstStyle/>
                     <a:p>
                       <a:r>
-                        <a:rPr b="1" sz="1400">
+                        <a:rPr sz="1400">
                           <a:solidFill>
                             <a:srgbClr val="FFFFFF"/>
                           </a:solidFill>
@@ -5039,7 +5039,7 @@
                     <a:lstStyle/>
                     <a:p>
                       <a:r>
-                        <a:rPr b="1" sz="1400">
+                        <a:rPr sz="1400">
                           <a:solidFill>
                             <a:srgbClr val="FFFFFF"/>
                           </a:solidFill>
@@ -5763,43 +5763,71 @@
           <a:p>
             <a:pPr/>
             <a:r>
-              <a:t>Decision: [Specific decision needed by when]</a:t>
+              <a:rPr b="1"/>
+              <a:t>Decision:</a:t>
+            </a:r>
+            <a:r>
+              <a:t> [Specific decision needed by when]</a:t>
             </a:r>
           </a:p>
           <a:p>
             <a:pPr/>
             <a:r>
-              <a:t>Kickoff: [Target start date]</a:t>
+              <a:rPr b="1"/>
+              <a:t>Kickoff:</a:t>
+            </a:r>
+            <a:r>
+              <a:t> [Target start date]</a:t>
             </a:r>
           </a:p>
           <a:p>
             <a:pPr/>
             <a:r>
-              <a:t>Team Formation: [Key team members required]</a:t>
+              <a:rPr b="1"/>
+              <a:t>Team Formation:</a:t>
+            </a:r>
+            <a:r>
+              <a:t> [Key team members required]</a:t>
             </a:r>
           </a:p>
           <a:p>
             <a:pPr/>
             <a:r>
-              <a:t>Week 1: Contract finalization and legal review</a:t>
+              <a:rPr b="1"/>
+              <a:t>Week 1:</a:t>
+            </a:r>
+            <a:r>
+              <a:t> Contract finalization and legal review</a:t>
             </a:r>
           </a:p>
           <a:p>
             <a:pPr/>
             <a:r>
-              <a:t>Week 2: Project initiation &amp; planning kickoff</a:t>
+              <a:rPr b="1"/>
+              <a:t>Week 2:</a:t>
+            </a:r>
+            <a:r>
+              <a:t> Project initiation &amp; planning kickoff</a:t>
             </a:r>
           </a:p>
           <a:p>
             <a:pPr/>
             <a:r>
-              <a:t>Week 3: Environment setup and access provisioning</a:t>
+              <a:rPr b="1"/>
+              <a:t>Week 3:</a:t>
+            </a:r>
+            <a:r>
+              <a:t> Environment setup and access provisioning</a:t>
             </a:r>
           </a:p>
           <a:p>
             <a:pPr/>
             <a:r>
-              <a:t>Week 4: Initial implementation begins</a:t>
+              <a:rPr b="1"/>
+              <a:t>Week 4:</a:t>
+            </a:r>
+            <a:r>
+              <a:t> Initial implementation begins</a:t>
             </a:r>
           </a:p>
         </p:txBody>

</xml_diff>

<commit_message>
Add TABLE_CONFIG column width specifications to solution briefings
- Add TABLE_CONFIG widths to solution-template Timeline & Milestones table
- Add TABLE_CONFIG widths to solution-template Investment Summary table
- Update virtual-wan-global with TABLE_CONFIG for Timeline and Cost tables
- New widths: Provider/Partner Credits 21%, Year 1 List 10%, Year 2/3 11% each
</commit_message>
<xml_diff>
--- a/solution-template/sample-provider/sample-category/sample-solution/presales/solution-briefing.pptx
+++ b/solution-template/sample-provider/sample-category/sample-solution/presales/solution-briefing.pptx
@@ -4129,7 +4129,7 @@
         </p:nvGraphicFramePr>
         <p:xfrm>
           <a:off x="256855" y="677011"/>
-          <a:ext cx="8710930" cy="1483360"/>
+          <a:ext cx="8710931" cy="1483360"/>
         </p:xfrm>
         <a:graphic>
           <a:graphicData uri="http://schemas.openxmlformats.org/drawingml/2006/table">
@@ -4138,10 +4138,10 @@
                 <a:tableStyleId>{5C22544A-7EE6-4342-B048-85BDC9FD1C3A}</a:tableStyleId>
               </a:tblPr>
               <a:tblGrid>
-                <a:gridCol w="1045311"/>
+                <a:gridCol w="871093"/>
                 <a:gridCol w="2177733"/>
-                <a:gridCol w="1045311"/>
-                <a:gridCol w="4442575"/>
+                <a:gridCol w="1306639"/>
+                <a:gridCol w="4355466"/>
               </a:tblGrid>
               <a:tr h="370840">
                 <a:tc>
@@ -4889,7 +4889,7 @@
         </p:nvGraphicFramePr>
         <p:xfrm>
           <a:off x="256855" y="677011"/>
-          <a:ext cx="8719641" cy="2225040"/>
+          <a:ext cx="8710929" cy="2225040"/>
         </p:xfrm>
         <a:graphic>
           <a:graphicData uri="http://schemas.openxmlformats.org/drawingml/2006/table">
@@ -4898,13 +4898,13 @@
                 <a:tableStyleId>{5C22544A-7EE6-4342-B048-85BDC9FD1C3A}</a:tableStyleId>
               </a:tblPr>
               <a:tblGrid>
-                <a:gridCol w="1567967"/>
+                <a:gridCol w="1742186"/>
+                <a:gridCol w="871093"/>
+                <a:gridCol w="1829295"/>
+                <a:gridCol w="1219530"/>
+                <a:gridCol w="958202"/>
+                <a:gridCol w="958202"/>
                 <a:gridCol w="1132421"/>
-                <a:gridCol w="1742186"/>
-                <a:gridCol w="1132421"/>
-                <a:gridCol w="993046"/>
-                <a:gridCol w="993046"/>
-                <a:gridCol w="1158554"/>
               </a:tblGrid>
               <a:tr h="370840">
                 <a:tc>

</xml_diff>

<commit_message>
Adjust Investment Summary table column widths for better formatting
</commit_message>
<xml_diff>
--- a/solution-template/sample-provider/sample-category/sample-solution/presales/solution-briefing.pptx
+++ b/solution-template/sample-provider/sample-category/sample-solution/presales/solution-briefing.pptx
@@ -4899,12 +4899,12 @@
               </a:tblPr>
               <a:tblGrid>
                 <a:gridCol w="1742186"/>
+                <a:gridCol w="1045311"/>
+                <a:gridCol w="2003514"/>
+                <a:gridCol w="1132421"/>
                 <a:gridCol w="871093"/>
-                <a:gridCol w="1829295"/>
-                <a:gridCol w="1219530"/>
-                <a:gridCol w="958202"/>
-                <a:gridCol w="958202"/>
-                <a:gridCol w="1132421"/>
+                <a:gridCol w="871093"/>
+                <a:gridCol w="1045311"/>
               </a:tblGrid>
               <a:tr h="370840">
                 <a:tc>

</xml_diff>

<commit_message>
Add Engagement Scope slide to solution-template
- Added new Engagement Scope slide with SCOPE_SIZING_TABLE markers
- Populated scope parameters from LOE CSV (15 parameters)
- Regenerated PPTX with 11-slide structure
- Table layout with Category, Parameter, Scope columns
</commit_message>
<xml_diff>
--- a/solution-template/sample-provider/sample-category/sample-solution/presales/solution-briefing.pptx
+++ b/solution-template/sample-provider/sample-category/sample-solution/presales/solution-briefing.pptx
@@ -18,6 +18,7 @@
     <p:sldId id="263" r:id="rId14"/>
     <p:sldId id="264" r:id="rId15"/>
     <p:sldId id="265" r:id="rId16"/>
+    <p:sldId id="266" r:id="rId17"/>
   </p:sldIdLst>
   <p:sldSz cx="9144000" cy="5143500" type="screen16x9"/>
   <p:notesSz cx="5143500" cy="9144000"/>
@@ -3360,7 +3361,7 @@
           <a:lstStyle/>
           <a:p>
             <a:r>
-              <a:t>Alison Smith | November 15, 2025</a:t>
+              <a:t>Alison Smith | November 16, 2025</a:t>
             </a:r>
           </a:p>
         </p:txBody>
@@ -3398,6 +3399,174 @@
 </file>
 
 <file path=ppt/slides/slide10.xml><?xml version="1.0" encoding="utf-8"?>
+<p:sld xmlns:a="http://schemas.openxmlformats.org/drawingml/2006/main" xmlns:p="http://schemas.openxmlformats.org/presentationml/2006/main" xmlns:r="http://schemas.openxmlformats.org/officeDocument/2006/relationships">
+  <p:cSld>
+    <p:spTree>
+      <p:nvGrpSpPr>
+        <p:cNvPr id="1" name=""/>
+        <p:cNvGrpSpPr/>
+        <p:nvPr/>
+      </p:nvGrpSpPr>
+      <p:grpSpPr/>
+      <p:sp>
+        <p:nvSpPr>
+          <p:cNvPr id="2" name="Text Placeholder 1"/>
+          <p:cNvSpPr>
+            <a:spLocks noGrp="1"/>
+          </p:cNvSpPr>
+          <p:nvPr>
+            <p:ph type="body" idx="10" sz="quarter"/>
+          </p:nvPr>
+        </p:nvSpPr>
+        <p:spPr/>
+        <p:txBody>
+          <a:bodyPr/>
+          <a:lstStyle/>
+          <a:p>
+            <a:r>
+              <a:t>Next Steps</a:t>
+            </a:r>
+          </a:p>
+        </p:txBody>
+      </p:sp>
+      <p:pic>
+        <p:nvPicPr>
+          <p:cNvPr id="3" name="Picture Placeholder 2" descr="consulting_company_logo.png"/>
+          <p:cNvPicPr>
+            <a:picLocks noGrp="1" noChangeAspect="1"/>
+          </p:cNvPicPr>
+          <p:nvPr>
+            <p:ph type="pic" idx="13" sz="quarter"/>
+          </p:nvPr>
+        </p:nvPicPr>
+        <p:blipFill>
+          <a:blip r:embed="rId2"/>
+          <a:srcRect t="6762" b="6762"/>
+          <a:stretch>
+            <a:fillRect/>
+          </a:stretch>
+        </p:blipFill>
+        <p:spPr/>
+      </p:pic>
+      <p:sp>
+        <p:nvSpPr>
+          <p:cNvPr id="4" name="Text Placeholder 3"/>
+          <p:cNvSpPr>
+            <a:spLocks noGrp="1"/>
+          </p:cNvSpPr>
+          <p:nvPr>
+            <p:ph type="body" idx="14" sz="quarter"/>
+          </p:nvPr>
+        </p:nvSpPr>
+        <p:spPr/>
+        <p:txBody>
+          <a:bodyPr/>
+          <a:lstStyle/>
+          <a:p>
+            <a:pPr/>
+            <a:r>
+              <a:rPr b="1"/>
+              <a:t>Decision:</a:t>
+            </a:r>
+            <a:r>
+              <a:t> [Specific decision needed by when]</a:t>
+            </a:r>
+          </a:p>
+          <a:p>
+            <a:pPr/>
+            <a:r>
+              <a:rPr b="1"/>
+              <a:t>Kickoff:</a:t>
+            </a:r>
+            <a:r>
+              <a:t> [Target start date]</a:t>
+            </a:r>
+          </a:p>
+          <a:p>
+            <a:pPr/>
+            <a:r>
+              <a:rPr b="1"/>
+              <a:t>Team Formation:</a:t>
+            </a:r>
+            <a:r>
+              <a:t> [Key team members required]</a:t>
+            </a:r>
+          </a:p>
+          <a:p>
+            <a:pPr/>
+            <a:r>
+              <a:rPr b="1"/>
+              <a:t>Week 1:</a:t>
+            </a:r>
+            <a:r>
+              <a:t> Contract finalization and legal review</a:t>
+            </a:r>
+          </a:p>
+          <a:p>
+            <a:pPr/>
+            <a:r>
+              <a:rPr b="1"/>
+              <a:t>Week 2:</a:t>
+            </a:r>
+            <a:r>
+              <a:t> Project initiation &amp; planning kickoff</a:t>
+            </a:r>
+          </a:p>
+          <a:p>
+            <a:pPr/>
+            <a:r>
+              <a:rPr b="1"/>
+              <a:t>Week 3:</a:t>
+            </a:r>
+            <a:r>
+              <a:t> Environment setup and access provisioning</a:t>
+            </a:r>
+          </a:p>
+          <a:p>
+            <a:pPr/>
+            <a:r>
+              <a:rPr b="1"/>
+              <a:t>Week 4:</a:t>
+            </a:r>
+            <a:r>
+              <a:t> Initial implementation begins</a:t>
+            </a:r>
+          </a:p>
+        </p:txBody>
+      </p:sp>
+      <p:pic>
+        <p:nvPicPr>
+          <p:cNvPr id="5" name="Picture 4" descr="eo-framework-logo-real.png"/>
+          <p:cNvPicPr>
+            <a:picLocks noChangeAspect="1"/>
+          </p:cNvPicPr>
+          <p:nvPr/>
+        </p:nvPicPr>
+        <p:blipFill>
+          <a:blip r:embed="rId3"/>
+          <a:stretch>
+            <a:fillRect/>
+          </a:stretch>
+        </p:blipFill>
+        <p:spPr>
+          <a:xfrm>
+            <a:off x="6684264" y="4535424"/>
+            <a:ext cx="2139696" cy="530352"/>
+          </a:xfrm>
+          <a:prstGeom prst="rect">
+            <a:avLst/>
+          </a:prstGeom>
+        </p:spPr>
+      </p:pic>
+    </p:spTree>
+  </p:cSld>
+  <p:clrMapOvr>
+    <a:masterClrMapping/>
+  </p:clrMapOvr>
+</p:sld>
+</file>
+
+<file path=ppt/slides/slide11.xml><?xml version="1.0" encoding="utf-8"?>
 <p:sld xmlns:a="http://schemas.openxmlformats.org/drawingml/2006/main" xmlns:p="http://schemas.openxmlformats.org/presentationml/2006/main" xmlns:r="http://schemas.openxmlformats.org/officeDocument/2006/relationships">
   <p:cSld>
     <p:spTree>
@@ -3730,6 +3899,979 @@
           <a:bodyPr/>
           <a:lstStyle/>
           <a:p>
+            <a:pPr algn="l"/>
+            <a:r>
+              <a:rPr b="1"/>
+              <a:t>Engagement Scope</a:t>
+            </a:r>
+          </a:p>
+        </p:txBody>
+      </p:sp>
+      <p:pic>
+        <p:nvPicPr>
+          <p:cNvPr id="3" name="Picture Placeholder 2" descr="consulting_company_logo.png"/>
+          <p:cNvPicPr>
+            <a:picLocks noGrp="1" noChangeAspect="1"/>
+          </p:cNvPicPr>
+          <p:nvPr>
+            <p:ph type="pic" idx="13" sz="quarter"/>
+          </p:nvPr>
+        </p:nvPicPr>
+        <p:blipFill>
+          <a:blip r:embed="rId2"/>
+          <a:srcRect t="6404" b="6404"/>
+          <a:stretch>
+            <a:fillRect/>
+          </a:stretch>
+        </p:blipFill>
+        <p:spPr/>
+      </p:pic>
+      <p:graphicFrame>
+        <p:nvGraphicFramePr>
+          <p:cNvPr id="4" name="Table Placeholder 3"/>
+          <p:cNvGraphicFramePr>
+            <a:graphicFrameLocks noGrp="1"/>
+          </p:cNvGraphicFramePr>
+          <p:nvPr>
+            <p:ph type="tbl" idx="14" sz="quarter"/>
+          </p:nvPr>
+        </p:nvGraphicFramePr>
+        <p:xfrm>
+          <a:off x="256855" y="677011"/>
+          <a:ext cx="8710931" cy="5933440"/>
+        </p:xfrm>
+        <a:graphic>
+          <a:graphicData uri="http://schemas.openxmlformats.org/drawingml/2006/table">
+            <a:tbl>
+              <a:tblPr firstRow="1" bandRow="1">
+                <a:tableStyleId>{5C22544A-7EE6-4342-B048-85BDC9FD1C3A}</a:tableStyleId>
+              </a:tblPr>
+              <a:tblGrid>
+                <a:gridCol w="2613279"/>
+                <a:gridCol w="3048826"/>
+                <a:gridCol w="3048826"/>
+              </a:tblGrid>
+              <a:tr h="370840">
+                <a:tc>
+                  <a:txBody>
+                    <a:bodyPr/>
+                    <a:lstStyle/>
+                    <a:p>
+                      <a:r>
+                        <a:rPr sz="1400">
+                          <a:solidFill>
+                            <a:srgbClr val="FFFFFF"/>
+                          </a:solidFill>
+                        </a:rPr>
+                        <a:t>Category</a:t>
+                      </a:r>
+                    </a:p>
+                  </a:txBody>
+                  <a:tcPr>
+                    <a:solidFill>
+                      <a:srgbClr val="A01C02"/>
+                    </a:solidFill>
+                  </a:tcPr>
+                </a:tc>
+                <a:tc>
+                  <a:txBody>
+                    <a:bodyPr/>
+                    <a:lstStyle/>
+                    <a:p>
+                      <a:r>
+                        <a:rPr sz="1400">
+                          <a:solidFill>
+                            <a:srgbClr val="FFFFFF"/>
+                          </a:solidFill>
+                        </a:rPr>
+                        <a:t>Parameter</a:t>
+                      </a:r>
+                    </a:p>
+                  </a:txBody>
+                  <a:tcPr>
+                    <a:solidFill>
+                      <a:srgbClr val="A01C02"/>
+                    </a:solidFill>
+                  </a:tcPr>
+                </a:tc>
+                <a:tc>
+                  <a:txBody>
+                    <a:bodyPr/>
+                    <a:lstStyle/>
+                    <a:p>
+                      <a:r>
+                        <a:rPr sz="1400">
+                          <a:solidFill>
+                            <a:srgbClr val="FFFFFF"/>
+                          </a:solidFill>
+                        </a:rPr>
+                        <a:t>Scope</a:t>
+                      </a:r>
+                    </a:p>
+                  </a:txBody>
+                  <a:tcPr>
+                    <a:solidFill>
+                      <a:srgbClr val="A01C02"/>
+                    </a:solidFill>
+                  </a:tcPr>
+                </a:tc>
+              </a:tr>
+              <a:tr h="370840">
+                <a:tc>
+                  <a:txBody>
+                    <a:bodyPr/>
+                    <a:lstStyle/>
+                    <a:p>
+                      <a:r>
+                        <a:rPr sz="1100"/>
+                        <a:t>Solution Scope</a:t>
+                      </a:r>
+                    </a:p>
+                  </a:txBody>
+                  <a:tcPr>
+                    <a:solidFill>
+                      <a:srgbClr val="E7E6E6"/>
+                    </a:solidFill>
+                  </a:tcPr>
+                </a:tc>
+                <a:tc>
+                  <a:txBody>
+                    <a:bodyPr/>
+                    <a:lstStyle/>
+                    <a:p>
+                      <a:r>
+                        <a:rPr sz="1100"/>
+                        <a:t>Primary Features/Capabilities</a:t>
+                      </a:r>
+                    </a:p>
+                  </a:txBody>
+                  <a:tcPr>
+                    <a:solidFill>
+                      <a:srgbClr val="E7E6E6"/>
+                    </a:solidFill>
+                  </a:tcPr>
+                </a:tc>
+                <a:tc>
+                  <a:txBody>
+                    <a:bodyPr/>
+                    <a:lstStyle/>
+                    <a:p>
+                      <a:r>
+                        <a:rPr sz="1100"/>
+                        <a:t>3-5 core features</a:t>
+                      </a:r>
+                    </a:p>
+                  </a:txBody>
+                  <a:tcPr>
+                    <a:solidFill>
+                      <a:srgbClr val="E7E6E6"/>
+                    </a:solidFill>
+                  </a:tcPr>
+                </a:tc>
+              </a:tr>
+              <a:tr h="370840">
+                <a:tc>
+                  <a:txBody>
+                    <a:bodyPr/>
+                    <a:lstStyle/>
+                    <a:p>
+                      <a:r>
+                        <a:rPr sz="1100"/>
+                        <a:t>Solution Scope</a:t>
+                      </a:r>
+                    </a:p>
+                  </a:txBody>
+                  <a:tcPr>
+                    <a:solidFill>
+                      <a:srgbClr val="E7E6E6"/>
+                    </a:solidFill>
+                  </a:tcPr>
+                </a:tc>
+                <a:tc>
+                  <a:txBody>
+                    <a:bodyPr/>
+                    <a:lstStyle/>
+                    <a:p>
+                      <a:r>
+                        <a:rPr sz="1100"/>
+                        <a:t>Customization Level</a:t>
+                      </a:r>
+                    </a:p>
+                  </a:txBody>
+                  <a:tcPr>
+                    <a:solidFill>
+                      <a:srgbClr val="E7E6E6"/>
+                    </a:solidFill>
+                  </a:tcPr>
+                </a:tc>
+                <a:tc>
+                  <a:txBody>
+                    <a:bodyPr/>
+                    <a:lstStyle/>
+                    <a:p>
+                      <a:r>
+                        <a:rPr sz="1100"/>
+                        <a:t>Minimal configuration</a:t>
+                      </a:r>
+                    </a:p>
+                  </a:txBody>
+                  <a:tcPr>
+                    <a:solidFill>
+                      <a:srgbClr val="E7E6E6"/>
+                    </a:solidFill>
+                  </a:tcPr>
+                </a:tc>
+              </a:tr>
+              <a:tr h="370840">
+                <a:tc>
+                  <a:txBody>
+                    <a:bodyPr/>
+                    <a:lstStyle/>
+                    <a:p>
+                      <a:r>
+                        <a:rPr sz="1100"/>
+                        <a:t>Integration</a:t>
+                      </a:r>
+                    </a:p>
+                  </a:txBody>
+                  <a:tcPr>
+                    <a:solidFill>
+                      <a:srgbClr val="E7E6E6"/>
+                    </a:solidFill>
+                  </a:tcPr>
+                </a:tc>
+                <a:tc>
+                  <a:txBody>
+                    <a:bodyPr/>
+                    <a:lstStyle/>
+                    <a:p>
+                      <a:r>
+                        <a:rPr sz="1100"/>
+                        <a:t>External System Integrations</a:t>
+                      </a:r>
+                    </a:p>
+                  </a:txBody>
+                  <a:tcPr>
+                    <a:solidFill>
+                      <a:srgbClr val="E7E6E6"/>
+                    </a:solidFill>
+                  </a:tcPr>
+                </a:tc>
+                <a:tc>
+                  <a:txBody>
+                    <a:bodyPr/>
+                    <a:lstStyle/>
+                    <a:p>
+                      <a:r>
+                        <a:rPr sz="1100"/>
+                        <a:t>2 REST APIs</a:t>
+                      </a:r>
+                    </a:p>
+                  </a:txBody>
+                  <a:tcPr>
+                    <a:solidFill>
+                      <a:srgbClr val="E7E6E6"/>
+                    </a:solidFill>
+                  </a:tcPr>
+                </a:tc>
+              </a:tr>
+              <a:tr h="370840">
+                <a:tc>
+                  <a:txBody>
+                    <a:bodyPr/>
+                    <a:lstStyle/>
+                    <a:p>
+                      <a:r>
+                        <a:rPr sz="1100"/>
+                        <a:t>Integration</a:t>
+                      </a:r>
+                    </a:p>
+                  </a:txBody>
+                  <a:tcPr>
+                    <a:solidFill>
+                      <a:srgbClr val="E7E6E6"/>
+                    </a:solidFill>
+                  </a:tcPr>
+                </a:tc>
+                <a:tc>
+                  <a:txBody>
+                    <a:bodyPr/>
+                    <a:lstStyle/>
+                    <a:p>
+                      <a:r>
+                        <a:rPr sz="1100"/>
+                        <a:t>Data Sources</a:t>
+                      </a:r>
+                    </a:p>
+                  </a:txBody>
+                  <a:tcPr>
+                    <a:solidFill>
+                      <a:srgbClr val="E7E6E6"/>
+                    </a:solidFill>
+                  </a:tcPr>
+                </a:tc>
+                <a:tc>
+                  <a:txBody>
+                    <a:bodyPr/>
+                    <a:lstStyle/>
+                    <a:p>
+                      <a:r>
+                        <a:rPr sz="1100"/>
+                        <a:t>2-3 data sources</a:t>
+                      </a:r>
+                    </a:p>
+                  </a:txBody>
+                  <a:tcPr>
+                    <a:solidFill>
+                      <a:srgbClr val="E7E6E6"/>
+                    </a:solidFill>
+                  </a:tcPr>
+                </a:tc>
+              </a:tr>
+              <a:tr h="370840">
+                <a:tc>
+                  <a:txBody>
+                    <a:bodyPr/>
+                    <a:lstStyle/>
+                    <a:p>
+                      <a:r>
+                        <a:rPr sz="1100"/>
+                        <a:t>User Base</a:t>
+                      </a:r>
+                    </a:p>
+                  </a:txBody>
+                  <a:tcPr>
+                    <a:solidFill>
+                      <a:srgbClr val="E7E6E6"/>
+                    </a:solidFill>
+                  </a:tcPr>
+                </a:tc>
+                <a:tc>
+                  <a:txBody>
+                    <a:bodyPr/>
+                    <a:lstStyle/>
+                    <a:p>
+                      <a:r>
+                        <a:rPr sz="1100"/>
+                        <a:t>Total Users</a:t>
+                      </a:r>
+                    </a:p>
+                  </a:txBody>
+                  <a:tcPr>
+                    <a:solidFill>
+                      <a:srgbClr val="E7E6E6"/>
+                    </a:solidFill>
+                  </a:tcPr>
+                </a:tc>
+                <a:tc>
+                  <a:txBody>
+                    <a:bodyPr/>
+                    <a:lstStyle/>
+                    <a:p>
+                      <a:r>
+                        <a:rPr sz="1100"/>
+                        <a:t>50 users</a:t>
+                      </a:r>
+                    </a:p>
+                  </a:txBody>
+                  <a:tcPr>
+                    <a:solidFill>
+                      <a:srgbClr val="E7E6E6"/>
+                    </a:solidFill>
+                  </a:tcPr>
+                </a:tc>
+              </a:tr>
+              <a:tr h="370840">
+                <a:tc>
+                  <a:txBody>
+                    <a:bodyPr/>
+                    <a:lstStyle/>
+                    <a:p>
+                      <a:r>
+                        <a:rPr sz="1100"/>
+                        <a:t>User Base</a:t>
+                      </a:r>
+                    </a:p>
+                  </a:txBody>
+                  <a:tcPr>
+                    <a:solidFill>
+                      <a:srgbClr val="E7E6E6"/>
+                    </a:solidFill>
+                  </a:tcPr>
+                </a:tc>
+                <a:tc>
+                  <a:txBody>
+                    <a:bodyPr/>
+                    <a:lstStyle/>
+                    <a:p>
+                      <a:r>
+                        <a:rPr sz="1100"/>
+                        <a:t>User Roles</a:t>
+                      </a:r>
+                    </a:p>
+                  </a:txBody>
+                  <a:tcPr>
+                    <a:solidFill>
+                      <a:srgbClr val="E7E6E6"/>
+                    </a:solidFill>
+                  </a:tcPr>
+                </a:tc>
+                <a:tc>
+                  <a:txBody>
+                    <a:bodyPr/>
+                    <a:lstStyle/>
+                    <a:p>
+                      <a:r>
+                        <a:rPr sz="1100"/>
+                        <a:t>2-3 standard roles</a:t>
+                      </a:r>
+                    </a:p>
+                  </a:txBody>
+                  <a:tcPr>
+                    <a:solidFill>
+                      <a:srgbClr val="E7E6E6"/>
+                    </a:solidFill>
+                  </a:tcPr>
+                </a:tc>
+              </a:tr>
+              <a:tr h="370840">
+                <a:tc>
+                  <a:txBody>
+                    <a:bodyPr/>
+                    <a:lstStyle/>
+                    <a:p>
+                      <a:r>
+                        <a:rPr sz="1100"/>
+                        <a:t>Data Volume</a:t>
+                      </a:r>
+                    </a:p>
+                  </a:txBody>
+                  <a:tcPr>
+                    <a:solidFill>
+                      <a:srgbClr val="E7E6E6"/>
+                    </a:solidFill>
+                  </a:tcPr>
+                </a:tc>
+                <a:tc>
+                  <a:txBody>
+                    <a:bodyPr/>
+                    <a:lstStyle/>
+                    <a:p>
+                      <a:r>
+                        <a:rPr sz="1100"/>
+                        <a:t>Data Processing Volume</a:t>
+                      </a:r>
+                    </a:p>
+                  </a:txBody>
+                  <a:tcPr>
+                    <a:solidFill>
+                      <a:srgbClr val="E7E6E6"/>
+                    </a:solidFill>
+                  </a:tcPr>
+                </a:tc>
+                <a:tc>
+                  <a:txBody>
+                    <a:bodyPr/>
+                    <a:lstStyle/>
+                    <a:p>
+                      <a:r>
+                        <a:rPr sz="1100"/>
+                        <a:t>Small scale standard volume</a:t>
+                      </a:r>
+                    </a:p>
+                  </a:txBody>
+                  <a:tcPr>
+                    <a:solidFill>
+                      <a:srgbClr val="E7E6E6"/>
+                    </a:solidFill>
+                  </a:tcPr>
+                </a:tc>
+              </a:tr>
+              <a:tr h="370840">
+                <a:tc>
+                  <a:txBody>
+                    <a:bodyPr/>
+                    <a:lstStyle/>
+                    <a:p>
+                      <a:r>
+                        <a:rPr sz="1100"/>
+                        <a:t>Data Volume</a:t>
+                      </a:r>
+                    </a:p>
+                  </a:txBody>
+                  <a:tcPr>
+                    <a:solidFill>
+                      <a:srgbClr val="E7E6E6"/>
+                    </a:solidFill>
+                  </a:tcPr>
+                </a:tc>
+                <a:tc>
+                  <a:txBody>
+                    <a:bodyPr/>
+                    <a:lstStyle/>
+                    <a:p>
+                      <a:r>
+                        <a:rPr sz="1100"/>
+                        <a:t>Data Storage Requirements</a:t>
+                      </a:r>
+                    </a:p>
+                  </a:txBody>
+                  <a:tcPr>
+                    <a:solidFill>
+                      <a:srgbClr val="E7E6E6"/>
+                    </a:solidFill>
+                  </a:tcPr>
+                </a:tc>
+                <a:tc>
+                  <a:txBody>
+                    <a:bodyPr/>
+                    <a:lstStyle/>
+                    <a:p>
+                      <a:r>
+                        <a:rPr sz="1100"/>
+                        <a:t>100 GB</a:t>
+                      </a:r>
+                    </a:p>
+                  </a:txBody>
+                  <a:tcPr>
+                    <a:solidFill>
+                      <a:srgbClr val="E7E6E6"/>
+                    </a:solidFill>
+                  </a:tcPr>
+                </a:tc>
+              </a:tr>
+              <a:tr h="370840">
+                <a:tc>
+                  <a:txBody>
+                    <a:bodyPr/>
+                    <a:lstStyle/>
+                    <a:p>
+                      <a:r>
+                        <a:rPr sz="1100"/>
+                        <a:t>Technical Environment</a:t>
+                      </a:r>
+                    </a:p>
+                  </a:txBody>
+                  <a:tcPr>
+                    <a:solidFill>
+                      <a:srgbClr val="E7E6E6"/>
+                    </a:solidFill>
+                  </a:tcPr>
+                </a:tc>
+                <a:tc>
+                  <a:txBody>
+                    <a:bodyPr/>
+                    <a:lstStyle/>
+                    <a:p>
+                      <a:r>
+                        <a:rPr sz="1100"/>
+                        <a:t>Deployment Regions</a:t>
+                      </a:r>
+                    </a:p>
+                  </a:txBody>
+                  <a:tcPr>
+                    <a:solidFill>
+                      <a:srgbClr val="E7E6E6"/>
+                    </a:solidFill>
+                  </a:tcPr>
+                </a:tc>
+                <a:tc>
+                  <a:txBody>
+                    <a:bodyPr/>
+                    <a:lstStyle/>
+                    <a:p>
+                      <a:r>
+                        <a:rPr sz="1100"/>
+                        <a:t>Single region</a:t>
+                      </a:r>
+                    </a:p>
+                  </a:txBody>
+                  <a:tcPr>
+                    <a:solidFill>
+                      <a:srgbClr val="E7E6E6"/>
+                    </a:solidFill>
+                  </a:tcPr>
+                </a:tc>
+              </a:tr>
+              <a:tr h="370840">
+                <a:tc>
+                  <a:txBody>
+                    <a:bodyPr/>
+                    <a:lstStyle/>
+                    <a:p>
+                      <a:r>
+                        <a:rPr sz="1100"/>
+                        <a:t>Technical Environment</a:t>
+                      </a:r>
+                    </a:p>
+                  </a:txBody>
+                  <a:tcPr>
+                    <a:solidFill>
+                      <a:srgbClr val="E7E6E6"/>
+                    </a:solidFill>
+                  </a:tcPr>
+                </a:tc>
+                <a:tc>
+                  <a:txBody>
+                    <a:bodyPr/>
+                    <a:lstStyle/>
+                    <a:p>
+                      <a:r>
+                        <a:rPr sz="1100"/>
+                        <a:t>Availability Requirements</a:t>
+                      </a:r>
+                    </a:p>
+                  </a:txBody>
+                  <a:tcPr>
+                    <a:solidFill>
+                      <a:srgbClr val="E7E6E6"/>
+                    </a:solidFill>
+                  </a:tcPr>
+                </a:tc>
+                <a:tc>
+                  <a:txBody>
+                    <a:bodyPr/>
+                    <a:lstStyle/>
+                    <a:p>
+                      <a:r>
+                        <a:rPr sz="1100"/>
+                        <a:t>Standard (99.5%)</a:t>
+                      </a:r>
+                    </a:p>
+                  </a:txBody>
+                  <a:tcPr>
+                    <a:solidFill>
+                      <a:srgbClr val="E7E6E6"/>
+                    </a:solidFill>
+                  </a:tcPr>
+                </a:tc>
+              </a:tr>
+              <a:tr h="370840">
+                <a:tc>
+                  <a:txBody>
+                    <a:bodyPr/>
+                    <a:lstStyle/>
+                    <a:p>
+                      <a:r>
+                        <a:rPr sz="1100"/>
+                        <a:t>Technical Environment</a:t>
+                      </a:r>
+                    </a:p>
+                  </a:txBody>
+                  <a:tcPr>
+                    <a:solidFill>
+                      <a:srgbClr val="E7E6E6"/>
+                    </a:solidFill>
+                  </a:tcPr>
+                </a:tc>
+                <a:tc>
+                  <a:txBody>
+                    <a:bodyPr/>
+                    <a:lstStyle/>
+                    <a:p>
+                      <a:r>
+                        <a:rPr sz="1100"/>
+                        <a:t>Infrastructure Complexity</a:t>
+                      </a:r>
+                    </a:p>
+                  </a:txBody>
+                  <a:tcPr>
+                    <a:solidFill>
+                      <a:srgbClr val="E7E6E6"/>
+                    </a:solidFill>
+                  </a:tcPr>
+                </a:tc>
+                <a:tc>
+                  <a:txBody>
+                    <a:bodyPr/>
+                    <a:lstStyle/>
+                    <a:p>
+                      <a:r>
+                        <a:rPr sz="1100"/>
+                        <a:t>Basic single-tier</a:t>
+                      </a:r>
+                    </a:p>
+                  </a:txBody>
+                  <a:tcPr>
+                    <a:solidFill>
+                      <a:srgbClr val="E7E6E6"/>
+                    </a:solidFill>
+                  </a:tcPr>
+                </a:tc>
+              </a:tr>
+              <a:tr h="370840">
+                <a:tc>
+                  <a:txBody>
+                    <a:bodyPr/>
+                    <a:lstStyle/>
+                    <a:p>
+                      <a:r>
+                        <a:rPr sz="1100"/>
+                        <a:t>Security &amp; Compliance</a:t>
+                      </a:r>
+                    </a:p>
+                  </a:txBody>
+                  <a:tcPr>
+                    <a:solidFill>
+                      <a:srgbClr val="E7E6E6"/>
+                    </a:solidFill>
+                  </a:tcPr>
+                </a:tc>
+                <a:tc>
+                  <a:txBody>
+                    <a:bodyPr/>
+                    <a:lstStyle/>
+                    <a:p>
+                      <a:r>
+                        <a:rPr sz="1100"/>
+                        <a:t>Security Requirements</a:t>
+                      </a:r>
+                    </a:p>
+                  </a:txBody>
+                  <a:tcPr>
+                    <a:solidFill>
+                      <a:srgbClr val="E7E6E6"/>
+                    </a:solidFill>
+                  </a:tcPr>
+                </a:tc>
+                <a:tc>
+                  <a:txBody>
+                    <a:bodyPr/>
+                    <a:lstStyle/>
+                    <a:p>
+                      <a:r>
+                        <a:rPr sz="1100"/>
+                        <a:t>Basic authentication and encryption</a:t>
+                      </a:r>
+                    </a:p>
+                  </a:txBody>
+                  <a:tcPr>
+                    <a:solidFill>
+                      <a:srgbClr val="E7E6E6"/>
+                    </a:solidFill>
+                  </a:tcPr>
+                </a:tc>
+              </a:tr>
+              <a:tr h="370840">
+                <a:tc>
+                  <a:txBody>
+                    <a:bodyPr/>
+                    <a:lstStyle/>
+                    <a:p>
+                      <a:r>
+                        <a:rPr sz="1100"/>
+                        <a:t>Security &amp; Compliance</a:t>
+                      </a:r>
+                    </a:p>
+                  </a:txBody>
+                  <a:tcPr>
+                    <a:solidFill>
+                      <a:srgbClr val="E7E6E6"/>
+                    </a:solidFill>
+                  </a:tcPr>
+                </a:tc>
+                <a:tc>
+                  <a:txBody>
+                    <a:bodyPr/>
+                    <a:lstStyle/>
+                    <a:p>
+                      <a:r>
+                        <a:rPr sz="1100"/>
+                        <a:t>Compliance Frameworks</a:t>
+                      </a:r>
+                    </a:p>
+                  </a:txBody>
+                  <a:tcPr>
+                    <a:solidFill>
+                      <a:srgbClr val="E7E6E6"/>
+                    </a:solidFill>
+                  </a:tcPr>
+                </a:tc>
+                <a:tc>
+                  <a:txBody>
+                    <a:bodyPr/>
+                    <a:lstStyle/>
+                    <a:p>
+                      <a:r>
+                        <a:rPr sz="1100"/>
+                        <a:t>1-2 basic standards</a:t>
+                      </a:r>
+                    </a:p>
+                  </a:txBody>
+                  <a:tcPr>
+                    <a:solidFill>
+                      <a:srgbClr val="E7E6E6"/>
+                    </a:solidFill>
+                  </a:tcPr>
+                </a:tc>
+              </a:tr>
+              <a:tr h="370840">
+                <a:tc>
+                  <a:txBody>
+                    <a:bodyPr/>
+                    <a:lstStyle/>
+                    <a:p>
+                      <a:r>
+                        <a:rPr sz="1100"/>
+                        <a:t>Performance</a:t>
+                      </a:r>
+                    </a:p>
+                  </a:txBody>
+                  <a:tcPr>
+                    <a:solidFill>
+                      <a:srgbClr val="E7E6E6"/>
+                    </a:solidFill>
+                  </a:tcPr>
+                </a:tc>
+                <a:tc>
+                  <a:txBody>
+                    <a:bodyPr/>
+                    <a:lstStyle/>
+                    <a:p>
+                      <a:r>
+                        <a:rPr sz="1100"/>
+                        <a:t>Performance Requirements</a:t>
+                      </a:r>
+                    </a:p>
+                  </a:txBody>
+                  <a:tcPr>
+                    <a:solidFill>
+                      <a:srgbClr val="E7E6E6"/>
+                    </a:solidFill>
+                  </a:tcPr>
+                </a:tc>
+                <a:tc>
+                  <a:txBody>
+                    <a:bodyPr/>
+                    <a:lstStyle/>
+                    <a:p>
+                      <a:r>
+                        <a:rPr sz="1100"/>
+                        <a:t>Standard performance</a:t>
+                      </a:r>
+                    </a:p>
+                  </a:txBody>
+                  <a:tcPr>
+                    <a:solidFill>
+                      <a:srgbClr val="E7E6E6"/>
+                    </a:solidFill>
+                  </a:tcPr>
+                </a:tc>
+              </a:tr>
+              <a:tr h="370840">
+                <a:tc>
+                  <a:txBody>
+                    <a:bodyPr/>
+                    <a:lstStyle/>
+                    <a:p>
+                      <a:r>
+                        <a:rPr sz="1100"/>
+                        <a:t>Environment</a:t>
+                      </a:r>
+                    </a:p>
+                  </a:txBody>
+                  <a:tcPr>
+                    <a:solidFill>
+                      <a:srgbClr val="E7E6E6"/>
+                    </a:solidFill>
+                  </a:tcPr>
+                </a:tc>
+                <a:tc>
+                  <a:txBody>
+                    <a:bodyPr/>
+                    <a:lstStyle/>
+                    <a:p>
+                      <a:r>
+                        <a:rPr sz="1100"/>
+                        <a:t>Deployment Environments</a:t>
+                      </a:r>
+                    </a:p>
+                  </a:txBody>
+                  <a:tcPr>
+                    <a:solidFill>
+                      <a:srgbClr val="E7E6E6"/>
+                    </a:solidFill>
+                  </a:tcPr>
+                </a:tc>
+                <a:tc>
+                  <a:txBody>
+                    <a:bodyPr/>
+                    <a:lstStyle/>
+                    <a:p>
+                      <a:r>
+                        <a:rPr sz="1100"/>
+                        <a:t>2 environments (dev prod)</a:t>
+                      </a:r>
+                    </a:p>
+                  </a:txBody>
+                  <a:tcPr>
+                    <a:solidFill>
+                      <a:srgbClr val="E7E6E6"/>
+                    </a:solidFill>
+                  </a:tcPr>
+                </a:tc>
+              </a:tr>
+            </a:tbl>
+          </a:graphicData>
+        </a:graphic>
+      </p:graphicFrame>
+      <p:pic>
+        <p:nvPicPr>
+          <p:cNvPr id="5" name="Picture 4" descr="eo-framework-logo-real.png"/>
+          <p:cNvPicPr>
+            <a:picLocks noChangeAspect="1"/>
+          </p:cNvPicPr>
+          <p:nvPr/>
+        </p:nvPicPr>
+        <p:blipFill>
+          <a:blip r:embed="rId3"/>
+          <a:stretch>
+            <a:fillRect/>
+          </a:stretch>
+        </p:blipFill>
+        <p:spPr>
+          <a:xfrm>
+            <a:off x="6684264" y="4535424"/>
+            <a:ext cx="2139696" cy="530352"/>
+          </a:xfrm>
+          <a:prstGeom prst="rect">
+            <a:avLst/>
+          </a:prstGeom>
+        </p:spPr>
+      </p:pic>
+    </p:spTree>
+  </p:cSld>
+  <p:clrMapOvr>
+    <a:masterClrMapping/>
+  </p:clrMapOvr>
+</p:sld>
+</file>
+
+<file path=ppt/slides/slide4.xml><?xml version="1.0" encoding="utf-8"?>
+<p:sld xmlns:a="http://schemas.openxmlformats.org/drawingml/2006/main" xmlns:p="http://schemas.openxmlformats.org/presentationml/2006/main" xmlns:r="http://schemas.openxmlformats.org/officeDocument/2006/relationships">
+  <p:cSld>
+    <p:spTree>
+      <p:nvGrpSpPr>
+        <p:cNvPr id="1" name=""/>
+        <p:cNvGrpSpPr/>
+        <p:nvPr/>
+      </p:nvGrpSpPr>
+      <p:grpSpPr/>
+      <p:sp>
+        <p:nvSpPr>
+          <p:cNvPr id="2" name="Text Placeholder 1"/>
+          <p:cNvSpPr>
+            <a:spLocks noGrp="1"/>
+          </p:cNvSpPr>
+          <p:nvPr>
+            <p:ph type="body" idx="10" sz="quarter"/>
+          </p:nvPr>
+        </p:nvSpPr>
+        <p:spPr/>
+        <p:txBody>
+          <a:bodyPr/>
+          <a:lstStyle/>
+          <a:p>
             <a:r>
               <a:t>Solution Overview</a:t>
             </a:r>
@@ -3883,7 +5025,7 @@
 </p:sld>
 </file>
 
-<file path=ppt/slides/slide4.xml><?xml version="1.0" encoding="utf-8"?>
+<file path=ppt/slides/slide5.xml><?xml version="1.0" encoding="utf-8"?>
 <p:sld xmlns:a="http://schemas.openxmlformats.org/drawingml/2006/main" xmlns:p="http://schemas.openxmlformats.org/presentationml/2006/main" xmlns:r="http://schemas.openxmlformats.org/officeDocument/2006/relationships">
   <p:cSld>
     <p:spTree>
@@ -4033,416 +5175,6 @@
           </a:p>
         </p:txBody>
       </p:sp>
-      <p:pic>
-        <p:nvPicPr>
-          <p:cNvPr id="5" name="Picture 4" descr="eo-framework-logo-real.png"/>
-          <p:cNvPicPr>
-            <a:picLocks noChangeAspect="1"/>
-          </p:cNvPicPr>
-          <p:nvPr/>
-        </p:nvPicPr>
-        <p:blipFill>
-          <a:blip r:embed="rId3"/>
-          <a:stretch>
-            <a:fillRect/>
-          </a:stretch>
-        </p:blipFill>
-        <p:spPr>
-          <a:xfrm>
-            <a:off x="6684264" y="4535424"/>
-            <a:ext cx="2139696" cy="530352"/>
-          </a:xfrm>
-          <a:prstGeom prst="rect">
-            <a:avLst/>
-          </a:prstGeom>
-        </p:spPr>
-      </p:pic>
-    </p:spTree>
-  </p:cSld>
-  <p:clrMapOvr>
-    <a:masterClrMapping/>
-  </p:clrMapOvr>
-</p:sld>
-</file>
-
-<file path=ppt/slides/slide5.xml><?xml version="1.0" encoding="utf-8"?>
-<p:sld xmlns:a="http://schemas.openxmlformats.org/drawingml/2006/main" xmlns:p="http://schemas.openxmlformats.org/presentationml/2006/main" xmlns:r="http://schemas.openxmlformats.org/officeDocument/2006/relationships">
-  <p:cSld>
-    <p:spTree>
-      <p:nvGrpSpPr>
-        <p:cNvPr id="1" name=""/>
-        <p:cNvGrpSpPr/>
-        <p:nvPr/>
-      </p:nvGrpSpPr>
-      <p:grpSpPr/>
-      <p:sp>
-        <p:nvSpPr>
-          <p:cNvPr id="2" name="Text Placeholder 1"/>
-          <p:cNvSpPr>
-            <a:spLocks noGrp="1"/>
-          </p:cNvSpPr>
-          <p:nvPr>
-            <p:ph type="body" idx="10" sz="quarter"/>
-          </p:nvPr>
-        </p:nvSpPr>
-        <p:spPr/>
-        <p:txBody>
-          <a:bodyPr/>
-          <a:lstStyle/>
-          <a:p>
-            <a:pPr algn="l"/>
-            <a:r>
-              <a:rPr b="1"/>
-              <a:t>Timeline &amp; Milestones</a:t>
-            </a:r>
-          </a:p>
-        </p:txBody>
-      </p:sp>
-      <p:pic>
-        <p:nvPicPr>
-          <p:cNvPr id="3" name="Picture Placeholder 2" descr="consulting_company_logo.png"/>
-          <p:cNvPicPr>
-            <a:picLocks noGrp="1" noChangeAspect="1"/>
-          </p:cNvPicPr>
-          <p:nvPr>
-            <p:ph type="pic" idx="13" sz="quarter"/>
-          </p:nvPr>
-        </p:nvPicPr>
-        <p:blipFill>
-          <a:blip r:embed="rId2"/>
-          <a:srcRect t="6404" b="6404"/>
-          <a:stretch>
-            <a:fillRect/>
-          </a:stretch>
-        </p:blipFill>
-        <p:spPr/>
-      </p:pic>
-      <p:graphicFrame>
-        <p:nvGraphicFramePr>
-          <p:cNvPr id="4" name="Table Placeholder 3"/>
-          <p:cNvGraphicFramePr>
-            <a:graphicFrameLocks noGrp="1"/>
-          </p:cNvGraphicFramePr>
-          <p:nvPr>
-            <p:ph type="tbl" idx="14" sz="quarter"/>
-          </p:nvPr>
-        </p:nvGraphicFramePr>
-        <p:xfrm>
-          <a:off x="256855" y="677011"/>
-          <a:ext cx="8710931" cy="1483360"/>
-        </p:xfrm>
-        <a:graphic>
-          <a:graphicData uri="http://schemas.openxmlformats.org/drawingml/2006/table">
-            <a:tbl>
-              <a:tblPr firstRow="1" bandRow="1">
-                <a:tableStyleId>{5C22544A-7EE6-4342-B048-85BDC9FD1C3A}</a:tableStyleId>
-              </a:tblPr>
-              <a:tblGrid>
-                <a:gridCol w="871093"/>
-                <a:gridCol w="2177733"/>
-                <a:gridCol w="1306639"/>
-                <a:gridCol w="4355466"/>
-              </a:tblGrid>
-              <a:tr h="370840">
-                <a:tc>
-                  <a:txBody>
-                    <a:bodyPr/>
-                    <a:lstStyle/>
-                    <a:p>
-                      <a:r>
-                        <a:rPr sz="1400">
-                          <a:solidFill>
-                            <a:srgbClr val="FFFFFF"/>
-                          </a:solidFill>
-                        </a:rPr>
-                        <a:t>Phase No</a:t>
-                      </a:r>
-                    </a:p>
-                  </a:txBody>
-                  <a:tcPr>
-                    <a:solidFill>
-                      <a:srgbClr val="A01C02"/>
-                    </a:solidFill>
-                  </a:tcPr>
-                </a:tc>
-                <a:tc>
-                  <a:txBody>
-                    <a:bodyPr/>
-                    <a:lstStyle/>
-                    <a:p>
-                      <a:r>
-                        <a:rPr sz="1400">
-                          <a:solidFill>
-                            <a:srgbClr val="FFFFFF"/>
-                          </a:solidFill>
-                        </a:rPr>
-                        <a:t>Phase Description</a:t>
-                      </a:r>
-                    </a:p>
-                  </a:txBody>
-                  <a:tcPr>
-                    <a:solidFill>
-                      <a:srgbClr val="A01C02"/>
-                    </a:solidFill>
-                  </a:tcPr>
-                </a:tc>
-                <a:tc>
-                  <a:txBody>
-                    <a:bodyPr/>
-                    <a:lstStyle/>
-                    <a:p>
-                      <a:r>
-                        <a:rPr sz="1400">
-                          <a:solidFill>
-                            <a:srgbClr val="FFFFFF"/>
-                          </a:solidFill>
-                        </a:rPr>
-                        <a:t>Timeline</a:t>
-                      </a:r>
-                    </a:p>
-                  </a:txBody>
-                  <a:tcPr>
-                    <a:solidFill>
-                      <a:srgbClr val="A01C02"/>
-                    </a:solidFill>
-                  </a:tcPr>
-                </a:tc>
-                <a:tc>
-                  <a:txBody>
-                    <a:bodyPr/>
-                    <a:lstStyle/>
-                    <a:p>
-                      <a:r>
-                        <a:rPr sz="1400">
-                          <a:solidFill>
-                            <a:srgbClr val="FFFFFF"/>
-                          </a:solidFill>
-                        </a:rPr>
-                        <a:t>Key Deliverables</a:t>
-                      </a:r>
-                    </a:p>
-                  </a:txBody>
-                  <a:tcPr>
-                    <a:solidFill>
-                      <a:srgbClr val="A01C02"/>
-                    </a:solidFill>
-                  </a:tcPr>
-                </a:tc>
-              </a:tr>
-              <a:tr h="370840">
-                <a:tc>
-                  <a:txBody>
-                    <a:bodyPr/>
-                    <a:lstStyle/>
-                    <a:p>
-                      <a:r>
-                        <a:rPr sz="1100"/>
-                        <a:t>Phase 1</a:t>
-                      </a:r>
-                    </a:p>
-                  </a:txBody>
-                  <a:tcPr>
-                    <a:solidFill>
-                      <a:srgbClr val="E7E6E6"/>
-                    </a:solidFill>
-                  </a:tcPr>
-                </a:tc>
-                <a:tc>
-                  <a:txBody>
-                    <a:bodyPr/>
-                    <a:lstStyle/>
-                    <a:p>
-                      <a:r>
-                        <a:rPr sz="1100"/>
-                        <a:t>Foundation &amp; Planning</a:t>
-                      </a:r>
-                    </a:p>
-                  </a:txBody>
-                  <a:tcPr>
-                    <a:solidFill>
-                      <a:srgbClr val="E7E6E6"/>
-                    </a:solidFill>
-                  </a:tcPr>
-                </a:tc>
-                <a:tc>
-                  <a:txBody>
-                    <a:bodyPr/>
-                    <a:lstStyle/>
-                    <a:p>
-                      <a:r>
-                        <a:rPr sz="1100"/>
-                        <a:t>Months 1-2</a:t>
-                      </a:r>
-                    </a:p>
-                  </a:txBody>
-                  <a:tcPr>
-                    <a:solidFill>
-                      <a:srgbClr val="E7E6E6"/>
-                    </a:solidFill>
-                  </a:tcPr>
-                </a:tc>
-                <a:tc>
-                  <a:txBody>
-                    <a:bodyPr/>
-                    <a:lstStyle/>
-                    <a:p>
-                      <a:r>
-                        <a:rPr sz="1100"/>
-                        <a:t>Cloud environment live, Security baseline configured, CI/CD pipeline operational</a:t>
-                      </a:r>
-                    </a:p>
-                  </a:txBody>
-                  <a:tcPr>
-                    <a:solidFill>
-                      <a:srgbClr val="E7E6E6"/>
-                    </a:solidFill>
-                  </a:tcPr>
-                </a:tc>
-              </a:tr>
-              <a:tr h="370840">
-                <a:tc>
-                  <a:txBody>
-                    <a:bodyPr/>
-                    <a:lstStyle/>
-                    <a:p>
-                      <a:r>
-                        <a:rPr sz="1100"/>
-                        <a:t>Phase 2</a:t>
-                      </a:r>
-                    </a:p>
-                  </a:txBody>
-                  <a:tcPr>
-                    <a:solidFill>
-                      <a:srgbClr val="E7E6E6"/>
-                    </a:solidFill>
-                  </a:tcPr>
-                </a:tc>
-                <a:tc>
-                  <a:txBody>
-                    <a:bodyPr/>
-                    <a:lstStyle/>
-                    <a:p>
-                      <a:r>
-                        <a:rPr sz="1100"/>
-                        <a:t>Core Implementation</a:t>
-                      </a:r>
-                    </a:p>
-                  </a:txBody>
-                  <a:tcPr>
-                    <a:solidFill>
-                      <a:srgbClr val="E7E6E6"/>
-                    </a:solidFill>
-                  </a:tcPr>
-                </a:tc>
-                <a:tc>
-                  <a:txBody>
-                    <a:bodyPr/>
-                    <a:lstStyle/>
-                    <a:p>
-                      <a:r>
-                        <a:rPr sz="1100"/>
-                        <a:t>Months 3-4</a:t>
-                      </a:r>
-                    </a:p>
-                  </a:txBody>
-                  <a:tcPr>
-                    <a:solidFill>
-                      <a:srgbClr val="E7E6E6"/>
-                    </a:solidFill>
-                  </a:tcPr>
-                </a:tc>
-                <a:tc>
-                  <a:txBody>
-                    <a:bodyPr/>
-                    <a:lstStyle/>
-                    <a:p>
-                      <a:r>
-                        <a:rPr sz="1100"/>
-                        <a:t>Database layer deployed, Application tier functional, Integration testing complete</a:t>
-                      </a:r>
-                    </a:p>
-                  </a:txBody>
-                  <a:tcPr>
-                    <a:solidFill>
-                      <a:srgbClr val="E7E6E6"/>
-                    </a:solidFill>
-                  </a:tcPr>
-                </a:tc>
-              </a:tr>
-              <a:tr h="370840">
-                <a:tc>
-                  <a:txBody>
-                    <a:bodyPr/>
-                    <a:lstStyle/>
-                    <a:p>
-                      <a:r>
-                        <a:rPr sz="1100"/>
-                        <a:t>Phase 3</a:t>
-                      </a:r>
-                    </a:p>
-                  </a:txBody>
-                  <a:tcPr>
-                    <a:solidFill>
-                      <a:srgbClr val="E7E6E6"/>
-                    </a:solidFill>
-                  </a:tcPr>
-                </a:tc>
-                <a:tc>
-                  <a:txBody>
-                    <a:bodyPr/>
-                    <a:lstStyle/>
-                    <a:p>
-                      <a:r>
-                        <a:rPr sz="1100"/>
-                        <a:t>Deployment &amp; Optimization</a:t>
-                      </a:r>
-                    </a:p>
-                  </a:txBody>
-                  <a:tcPr>
-                    <a:solidFill>
-                      <a:srgbClr val="E7E6E6"/>
-                    </a:solidFill>
-                  </a:tcPr>
-                </a:tc>
-                <a:tc>
-                  <a:txBody>
-                    <a:bodyPr/>
-                    <a:lstStyle/>
-                    <a:p>
-                      <a:r>
-                        <a:rPr sz="1100"/>
-                        <a:t>Months 5-6</a:t>
-                      </a:r>
-                    </a:p>
-                  </a:txBody>
-                  <a:tcPr>
-                    <a:solidFill>
-                      <a:srgbClr val="E7E6E6"/>
-                    </a:solidFill>
-                  </a:tcPr>
-                </a:tc>
-                <a:tc>
-                  <a:txBody>
-                    <a:bodyPr/>
-                    <a:lstStyle/>
-                    <a:p>
-                      <a:r>
-                        <a:rPr sz="1100"/>
-                        <a:t>UAT completed, Production deployment successful, Monitoring and optimization active</a:t>
-                      </a:r>
-                    </a:p>
-                  </a:txBody>
-                  <a:tcPr>
-                    <a:solidFill>
-                      <a:srgbClr val="E7E6E6"/>
-                    </a:solidFill>
-                  </a:tcPr>
-                </a:tc>
-              </a:tr>
-            </a:tbl>
-          </a:graphicData>
-        </a:graphic>
-      </p:graphicFrame>
       <p:pic>
         <p:nvPicPr>
           <p:cNvPr id="5" name="Picture 4" descr="eo-framework-logo-real.png"/>
@@ -4500,8 +5232,10 @@
           <a:bodyPr/>
           <a:lstStyle/>
           <a:p>
-            <a:r>
-              <a:t>Success Stories</a:t>
+            <a:pPr algn="l"/>
+            <a:r>
+              <a:rPr b="1"/>
+              <a:t>Timeline &amp; Milestones</a:t>
             </a:r>
           </a:p>
         </p:txBody>
@@ -4518,93 +5252,339 @@
         </p:nvPicPr>
         <p:blipFill>
           <a:blip r:embed="rId2"/>
-          <a:srcRect t="6762" b="6762"/>
+          <a:srcRect t="6404" b="6404"/>
           <a:stretch>
             <a:fillRect/>
           </a:stretch>
         </p:blipFill>
         <p:spPr/>
       </p:pic>
-      <p:sp>
-        <p:nvSpPr>
-          <p:cNvPr id="4" name="Text Placeholder 3"/>
-          <p:cNvSpPr>
-            <a:spLocks noGrp="1"/>
-          </p:cNvSpPr>
-          <p:nvPr>
-            <p:ph type="body" idx="14" sz="quarter"/>
-          </p:nvPr>
-        </p:nvSpPr>
-        <p:spPr/>
-        <p:txBody>
-          <a:bodyPr/>
-          <a:lstStyle/>
-          <a:p>
-            <a:pPr/>
-            <a:r>
-              <a:rPr b="1"/>
-              <a:t>Client Success: Global Manufacturing Leader</a:t>
-            </a:r>
-          </a:p>
-          <a:p>
-            <a:pPr lvl="1"/>
-            <a:r>
-              <a:rPr b="1"/>
-              <a:t>Client:</a:t>
-            </a:r>
-            <a:r>
-              <a:t> Fortune 500 Manufacturing Company with 15,000+ employees across 30 countries</a:t>
-            </a:r>
-          </a:p>
-          <a:p>
-            <a:pPr lvl="1"/>
-            <a:r>
-              <a:rPr b="1"/>
-              <a:t>Challenge:</a:t>
-            </a:r>
-            <a:r>
-              <a:t> Legacy systems causing 40% operational inefficiency, $12M annual waste from manual processes, and inability to scale for market expansion</a:t>
-            </a:r>
-          </a:p>
-          <a:p>
-            <a:pPr lvl="1"/>
-            <a:r>
-              <a:rPr b="1"/>
-              <a:t>Solution:</a:t>
-            </a:r>
-            <a:r>
-              <a:t> Deployed cloud-native platform with automated workflows, real-time analytics, and integrated supply chain visibility across all manufacturing sites</a:t>
-            </a:r>
-          </a:p>
-          <a:p>
-            <a:pPr lvl="1"/>
-            <a:r>
-              <a:rPr b="1"/>
-              <a:t>Results:</a:t>
-            </a:r>
-            <a:r>
-              <a:t> 45% reduction in operational costs ($5.4M annual savings), 60% faster order-to-delivery cycle, 99.7% system uptime, full ROI achieved in 14 months</a:t>
-            </a:r>
-          </a:p>
-          <a:p>
-            <a:pPr lvl="1"/>
-            <a:r>
-              <a:rPr b="1"/>
-              <a:t>Testimonial:</a:t>
-            </a:r>
-            <a:r>
-              <a:t> "This transformation exceeded our expectations. We've not only modernized our operations but created a competitive advantage that positions us for the next decade of growth. The implementation was seamless and the results were measurable from day one." — </a:t>
-            </a:r>
-            <a:r>
-              <a:rPr b="1"/>
-              <a:t>Michael Chen, Chief Operations Officer</a:t>
-            </a:r>
-            <a:r>
-              <a:t>, Global Manufacturing Corp</a:t>
-            </a:r>
-          </a:p>
-        </p:txBody>
-      </p:sp>
+      <p:graphicFrame>
+        <p:nvGraphicFramePr>
+          <p:cNvPr id="4" name="Table Placeholder 3"/>
+          <p:cNvGraphicFramePr>
+            <a:graphicFrameLocks noGrp="1"/>
+          </p:cNvGraphicFramePr>
+          <p:nvPr>
+            <p:ph type="tbl" idx="14" sz="quarter"/>
+          </p:nvPr>
+        </p:nvGraphicFramePr>
+        <p:xfrm>
+          <a:off x="256855" y="677011"/>
+          <a:ext cx="8710931" cy="1483360"/>
+        </p:xfrm>
+        <a:graphic>
+          <a:graphicData uri="http://schemas.openxmlformats.org/drawingml/2006/table">
+            <a:tbl>
+              <a:tblPr firstRow="1" bandRow="1">
+                <a:tableStyleId>{5C22544A-7EE6-4342-B048-85BDC9FD1C3A}</a:tableStyleId>
+              </a:tblPr>
+              <a:tblGrid>
+                <a:gridCol w="871093"/>
+                <a:gridCol w="2177733"/>
+                <a:gridCol w="1306639"/>
+                <a:gridCol w="4355466"/>
+              </a:tblGrid>
+              <a:tr h="370840">
+                <a:tc>
+                  <a:txBody>
+                    <a:bodyPr/>
+                    <a:lstStyle/>
+                    <a:p>
+                      <a:r>
+                        <a:rPr sz="1400">
+                          <a:solidFill>
+                            <a:srgbClr val="FFFFFF"/>
+                          </a:solidFill>
+                        </a:rPr>
+                        <a:t>Phase No</a:t>
+                      </a:r>
+                    </a:p>
+                  </a:txBody>
+                  <a:tcPr>
+                    <a:solidFill>
+                      <a:srgbClr val="A01C02"/>
+                    </a:solidFill>
+                  </a:tcPr>
+                </a:tc>
+                <a:tc>
+                  <a:txBody>
+                    <a:bodyPr/>
+                    <a:lstStyle/>
+                    <a:p>
+                      <a:r>
+                        <a:rPr sz="1400">
+                          <a:solidFill>
+                            <a:srgbClr val="FFFFFF"/>
+                          </a:solidFill>
+                        </a:rPr>
+                        <a:t>Phase Description</a:t>
+                      </a:r>
+                    </a:p>
+                  </a:txBody>
+                  <a:tcPr>
+                    <a:solidFill>
+                      <a:srgbClr val="A01C02"/>
+                    </a:solidFill>
+                  </a:tcPr>
+                </a:tc>
+                <a:tc>
+                  <a:txBody>
+                    <a:bodyPr/>
+                    <a:lstStyle/>
+                    <a:p>
+                      <a:r>
+                        <a:rPr sz="1400">
+                          <a:solidFill>
+                            <a:srgbClr val="FFFFFF"/>
+                          </a:solidFill>
+                        </a:rPr>
+                        <a:t>Timeline</a:t>
+                      </a:r>
+                    </a:p>
+                  </a:txBody>
+                  <a:tcPr>
+                    <a:solidFill>
+                      <a:srgbClr val="A01C02"/>
+                    </a:solidFill>
+                  </a:tcPr>
+                </a:tc>
+                <a:tc>
+                  <a:txBody>
+                    <a:bodyPr/>
+                    <a:lstStyle/>
+                    <a:p>
+                      <a:r>
+                        <a:rPr sz="1400">
+                          <a:solidFill>
+                            <a:srgbClr val="FFFFFF"/>
+                          </a:solidFill>
+                        </a:rPr>
+                        <a:t>Key Deliverables</a:t>
+                      </a:r>
+                    </a:p>
+                  </a:txBody>
+                  <a:tcPr>
+                    <a:solidFill>
+                      <a:srgbClr val="A01C02"/>
+                    </a:solidFill>
+                  </a:tcPr>
+                </a:tc>
+              </a:tr>
+              <a:tr h="370840">
+                <a:tc>
+                  <a:txBody>
+                    <a:bodyPr/>
+                    <a:lstStyle/>
+                    <a:p>
+                      <a:r>
+                        <a:rPr sz="1100"/>
+                        <a:t>Phase 1</a:t>
+                      </a:r>
+                    </a:p>
+                  </a:txBody>
+                  <a:tcPr>
+                    <a:solidFill>
+                      <a:srgbClr val="E7E6E6"/>
+                    </a:solidFill>
+                  </a:tcPr>
+                </a:tc>
+                <a:tc>
+                  <a:txBody>
+                    <a:bodyPr/>
+                    <a:lstStyle/>
+                    <a:p>
+                      <a:r>
+                        <a:rPr sz="1100"/>
+                        <a:t>Foundation &amp; Planning</a:t>
+                      </a:r>
+                    </a:p>
+                  </a:txBody>
+                  <a:tcPr>
+                    <a:solidFill>
+                      <a:srgbClr val="E7E6E6"/>
+                    </a:solidFill>
+                  </a:tcPr>
+                </a:tc>
+                <a:tc>
+                  <a:txBody>
+                    <a:bodyPr/>
+                    <a:lstStyle/>
+                    <a:p>
+                      <a:r>
+                        <a:rPr sz="1100"/>
+                        <a:t>Months 1-2</a:t>
+                      </a:r>
+                    </a:p>
+                  </a:txBody>
+                  <a:tcPr>
+                    <a:solidFill>
+                      <a:srgbClr val="E7E6E6"/>
+                    </a:solidFill>
+                  </a:tcPr>
+                </a:tc>
+                <a:tc>
+                  <a:txBody>
+                    <a:bodyPr/>
+                    <a:lstStyle/>
+                    <a:p>
+                      <a:r>
+                        <a:rPr sz="1100"/>
+                        <a:t>Cloud environment live, Security baseline configured, CI/CD pipeline operational</a:t>
+                      </a:r>
+                    </a:p>
+                  </a:txBody>
+                  <a:tcPr>
+                    <a:solidFill>
+                      <a:srgbClr val="E7E6E6"/>
+                    </a:solidFill>
+                  </a:tcPr>
+                </a:tc>
+              </a:tr>
+              <a:tr h="370840">
+                <a:tc>
+                  <a:txBody>
+                    <a:bodyPr/>
+                    <a:lstStyle/>
+                    <a:p>
+                      <a:r>
+                        <a:rPr sz="1100"/>
+                        <a:t>Phase 2</a:t>
+                      </a:r>
+                    </a:p>
+                  </a:txBody>
+                  <a:tcPr>
+                    <a:solidFill>
+                      <a:srgbClr val="E7E6E6"/>
+                    </a:solidFill>
+                  </a:tcPr>
+                </a:tc>
+                <a:tc>
+                  <a:txBody>
+                    <a:bodyPr/>
+                    <a:lstStyle/>
+                    <a:p>
+                      <a:r>
+                        <a:rPr sz="1100"/>
+                        <a:t>Core Implementation</a:t>
+                      </a:r>
+                    </a:p>
+                  </a:txBody>
+                  <a:tcPr>
+                    <a:solidFill>
+                      <a:srgbClr val="E7E6E6"/>
+                    </a:solidFill>
+                  </a:tcPr>
+                </a:tc>
+                <a:tc>
+                  <a:txBody>
+                    <a:bodyPr/>
+                    <a:lstStyle/>
+                    <a:p>
+                      <a:r>
+                        <a:rPr sz="1100"/>
+                        <a:t>Months 3-4</a:t>
+                      </a:r>
+                    </a:p>
+                  </a:txBody>
+                  <a:tcPr>
+                    <a:solidFill>
+                      <a:srgbClr val="E7E6E6"/>
+                    </a:solidFill>
+                  </a:tcPr>
+                </a:tc>
+                <a:tc>
+                  <a:txBody>
+                    <a:bodyPr/>
+                    <a:lstStyle/>
+                    <a:p>
+                      <a:r>
+                        <a:rPr sz="1100"/>
+                        <a:t>Database layer deployed, Application tier functional, Integration testing complete</a:t>
+                      </a:r>
+                    </a:p>
+                  </a:txBody>
+                  <a:tcPr>
+                    <a:solidFill>
+                      <a:srgbClr val="E7E6E6"/>
+                    </a:solidFill>
+                  </a:tcPr>
+                </a:tc>
+              </a:tr>
+              <a:tr h="370840">
+                <a:tc>
+                  <a:txBody>
+                    <a:bodyPr/>
+                    <a:lstStyle/>
+                    <a:p>
+                      <a:r>
+                        <a:rPr sz="1100"/>
+                        <a:t>Phase 3</a:t>
+                      </a:r>
+                    </a:p>
+                  </a:txBody>
+                  <a:tcPr>
+                    <a:solidFill>
+                      <a:srgbClr val="E7E6E6"/>
+                    </a:solidFill>
+                  </a:tcPr>
+                </a:tc>
+                <a:tc>
+                  <a:txBody>
+                    <a:bodyPr/>
+                    <a:lstStyle/>
+                    <a:p>
+                      <a:r>
+                        <a:rPr sz="1100"/>
+                        <a:t>Deployment &amp; Optimization</a:t>
+                      </a:r>
+                    </a:p>
+                  </a:txBody>
+                  <a:tcPr>
+                    <a:solidFill>
+                      <a:srgbClr val="E7E6E6"/>
+                    </a:solidFill>
+                  </a:tcPr>
+                </a:tc>
+                <a:tc>
+                  <a:txBody>
+                    <a:bodyPr/>
+                    <a:lstStyle/>
+                    <a:p>
+                      <a:r>
+                        <a:rPr sz="1100"/>
+                        <a:t>Months 5-6</a:t>
+                      </a:r>
+                    </a:p>
+                  </a:txBody>
+                  <a:tcPr>
+                    <a:solidFill>
+                      <a:srgbClr val="E7E6E6"/>
+                    </a:solidFill>
+                  </a:tcPr>
+                </a:tc>
+                <a:tc>
+                  <a:txBody>
+                    <a:bodyPr/>
+                    <a:lstStyle/>
+                    <a:p>
+                      <a:r>
+                        <a:rPr sz="1100"/>
+                        <a:t>UAT completed, Production deployment successful, Monitoring and optimization active</a:t>
+                      </a:r>
+                    </a:p>
+                  </a:txBody>
+                  <a:tcPr>
+                    <a:solidFill>
+                      <a:srgbClr val="E7E6E6"/>
+                    </a:solidFill>
+                  </a:tcPr>
+                </a:tc>
+              </a:tr>
+            </a:tbl>
+          </a:graphicData>
+        </a:graphic>
+      </p:graphicFrame>
       <p:pic>
         <p:nvPicPr>
           <p:cNvPr id="5" name="Picture 4" descr="eo-framework-logo-real.png"/>
@@ -4663,7 +5643,7 @@
           <a:lstStyle/>
           <a:p>
             <a:r>
-              <a:t>Our Partnership Advantage</a:t>
+              <a:t>Success Stories</a:t>
             </a:r>
           </a:p>
         </p:txBody>
@@ -4675,12 +5655,12 @@
             <a:picLocks noGrp="1" noChangeAspect="1"/>
           </p:cNvPicPr>
           <p:nvPr>
-            <p:ph type="pic" idx="14" sz="quarter"/>
+            <p:ph type="pic" idx="13" sz="quarter"/>
           </p:nvPr>
         </p:nvPicPr>
         <p:blipFill>
           <a:blip r:embed="rId2"/>
-          <a:srcRect t="6314" b="6314"/>
+          <a:srcRect t="6762" b="6762"/>
           <a:stretch>
             <a:fillRect/>
           </a:stretch>
@@ -4694,7 +5674,7 @@
             <a:spLocks noGrp="1"/>
           </p:cNvSpPr>
           <p:nvPr>
-            <p:ph type="body" idx="16" sz="quarter"/>
+            <p:ph type="body" idx="14" sz="quarter"/>
           </p:nvPr>
         </p:nvSpPr>
         <p:spPr/>
@@ -4705,97 +5685,71 @@
             <a:pPr/>
             <a:r>
               <a:rPr b="1"/>
-              <a:t>What We Bring</a:t>
+              <a:t>Client Success: Global Manufacturing Leader</a:t>
             </a:r>
           </a:p>
           <a:p>
             <a:pPr lvl="1"/>
             <a:r>
-              <a:t>15+ years delivering enterprise technology solutions</a:t>
+              <a:rPr b="1"/>
+              <a:t>Client:</a:t>
+            </a:r>
+            <a:r>
+              <a:t> Fortune 500 Manufacturing Company with 15,000+ employees across 30 countries</a:t>
             </a:r>
           </a:p>
           <a:p>
             <a:pPr lvl="1"/>
             <a:r>
-              <a:t>200+ successful implementations for Fortune 500 companies</a:t>
+              <a:rPr b="1"/>
+              <a:t>Challenge:</a:t>
+            </a:r>
+            <a:r>
+              <a:t> Legacy systems causing 40% operational inefficiency, $12M annual waste from manual processes, and inability to scale for market expansion</a:t>
             </a:r>
           </a:p>
           <a:p>
             <a:pPr lvl="1"/>
             <a:r>
-              <a:t>Premier partnerships with AWS, Azure, Google Cloud</a:t>
+              <a:rPr b="1"/>
+              <a:t>Solution:</a:t>
+            </a:r>
+            <a:r>
+              <a:t> Deployed cloud-native platform with automated workflows, real-time analytics, and integrated supply chain visibility across all manufacturing sites</a:t>
             </a:r>
           </a:p>
           <a:p>
             <a:pPr lvl="1"/>
             <a:r>
-              <a:t>Certified solution architects with 10+ years expertise</a:t>
+              <a:rPr b="1"/>
+              <a:t>Results:</a:t>
+            </a:r>
+            <a:r>
+              <a:t> 45% reduction in operational costs ($5.4M annual savings), 60% faster order-to-delivery cycle, 99.7% system uptime, full ROI achieved in 14 months</a:t>
             </a:r>
           </a:p>
           <a:p>
             <a:pPr lvl="1"/>
             <a:r>
-              <a:t>24/7 support with 99.5% SLA guarantee</a:t>
-            </a:r>
-          </a:p>
-        </p:txBody>
-      </p:sp>
-      <p:sp>
-        <p:nvSpPr>
-          <p:cNvPr id="5" name="Text Placeholder 4"/>
-          <p:cNvSpPr>
-            <a:spLocks noGrp="1"/>
-          </p:cNvSpPr>
-          <p:nvPr>
-            <p:ph type="body" idx="17" sz="quarter"/>
-          </p:nvPr>
-        </p:nvSpPr>
-        <p:spPr/>
-        <p:txBody>
-          <a:bodyPr/>
-          <a:lstStyle/>
-          <a:p>
-            <a:pPr/>
-            <a:r>
               <a:rPr b="1"/>
-              <a:t>Value to You</a:t>
-            </a:r>
-          </a:p>
-          <a:p>
-            <a:pPr lvl="1"/>
-            <a:r>
-              <a:t>Proven methodology reduces implementation risk by 60%</a:t>
-            </a:r>
-          </a:p>
-          <a:p>
-            <a:pPr lvl="1"/>
-            <a:r>
-              <a:t>Pre-built accelerators fast-track your deployment</a:t>
-            </a:r>
-          </a:p>
-          <a:p>
-            <a:pPr lvl="1"/>
-            <a:r>
-              <a:t>Direct vendor escalation and early-access programs</a:t>
-            </a:r>
-          </a:p>
-          <a:p>
-            <a:pPr lvl="1"/>
-            <a:r>
-              <a:t>Comprehensive skills transfer for team self-sufficiency</a:t>
-            </a:r>
-          </a:p>
-          <a:p>
-            <a:pPr lvl="1"/>
-            <a:r>
-              <a:t>Best practices from 200+ implementations</a:t>
+              <a:t>Testimonial:</a:t>
+            </a:r>
+            <a:r>
+              <a:t> "This transformation exceeded our expectations. We've not only modernized our operations but created a competitive advantage that positions us for the next decade of growth. The implementation was seamless and the results were measurable from day one." — </a:t>
+            </a:r>
+            <a:r>
+              <a:rPr b="1"/>
+              <a:t>Michael Chen, Chief Operations Officer</a:t>
+            </a:r>
+            <a:r>
+              <a:t>, Global Manufacturing Corp</a:t>
             </a:r>
           </a:p>
         </p:txBody>
       </p:sp>
       <p:pic>
         <p:nvPicPr>
-          <p:cNvPr id="6" name="Picture 5" descr="eo-framework-logo-real.png"/>
+          <p:cNvPr id="5" name="Picture 4" descr="eo-framework-logo-real.png"/>
           <p:cNvPicPr>
             <a:picLocks noChangeAspect="1"/>
           </p:cNvPicPr>
@@ -4850,10 +5804,8 @@
           <a:bodyPr/>
           <a:lstStyle/>
           <a:p>
-            <a:pPr algn="l"/>
-            <a:r>
-              <a:rPr b="1"/>
-              <a:t>Investment Summary</a:t>
+            <a:r>
+              <a:t>Our Partnership Advantage</a:t>
             </a:r>
           </a:p>
         </p:txBody>
@@ -4865,808 +5817,127 @@
             <a:picLocks noGrp="1" noChangeAspect="1"/>
           </p:cNvPicPr>
           <p:nvPr>
-            <p:ph type="pic" idx="13" sz="quarter"/>
+            <p:ph type="pic" idx="14" sz="quarter"/>
           </p:nvPr>
         </p:nvPicPr>
         <p:blipFill>
           <a:blip r:embed="rId2"/>
-          <a:srcRect t="6404" b="6404"/>
+          <a:srcRect t="6314" b="6314"/>
           <a:stretch>
             <a:fillRect/>
           </a:stretch>
         </p:blipFill>
         <p:spPr/>
       </p:pic>
-      <p:graphicFrame>
-        <p:nvGraphicFramePr>
-          <p:cNvPr id="4" name="Table Placeholder 3"/>
-          <p:cNvGraphicFramePr>
-            <a:graphicFrameLocks noGrp="1"/>
-          </p:cNvGraphicFramePr>
-          <p:nvPr>
-            <p:ph type="tbl" idx="14" sz="quarter"/>
-          </p:nvPr>
-        </p:nvGraphicFramePr>
-        <p:xfrm>
-          <a:off x="256855" y="677011"/>
-          <a:ext cx="8710929" cy="2225040"/>
-        </p:xfrm>
-        <a:graphic>
-          <a:graphicData uri="http://schemas.openxmlformats.org/drawingml/2006/table">
-            <a:tbl>
-              <a:tblPr firstRow="1" bandRow="1">
-                <a:tableStyleId>{5C22544A-7EE6-4342-B048-85BDC9FD1C3A}</a:tableStyleId>
-              </a:tblPr>
-              <a:tblGrid>
-                <a:gridCol w="1742186"/>
-                <a:gridCol w="1045311"/>
-                <a:gridCol w="2003514"/>
-                <a:gridCol w="1132421"/>
-                <a:gridCol w="871093"/>
-                <a:gridCol w="871093"/>
-                <a:gridCol w="1045311"/>
-              </a:tblGrid>
-              <a:tr h="370840">
-                <a:tc>
-                  <a:txBody>
-                    <a:bodyPr/>
-                    <a:lstStyle/>
-                    <a:p>
-                      <a:r>
-                        <a:rPr sz="1400">
-                          <a:solidFill>
-                            <a:srgbClr val="FFFFFF"/>
-                          </a:solidFill>
-                        </a:rPr>
-                        <a:t>Cost Category</a:t>
-                      </a:r>
-                    </a:p>
-                  </a:txBody>
-                  <a:tcPr>
-                    <a:solidFill>
-                      <a:srgbClr val="A01C02"/>
-                    </a:solidFill>
-                  </a:tcPr>
-                </a:tc>
-                <a:tc>
-                  <a:txBody>
-                    <a:bodyPr/>
-                    <a:lstStyle/>
-                    <a:p>
-                      <a:r>
-                        <a:rPr sz="1400">
-                          <a:solidFill>
-                            <a:srgbClr val="FFFFFF"/>
-                          </a:solidFill>
-                        </a:rPr>
-                        <a:t>Year 1 List</a:t>
-                      </a:r>
-                    </a:p>
-                  </a:txBody>
-                  <a:tcPr>
-                    <a:solidFill>
-                      <a:srgbClr val="A01C02"/>
-                    </a:solidFill>
-                  </a:tcPr>
-                </a:tc>
-                <a:tc>
-                  <a:txBody>
-                    <a:bodyPr/>
-                    <a:lstStyle/>
-                    <a:p>
-                      <a:r>
-                        <a:rPr sz="1400">
-                          <a:solidFill>
-                            <a:srgbClr val="FFFFFF"/>
-                          </a:solidFill>
-                        </a:rPr>
-                        <a:t>Provider/Partner Credits</a:t>
-                      </a:r>
-                    </a:p>
-                  </a:txBody>
-                  <a:tcPr>
-                    <a:solidFill>
-                      <a:srgbClr val="A01C02"/>
-                    </a:solidFill>
-                  </a:tcPr>
-                </a:tc>
-                <a:tc>
-                  <a:txBody>
-                    <a:bodyPr/>
-                    <a:lstStyle/>
-                    <a:p>
-                      <a:r>
-                        <a:rPr sz="1400">
-                          <a:solidFill>
-                            <a:srgbClr val="FFFFFF"/>
-                          </a:solidFill>
-                        </a:rPr>
-                        <a:t>Year 1 Net</a:t>
-                      </a:r>
-                    </a:p>
-                  </a:txBody>
-                  <a:tcPr>
-                    <a:solidFill>
-                      <a:srgbClr val="A01C02"/>
-                    </a:solidFill>
-                  </a:tcPr>
-                </a:tc>
-                <a:tc>
-                  <a:txBody>
-                    <a:bodyPr/>
-                    <a:lstStyle/>
-                    <a:p>
-                      <a:r>
-                        <a:rPr sz="1400">
-                          <a:solidFill>
-                            <a:srgbClr val="FFFFFF"/>
-                          </a:solidFill>
-                        </a:rPr>
-                        <a:t>Year 2</a:t>
-                      </a:r>
-                    </a:p>
-                  </a:txBody>
-                  <a:tcPr>
-                    <a:solidFill>
-                      <a:srgbClr val="A01C02"/>
-                    </a:solidFill>
-                  </a:tcPr>
-                </a:tc>
-                <a:tc>
-                  <a:txBody>
-                    <a:bodyPr/>
-                    <a:lstStyle/>
-                    <a:p>
-                      <a:r>
-                        <a:rPr sz="1400">
-                          <a:solidFill>
-                            <a:srgbClr val="FFFFFF"/>
-                          </a:solidFill>
-                        </a:rPr>
-                        <a:t>Year 3</a:t>
-                      </a:r>
-                    </a:p>
-                  </a:txBody>
-                  <a:tcPr>
-                    <a:solidFill>
-                      <a:srgbClr val="A01C02"/>
-                    </a:solidFill>
-                  </a:tcPr>
-                </a:tc>
-                <a:tc>
-                  <a:txBody>
-                    <a:bodyPr/>
-                    <a:lstStyle/>
-                    <a:p>
-                      <a:r>
-                        <a:rPr sz="1400">
-                          <a:solidFill>
-                            <a:srgbClr val="FFFFFF"/>
-                          </a:solidFill>
-                        </a:rPr>
-                        <a:t>3-Year Total</a:t>
-                      </a:r>
-                    </a:p>
-                  </a:txBody>
-                  <a:tcPr>
-                    <a:solidFill>
-                      <a:srgbClr val="A01C02"/>
-                    </a:solidFill>
-                  </a:tcPr>
-                </a:tc>
-              </a:tr>
-              <a:tr h="370840">
-                <a:tc>
-                  <a:txBody>
-                    <a:bodyPr/>
-                    <a:lstStyle/>
-                    <a:p>
-                      <a:r>
-                        <a:rPr sz="1100"/>
-                        <a:t>Cloud Infrastructure</a:t>
-                      </a:r>
-                    </a:p>
-                  </a:txBody>
-                  <a:tcPr>
-                    <a:solidFill>
-                      <a:srgbClr val="E7E6E6"/>
-                    </a:solidFill>
-                  </a:tcPr>
-                </a:tc>
-                <a:tc>
-                  <a:txBody>
-                    <a:bodyPr/>
-                    <a:lstStyle/>
-                    <a:p>
-                      <a:r>
-                        <a:rPr sz="1100"/>
-                        <a:t>$12,225</a:t>
-                      </a:r>
-                    </a:p>
-                  </a:txBody>
-                  <a:tcPr>
-                    <a:solidFill>
-                      <a:srgbClr val="E7E6E6"/>
-                    </a:solidFill>
-                  </a:tcPr>
-                </a:tc>
-                <a:tc>
-                  <a:txBody>
-                    <a:bodyPr/>
-                    <a:lstStyle/>
-                    <a:p>
-                      <a:r>
-                        <a:rPr sz="1100"/>
-                        <a:t>($990)</a:t>
-                      </a:r>
-                    </a:p>
-                  </a:txBody>
-                  <a:tcPr>
-                    <a:solidFill>
-                      <a:srgbClr val="E7E6E6"/>
-                    </a:solidFill>
-                  </a:tcPr>
-                </a:tc>
-                <a:tc>
-                  <a:txBody>
-                    <a:bodyPr/>
-                    <a:lstStyle/>
-                    <a:p>
-                      <a:r>
-                        <a:rPr sz="1100"/>
-                        <a:t>$11,235</a:t>
-                      </a:r>
-                    </a:p>
-                  </a:txBody>
-                  <a:tcPr>
-                    <a:solidFill>
-                      <a:srgbClr val="E7E6E6"/>
-                    </a:solidFill>
-                  </a:tcPr>
-                </a:tc>
-                <a:tc>
-                  <a:txBody>
-                    <a:bodyPr/>
-                    <a:lstStyle/>
-                    <a:p>
-                      <a:r>
-                        <a:rPr sz="1100"/>
-                        <a:t>$12,225</a:t>
-                      </a:r>
-                    </a:p>
-                  </a:txBody>
-                  <a:tcPr>
-                    <a:solidFill>
-                      <a:srgbClr val="E7E6E6"/>
-                    </a:solidFill>
-                  </a:tcPr>
-                </a:tc>
-                <a:tc>
-                  <a:txBody>
-                    <a:bodyPr/>
-                    <a:lstStyle/>
-                    <a:p>
-                      <a:r>
-                        <a:rPr sz="1100"/>
-                        <a:t>$12,225</a:t>
-                      </a:r>
-                    </a:p>
-                  </a:txBody>
-                  <a:tcPr>
-                    <a:solidFill>
-                      <a:srgbClr val="E7E6E6"/>
-                    </a:solidFill>
-                  </a:tcPr>
-                </a:tc>
-                <a:tc>
-                  <a:txBody>
-                    <a:bodyPr/>
-                    <a:lstStyle/>
-                    <a:p>
-                      <a:r>
-                        <a:rPr sz="1100"/>
-                        <a:t>$35,685</a:t>
-                      </a:r>
-                    </a:p>
-                  </a:txBody>
-                  <a:tcPr>
-                    <a:solidFill>
-                      <a:srgbClr val="E7E6E6"/>
-                    </a:solidFill>
-                  </a:tcPr>
-                </a:tc>
-              </a:tr>
-              <a:tr h="370840">
-                <a:tc>
-                  <a:txBody>
-                    <a:bodyPr/>
-                    <a:lstStyle/>
-                    <a:p>
-                      <a:r>
-                        <a:rPr sz="1100"/>
-                        <a:t>Professional Services</a:t>
-                      </a:r>
-                    </a:p>
-                  </a:txBody>
-                  <a:tcPr>
-                    <a:solidFill>
-                      <a:srgbClr val="E7E6E6"/>
-                    </a:solidFill>
-                  </a:tcPr>
-                </a:tc>
-                <a:tc>
-                  <a:txBody>
-                    <a:bodyPr/>
-                    <a:lstStyle/>
-                    <a:p>
-                      <a:r>
-                        <a:rPr sz="1100"/>
-                        <a:t>$64,300</a:t>
-                      </a:r>
-                    </a:p>
-                  </a:txBody>
-                  <a:tcPr>
-                    <a:solidFill>
-                      <a:srgbClr val="E7E6E6"/>
-                    </a:solidFill>
-                  </a:tcPr>
-                </a:tc>
-                <a:tc>
-                  <a:txBody>
-                    <a:bodyPr/>
-                    <a:lstStyle/>
-                    <a:p>
-                      <a:r>
-                        <a:rPr sz="1100"/>
-                        <a:t>($5,000)</a:t>
-                      </a:r>
-                    </a:p>
-                  </a:txBody>
-                  <a:tcPr>
-                    <a:solidFill>
-                      <a:srgbClr val="E7E6E6"/>
-                    </a:solidFill>
-                  </a:tcPr>
-                </a:tc>
-                <a:tc>
-                  <a:txBody>
-                    <a:bodyPr/>
-                    <a:lstStyle/>
-                    <a:p>
-                      <a:r>
-                        <a:rPr sz="1100"/>
-                        <a:t>$59,300</a:t>
-                      </a:r>
-                    </a:p>
-                  </a:txBody>
-                  <a:tcPr>
-                    <a:solidFill>
-                      <a:srgbClr val="E7E6E6"/>
-                    </a:solidFill>
-                  </a:tcPr>
-                </a:tc>
-                <a:tc>
-                  <a:txBody>
-                    <a:bodyPr/>
-                    <a:lstStyle/>
-                    <a:p>
-                      <a:r>
-                        <a:rPr sz="1100"/>
-                        <a:t>$0</a:t>
-                      </a:r>
-                    </a:p>
-                  </a:txBody>
-                  <a:tcPr>
-                    <a:solidFill>
-                      <a:srgbClr val="E7E6E6"/>
-                    </a:solidFill>
-                  </a:tcPr>
-                </a:tc>
-                <a:tc>
-                  <a:txBody>
-                    <a:bodyPr/>
-                    <a:lstStyle/>
-                    <a:p>
-                      <a:r>
-                        <a:rPr sz="1100"/>
-                        <a:t>$0</a:t>
-                      </a:r>
-                    </a:p>
-                  </a:txBody>
-                  <a:tcPr>
-                    <a:solidFill>
-                      <a:srgbClr val="E7E6E6"/>
-                    </a:solidFill>
-                  </a:tcPr>
-                </a:tc>
-                <a:tc>
-                  <a:txBody>
-                    <a:bodyPr/>
-                    <a:lstStyle/>
-                    <a:p>
-                      <a:r>
-                        <a:rPr sz="1100"/>
-                        <a:t>$59,300</a:t>
-                      </a:r>
-                    </a:p>
-                  </a:txBody>
-                  <a:tcPr>
-                    <a:solidFill>
-                      <a:srgbClr val="E7E6E6"/>
-                    </a:solidFill>
-                  </a:tcPr>
-                </a:tc>
-              </a:tr>
-              <a:tr h="370840">
-                <a:tc>
-                  <a:txBody>
-                    <a:bodyPr/>
-                    <a:lstStyle/>
-                    <a:p>
-                      <a:r>
-                        <a:rPr sz="1100"/>
-                        <a:t>Software Licenses &amp; Subscriptions</a:t>
-                      </a:r>
-                    </a:p>
-                  </a:txBody>
-                  <a:tcPr>
-                    <a:solidFill>
-                      <a:srgbClr val="E7E6E6"/>
-                    </a:solidFill>
-                  </a:tcPr>
-                </a:tc>
-                <a:tc>
-                  <a:txBody>
-                    <a:bodyPr/>
-                    <a:lstStyle/>
-                    <a:p>
-                      <a:r>
-                        <a:rPr sz="1100"/>
-                        <a:t>$7,650</a:t>
-                      </a:r>
-                    </a:p>
-                  </a:txBody>
-                  <a:tcPr>
-                    <a:solidFill>
-                      <a:srgbClr val="E7E6E6"/>
-                    </a:solidFill>
-                  </a:tcPr>
-                </a:tc>
-                <a:tc>
-                  <a:txBody>
-                    <a:bodyPr/>
-                    <a:lstStyle/>
-                    <a:p>
-                      <a:r>
-                        <a:rPr sz="1100"/>
-                        <a:t>$0</a:t>
-                      </a:r>
-                    </a:p>
-                  </a:txBody>
-                  <a:tcPr>
-                    <a:solidFill>
-                      <a:srgbClr val="E7E6E6"/>
-                    </a:solidFill>
-                  </a:tcPr>
-                </a:tc>
-                <a:tc>
-                  <a:txBody>
-                    <a:bodyPr/>
-                    <a:lstStyle/>
-                    <a:p>
-                      <a:r>
-                        <a:rPr sz="1100"/>
-                        <a:t>$7,650</a:t>
-                      </a:r>
-                    </a:p>
-                  </a:txBody>
-                  <a:tcPr>
-                    <a:solidFill>
-                      <a:srgbClr val="E7E6E6"/>
-                    </a:solidFill>
-                  </a:tcPr>
-                </a:tc>
-                <a:tc>
-                  <a:txBody>
-                    <a:bodyPr/>
-                    <a:lstStyle/>
-                    <a:p>
-                      <a:r>
-                        <a:rPr sz="1100"/>
-                        <a:t>$7,650</a:t>
-                      </a:r>
-                    </a:p>
-                  </a:txBody>
-                  <a:tcPr>
-                    <a:solidFill>
-                      <a:srgbClr val="E7E6E6"/>
-                    </a:solidFill>
-                  </a:tcPr>
-                </a:tc>
-                <a:tc>
-                  <a:txBody>
-                    <a:bodyPr/>
-                    <a:lstStyle/>
-                    <a:p>
-                      <a:r>
-                        <a:rPr sz="1100"/>
-                        <a:t>$7,650</a:t>
-                      </a:r>
-                    </a:p>
-                  </a:txBody>
-                  <a:tcPr>
-                    <a:solidFill>
-                      <a:srgbClr val="E7E6E6"/>
-                    </a:solidFill>
-                  </a:tcPr>
-                </a:tc>
-                <a:tc>
-                  <a:txBody>
-                    <a:bodyPr/>
-                    <a:lstStyle/>
-                    <a:p>
-                      <a:r>
-                        <a:rPr sz="1100"/>
-                        <a:t>$22,950</a:t>
-                      </a:r>
-                    </a:p>
-                  </a:txBody>
-                  <a:tcPr>
-                    <a:solidFill>
-                      <a:srgbClr val="E7E6E6"/>
-                    </a:solidFill>
-                  </a:tcPr>
-                </a:tc>
-              </a:tr>
-              <a:tr h="370840">
-                <a:tc>
-                  <a:txBody>
-                    <a:bodyPr/>
-                    <a:lstStyle/>
-                    <a:p>
-                      <a:r>
-                        <a:rPr sz="1100"/>
-                        <a:t>Support &amp; Maintenance</a:t>
-                      </a:r>
-                    </a:p>
-                  </a:txBody>
-                  <a:tcPr>
-                    <a:solidFill>
-                      <a:srgbClr val="E7E6E6"/>
-                    </a:solidFill>
-                  </a:tcPr>
-                </a:tc>
-                <a:tc>
-                  <a:txBody>
-                    <a:bodyPr/>
-                    <a:lstStyle/>
-                    <a:p>
-                      <a:r>
-                        <a:rPr sz="1100"/>
-                        <a:t>$0</a:t>
-                      </a:r>
-                    </a:p>
-                  </a:txBody>
-                  <a:tcPr>
-                    <a:solidFill>
-                      <a:srgbClr val="E7E6E6"/>
-                    </a:solidFill>
-                  </a:tcPr>
-                </a:tc>
-                <a:tc>
-                  <a:txBody>
-                    <a:bodyPr/>
-                    <a:lstStyle/>
-                    <a:p>
-                      <a:r>
-                        <a:rPr sz="1100"/>
-                        <a:t>$0</a:t>
-                      </a:r>
-                    </a:p>
-                  </a:txBody>
-                  <a:tcPr>
-                    <a:solidFill>
-                      <a:srgbClr val="E7E6E6"/>
-                    </a:solidFill>
-                  </a:tcPr>
-                </a:tc>
-                <a:tc>
-                  <a:txBody>
-                    <a:bodyPr/>
-                    <a:lstStyle/>
-                    <a:p>
-                      <a:r>
-                        <a:rPr sz="1100"/>
-                        <a:t>$0</a:t>
-                      </a:r>
-                    </a:p>
-                  </a:txBody>
-                  <a:tcPr>
-                    <a:solidFill>
-                      <a:srgbClr val="E7E6E6"/>
-                    </a:solidFill>
-                  </a:tcPr>
-                </a:tc>
-                <a:tc>
-                  <a:txBody>
-                    <a:bodyPr/>
-                    <a:lstStyle/>
-                    <a:p>
-                      <a:r>
-                        <a:rPr sz="1100"/>
-                        <a:t>$0</a:t>
-                      </a:r>
-                    </a:p>
-                  </a:txBody>
-                  <a:tcPr>
-                    <a:solidFill>
-                      <a:srgbClr val="E7E6E6"/>
-                    </a:solidFill>
-                  </a:tcPr>
-                </a:tc>
-                <a:tc>
-                  <a:txBody>
-                    <a:bodyPr/>
-                    <a:lstStyle/>
-                    <a:p>
-                      <a:r>
-                        <a:rPr sz="1100"/>
-                        <a:t>$0</a:t>
-                      </a:r>
-                    </a:p>
-                  </a:txBody>
-                  <a:tcPr>
-                    <a:solidFill>
-                      <a:srgbClr val="E7E6E6"/>
-                    </a:solidFill>
-                  </a:tcPr>
-                </a:tc>
-                <a:tc>
-                  <a:txBody>
-                    <a:bodyPr/>
-                    <a:lstStyle/>
-                    <a:p>
-                      <a:r>
-                        <a:rPr sz="1100"/>
-                        <a:t>$0</a:t>
-                      </a:r>
-                    </a:p>
-                  </a:txBody>
-                  <a:tcPr>
-                    <a:solidFill>
-                      <a:srgbClr val="E7E6E6"/>
-                    </a:solidFill>
-                  </a:tcPr>
-                </a:tc>
-              </a:tr>
-              <a:tr h="370840">
-                <a:tc>
-                  <a:txBody>
-                    <a:bodyPr/>
-                    <a:lstStyle/>
-                    <a:p>
-                      <a:r>
-                        <a:rPr b="1" sz="1100"/>
-                        <a:t>TOTAL INVESTMENT</a:t>
-                      </a:r>
-                    </a:p>
-                  </a:txBody>
-                  <a:tcPr>
-                    <a:solidFill>
-                      <a:srgbClr val="E7E6E6"/>
-                    </a:solidFill>
-                  </a:tcPr>
-                </a:tc>
-                <a:tc>
-                  <a:txBody>
-                    <a:bodyPr/>
-                    <a:lstStyle/>
-                    <a:p>
-                      <a:r>
-                        <a:rPr b="1" sz="1100"/>
-                        <a:t>$84,175</a:t>
-                      </a:r>
-                    </a:p>
-                  </a:txBody>
-                  <a:tcPr>
-                    <a:solidFill>
-                      <a:srgbClr val="E7E6E6"/>
-                    </a:solidFill>
-                  </a:tcPr>
-                </a:tc>
-                <a:tc>
-                  <a:txBody>
-                    <a:bodyPr/>
-                    <a:lstStyle/>
-                    <a:p>
-                      <a:r>
-                        <a:rPr b="1" sz="1100"/>
-                        <a:t>($5,990)</a:t>
-                      </a:r>
-                    </a:p>
-                  </a:txBody>
-                  <a:tcPr>
-                    <a:solidFill>
-                      <a:srgbClr val="E7E6E6"/>
-                    </a:solidFill>
-                  </a:tcPr>
-                </a:tc>
-                <a:tc>
-                  <a:txBody>
-                    <a:bodyPr/>
-                    <a:lstStyle/>
-                    <a:p>
-                      <a:r>
-                        <a:rPr b="1" sz="1100"/>
-                        <a:t>$78,185</a:t>
-                      </a:r>
-                    </a:p>
-                  </a:txBody>
-                  <a:tcPr>
-                    <a:solidFill>
-                      <a:srgbClr val="E7E6E6"/>
-                    </a:solidFill>
-                  </a:tcPr>
-                </a:tc>
-                <a:tc>
-                  <a:txBody>
-                    <a:bodyPr/>
-                    <a:lstStyle/>
-                    <a:p>
-                      <a:r>
-                        <a:rPr b="1" sz="1100"/>
-                        <a:t>$19,875</a:t>
-                      </a:r>
-                    </a:p>
-                  </a:txBody>
-                  <a:tcPr>
-                    <a:solidFill>
-                      <a:srgbClr val="E7E6E6"/>
-                    </a:solidFill>
-                  </a:tcPr>
-                </a:tc>
-                <a:tc>
-                  <a:txBody>
-                    <a:bodyPr/>
-                    <a:lstStyle/>
-                    <a:p>
-                      <a:r>
-                        <a:rPr b="1" sz="1100"/>
-                        <a:t>$19,875</a:t>
-                      </a:r>
-                    </a:p>
-                  </a:txBody>
-                  <a:tcPr>
-                    <a:solidFill>
-                      <a:srgbClr val="E7E6E6"/>
-                    </a:solidFill>
-                  </a:tcPr>
-                </a:tc>
-                <a:tc>
-                  <a:txBody>
-                    <a:bodyPr/>
-                    <a:lstStyle/>
-                    <a:p>
-                      <a:r>
-                        <a:rPr b="1" sz="1100"/>
-                        <a:t>$117,935</a:t>
-                      </a:r>
-                    </a:p>
-                  </a:txBody>
-                  <a:tcPr>
-                    <a:solidFill>
-                      <a:srgbClr val="E7E6E6"/>
-                    </a:solidFill>
-                  </a:tcPr>
-                </a:tc>
-              </a:tr>
-            </a:tbl>
-          </a:graphicData>
-        </a:graphic>
-      </p:graphicFrame>
+      <p:sp>
+        <p:nvSpPr>
+          <p:cNvPr id="4" name="Text Placeholder 3"/>
+          <p:cNvSpPr>
+            <a:spLocks noGrp="1"/>
+          </p:cNvSpPr>
+          <p:nvPr>
+            <p:ph type="body" idx="16" sz="quarter"/>
+          </p:nvPr>
+        </p:nvSpPr>
+        <p:spPr/>
+        <p:txBody>
+          <a:bodyPr/>
+          <a:lstStyle/>
+          <a:p>
+            <a:pPr/>
+            <a:r>
+              <a:rPr b="1"/>
+              <a:t>What We Bring</a:t>
+            </a:r>
+          </a:p>
+          <a:p>
+            <a:pPr lvl="1"/>
+            <a:r>
+              <a:t>15+ years delivering enterprise technology solutions</a:t>
+            </a:r>
+          </a:p>
+          <a:p>
+            <a:pPr lvl="1"/>
+            <a:r>
+              <a:t>200+ successful implementations for Fortune 500 companies</a:t>
+            </a:r>
+          </a:p>
+          <a:p>
+            <a:pPr lvl="1"/>
+            <a:r>
+              <a:t>Premier partnerships with AWS, Azure, Google Cloud</a:t>
+            </a:r>
+          </a:p>
+          <a:p>
+            <a:pPr lvl="1"/>
+            <a:r>
+              <a:t>Certified solution architects with 10+ years expertise</a:t>
+            </a:r>
+          </a:p>
+          <a:p>
+            <a:pPr lvl="1"/>
+            <a:r>
+              <a:t>24/7 support with 99.5% SLA guarantee</a:t>
+            </a:r>
+          </a:p>
+        </p:txBody>
+      </p:sp>
+      <p:sp>
+        <p:nvSpPr>
+          <p:cNvPr id="5" name="Text Placeholder 4"/>
+          <p:cNvSpPr>
+            <a:spLocks noGrp="1"/>
+          </p:cNvSpPr>
+          <p:nvPr>
+            <p:ph type="body" idx="17" sz="quarter"/>
+          </p:nvPr>
+        </p:nvSpPr>
+        <p:spPr/>
+        <p:txBody>
+          <a:bodyPr/>
+          <a:lstStyle/>
+          <a:p>
+            <a:pPr/>
+            <a:r>
+              <a:rPr b="1"/>
+              <a:t>Value to You</a:t>
+            </a:r>
+          </a:p>
+          <a:p>
+            <a:pPr lvl="1"/>
+            <a:r>
+              <a:t>Proven methodology reduces implementation risk by 60%</a:t>
+            </a:r>
+          </a:p>
+          <a:p>
+            <a:pPr lvl="1"/>
+            <a:r>
+              <a:t>Pre-built accelerators fast-track your deployment</a:t>
+            </a:r>
+          </a:p>
+          <a:p>
+            <a:pPr lvl="1"/>
+            <a:r>
+              <a:t>Direct vendor escalation and early-access programs</a:t>
+            </a:r>
+          </a:p>
+          <a:p>
+            <a:pPr lvl="1"/>
+            <a:r>
+              <a:t>Comprehensive skills transfer for team self-sufficiency</a:t>
+            </a:r>
+          </a:p>
+          <a:p>
+            <a:pPr lvl="1"/>
+            <a:r>
+              <a:t>Best practices from 200+ implementations</a:t>
+            </a:r>
+          </a:p>
+        </p:txBody>
+      </p:sp>
       <p:pic>
         <p:nvPicPr>
-          <p:cNvPr id="5" name="Picture 4" descr="eo-framework-logo-real.png"/>
+          <p:cNvPr id="6" name="Picture 5" descr="eo-framework-logo-real.png"/>
           <p:cNvPicPr>
             <a:picLocks noChangeAspect="1"/>
           </p:cNvPicPr>
@@ -5721,8 +5992,10 @@
           <a:bodyPr/>
           <a:lstStyle/>
           <a:p>
-            <a:r>
-              <a:t>Next Steps</a:t>
+            <a:pPr algn="l"/>
+            <a:r>
+              <a:rPr b="1"/>
+              <a:t>Investment Summary</a:t>
             </a:r>
           </a:p>
         </p:txBody>
@@ -5739,99 +6012,316 @@
         </p:nvPicPr>
         <p:blipFill>
           <a:blip r:embed="rId2"/>
-          <a:srcRect t="6762" b="6762"/>
+          <a:srcRect t="6404" b="6404"/>
           <a:stretch>
             <a:fillRect/>
           </a:stretch>
         </p:blipFill>
         <p:spPr/>
       </p:pic>
-      <p:sp>
-        <p:nvSpPr>
-          <p:cNvPr id="4" name="Text Placeholder 3"/>
-          <p:cNvSpPr>
-            <a:spLocks noGrp="1"/>
-          </p:cNvSpPr>
-          <p:nvPr>
-            <p:ph type="body" idx="14" sz="quarter"/>
-          </p:nvPr>
-        </p:nvSpPr>
-        <p:spPr/>
-        <p:txBody>
-          <a:bodyPr/>
-          <a:lstStyle/>
-          <a:p>
-            <a:pPr/>
-            <a:r>
-              <a:rPr b="1"/>
-              <a:t>Decision:</a:t>
-            </a:r>
-            <a:r>
-              <a:t> [Specific decision needed by when]</a:t>
-            </a:r>
-          </a:p>
-          <a:p>
-            <a:pPr/>
-            <a:r>
-              <a:rPr b="1"/>
-              <a:t>Kickoff:</a:t>
-            </a:r>
-            <a:r>
-              <a:t> [Target start date]</a:t>
-            </a:r>
-          </a:p>
-          <a:p>
-            <a:pPr/>
-            <a:r>
-              <a:rPr b="1"/>
-              <a:t>Team Formation:</a:t>
-            </a:r>
-            <a:r>
-              <a:t> [Key team members required]</a:t>
-            </a:r>
-          </a:p>
-          <a:p>
-            <a:pPr/>
-            <a:r>
-              <a:rPr b="1"/>
-              <a:t>Week 1:</a:t>
-            </a:r>
-            <a:r>
-              <a:t> Contract finalization and legal review</a:t>
-            </a:r>
-          </a:p>
-          <a:p>
-            <a:pPr/>
-            <a:r>
-              <a:rPr b="1"/>
-              <a:t>Week 2:</a:t>
-            </a:r>
-            <a:r>
-              <a:t> Project initiation &amp; planning kickoff</a:t>
-            </a:r>
-          </a:p>
-          <a:p>
-            <a:pPr/>
-            <a:r>
-              <a:rPr b="1"/>
-              <a:t>Week 3:</a:t>
-            </a:r>
-            <a:r>
-              <a:t> Environment setup and access provisioning</a:t>
-            </a:r>
-          </a:p>
-          <a:p>
-            <a:pPr/>
-            <a:r>
-              <a:rPr b="1"/>
-              <a:t>Week 4:</a:t>
-            </a:r>
-            <a:r>
-              <a:t> Initial implementation begins</a:t>
-            </a:r>
-          </a:p>
-        </p:txBody>
-      </p:sp>
+      <p:graphicFrame>
+        <p:nvGraphicFramePr>
+          <p:cNvPr id="4" name="Table Placeholder 3"/>
+          <p:cNvGraphicFramePr>
+            <a:graphicFrameLocks noGrp="1"/>
+          </p:cNvGraphicFramePr>
+          <p:nvPr>
+            <p:ph type="tbl" idx="14" sz="quarter"/>
+          </p:nvPr>
+        </p:nvGraphicFramePr>
+        <p:xfrm>
+          <a:off x="256855" y="677011"/>
+          <a:ext cx="8710929" cy="741680"/>
+        </p:xfrm>
+        <a:graphic>
+          <a:graphicData uri="http://schemas.openxmlformats.org/drawingml/2006/table">
+            <a:tbl>
+              <a:tblPr firstRow="1" bandRow="1">
+                <a:tableStyleId>{5C22544A-7EE6-4342-B048-85BDC9FD1C3A}</a:tableStyleId>
+              </a:tblPr>
+              <a:tblGrid>
+                <a:gridCol w="2177733"/>
+                <a:gridCol w="1306639"/>
+                <a:gridCol w="1306639"/>
+                <a:gridCol w="1306639"/>
+                <a:gridCol w="871093"/>
+                <a:gridCol w="871093"/>
+                <a:gridCol w="871093"/>
+              </a:tblGrid>
+              <a:tr h="370840">
+                <a:tc>
+                  <a:txBody>
+                    <a:bodyPr/>
+                    <a:lstStyle/>
+                    <a:p>
+                      <a:r>
+                        <a:rPr sz="1400">
+                          <a:solidFill>
+                            <a:srgbClr val="FFFFFF"/>
+                          </a:solidFill>
+                        </a:rPr>
+                        <a:t>Cost Category</a:t>
+                      </a:r>
+                    </a:p>
+                  </a:txBody>
+                  <a:tcPr>
+                    <a:solidFill>
+                      <a:srgbClr val="A01C02"/>
+                    </a:solidFill>
+                  </a:tcPr>
+                </a:tc>
+                <a:tc>
+                  <a:txBody>
+                    <a:bodyPr/>
+                    <a:lstStyle/>
+                    <a:p>
+                      <a:r>
+                        <a:rPr sz="1400">
+                          <a:solidFill>
+                            <a:srgbClr val="FFFFFF"/>
+                          </a:solidFill>
+                        </a:rPr>
+                        <a:t>Year 1 List</a:t>
+                      </a:r>
+                    </a:p>
+                  </a:txBody>
+                  <a:tcPr>
+                    <a:solidFill>
+                      <a:srgbClr val="A01C02"/>
+                    </a:solidFill>
+                  </a:tcPr>
+                </a:tc>
+                <a:tc>
+                  <a:txBody>
+                    <a:bodyPr/>
+                    <a:lstStyle/>
+                    <a:p>
+                      <a:r>
+                        <a:rPr sz="1400">
+                          <a:solidFill>
+                            <a:srgbClr val="FFFFFF"/>
+                          </a:solidFill>
+                        </a:rPr>
+                        <a:t>Provider/Partner Credits</a:t>
+                      </a:r>
+                    </a:p>
+                  </a:txBody>
+                  <a:tcPr>
+                    <a:solidFill>
+                      <a:srgbClr val="A01C02"/>
+                    </a:solidFill>
+                  </a:tcPr>
+                </a:tc>
+                <a:tc>
+                  <a:txBody>
+                    <a:bodyPr/>
+                    <a:lstStyle/>
+                    <a:p>
+                      <a:r>
+                        <a:rPr sz="1400">
+                          <a:solidFill>
+                            <a:srgbClr val="FFFFFF"/>
+                          </a:solidFill>
+                        </a:rPr>
+                        <a:t>Year 1 Net</a:t>
+                      </a:r>
+                    </a:p>
+                  </a:txBody>
+                  <a:tcPr>
+                    <a:solidFill>
+                      <a:srgbClr val="A01C02"/>
+                    </a:solidFill>
+                  </a:tcPr>
+                </a:tc>
+                <a:tc>
+                  <a:txBody>
+                    <a:bodyPr/>
+                    <a:lstStyle/>
+                    <a:p>
+                      <a:r>
+                        <a:rPr sz="1400">
+                          <a:solidFill>
+                            <a:srgbClr val="FFFFFF"/>
+                          </a:solidFill>
+                        </a:rPr>
+                        <a:t>Year 2</a:t>
+                      </a:r>
+                    </a:p>
+                  </a:txBody>
+                  <a:tcPr>
+                    <a:solidFill>
+                      <a:srgbClr val="A01C02"/>
+                    </a:solidFill>
+                  </a:tcPr>
+                </a:tc>
+                <a:tc>
+                  <a:txBody>
+                    <a:bodyPr/>
+                    <a:lstStyle/>
+                    <a:p>
+                      <a:r>
+                        <a:rPr sz="1400">
+                          <a:solidFill>
+                            <a:srgbClr val="FFFFFF"/>
+                          </a:solidFill>
+                        </a:rPr>
+                        <a:t>Year 3</a:t>
+                      </a:r>
+                    </a:p>
+                  </a:txBody>
+                  <a:tcPr>
+                    <a:solidFill>
+                      <a:srgbClr val="A01C02"/>
+                    </a:solidFill>
+                  </a:tcPr>
+                </a:tc>
+                <a:tc>
+                  <a:txBody>
+                    <a:bodyPr/>
+                    <a:lstStyle/>
+                    <a:p>
+                      <a:r>
+                        <a:rPr sz="1400">
+                          <a:solidFill>
+                            <a:srgbClr val="FFFFFF"/>
+                          </a:solidFill>
+                        </a:rPr>
+                        <a:t>3-Year Total</a:t>
+                      </a:r>
+                    </a:p>
+                  </a:txBody>
+                  <a:tcPr>
+                    <a:solidFill>
+                      <a:srgbClr val="A01C02"/>
+                    </a:solidFill>
+                  </a:tcPr>
+                </a:tc>
+              </a:tr>
+              <a:tr h="370840">
+                <a:tc>
+                  <a:txBody>
+                    <a:bodyPr/>
+                    <a:lstStyle/>
+                    <a:p>
+                      <a:r>
+                        <a:rPr b="1" sz="1100"/>
+                        <a:t>TOTAL INVESTMENT</a:t>
+                      </a:r>
+                    </a:p>
+                  </a:txBody>
+                  <a:tcPr>
+                    <a:solidFill>
+                      <a:srgbClr val="E7E6E6"/>
+                    </a:solidFill>
+                  </a:tcPr>
+                </a:tc>
+                <a:tc>
+                  <a:txBody>
+                    <a:bodyPr/>
+                    <a:lstStyle/>
+                    <a:p>
+                      <a:r>
+                        <a:rPr b="1" sz="1100"/>
+                        <a:t>$0</a:t>
+                      </a:r>
+                    </a:p>
+                  </a:txBody>
+                  <a:tcPr>
+                    <a:solidFill>
+                      <a:srgbClr val="E7E6E6"/>
+                    </a:solidFill>
+                  </a:tcPr>
+                </a:tc>
+                <a:tc>
+                  <a:txBody>
+                    <a:bodyPr/>
+                    <a:lstStyle/>
+                    <a:p>
+                      <a:r>
+                        <a:rPr b="1" sz="1100"/>
+                        <a:t>$0</a:t>
+                      </a:r>
+                    </a:p>
+                  </a:txBody>
+                  <a:tcPr>
+                    <a:solidFill>
+                      <a:srgbClr val="E7E6E6"/>
+                    </a:solidFill>
+                  </a:tcPr>
+                </a:tc>
+                <a:tc>
+                  <a:txBody>
+                    <a:bodyPr/>
+                    <a:lstStyle/>
+                    <a:p>
+                      <a:r>
+                        <a:rPr b="1" sz="1100"/>
+                        <a:t>$0</a:t>
+                      </a:r>
+                    </a:p>
+                  </a:txBody>
+                  <a:tcPr>
+                    <a:solidFill>
+                      <a:srgbClr val="E7E6E6"/>
+                    </a:solidFill>
+                  </a:tcPr>
+                </a:tc>
+                <a:tc>
+                  <a:txBody>
+                    <a:bodyPr/>
+                    <a:lstStyle/>
+                    <a:p>
+                      <a:r>
+                        <a:rPr b="1" sz="1100"/>
+                        <a:t>$0</a:t>
+                      </a:r>
+                    </a:p>
+                  </a:txBody>
+                  <a:tcPr>
+                    <a:solidFill>
+                      <a:srgbClr val="E7E6E6"/>
+                    </a:solidFill>
+                  </a:tcPr>
+                </a:tc>
+                <a:tc>
+                  <a:txBody>
+                    <a:bodyPr/>
+                    <a:lstStyle/>
+                    <a:p>
+                      <a:r>
+                        <a:rPr b="1" sz="1100"/>
+                        <a:t>$0</a:t>
+                      </a:r>
+                    </a:p>
+                  </a:txBody>
+                  <a:tcPr>
+                    <a:solidFill>
+                      <a:srgbClr val="E7E6E6"/>
+                    </a:solidFill>
+                  </a:tcPr>
+                </a:tc>
+                <a:tc>
+                  <a:txBody>
+                    <a:bodyPr/>
+                    <a:lstStyle/>
+                    <a:p>
+                      <a:r>
+                        <a:rPr b="1" sz="1100"/>
+                        <a:t>$0</a:t>
+                      </a:r>
+                    </a:p>
+                  </a:txBody>
+                  <a:tcPr>
+                    <a:solidFill>
+                      <a:srgbClr val="E7E6E6"/>
+                    </a:solidFill>
+                  </a:tcPr>
+                </a:tc>
+              </a:tr>
+            </a:tbl>
+          </a:graphicData>
+        </a:graphic>
+      </p:graphicFrame>
       <p:pic>
         <p:nvPicPr>
           <p:cNvPr id="5" name="Picture 4" descr="eo-framework-logo-real.png"/>

</xml_diff>

<commit_message>
Apply 5-column Engagement Scope layout to solution-template, AWS, and Azure solutions
Updated all solution-briefing.md and regenerated PPTX files for:
- Solution template (15 parameters: 8 left + 7 right)
- AWS solutions (3): intelligent-document-processing, disaster-recovery-web-application, onpremise-to-cloud-migration
- Azure solutions (6): document-intelligence, enterprise-landing-zone, sentinel-siem, enterprise-platform, virtual-desktop, virtual-wan-global

All solutions now use:
- 5-column format: Parameter | Scope | [spacer] | Parameter | Scope
- Auto-balanced distribution (16 params → 8+8, 15 params → 8+7)
- Column widths: 18%, 29%, 5%, 18%, 30%
- Subtle spacer column for visual separation
- Bolded parameters for easy scanning

Total: 10 solutions updated with new professional layout
</commit_message>
<xml_diff>
--- a/solution-template/sample-provider/sample-category/sample-solution/presales/solution-briefing.pptx
+++ b/solution-template/sample-provider/sample-category/sample-solution/presales/solution-briefing.pptx
@@ -3361,7 +3361,7 @@
           <a:lstStyle/>
           <a:p>
             <a:r>
-              <a:t>Alison Smith | November 16, 2025</a:t>
+              <a:t>Alison Smith | November 17, 2025</a:t>
             </a:r>
           </a:p>
         </p:txBody>
@@ -3938,7 +3938,7 @@
         </p:nvGraphicFramePr>
         <p:xfrm>
           <a:off x="256855" y="677011"/>
-          <a:ext cx="8710931" cy="5933440"/>
+          <a:ext cx="8710929" cy="3337560"/>
         </p:xfrm>
         <a:graphic>
           <a:graphicData uri="http://schemas.openxmlformats.org/drawingml/2006/table">
@@ -3947,32 +3947,13 @@
                 <a:tableStyleId>{5C22544A-7EE6-4342-B048-85BDC9FD1C3A}</a:tableStyleId>
               </a:tblPr>
               <a:tblGrid>
+                <a:gridCol w="1567967"/>
+                <a:gridCol w="2526170"/>
+                <a:gridCol w="435546"/>
+                <a:gridCol w="1567967"/>
                 <a:gridCol w="2613279"/>
-                <a:gridCol w="3048826"/>
-                <a:gridCol w="3048826"/>
               </a:tblGrid>
               <a:tr h="370840">
-                <a:tc>
-                  <a:txBody>
-                    <a:bodyPr/>
-                    <a:lstStyle/>
-                    <a:p>
-                      <a:r>
-                        <a:rPr sz="1400">
-                          <a:solidFill>
-                            <a:srgbClr val="FFFFFF"/>
-                          </a:solidFill>
-                        </a:rPr>
-                        <a:t>Category</a:t>
-                      </a:r>
-                    </a:p>
-                  </a:txBody>
-                  <a:tcPr>
-                    <a:solidFill>
-                      <a:srgbClr val="A01C02"/>
-                    </a:solidFill>
-                  </a:tcPr>
-                </a:tc>
                 <a:tc>
                   <a:txBody>
                     <a:bodyPr/>
@@ -4015,6 +3996,65 @@
                     </a:solidFill>
                   </a:tcPr>
                 </a:tc>
+                <a:tc>
+                  <a:txBody>
+                    <a:bodyPr/>
+                    <a:lstStyle/>
+                    <a:p/>
+                  </a:txBody>
+                  <a:tcPr>
+                    <a:solidFill>
+                      <a:srgbClr val="FFFFFF"/>
+                    </a:solidFill>
+                    <a:lnL w="12700">
+                      <a:solidFill>
+                        <a:srgbClr val="D0D0D0"/>
+                      </a:solidFill>
+                    </a:lnL>
+                  </a:tcPr>
+                </a:tc>
+                <a:tc>
+                  <a:txBody>
+                    <a:bodyPr/>
+                    <a:lstStyle/>
+                    <a:p>
+                      <a:r>
+                        <a:rPr sz="1400">
+                          <a:solidFill>
+                            <a:srgbClr val="FFFFFF"/>
+                          </a:solidFill>
+                        </a:rPr>
+                        <a:t>Parameter</a:t>
+                      </a:r>
+                    </a:p>
+                  </a:txBody>
+                  <a:tcPr>
+                    <a:solidFill>
+                      <a:srgbClr val="A01C02"/>
+                    </a:solidFill>
+                  </a:tcPr>
+                </a:tc>
+                <a:tc>
+                  <a:txBody>
+                    <a:bodyPr/>
+                    <a:lstStyle/>
+                    <a:p>
+                      <a:r>
+                        <a:rPr sz="1400">
+                          <a:solidFill>
+                            <a:srgbClr val="FFFFFF"/>
+                          </a:solidFill>
+                        </a:rPr>
+                        <a:t>Scope</a:t>
+                      </a:r>
+                    </a:p>
+                  </a:txBody>
+                  <a:tcPr>
+                    <a:solidFill>
+                      <a:srgbClr val="A01C02"/>
+                    </a:solidFill>
+                  </a:tcPr>
+                </a:tc>
               </a:tr>
               <a:tr h="370840">
                 <a:tc>
@@ -4023,25 +4063,8 @@
                     <a:lstStyle/>
                     <a:p>
                       <a:r>
-                        <a:rPr sz="1100"/>
-                        <a:t>Solution Scope</a:t>
-                      </a:r>
-                    </a:p>
-                  </a:txBody>
-                  <a:tcPr>
-                    <a:solidFill>
-                      <a:srgbClr val="E7E6E6"/>
-                    </a:solidFill>
-                  </a:tcPr>
-                </a:tc>
-                <a:tc>
-                  <a:txBody>
-                    <a:bodyPr/>
-                    <a:lstStyle/>
-                    <a:p>
-                      <a:r>
-                        <a:rPr sz="1100"/>
-                        <a:t>Primary Features/Capabilities</a:t>
+                        <a:rPr b="1" sz="1100"/>
+                        <a:t>Primary Features</a:t>
                       </a:r>
                     </a:p>
                   </a:txBody>
@@ -4068,8 +4091,40 @@
                     </a:solidFill>
                   </a:tcPr>
                 </a:tc>
-              </a:tr>
-              <a:tr h="370840">
+                <a:tc>
+                  <a:txBody>
+                    <a:bodyPr/>
+                    <a:lstStyle/>
+                    <a:p/>
+                  </a:txBody>
+                  <a:tcPr>
+                    <a:solidFill>
+                      <a:srgbClr val="FFFFFF"/>
+                    </a:solidFill>
+                    <a:lnL w="12700">
+                      <a:solidFill>
+                        <a:srgbClr val="D0D0D0"/>
+                      </a:solidFill>
+                    </a:lnL>
+                  </a:tcPr>
+                </a:tc>
+                <a:tc>
+                  <a:txBody>
+                    <a:bodyPr/>
+                    <a:lstStyle/>
+                    <a:p>
+                      <a:r>
+                        <a:rPr b="1" sz="1100"/>
+                        <a:t>Deployment Regions</a:t>
+                      </a:r>
+                    </a:p>
+                  </a:txBody>
+                  <a:tcPr>
+                    <a:solidFill>
+                      <a:srgbClr val="E7E6E6"/>
+                    </a:solidFill>
+                  </a:tcPr>
+                </a:tc>
                 <a:tc>
                   <a:txBody>
                     <a:bodyPr/>
@@ -4077,7 +4132,7 @@
                     <a:p>
                       <a:r>
                         <a:rPr sz="1100"/>
-                        <a:t>Solution Scope</a:t>
+                        <a:t>Single region</a:t>
                       </a:r>
                     </a:p>
                   </a:txBody>
@@ -4087,13 +4142,15 @@
                     </a:solidFill>
                   </a:tcPr>
                 </a:tc>
+              </a:tr>
+              <a:tr h="370840">
                 <a:tc>
                   <a:txBody>
                     <a:bodyPr/>
                     <a:lstStyle/>
                     <a:p>
                       <a:r>
-                        <a:rPr sz="1100"/>
+                        <a:rPr b="1" sz="1100"/>
                         <a:t>Customization Level</a:t>
                       </a:r>
                     </a:p>
@@ -4121,8 +4178,40 @@
                     </a:solidFill>
                   </a:tcPr>
                 </a:tc>
-              </a:tr>
-              <a:tr h="370840">
+                <a:tc>
+                  <a:txBody>
+                    <a:bodyPr/>
+                    <a:lstStyle/>
+                    <a:p/>
+                  </a:txBody>
+                  <a:tcPr>
+                    <a:solidFill>
+                      <a:srgbClr val="FFFFFF"/>
+                    </a:solidFill>
+                    <a:lnL w="12700">
+                      <a:solidFill>
+                        <a:srgbClr val="D0D0D0"/>
+                      </a:solidFill>
+                    </a:lnL>
+                  </a:tcPr>
+                </a:tc>
+                <a:tc>
+                  <a:txBody>
+                    <a:bodyPr/>
+                    <a:lstStyle/>
+                    <a:p>
+                      <a:r>
+                        <a:rPr b="1" sz="1100"/>
+                        <a:t>Availability</a:t>
+                      </a:r>
+                    </a:p>
+                  </a:txBody>
+                  <a:tcPr>
+                    <a:solidFill>
+                      <a:srgbClr val="E7E6E6"/>
+                    </a:solidFill>
+                  </a:tcPr>
+                </a:tc>
                 <a:tc>
                   <a:txBody>
                     <a:bodyPr/>
@@ -4130,7 +4219,7 @@
                     <a:p>
                       <a:r>
                         <a:rPr sz="1100"/>
-                        <a:t>Integration</a:t>
+                        <a:t>Standard (99.5% SLA)</a:t>
                       </a:r>
                     </a:p>
                   </a:txBody>
@@ -4140,14 +4229,16 @@
                     </a:solidFill>
                   </a:tcPr>
                 </a:tc>
+              </a:tr>
+              <a:tr h="370840">
                 <a:tc>
                   <a:txBody>
                     <a:bodyPr/>
                     <a:lstStyle/>
                     <a:p>
                       <a:r>
-                        <a:rPr sz="1100"/>
-                        <a:t>External System Integrations</a:t>
+                        <a:rPr b="1" sz="1100"/>
+                        <a:t>External Integrations</a:t>
                       </a:r>
                     </a:p>
                   </a:txBody>
@@ -4174,8 +4265,40 @@
                     </a:solidFill>
                   </a:tcPr>
                 </a:tc>
-              </a:tr>
-              <a:tr h="370840">
+                <a:tc>
+                  <a:txBody>
+                    <a:bodyPr/>
+                    <a:lstStyle/>
+                    <a:p/>
+                  </a:txBody>
+                  <a:tcPr>
+                    <a:solidFill>
+                      <a:srgbClr val="FFFFFF"/>
+                    </a:solidFill>
+                    <a:lnL w="12700">
+                      <a:solidFill>
+                        <a:srgbClr val="D0D0D0"/>
+                      </a:solidFill>
+                    </a:lnL>
+                  </a:tcPr>
+                </a:tc>
+                <a:tc>
+                  <a:txBody>
+                    <a:bodyPr/>
+                    <a:lstStyle/>
+                    <a:p>
+                      <a:r>
+                        <a:rPr b="1" sz="1100"/>
+                        <a:t>Infrastructure</a:t>
+                      </a:r>
+                    </a:p>
+                  </a:txBody>
+                  <a:tcPr>
+                    <a:solidFill>
+                      <a:srgbClr val="E7E6E6"/>
+                    </a:solidFill>
+                  </a:tcPr>
+                </a:tc>
                 <a:tc>
                   <a:txBody>
                     <a:bodyPr/>
@@ -4183,7 +4306,7 @@
                     <a:p>
                       <a:r>
                         <a:rPr sz="1100"/>
-                        <a:t>Integration</a:t>
+                        <a:t>Basic single-tier</a:t>
                       </a:r>
                     </a:p>
                   </a:txBody>
@@ -4193,13 +4316,15 @@
                     </a:solidFill>
                   </a:tcPr>
                 </a:tc>
+              </a:tr>
+              <a:tr h="370840">
                 <a:tc>
                   <a:txBody>
                     <a:bodyPr/>
                     <a:lstStyle/>
                     <a:p>
                       <a:r>
-                        <a:rPr sz="1100"/>
+                        <a:rPr b="1" sz="1100"/>
                         <a:t>Data Sources</a:t>
                       </a:r>
                     </a:p>
@@ -4227,8 +4352,40 @@
                     </a:solidFill>
                   </a:tcPr>
                 </a:tc>
-              </a:tr>
-              <a:tr h="370840">
+                <a:tc>
+                  <a:txBody>
+                    <a:bodyPr/>
+                    <a:lstStyle/>
+                    <a:p/>
+                  </a:txBody>
+                  <a:tcPr>
+                    <a:solidFill>
+                      <a:srgbClr val="FFFFFF"/>
+                    </a:solidFill>
+                    <a:lnL w="12700">
+                      <a:solidFill>
+                        <a:srgbClr val="D0D0D0"/>
+                      </a:solidFill>
+                    </a:lnL>
+                  </a:tcPr>
+                </a:tc>
+                <a:tc>
+                  <a:txBody>
+                    <a:bodyPr/>
+                    <a:lstStyle/>
+                    <a:p>
+                      <a:r>
+                        <a:rPr b="1" sz="1100"/>
+                        <a:t>Security</a:t>
+                      </a:r>
+                    </a:p>
+                  </a:txBody>
+                  <a:tcPr>
+                    <a:solidFill>
+                      <a:srgbClr val="E7E6E6"/>
+                    </a:solidFill>
+                  </a:tcPr>
+                </a:tc>
                 <a:tc>
                   <a:txBody>
                     <a:bodyPr/>
@@ -4236,7 +4393,7 @@
                     <a:p>
                       <a:r>
                         <a:rPr sz="1100"/>
-                        <a:t>User Base</a:t>
+                        <a:t>Basic authentication and encryption</a:t>
                       </a:r>
                     </a:p>
                   </a:txBody>
@@ -4246,13 +4403,15 @@
                     </a:solidFill>
                   </a:tcPr>
                 </a:tc>
+              </a:tr>
+              <a:tr h="370840">
                 <a:tc>
                   <a:txBody>
                     <a:bodyPr/>
                     <a:lstStyle/>
                     <a:p>
                       <a:r>
-                        <a:rPr sz="1100"/>
+                        <a:rPr b="1" sz="1100"/>
                         <a:t>Total Users</a:t>
                       </a:r>
                     </a:p>
@@ -4280,8 +4439,40 @@
                     </a:solidFill>
                   </a:tcPr>
                 </a:tc>
-              </a:tr>
-              <a:tr h="370840">
+                <a:tc>
+                  <a:txBody>
+                    <a:bodyPr/>
+                    <a:lstStyle/>
+                    <a:p/>
+                  </a:txBody>
+                  <a:tcPr>
+                    <a:solidFill>
+                      <a:srgbClr val="FFFFFF"/>
+                    </a:solidFill>
+                    <a:lnL w="12700">
+                      <a:solidFill>
+                        <a:srgbClr val="D0D0D0"/>
+                      </a:solidFill>
+                    </a:lnL>
+                  </a:tcPr>
+                </a:tc>
+                <a:tc>
+                  <a:txBody>
+                    <a:bodyPr/>
+                    <a:lstStyle/>
+                    <a:p>
+                      <a:r>
+                        <a:rPr b="1" sz="1100"/>
+                        <a:t>Compliance</a:t>
+                      </a:r>
+                    </a:p>
+                  </a:txBody>
+                  <a:tcPr>
+                    <a:solidFill>
+                      <a:srgbClr val="E7E6E6"/>
+                    </a:solidFill>
+                  </a:tcPr>
+                </a:tc>
                 <a:tc>
                   <a:txBody>
                     <a:bodyPr/>
@@ -4289,7 +4480,7 @@
                     <a:p>
                       <a:r>
                         <a:rPr sz="1100"/>
-                        <a:t>User Base</a:t>
+                        <a:t>1-2 basic standards</a:t>
                       </a:r>
                     </a:p>
                   </a:txBody>
@@ -4299,13 +4490,15 @@
                     </a:solidFill>
                   </a:tcPr>
                 </a:tc>
+              </a:tr>
+              <a:tr h="370840">
                 <a:tc>
                   <a:txBody>
                     <a:bodyPr/>
                     <a:lstStyle/>
                     <a:p>
                       <a:r>
-                        <a:rPr sz="1100"/>
+                        <a:rPr b="1" sz="1100"/>
                         <a:t>User Roles</a:t>
                       </a:r>
                     </a:p>
@@ -4333,8 +4526,40 @@
                     </a:solidFill>
                   </a:tcPr>
                 </a:tc>
-              </a:tr>
-              <a:tr h="370840">
+                <a:tc>
+                  <a:txBody>
+                    <a:bodyPr/>
+                    <a:lstStyle/>
+                    <a:p/>
+                  </a:txBody>
+                  <a:tcPr>
+                    <a:solidFill>
+                      <a:srgbClr val="FFFFFF"/>
+                    </a:solidFill>
+                    <a:lnL w="12700">
+                      <a:solidFill>
+                        <a:srgbClr val="D0D0D0"/>
+                      </a:solidFill>
+                    </a:lnL>
+                  </a:tcPr>
+                </a:tc>
+                <a:tc>
+                  <a:txBody>
+                    <a:bodyPr/>
+                    <a:lstStyle/>
+                    <a:p>
+                      <a:r>
+                        <a:rPr b="1" sz="1100"/>
+                        <a:t>Performance</a:t>
+                      </a:r>
+                    </a:p>
+                  </a:txBody>
+                  <a:tcPr>
+                    <a:solidFill>
+                      <a:srgbClr val="E7E6E6"/>
+                    </a:solidFill>
+                  </a:tcPr>
+                </a:tc>
                 <a:tc>
                   <a:txBody>
                     <a:bodyPr/>
@@ -4342,7 +4567,7 @@
                     <a:p>
                       <a:r>
                         <a:rPr sz="1100"/>
-                        <a:t>Data Volume</a:t>
+                        <a:t>Standard performance</a:t>
                       </a:r>
                     </a:p>
                   </a:txBody>
@@ -4352,14 +4577,16 @@
                     </a:solidFill>
                   </a:tcPr>
                 </a:tc>
+              </a:tr>
+              <a:tr h="370840">
                 <a:tc>
                   <a:txBody>
                     <a:bodyPr/>
                     <a:lstStyle/>
                     <a:p>
                       <a:r>
-                        <a:rPr sz="1100"/>
-                        <a:t>Data Processing Volume</a:t>
+                        <a:rPr b="1" sz="1100"/>
+                        <a:t>Processing Volume</a:t>
                       </a:r>
                     </a:p>
                   </a:txBody>
@@ -4386,8 +4613,40 @@
                     </a:solidFill>
                   </a:tcPr>
                 </a:tc>
-              </a:tr>
-              <a:tr h="370840">
+                <a:tc>
+                  <a:txBody>
+                    <a:bodyPr/>
+                    <a:lstStyle/>
+                    <a:p/>
+                  </a:txBody>
+                  <a:tcPr>
+                    <a:solidFill>
+                      <a:srgbClr val="FFFFFF"/>
+                    </a:solidFill>
+                    <a:lnL w="12700">
+                      <a:solidFill>
+                        <a:srgbClr val="D0D0D0"/>
+                      </a:solidFill>
+                    </a:lnL>
+                  </a:tcPr>
+                </a:tc>
+                <a:tc>
+                  <a:txBody>
+                    <a:bodyPr/>
+                    <a:lstStyle/>
+                    <a:p>
+                      <a:r>
+                        <a:rPr b="1" sz="1100"/>
+                        <a:t>Environments</a:t>
+                      </a:r>
+                    </a:p>
+                  </a:txBody>
+                  <a:tcPr>
+                    <a:solidFill>
+                      <a:srgbClr val="E7E6E6"/>
+                    </a:solidFill>
+                  </a:tcPr>
+                </a:tc>
                 <a:tc>
                   <a:txBody>
                     <a:bodyPr/>
@@ -4395,7 +4654,7 @@
                     <a:p>
                       <a:r>
                         <a:rPr sz="1100"/>
-                        <a:t>Data Volume</a:t>
+                        <a:t>2 (dev, prod)</a:t>
                       </a:r>
                     </a:p>
                   </a:txBody>
@@ -4405,14 +4664,16 @@
                     </a:solidFill>
                   </a:tcPr>
                 </a:tc>
+              </a:tr>
+              <a:tr h="370840">
                 <a:tc>
                   <a:txBody>
                     <a:bodyPr/>
                     <a:lstStyle/>
                     <a:p>
                       <a:r>
-                        <a:rPr sz="1100"/>
-                        <a:t>Data Storage Requirements</a:t>
+                        <a:rPr b="1" sz="1100"/>
+                        <a:t>Data Storage</a:t>
                       </a:r>
                     </a:p>
                   </a:txBody>
@@ -4439,18 +4700,28 @@
                     </a:solidFill>
                   </a:tcPr>
                 </a:tc>
-              </a:tr>
-              <a:tr h="370840">
-                <a:tc>
-                  <a:txBody>
-                    <a:bodyPr/>
-                    <a:lstStyle/>
-                    <a:p>
-                      <a:r>
-                        <a:rPr sz="1100"/>
-                        <a:t>Technical Environment</a:t>
-                      </a:r>
-                    </a:p>
+                <a:tc>
+                  <a:txBody>
+                    <a:bodyPr/>
+                    <a:lstStyle/>
+                    <a:p/>
+                  </a:txBody>
+                  <a:tcPr>
+                    <a:solidFill>
+                      <a:srgbClr val="FFFFFF"/>
+                    </a:solidFill>
+                    <a:lnL w="12700">
+                      <a:solidFill>
+                        <a:srgbClr val="D0D0D0"/>
+                      </a:solidFill>
+                    </a:lnL>
+                  </a:tcPr>
+                </a:tc>
+                <a:tc>
+                  <a:txBody>
+                    <a:bodyPr/>
+                    <a:lstStyle/>
+                    <a:p/>
                   </a:txBody>
                   <a:tcPr>
                     <a:solidFill>
@@ -4462,347 +4733,7 @@
                   <a:txBody>
                     <a:bodyPr/>
                     <a:lstStyle/>
-                    <a:p>
-                      <a:r>
-                        <a:rPr sz="1100"/>
-                        <a:t>Deployment Regions</a:t>
-                      </a:r>
-                    </a:p>
-                  </a:txBody>
-                  <a:tcPr>
-                    <a:solidFill>
-                      <a:srgbClr val="E7E6E6"/>
-                    </a:solidFill>
-                  </a:tcPr>
-                </a:tc>
-                <a:tc>
-                  <a:txBody>
-                    <a:bodyPr/>
-                    <a:lstStyle/>
-                    <a:p>
-                      <a:r>
-                        <a:rPr sz="1100"/>
-                        <a:t>Single region</a:t>
-                      </a:r>
-                    </a:p>
-                  </a:txBody>
-                  <a:tcPr>
-                    <a:solidFill>
-                      <a:srgbClr val="E7E6E6"/>
-                    </a:solidFill>
-                  </a:tcPr>
-                </a:tc>
-              </a:tr>
-              <a:tr h="370840">
-                <a:tc>
-                  <a:txBody>
-                    <a:bodyPr/>
-                    <a:lstStyle/>
-                    <a:p>
-                      <a:r>
-                        <a:rPr sz="1100"/>
-                        <a:t>Technical Environment</a:t>
-                      </a:r>
-                    </a:p>
-                  </a:txBody>
-                  <a:tcPr>
-                    <a:solidFill>
-                      <a:srgbClr val="E7E6E6"/>
-                    </a:solidFill>
-                  </a:tcPr>
-                </a:tc>
-                <a:tc>
-                  <a:txBody>
-                    <a:bodyPr/>
-                    <a:lstStyle/>
-                    <a:p>
-                      <a:r>
-                        <a:rPr sz="1100"/>
-                        <a:t>Availability Requirements</a:t>
-                      </a:r>
-                    </a:p>
-                  </a:txBody>
-                  <a:tcPr>
-                    <a:solidFill>
-                      <a:srgbClr val="E7E6E6"/>
-                    </a:solidFill>
-                  </a:tcPr>
-                </a:tc>
-                <a:tc>
-                  <a:txBody>
-                    <a:bodyPr/>
-                    <a:lstStyle/>
-                    <a:p>
-                      <a:r>
-                        <a:rPr sz="1100"/>
-                        <a:t>Standard (99.5%)</a:t>
-                      </a:r>
-                    </a:p>
-                  </a:txBody>
-                  <a:tcPr>
-                    <a:solidFill>
-                      <a:srgbClr val="E7E6E6"/>
-                    </a:solidFill>
-                  </a:tcPr>
-                </a:tc>
-              </a:tr>
-              <a:tr h="370840">
-                <a:tc>
-                  <a:txBody>
-                    <a:bodyPr/>
-                    <a:lstStyle/>
-                    <a:p>
-                      <a:r>
-                        <a:rPr sz="1100"/>
-                        <a:t>Technical Environment</a:t>
-                      </a:r>
-                    </a:p>
-                  </a:txBody>
-                  <a:tcPr>
-                    <a:solidFill>
-                      <a:srgbClr val="E7E6E6"/>
-                    </a:solidFill>
-                  </a:tcPr>
-                </a:tc>
-                <a:tc>
-                  <a:txBody>
-                    <a:bodyPr/>
-                    <a:lstStyle/>
-                    <a:p>
-                      <a:r>
-                        <a:rPr sz="1100"/>
-                        <a:t>Infrastructure Complexity</a:t>
-                      </a:r>
-                    </a:p>
-                  </a:txBody>
-                  <a:tcPr>
-                    <a:solidFill>
-                      <a:srgbClr val="E7E6E6"/>
-                    </a:solidFill>
-                  </a:tcPr>
-                </a:tc>
-                <a:tc>
-                  <a:txBody>
-                    <a:bodyPr/>
-                    <a:lstStyle/>
-                    <a:p>
-                      <a:r>
-                        <a:rPr sz="1100"/>
-                        <a:t>Basic single-tier</a:t>
-                      </a:r>
-                    </a:p>
-                  </a:txBody>
-                  <a:tcPr>
-                    <a:solidFill>
-                      <a:srgbClr val="E7E6E6"/>
-                    </a:solidFill>
-                  </a:tcPr>
-                </a:tc>
-              </a:tr>
-              <a:tr h="370840">
-                <a:tc>
-                  <a:txBody>
-                    <a:bodyPr/>
-                    <a:lstStyle/>
-                    <a:p>
-                      <a:r>
-                        <a:rPr sz="1100"/>
-                        <a:t>Security &amp; Compliance</a:t>
-                      </a:r>
-                    </a:p>
-                  </a:txBody>
-                  <a:tcPr>
-                    <a:solidFill>
-                      <a:srgbClr val="E7E6E6"/>
-                    </a:solidFill>
-                  </a:tcPr>
-                </a:tc>
-                <a:tc>
-                  <a:txBody>
-                    <a:bodyPr/>
-                    <a:lstStyle/>
-                    <a:p>
-                      <a:r>
-                        <a:rPr sz="1100"/>
-                        <a:t>Security Requirements</a:t>
-                      </a:r>
-                    </a:p>
-                  </a:txBody>
-                  <a:tcPr>
-                    <a:solidFill>
-                      <a:srgbClr val="E7E6E6"/>
-                    </a:solidFill>
-                  </a:tcPr>
-                </a:tc>
-                <a:tc>
-                  <a:txBody>
-                    <a:bodyPr/>
-                    <a:lstStyle/>
-                    <a:p>
-                      <a:r>
-                        <a:rPr sz="1100"/>
-                        <a:t>Basic authentication and encryption</a:t>
-                      </a:r>
-                    </a:p>
-                  </a:txBody>
-                  <a:tcPr>
-                    <a:solidFill>
-                      <a:srgbClr val="E7E6E6"/>
-                    </a:solidFill>
-                  </a:tcPr>
-                </a:tc>
-              </a:tr>
-              <a:tr h="370840">
-                <a:tc>
-                  <a:txBody>
-                    <a:bodyPr/>
-                    <a:lstStyle/>
-                    <a:p>
-                      <a:r>
-                        <a:rPr sz="1100"/>
-                        <a:t>Security &amp; Compliance</a:t>
-                      </a:r>
-                    </a:p>
-                  </a:txBody>
-                  <a:tcPr>
-                    <a:solidFill>
-                      <a:srgbClr val="E7E6E6"/>
-                    </a:solidFill>
-                  </a:tcPr>
-                </a:tc>
-                <a:tc>
-                  <a:txBody>
-                    <a:bodyPr/>
-                    <a:lstStyle/>
-                    <a:p>
-                      <a:r>
-                        <a:rPr sz="1100"/>
-                        <a:t>Compliance Frameworks</a:t>
-                      </a:r>
-                    </a:p>
-                  </a:txBody>
-                  <a:tcPr>
-                    <a:solidFill>
-                      <a:srgbClr val="E7E6E6"/>
-                    </a:solidFill>
-                  </a:tcPr>
-                </a:tc>
-                <a:tc>
-                  <a:txBody>
-                    <a:bodyPr/>
-                    <a:lstStyle/>
-                    <a:p>
-                      <a:r>
-                        <a:rPr sz="1100"/>
-                        <a:t>1-2 basic standards</a:t>
-                      </a:r>
-                    </a:p>
-                  </a:txBody>
-                  <a:tcPr>
-                    <a:solidFill>
-                      <a:srgbClr val="E7E6E6"/>
-                    </a:solidFill>
-                  </a:tcPr>
-                </a:tc>
-              </a:tr>
-              <a:tr h="370840">
-                <a:tc>
-                  <a:txBody>
-                    <a:bodyPr/>
-                    <a:lstStyle/>
-                    <a:p>
-                      <a:r>
-                        <a:rPr sz="1100"/>
-                        <a:t>Performance</a:t>
-                      </a:r>
-                    </a:p>
-                  </a:txBody>
-                  <a:tcPr>
-                    <a:solidFill>
-                      <a:srgbClr val="E7E6E6"/>
-                    </a:solidFill>
-                  </a:tcPr>
-                </a:tc>
-                <a:tc>
-                  <a:txBody>
-                    <a:bodyPr/>
-                    <a:lstStyle/>
-                    <a:p>
-                      <a:r>
-                        <a:rPr sz="1100"/>
-                        <a:t>Performance Requirements</a:t>
-                      </a:r>
-                    </a:p>
-                  </a:txBody>
-                  <a:tcPr>
-                    <a:solidFill>
-                      <a:srgbClr val="E7E6E6"/>
-                    </a:solidFill>
-                  </a:tcPr>
-                </a:tc>
-                <a:tc>
-                  <a:txBody>
-                    <a:bodyPr/>
-                    <a:lstStyle/>
-                    <a:p>
-                      <a:r>
-                        <a:rPr sz="1100"/>
-                        <a:t>Standard performance</a:t>
-                      </a:r>
-                    </a:p>
-                  </a:txBody>
-                  <a:tcPr>
-                    <a:solidFill>
-                      <a:srgbClr val="E7E6E6"/>
-                    </a:solidFill>
-                  </a:tcPr>
-                </a:tc>
-              </a:tr>
-              <a:tr h="370840">
-                <a:tc>
-                  <a:txBody>
-                    <a:bodyPr/>
-                    <a:lstStyle/>
-                    <a:p>
-                      <a:r>
-                        <a:rPr sz="1100"/>
-                        <a:t>Environment</a:t>
-                      </a:r>
-                    </a:p>
-                  </a:txBody>
-                  <a:tcPr>
-                    <a:solidFill>
-                      <a:srgbClr val="E7E6E6"/>
-                    </a:solidFill>
-                  </a:tcPr>
-                </a:tc>
-                <a:tc>
-                  <a:txBody>
-                    <a:bodyPr/>
-                    <a:lstStyle/>
-                    <a:p>
-                      <a:r>
-                        <a:rPr sz="1100"/>
-                        <a:t>Deployment Environments</a:t>
-                      </a:r>
-                    </a:p>
-                  </a:txBody>
-                  <a:tcPr>
-                    <a:solidFill>
-                      <a:srgbClr val="E7E6E6"/>
-                    </a:solidFill>
-                  </a:tcPr>
-                </a:tc>
-                <a:tc>
-                  <a:txBody>
-                    <a:bodyPr/>
-                    <a:lstStyle/>
-                    <a:p>
-                      <a:r>
-                        <a:rPr sz="1100"/>
-                        <a:t>2 environments (dev prod)</a:t>
-                      </a:r>
-                    </a:p>
+                    <a:p/>
                   </a:txBody>
                   <a:tcPr>
                     <a:solidFill>

</xml_diff>

<commit_message>
Update solution-template to November 2025 infrastructure cost categories
- Standardize categories: Hardware, Cloud Services, Software Licenses,
  Connectivity, Support & Maintenance, Facilities
- Regenerate all presales documents with new category structure
- Add CLAUDE.md to .gitignore
</commit_message>
<xml_diff>
--- a/solution-template/sample-provider/sample-category/sample-solution/presales/solution-briefing.pptx
+++ b/solution-template/sample-provider/sample-category/sample-solution/presales/solution-briefing.pptx
@@ -118,6 +118,9 @@
     <p:ext uri="{EFAFB233-063F-42B5-8137-9DF3F51BA10A}">
       <p15:sldGuideLst xmlns:p15="http://schemas.microsoft.com/office/powerpoint/2012/main"/>
     </p:ext>
+    <p:ext uri="{2D200454-40CA-4A62-9FC3-DE9A4176ACB9}">
+      <p15:notesGuideLst xmlns:p15="http://schemas.microsoft.com/office/powerpoint/2012/main"/>
+    </p:ext>
   </p:extLst>
 </p:presentation>
 </file>
@@ -144,6 +147,59 @@
           <a:chExt cx="0" cy="0"/>
         </a:xfrm>
       </p:grpSpPr>
+      <p:sp>
+        <p:nvSpPr>
+          <p:cNvPr id="2" name="Slide Image Placeholder 1"/>
+          <p:cNvSpPr>
+            <a:spLocks noGrp="1" noRot="1" noChangeAspect="1"/>
+          </p:cNvSpPr>
+          <p:nvPr>
+            <p:ph type="sldImg"/>
+          </p:nvPr>
+        </p:nvSpPr>
+        <p:spPr>
+          <a:xfrm>
+            <a:off x="-171450" y="1143000"/>
+            <a:ext cx="5486400" cy="3086100"/>
+          </a:xfrm>
+          <a:prstGeom prst="rect">
+            <a:avLst/>
+          </a:prstGeom>
+          <a:noFill/>
+          <a:ln w="12700">
+            <a:solidFill>
+              <a:prstClr val="black"/>
+            </a:solidFill>
+          </a:ln>
+        </p:spPr>
+      </p:sp>
+      <p:sp>
+        <p:nvSpPr>
+          <p:cNvPr id="3" name="Notes Placeholder 2"/>
+          <p:cNvSpPr>
+            <a:spLocks noGrp="1"/>
+          </p:cNvSpPr>
+          <p:nvPr>
+            <p:ph type="body" idx="1"/>
+          </p:nvPr>
+        </p:nvSpPr>
+        <p:spPr>
+          <a:xfrm>
+            <a:off x="514350" y="4400550"/>
+            <a:ext cx="4114800" cy="3600450"/>
+          </a:xfrm>
+          <a:prstGeom prst="rect">
+            <a:avLst/>
+          </a:prstGeom>
+        </p:spPr>
+        <p:txBody>
+          <a:bodyPr/>
+          <a:lstStyle/>
+          <a:p>
+            <a:endParaRPr lang="en-US"/>
+          </a:p>
+        </p:txBody>
+      </p:sp>
     </p:spTree>
     <p:extLst>
       <p:ext uri="{BB962C8B-B14F-4D97-AF65-F5344CB8AC3E}">
@@ -637,6 +693,39 @@
       </p:grpSpPr>
       <p:sp>
         <p:nvSpPr>
+          <p:cNvPr id="12" name="Picture Placeholder 13">
+            <a:extLst>
+              <a:ext uri="{FF2B5EF4-FFF2-40B4-BE49-F238E27FC236}">
+                <a16:creationId xmlns:a16="http://schemas.microsoft.com/office/drawing/2014/main" id="{2DB97592-C4D5-B315-7F11-AA14F6EE8A62}"/>
+              </a:ext>
+            </a:extLst>
+          </p:cNvPr>
+          <p:cNvSpPr>
+            <a:spLocks noGrp="1"/>
+          </p:cNvSpPr>
+          <p:nvPr>
+            <p:ph type="pic" sz="quarter" idx="13"/>
+          </p:nvPr>
+        </p:nvSpPr>
+        <p:spPr>
+          <a:xfrm>
+            <a:off x="313593" y="4536078"/>
+            <a:ext cx="2143858" cy="529698"/>
+          </a:xfrm>
+          <a:prstGeom prst="rect">
+            <a:avLst/>
+          </a:prstGeom>
+        </p:spPr>
+        <p:txBody>
+          <a:bodyPr/>
+          <a:lstStyle/>
+          <a:p>
+            <a:endParaRPr lang="en-US" dirty="0"/>
+          </a:p>
+        </p:txBody>
+      </p:sp>
+      <p:sp>
+        <p:nvSpPr>
           <p:cNvPr id="3" name="Shape 1">
             <a:extLst>
               <a:ext uri="{FF2B5EF4-FFF2-40B4-BE49-F238E27FC236}">
@@ -726,39 +815,6 @@
               <a:rPr lang="en-US" dirty="0"/>
               <a:t>Slide Title</a:t>
             </a:r>
-          </a:p>
-        </p:txBody>
-      </p:sp>
-      <p:sp>
-        <p:nvSpPr>
-          <p:cNvPr id="12" name="Picture Placeholder 13">
-            <a:extLst>
-              <a:ext uri="{FF2B5EF4-FFF2-40B4-BE49-F238E27FC236}">
-                <a16:creationId xmlns:a16="http://schemas.microsoft.com/office/drawing/2014/main" id="{2DB97592-C4D5-B315-7F11-AA14F6EE8A62}"/>
-              </a:ext>
-            </a:extLst>
-          </p:cNvPr>
-          <p:cNvSpPr>
-            <a:spLocks noGrp="1"/>
-          </p:cNvSpPr>
-          <p:nvPr>
-            <p:ph type="pic" sz="quarter" idx="13"/>
-          </p:nvPr>
-        </p:nvSpPr>
-        <p:spPr>
-          <a:xfrm>
-            <a:off x="313593" y="4536078"/>
-            <a:ext cx="2143858" cy="529698"/>
-          </a:xfrm>
-          <a:prstGeom prst="rect">
-            <a:avLst/>
-          </a:prstGeom>
-        </p:spPr>
-        <p:txBody>
-          <a:bodyPr/>
-          <a:lstStyle/>
-          <a:p>
-            <a:endParaRPr lang="en-US" dirty="0"/>
           </a:p>
         </p:txBody>
       </p:sp>
@@ -915,6 +971,39 @@
       </p:grpSpPr>
       <p:sp>
         <p:nvSpPr>
+          <p:cNvPr id="12" name="Picture Placeholder 13">
+            <a:extLst>
+              <a:ext uri="{FF2B5EF4-FFF2-40B4-BE49-F238E27FC236}">
+                <a16:creationId xmlns:a16="http://schemas.microsoft.com/office/drawing/2014/main" id="{2DB97592-C4D5-B315-7F11-AA14F6EE8A62}"/>
+              </a:ext>
+            </a:extLst>
+          </p:cNvPr>
+          <p:cNvSpPr>
+            <a:spLocks noGrp="1"/>
+          </p:cNvSpPr>
+          <p:nvPr>
+            <p:ph type="pic" sz="quarter" idx="13"/>
+          </p:nvPr>
+        </p:nvSpPr>
+        <p:spPr>
+          <a:xfrm>
+            <a:off x="313593" y="4536078"/>
+            <a:ext cx="2143858" cy="529698"/>
+          </a:xfrm>
+          <a:prstGeom prst="rect">
+            <a:avLst/>
+          </a:prstGeom>
+        </p:spPr>
+        <p:txBody>
+          <a:bodyPr/>
+          <a:lstStyle/>
+          <a:p>
+            <a:endParaRPr lang="en-US" dirty="0"/>
+          </a:p>
+        </p:txBody>
+      </p:sp>
+      <p:sp>
+        <p:nvSpPr>
           <p:cNvPr id="3" name="Shape 1">
             <a:extLst>
               <a:ext uri="{FF2B5EF4-FFF2-40B4-BE49-F238E27FC236}">
@@ -1004,39 +1093,6 @@
               <a:rPr lang="en-US" dirty="0"/>
               <a:t>Bullet Points</a:t>
             </a:r>
-          </a:p>
-        </p:txBody>
-      </p:sp>
-      <p:sp>
-        <p:nvSpPr>
-          <p:cNvPr id="12" name="Picture Placeholder 13">
-            <a:extLst>
-              <a:ext uri="{FF2B5EF4-FFF2-40B4-BE49-F238E27FC236}">
-                <a16:creationId xmlns:a16="http://schemas.microsoft.com/office/drawing/2014/main" id="{2DB97592-C4D5-B315-7F11-AA14F6EE8A62}"/>
-              </a:ext>
-            </a:extLst>
-          </p:cNvPr>
-          <p:cNvSpPr>
-            <a:spLocks noGrp="1"/>
-          </p:cNvSpPr>
-          <p:nvPr>
-            <p:ph type="pic" sz="quarter" idx="13"/>
-          </p:nvPr>
-        </p:nvSpPr>
-        <p:spPr>
-          <a:xfrm>
-            <a:off x="313593" y="4536078"/>
-            <a:ext cx="2143858" cy="529698"/>
-          </a:xfrm>
-          <a:prstGeom prst="rect">
-            <a:avLst/>
-          </a:prstGeom>
-        </p:spPr>
-        <p:txBody>
-          <a:bodyPr/>
-          <a:lstStyle/>
-          <a:p>
-            <a:endParaRPr lang="en-US" dirty="0"/>
           </a:p>
         </p:txBody>
       </p:sp>
@@ -1179,6 +1235,39 @@
       </p:grpSpPr>
       <p:sp>
         <p:nvSpPr>
+          <p:cNvPr id="10" name="Picture Placeholder 13">
+            <a:extLst>
+              <a:ext uri="{FF2B5EF4-FFF2-40B4-BE49-F238E27FC236}">
+                <a16:creationId xmlns:a16="http://schemas.microsoft.com/office/drawing/2014/main" id="{6A0FA445-7602-F06E-EC73-5504EBF827CC}"/>
+              </a:ext>
+            </a:extLst>
+          </p:cNvPr>
+          <p:cNvSpPr>
+            <a:spLocks noGrp="1"/>
+          </p:cNvSpPr>
+          <p:nvPr>
+            <p:ph type="pic" sz="quarter" idx="14"/>
+          </p:nvPr>
+        </p:nvSpPr>
+        <p:spPr>
+          <a:xfrm>
+            <a:off x="313592" y="4536078"/>
+            <a:ext cx="2121877" cy="529698"/>
+          </a:xfrm>
+          <a:prstGeom prst="rect">
+            <a:avLst/>
+          </a:prstGeom>
+        </p:spPr>
+        <p:txBody>
+          <a:bodyPr/>
+          <a:lstStyle/>
+          <a:p>
+            <a:endParaRPr lang="en-US" dirty="0"/>
+          </a:p>
+        </p:txBody>
+      </p:sp>
+      <p:sp>
+        <p:nvSpPr>
           <p:cNvPr id="3" name="Shape 1">
             <a:extLst>
               <a:ext uri="{FF2B5EF4-FFF2-40B4-BE49-F238E27FC236}">
@@ -1268,39 +1357,6 @@
               <a:rPr lang="en-US" dirty="0"/>
               <a:t>Two Column Layout</a:t>
             </a:r>
-          </a:p>
-        </p:txBody>
-      </p:sp>
-      <p:sp>
-        <p:nvSpPr>
-          <p:cNvPr id="10" name="Picture Placeholder 13">
-            <a:extLst>
-              <a:ext uri="{FF2B5EF4-FFF2-40B4-BE49-F238E27FC236}">
-                <a16:creationId xmlns:a16="http://schemas.microsoft.com/office/drawing/2014/main" id="{6A0FA445-7602-F06E-EC73-5504EBF827CC}"/>
-              </a:ext>
-            </a:extLst>
-          </p:cNvPr>
-          <p:cNvSpPr>
-            <a:spLocks noGrp="1"/>
-          </p:cNvSpPr>
-          <p:nvPr>
-            <p:ph type="pic" sz="quarter" idx="14"/>
-          </p:nvPr>
-        </p:nvSpPr>
-        <p:spPr>
-          <a:xfrm>
-            <a:off x="313592" y="4536078"/>
-            <a:ext cx="2121877" cy="529698"/>
-          </a:xfrm>
-          <a:prstGeom prst="rect">
-            <a:avLst/>
-          </a:prstGeom>
-        </p:spPr>
-        <p:txBody>
-          <a:bodyPr/>
-          <a:lstStyle/>
-          <a:p>
-            <a:endParaRPr lang="en-US" dirty="0"/>
           </a:p>
         </p:txBody>
       </p:sp>
@@ -1548,6 +1604,39 @@
       </p:grpSpPr>
       <p:sp>
         <p:nvSpPr>
+          <p:cNvPr id="12" name="Picture Placeholder 13">
+            <a:extLst>
+              <a:ext uri="{FF2B5EF4-FFF2-40B4-BE49-F238E27FC236}">
+                <a16:creationId xmlns:a16="http://schemas.microsoft.com/office/drawing/2014/main" id="{2DB97592-C4D5-B315-7F11-AA14F6EE8A62}"/>
+              </a:ext>
+            </a:extLst>
+          </p:cNvPr>
+          <p:cNvSpPr>
+            <a:spLocks noGrp="1"/>
+          </p:cNvSpPr>
+          <p:nvPr>
+            <p:ph type="pic" sz="quarter" idx="13"/>
+          </p:nvPr>
+        </p:nvSpPr>
+        <p:spPr>
+          <a:xfrm>
+            <a:off x="313592" y="4536078"/>
+            <a:ext cx="2126273" cy="529698"/>
+          </a:xfrm>
+          <a:prstGeom prst="rect">
+            <a:avLst/>
+          </a:prstGeom>
+        </p:spPr>
+        <p:txBody>
+          <a:bodyPr/>
+          <a:lstStyle/>
+          <a:p>
+            <a:endParaRPr lang="en-US" dirty="0"/>
+          </a:p>
+        </p:txBody>
+      </p:sp>
+      <p:sp>
+        <p:nvSpPr>
           <p:cNvPr id="3" name="Shape 1">
             <a:extLst>
               <a:ext uri="{FF2B5EF4-FFF2-40B4-BE49-F238E27FC236}">
@@ -1663,39 +1752,6 @@
           </a:p>
           <a:p>
             <a:pPr lvl="0"/>
-            <a:endParaRPr lang="en-US" dirty="0"/>
-          </a:p>
-        </p:txBody>
-      </p:sp>
-      <p:sp>
-        <p:nvSpPr>
-          <p:cNvPr id="12" name="Picture Placeholder 13">
-            <a:extLst>
-              <a:ext uri="{FF2B5EF4-FFF2-40B4-BE49-F238E27FC236}">
-                <a16:creationId xmlns:a16="http://schemas.microsoft.com/office/drawing/2014/main" id="{2DB97592-C4D5-B315-7F11-AA14F6EE8A62}"/>
-              </a:ext>
-            </a:extLst>
-          </p:cNvPr>
-          <p:cNvSpPr>
-            <a:spLocks noGrp="1"/>
-          </p:cNvSpPr>
-          <p:nvPr>
-            <p:ph type="pic" sz="quarter" idx="13"/>
-          </p:nvPr>
-        </p:nvSpPr>
-        <p:spPr>
-          <a:xfrm>
-            <a:off x="313592" y="4536078"/>
-            <a:ext cx="2126273" cy="529698"/>
-          </a:xfrm>
-          <a:prstGeom prst="rect">
-            <a:avLst/>
-          </a:prstGeom>
-        </p:spPr>
-        <p:txBody>
-          <a:bodyPr/>
-          <a:lstStyle/>
-          <a:p>
             <a:endParaRPr lang="en-US" dirty="0"/>
           </a:p>
         </p:txBody>
@@ -1807,6 +1863,39 @@
       </p:grpSpPr>
       <p:sp>
         <p:nvSpPr>
+          <p:cNvPr id="10" name="Picture Placeholder 13">
+            <a:extLst>
+              <a:ext uri="{FF2B5EF4-FFF2-40B4-BE49-F238E27FC236}">
+                <a16:creationId xmlns:a16="http://schemas.microsoft.com/office/drawing/2014/main" id="{6A0FA445-7602-F06E-EC73-5504EBF827CC}"/>
+              </a:ext>
+            </a:extLst>
+          </p:cNvPr>
+          <p:cNvSpPr>
+            <a:spLocks noGrp="1"/>
+          </p:cNvSpPr>
+          <p:nvPr>
+            <p:ph type="pic" sz="quarter" idx="14"/>
+          </p:nvPr>
+        </p:nvSpPr>
+        <p:spPr>
+          <a:xfrm>
+            <a:off x="313592" y="4536078"/>
+            <a:ext cx="2130670" cy="529698"/>
+          </a:xfrm>
+          <a:prstGeom prst="rect">
+            <a:avLst/>
+          </a:prstGeom>
+        </p:spPr>
+        <p:txBody>
+          <a:bodyPr/>
+          <a:lstStyle/>
+          <a:p>
+            <a:endParaRPr lang="en-US" dirty="0"/>
+          </a:p>
+        </p:txBody>
+      </p:sp>
+      <p:sp>
+        <p:nvSpPr>
           <p:cNvPr id="3" name="Shape 1">
             <a:extLst>
               <a:ext uri="{FF2B5EF4-FFF2-40B4-BE49-F238E27FC236}">
@@ -1896,39 +1985,6 @@
               <a:rPr lang="en-US" dirty="0"/>
               <a:t>Visual Content</a:t>
             </a:r>
-          </a:p>
-        </p:txBody>
-      </p:sp>
-      <p:sp>
-        <p:nvSpPr>
-          <p:cNvPr id="10" name="Picture Placeholder 13">
-            <a:extLst>
-              <a:ext uri="{FF2B5EF4-FFF2-40B4-BE49-F238E27FC236}">
-                <a16:creationId xmlns:a16="http://schemas.microsoft.com/office/drawing/2014/main" id="{6A0FA445-7602-F06E-EC73-5504EBF827CC}"/>
-              </a:ext>
-            </a:extLst>
-          </p:cNvPr>
-          <p:cNvSpPr>
-            <a:spLocks noGrp="1"/>
-          </p:cNvSpPr>
-          <p:nvPr>
-            <p:ph type="pic" sz="quarter" idx="14"/>
-          </p:nvPr>
-        </p:nvSpPr>
-        <p:spPr>
-          <a:xfrm>
-            <a:off x="313592" y="4536078"/>
-            <a:ext cx="2130670" cy="529698"/>
-          </a:xfrm>
-          <a:prstGeom prst="rect">
-            <a:avLst/>
-          </a:prstGeom>
-        </p:spPr>
-        <p:txBody>
-          <a:bodyPr/>
-          <a:lstStyle/>
-          <a:p>
-            <a:endParaRPr lang="en-US" dirty="0"/>
           </a:p>
         </p:txBody>
       </p:sp>
@@ -2124,6 +2180,39 @@
       </p:grpSpPr>
       <p:sp>
         <p:nvSpPr>
+          <p:cNvPr id="10" name="Picture Placeholder 13">
+            <a:extLst>
+              <a:ext uri="{FF2B5EF4-FFF2-40B4-BE49-F238E27FC236}">
+                <a16:creationId xmlns:a16="http://schemas.microsoft.com/office/drawing/2014/main" id="{6A0FA445-7602-F06E-EC73-5504EBF827CC}"/>
+              </a:ext>
+            </a:extLst>
+          </p:cNvPr>
+          <p:cNvSpPr>
+            <a:spLocks noGrp="1"/>
+          </p:cNvSpPr>
+          <p:nvPr>
+            <p:ph type="pic" sz="quarter" idx="14"/>
+          </p:nvPr>
+        </p:nvSpPr>
+        <p:spPr>
+          <a:xfrm>
+            <a:off x="313592" y="4536078"/>
+            <a:ext cx="2104294" cy="529698"/>
+          </a:xfrm>
+          <a:prstGeom prst="rect">
+            <a:avLst/>
+          </a:prstGeom>
+        </p:spPr>
+        <p:txBody>
+          <a:bodyPr/>
+          <a:lstStyle/>
+          <a:p>
+            <a:endParaRPr lang="en-US" dirty="0"/>
+          </a:p>
+        </p:txBody>
+      </p:sp>
+      <p:sp>
+        <p:nvSpPr>
           <p:cNvPr id="3" name="Shape 1">
             <a:extLst>
               <a:ext uri="{FF2B5EF4-FFF2-40B4-BE49-F238E27FC236}">
@@ -2213,39 +2302,6 @@
               <a:rPr lang="en-US" dirty="0"/>
               <a:t>Data Visualization</a:t>
             </a:r>
-          </a:p>
-        </p:txBody>
-      </p:sp>
-      <p:sp>
-        <p:nvSpPr>
-          <p:cNvPr id="10" name="Picture Placeholder 13">
-            <a:extLst>
-              <a:ext uri="{FF2B5EF4-FFF2-40B4-BE49-F238E27FC236}">
-                <a16:creationId xmlns:a16="http://schemas.microsoft.com/office/drawing/2014/main" id="{6A0FA445-7602-F06E-EC73-5504EBF827CC}"/>
-              </a:ext>
-            </a:extLst>
-          </p:cNvPr>
-          <p:cNvSpPr>
-            <a:spLocks noGrp="1"/>
-          </p:cNvSpPr>
-          <p:nvPr>
-            <p:ph type="pic" sz="quarter" idx="14"/>
-          </p:nvPr>
-        </p:nvSpPr>
-        <p:spPr>
-          <a:xfrm>
-            <a:off x="313592" y="4536078"/>
-            <a:ext cx="2104294" cy="529698"/>
-          </a:xfrm>
-          <a:prstGeom prst="rect">
-            <a:avLst/>
-          </a:prstGeom>
-        </p:spPr>
-        <p:txBody>
-          <a:bodyPr/>
-          <a:lstStyle/>
-          <a:p>
-            <a:endParaRPr lang="en-US" dirty="0"/>
           </a:p>
         </p:txBody>
       </p:sp>
@@ -3214,6 +3270,18 @@
       <p:grpSpPr/>
       <p:sp>
         <p:nvSpPr>
+          <p:cNvPr id="2" name="Picture Placeholder 1"/>
+          <p:cNvSpPr>
+            <a:spLocks noGrp="1"/>
+          </p:cNvSpPr>
+          <p:nvPr>
+            <p:ph type="pic" idx="10" sz="quarter"/>
+          </p:nvPr>
+        </p:nvSpPr>
+        <p:spPr/>
+      </p:sp>
+      <p:sp>
+        <p:nvSpPr>
           <p:cNvPr id="3" name="Text Placeholder 2"/>
           <p:cNvSpPr>
             <a:spLocks noGrp="1"/>
@@ -3235,6 +3303,18 @@
       </p:sp>
       <p:sp>
         <p:nvSpPr>
+          <p:cNvPr id="4" name="Picture Placeholder 3"/>
+          <p:cNvSpPr>
+            <a:spLocks noGrp="1"/>
+          </p:cNvSpPr>
+          <p:nvPr>
+            <p:ph type="pic" idx="13" sz="quarter"/>
+          </p:nvPr>
+        </p:nvSpPr>
+        <p:spPr/>
+      </p:sp>
+      <p:sp>
+        <p:nvSpPr>
           <p:cNvPr id="5" name="Text Placeholder 4"/>
           <p:cNvSpPr>
             <a:spLocks noGrp="1"/>
@@ -3270,83 +3350,11 @@
           <a:lstStyle/>
           <a:p>
             <a:r>
-              <a:t>['Presenter Name'] | November 21, 2025</a:t>
-            </a:r>
-          </a:p>
-        </p:txBody>
-      </p:sp>
-      <p:pic>
-        <p:nvPicPr>
-          <p:cNvPr id="7" name="Picture 6" descr="client_logo.png"/>
-          <p:cNvPicPr>
-            <a:picLocks noChangeAspect="1"/>
-          </p:cNvPicPr>
-          <p:nvPr/>
-        </p:nvPicPr>
-        <p:blipFill>
-          <a:blip r:embed="rId2"/>
-          <a:stretch>
-            <a:fillRect/>
-          </a:stretch>
-        </p:blipFill>
-        <p:spPr>
-          <a:xfrm>
-            <a:off x="2180492" y="171206"/>
-            <a:ext cx="3978520" cy="1314694"/>
-          </a:xfrm>
-          <a:prstGeom prst="rect">
-            <a:avLst/>
-          </a:prstGeom>
-        </p:spPr>
-      </p:pic>
-      <p:pic>
-        <p:nvPicPr>
-          <p:cNvPr id="8" name="Picture 7" descr="consulting_company_logo.png"/>
-          <p:cNvPicPr>
-            <a:picLocks noChangeAspect="1"/>
-          </p:cNvPicPr>
-          <p:nvPr/>
-        </p:nvPicPr>
-        <p:blipFill>
-          <a:blip r:embed="rId3"/>
-          <a:stretch>
-            <a:fillRect/>
-          </a:stretch>
-        </p:blipFill>
-        <p:spPr>
-          <a:xfrm>
-            <a:off x="313591" y="4536078"/>
-            <a:ext cx="2099897" cy="529698"/>
-          </a:xfrm>
-          <a:prstGeom prst="rect">
-            <a:avLst/>
-          </a:prstGeom>
-        </p:spPr>
-      </p:pic>
-      <p:pic>
-        <p:nvPicPr>
-          <p:cNvPr id="9" name="Picture 8" descr="eo-framework-logo-real.png"/>
-          <p:cNvPicPr>
-            <a:picLocks noChangeAspect="1"/>
-          </p:cNvPicPr>
-          <p:nvPr/>
-        </p:nvPicPr>
-        <p:blipFill>
-          <a:blip r:embed="rId4"/>
-          <a:stretch>
-            <a:fillRect/>
-          </a:stretch>
-        </p:blipFill>
-        <p:spPr>
-          <a:xfrm>
-            <a:off x="6684264" y="4535424"/>
-            <a:ext cx="2139696" cy="530352"/>
-          </a:xfrm>
-          <a:prstGeom prst="rect">
-            <a:avLst/>
-          </a:prstGeom>
-        </p:spPr>
-      </p:pic>
+              <a:t>['Presenter Name'] | November 25, 2025</a:t>
+            </a:r>
+          </a:p>
+        </p:txBody>
+      </p:sp>
     </p:spTree>
   </p:cSld>
   <p:clrMapOvr>
@@ -3367,7 +3375,19 @@
       <p:grpSpPr/>
       <p:sp>
         <p:nvSpPr>
-          <p:cNvPr id="2" name="Text Placeholder 1"/>
+          <p:cNvPr id="2" name="Picture Placeholder 1"/>
+          <p:cNvSpPr>
+            <a:spLocks noGrp="1"/>
+          </p:cNvSpPr>
+          <p:nvPr>
+            <p:ph type="pic" idx="13" sz="quarter"/>
+          </p:nvPr>
+        </p:nvSpPr>
+        <p:spPr/>
+      </p:sp>
+      <p:sp>
+        <p:nvSpPr>
+          <p:cNvPr id="3" name="Text Placeholder 2"/>
           <p:cNvSpPr>
             <a:spLocks noGrp="1"/>
           </p:cNvSpPr>
@@ -3482,30 +3502,6 @@
           </a:p>
         </p:txBody>
       </p:sp>
-      <p:pic>
-        <p:nvPicPr>
-          <p:cNvPr id="6" name="Picture 5" descr="consulting_company_logo.png"/>
-          <p:cNvPicPr>
-            <a:picLocks noChangeAspect="1"/>
-          </p:cNvPicPr>
-          <p:nvPr/>
-        </p:nvPicPr>
-        <p:blipFill>
-          <a:blip r:embed="rId2"/>
-          <a:stretch>
-            <a:fillRect/>
-          </a:stretch>
-        </p:blipFill>
-        <p:spPr>
-          <a:xfrm>
-            <a:off x="313593" y="4536078"/>
-            <a:ext cx="2143858" cy="529698"/>
-          </a:xfrm>
-          <a:prstGeom prst="rect">
-            <a:avLst/>
-          </a:prstGeom>
-        </p:spPr>
-      </p:pic>
     </p:spTree>
   </p:cSld>
   <p:clrMapOvr>
@@ -3526,6 +3522,18 @@
       <p:grpSpPr/>
       <p:sp>
         <p:nvSpPr>
+          <p:cNvPr id="2" name="Picture Placeholder 1"/>
+          <p:cNvSpPr>
+            <a:spLocks noGrp="1"/>
+          </p:cNvSpPr>
+          <p:nvPr>
+            <p:ph type="pic" idx="10" sz="quarter"/>
+          </p:nvPr>
+        </p:nvSpPr>
+        <p:spPr/>
+      </p:sp>
+      <p:sp>
+        <p:nvSpPr>
           <p:cNvPr id="3" name="Text Placeholder 2"/>
           <p:cNvSpPr>
             <a:spLocks noGrp="1"/>
@@ -3544,6 +3552,18 @@
             </a:r>
           </a:p>
         </p:txBody>
+      </p:sp>
+      <p:sp>
+        <p:nvSpPr>
+          <p:cNvPr id="4" name="Picture Placeholder 3"/>
+          <p:cNvSpPr>
+            <a:spLocks noGrp="1"/>
+          </p:cNvSpPr>
+          <p:nvPr>
+            <p:ph type="pic" idx="13" sz="quarter"/>
+          </p:nvPr>
+        </p:nvSpPr>
+        <p:spPr/>
       </p:sp>
       <p:sp>
         <p:nvSpPr>
@@ -3579,78 +3599,6 @@
           <a:p/>
         </p:txBody>
       </p:sp>
-      <p:pic>
-        <p:nvPicPr>
-          <p:cNvPr id="7" name="Picture 6" descr="client_logo.png"/>
-          <p:cNvPicPr>
-            <a:picLocks noChangeAspect="1"/>
-          </p:cNvPicPr>
-          <p:nvPr/>
-        </p:nvPicPr>
-        <p:blipFill>
-          <a:blip r:embed="rId2"/>
-          <a:stretch>
-            <a:fillRect/>
-          </a:stretch>
-        </p:blipFill>
-        <p:spPr>
-          <a:xfrm>
-            <a:off x="2180492" y="171206"/>
-            <a:ext cx="3978520" cy="1314694"/>
-          </a:xfrm>
-          <a:prstGeom prst="rect">
-            <a:avLst/>
-          </a:prstGeom>
-        </p:spPr>
-      </p:pic>
-      <p:pic>
-        <p:nvPicPr>
-          <p:cNvPr id="8" name="Picture 7" descr="consulting_company_logo.png"/>
-          <p:cNvPicPr>
-            <a:picLocks noChangeAspect="1"/>
-          </p:cNvPicPr>
-          <p:nvPr/>
-        </p:nvPicPr>
-        <p:blipFill>
-          <a:blip r:embed="rId3"/>
-          <a:stretch>
-            <a:fillRect/>
-          </a:stretch>
-        </p:blipFill>
-        <p:spPr>
-          <a:xfrm>
-            <a:off x="313592" y="4536078"/>
-            <a:ext cx="2164114" cy="529698"/>
-          </a:xfrm>
-          <a:prstGeom prst="rect">
-            <a:avLst/>
-          </a:prstGeom>
-        </p:spPr>
-      </p:pic>
-      <p:pic>
-        <p:nvPicPr>
-          <p:cNvPr id="9" name="Picture 8" descr="eo-framework-logo-real.png"/>
-          <p:cNvPicPr>
-            <a:picLocks noChangeAspect="1"/>
-          </p:cNvPicPr>
-          <p:nvPr/>
-        </p:nvPicPr>
-        <p:blipFill>
-          <a:blip r:embed="rId4"/>
-          <a:stretch>
-            <a:fillRect/>
-          </a:stretch>
-        </p:blipFill>
-        <p:spPr>
-          <a:xfrm>
-            <a:off x="6684264" y="4535424"/>
-            <a:ext cx="2139696" cy="530352"/>
-          </a:xfrm>
-          <a:prstGeom prst="rect">
-            <a:avLst/>
-          </a:prstGeom>
-        </p:spPr>
-      </p:pic>
     </p:spTree>
   </p:cSld>
   <p:clrMapOvr>
@@ -3671,7 +3619,19 @@
       <p:grpSpPr/>
       <p:sp>
         <p:nvSpPr>
-          <p:cNvPr id="2" name="Text Placeholder 1"/>
+          <p:cNvPr id="2" name="Picture Placeholder 1"/>
+          <p:cNvSpPr>
+            <a:spLocks noGrp="1"/>
+          </p:cNvSpPr>
+          <p:nvPr>
+            <p:ph type="pic" idx="14" sz="quarter"/>
+          </p:nvPr>
+        </p:nvSpPr>
+        <p:spPr/>
+      </p:sp>
+      <p:sp>
+        <p:nvSpPr>
+          <p:cNvPr id="3" name="Text Placeholder 2"/>
           <p:cNvSpPr>
             <a:spLocks noGrp="1"/>
           </p:cNvSpPr>
@@ -3802,30 +3762,6 @@
           </a:p>
         </p:txBody>
       </p:sp>
-      <p:pic>
-        <p:nvPicPr>
-          <p:cNvPr id="7" name="Picture 6" descr="consulting_company_logo.png"/>
-          <p:cNvPicPr>
-            <a:picLocks noChangeAspect="1"/>
-          </p:cNvPicPr>
-          <p:nvPr/>
-        </p:nvPicPr>
-        <p:blipFill>
-          <a:blip r:embed="rId2"/>
-          <a:stretch>
-            <a:fillRect/>
-          </a:stretch>
-        </p:blipFill>
-        <p:spPr>
-          <a:xfrm>
-            <a:off x="313592" y="4536078"/>
-            <a:ext cx="2121877" cy="529698"/>
-          </a:xfrm>
-          <a:prstGeom prst="rect">
-            <a:avLst/>
-          </a:prstGeom>
-        </p:spPr>
-      </p:pic>
     </p:spTree>
   </p:cSld>
   <p:clrMapOvr>
@@ -3846,7 +3782,19 @@
       <p:grpSpPr/>
       <p:sp>
         <p:nvSpPr>
-          <p:cNvPr id="2" name="Text Placeholder 1"/>
+          <p:cNvPr id="2" name="Picture Placeholder 1"/>
+          <p:cNvSpPr>
+            <a:spLocks noGrp="1"/>
+          </p:cNvSpPr>
+          <p:nvPr>
+            <p:ph type="pic" idx="13" sz="quarter"/>
+          </p:nvPr>
+        </p:nvSpPr>
+        <p:spPr/>
+      </p:sp>
+      <p:sp>
+        <p:nvSpPr>
+          <p:cNvPr id="3" name="Text Placeholder 2"/>
           <p:cNvSpPr>
             <a:spLocks noGrp="1"/>
           </p:cNvSpPr>
@@ -4670,30 +4618,6 @@
           </a:p>
         </p:txBody>
       </p:sp>
-      <p:pic>
-        <p:nvPicPr>
-          <p:cNvPr id="6" name="Picture 5" descr="consulting_company_logo.png"/>
-          <p:cNvPicPr>
-            <a:picLocks noChangeAspect="1"/>
-          </p:cNvPicPr>
-          <p:nvPr/>
-        </p:nvPicPr>
-        <p:blipFill>
-          <a:blip r:embed="rId2"/>
-          <a:stretch>
-            <a:fillRect/>
-          </a:stretch>
-        </p:blipFill>
-        <p:spPr>
-          <a:xfrm>
-            <a:off x="313592" y="4536078"/>
-            <a:ext cx="2126273" cy="529698"/>
-          </a:xfrm>
-          <a:prstGeom prst="rect">
-            <a:avLst/>
-          </a:prstGeom>
-        </p:spPr>
-      </p:pic>
     </p:spTree>
   </p:cSld>
   <p:clrMapOvr>
@@ -4714,7 +4638,19 @@
       <p:grpSpPr/>
       <p:sp>
         <p:nvSpPr>
-          <p:cNvPr id="2" name="Text Placeholder 1"/>
+          <p:cNvPr id="2" name="Picture Placeholder 1"/>
+          <p:cNvSpPr>
+            <a:spLocks noGrp="1"/>
+          </p:cNvSpPr>
+          <p:nvPr>
+            <p:ph type="pic" idx="14" sz="quarter"/>
+          </p:nvPr>
+        </p:nvSpPr>
+        <p:spPr/>
+      </p:sp>
+      <p:sp>
+        <p:nvSpPr>
+          <p:cNvPr id="3" name="Text Placeholder 2"/>
           <p:cNvSpPr>
             <a:spLocks noGrp="1"/>
           </p:cNvSpPr>
@@ -4865,30 +4801,6 @@
           </a:ln>
         </p:spPr>
       </p:pic>
-      <p:pic>
-        <p:nvPicPr>
-          <p:cNvPr id="8" name="Picture 7" descr="consulting_company_logo.png"/>
-          <p:cNvPicPr>
-            <a:picLocks noChangeAspect="1"/>
-          </p:cNvPicPr>
-          <p:nvPr/>
-        </p:nvPicPr>
-        <p:blipFill>
-          <a:blip r:embed="rId3"/>
-          <a:stretch>
-            <a:fillRect/>
-          </a:stretch>
-        </p:blipFill>
-        <p:spPr>
-          <a:xfrm>
-            <a:off x="313592" y="4536078"/>
-            <a:ext cx="2130670" cy="529698"/>
-          </a:xfrm>
-          <a:prstGeom prst="rect">
-            <a:avLst/>
-          </a:prstGeom>
-        </p:spPr>
-      </p:pic>
     </p:spTree>
   </p:cSld>
   <p:clrMapOvr>
@@ -4909,7 +4821,19 @@
       <p:grpSpPr/>
       <p:sp>
         <p:nvSpPr>
-          <p:cNvPr id="2" name="Text Placeholder 1"/>
+          <p:cNvPr id="2" name="Picture Placeholder 1"/>
+          <p:cNvSpPr>
+            <a:spLocks noGrp="1"/>
+          </p:cNvSpPr>
+          <p:nvPr>
+            <p:ph type="pic" idx="13" sz="quarter"/>
+          </p:nvPr>
+        </p:nvSpPr>
+        <p:spPr/>
+      </p:sp>
+      <p:sp>
+        <p:nvSpPr>
+          <p:cNvPr id="3" name="Text Placeholder 2"/>
           <p:cNvSpPr>
             <a:spLocks noGrp="1"/>
           </p:cNvSpPr>
@@ -5049,30 +4973,6 @@
           </a:p>
         </p:txBody>
       </p:sp>
-      <p:pic>
-        <p:nvPicPr>
-          <p:cNvPr id="6" name="Picture 5" descr="consulting_company_logo.png"/>
-          <p:cNvPicPr>
-            <a:picLocks noChangeAspect="1"/>
-          </p:cNvPicPr>
-          <p:nvPr/>
-        </p:nvPicPr>
-        <p:blipFill>
-          <a:blip r:embed="rId2"/>
-          <a:stretch>
-            <a:fillRect/>
-          </a:stretch>
-        </p:blipFill>
-        <p:spPr>
-          <a:xfrm>
-            <a:off x="313593" y="4536078"/>
-            <a:ext cx="2143858" cy="529698"/>
-          </a:xfrm>
-          <a:prstGeom prst="rect">
-            <a:avLst/>
-          </a:prstGeom>
-        </p:spPr>
-      </p:pic>
     </p:spTree>
   </p:cSld>
   <p:clrMapOvr>
@@ -5093,7 +4993,19 @@
       <p:grpSpPr/>
       <p:sp>
         <p:nvSpPr>
-          <p:cNvPr id="2" name="Text Placeholder 1"/>
+          <p:cNvPr id="2" name="Picture Placeholder 1"/>
+          <p:cNvSpPr>
+            <a:spLocks noGrp="1"/>
+          </p:cNvSpPr>
+          <p:nvPr>
+            <p:ph type="pic" idx="13" sz="quarter"/>
+          </p:nvPr>
+        </p:nvSpPr>
+        <p:spPr/>
+      </p:sp>
+      <p:sp>
+        <p:nvSpPr>
+          <p:cNvPr id="3" name="Text Placeholder 2"/>
           <p:cNvSpPr>
             <a:spLocks noGrp="1"/>
           </p:cNvSpPr>
@@ -5468,30 +5380,6 @@
           </a:p>
         </p:txBody>
       </p:sp>
-      <p:pic>
-        <p:nvPicPr>
-          <p:cNvPr id="6" name="Picture 5" descr="consulting_company_logo.png"/>
-          <p:cNvPicPr>
-            <a:picLocks noChangeAspect="1"/>
-          </p:cNvPicPr>
-          <p:nvPr/>
-        </p:nvPicPr>
-        <p:blipFill>
-          <a:blip r:embed="rId2"/>
-          <a:stretch>
-            <a:fillRect/>
-          </a:stretch>
-        </p:blipFill>
-        <p:spPr>
-          <a:xfrm>
-            <a:off x="313592" y="4536078"/>
-            <a:ext cx="2126273" cy="529698"/>
-          </a:xfrm>
-          <a:prstGeom prst="rect">
-            <a:avLst/>
-          </a:prstGeom>
-        </p:spPr>
-      </p:pic>
     </p:spTree>
   </p:cSld>
   <p:clrMapOvr>
@@ -5512,7 +5400,19 @@
       <p:grpSpPr/>
       <p:sp>
         <p:nvSpPr>
-          <p:cNvPr id="2" name="Text Placeholder 1"/>
+          <p:cNvPr id="2" name="Picture Placeholder 1"/>
+          <p:cNvSpPr>
+            <a:spLocks noGrp="1"/>
+          </p:cNvSpPr>
+          <p:nvPr>
+            <p:ph type="pic" idx="13" sz="quarter"/>
+          </p:nvPr>
+        </p:nvSpPr>
+        <p:spPr/>
+      </p:sp>
+      <p:sp>
+        <p:nvSpPr>
+          <p:cNvPr id="3" name="Text Placeholder 2"/>
           <p:cNvSpPr>
             <a:spLocks noGrp="1"/>
           </p:cNvSpPr>
@@ -5641,30 +5541,6 @@
           </a:p>
         </p:txBody>
       </p:sp>
-      <p:pic>
-        <p:nvPicPr>
-          <p:cNvPr id="6" name="Picture 5" descr="consulting_company_logo.png"/>
-          <p:cNvPicPr>
-            <a:picLocks noChangeAspect="1"/>
-          </p:cNvPicPr>
-          <p:nvPr/>
-        </p:nvPicPr>
-        <p:blipFill>
-          <a:blip r:embed="rId2"/>
-          <a:stretch>
-            <a:fillRect/>
-          </a:stretch>
-        </p:blipFill>
-        <p:spPr>
-          <a:xfrm>
-            <a:off x="313593" y="4536078"/>
-            <a:ext cx="2143858" cy="529698"/>
-          </a:xfrm>
-          <a:prstGeom prst="rect">
-            <a:avLst/>
-          </a:prstGeom>
-        </p:spPr>
-      </p:pic>
     </p:spTree>
   </p:cSld>
   <p:clrMapOvr>
@@ -5685,7 +5561,19 @@
       <p:grpSpPr/>
       <p:sp>
         <p:nvSpPr>
-          <p:cNvPr id="2" name="Text Placeholder 1"/>
+          <p:cNvPr id="2" name="Picture Placeholder 1"/>
+          <p:cNvSpPr>
+            <a:spLocks noGrp="1"/>
+          </p:cNvSpPr>
+          <p:nvPr>
+            <p:ph type="pic" idx="14" sz="quarter"/>
+          </p:nvPr>
+        </p:nvSpPr>
+        <p:spPr/>
+      </p:sp>
+      <p:sp>
+        <p:nvSpPr>
+          <p:cNvPr id="3" name="Text Placeholder 2"/>
           <p:cNvSpPr>
             <a:spLocks noGrp="1"/>
           </p:cNvSpPr>
@@ -5828,30 +5716,6 @@
           </a:p>
         </p:txBody>
       </p:sp>
-      <p:pic>
-        <p:nvPicPr>
-          <p:cNvPr id="7" name="Picture 6" descr="consulting_company_logo.png"/>
-          <p:cNvPicPr>
-            <a:picLocks noChangeAspect="1"/>
-          </p:cNvPicPr>
-          <p:nvPr/>
-        </p:nvPicPr>
-        <p:blipFill>
-          <a:blip r:embed="rId2"/>
-          <a:stretch>
-            <a:fillRect/>
-          </a:stretch>
-        </p:blipFill>
-        <p:spPr>
-          <a:xfrm>
-            <a:off x="313592" y="4536078"/>
-            <a:ext cx="2121877" cy="529698"/>
-          </a:xfrm>
-          <a:prstGeom prst="rect">
-            <a:avLst/>
-          </a:prstGeom>
-        </p:spPr>
-      </p:pic>
     </p:spTree>
   </p:cSld>
   <p:clrMapOvr>
@@ -5872,7 +5736,19 @@
       <p:grpSpPr/>
       <p:sp>
         <p:nvSpPr>
-          <p:cNvPr id="2" name="Text Placeholder 1"/>
+          <p:cNvPr id="2" name="Picture Placeholder 1"/>
+          <p:cNvSpPr>
+            <a:spLocks noGrp="1"/>
+          </p:cNvSpPr>
+          <p:nvPr>
+            <p:ph type="pic" idx="13" sz="quarter"/>
+          </p:nvPr>
+        </p:nvSpPr>
+        <p:spPr/>
+      </p:sp>
+      <p:sp>
+        <p:nvSpPr>
+          <p:cNvPr id="3" name="Text Placeholder 2"/>
           <p:cNvSpPr>
             <a:spLocks noGrp="1"/>
           </p:cNvSpPr>
@@ -6199,7 +6075,7 @@
                     <a:p>
                       <a:r>
                         <a:rPr sz="1100"/>
-                        <a:t>Cloud Infrastructure</a:t>
+                        <a:t>Cloud Services</a:t>
                       </a:r>
                     </a:p>
                   </a:txBody>
@@ -6708,30 +6584,6 @@
           </a:p>
         </p:txBody>
       </p:sp>
-      <p:pic>
-        <p:nvPicPr>
-          <p:cNvPr id="6" name="Picture 5" descr="consulting_company_logo.png"/>
-          <p:cNvPicPr>
-            <a:picLocks noChangeAspect="1"/>
-          </p:cNvPicPr>
-          <p:nvPr/>
-        </p:nvPicPr>
-        <p:blipFill>
-          <a:blip r:embed="rId2"/>
-          <a:stretch>
-            <a:fillRect/>
-          </a:stretch>
-        </p:blipFill>
-        <p:spPr>
-          <a:xfrm>
-            <a:off x="313592" y="4536078"/>
-            <a:ext cx="2126273" cy="529698"/>
-          </a:xfrm>
-          <a:prstGeom prst="rect">
-            <a:avLst/>
-          </a:prstGeom>
-        </p:spPr>
-      </p:pic>
     </p:spTree>
   </p:cSld>
   <p:clrMapOvr>

</xml_diff>